<commit_message>
Presentazione in costruzione: intro
</commit_message>
<xml_diff>
--- a/Presentazione_progetto.pptx
+++ b/Presentazione_progetto.pptx
@@ -4,9 +4,14 @@
   <p:sldMasterIdLst>
     <p:sldMasterId id="2147483672" r:id="rId1"/>
   </p:sldMasterIdLst>
+  <p:notesMasterIdLst>
+    <p:notesMasterId r:id="rId6"/>
+  </p:notesMasterIdLst>
   <p:sldIdLst>
     <p:sldId id="256" r:id="rId2"/>
     <p:sldId id="257" r:id="rId3"/>
+    <p:sldId id="258" r:id="rId4"/>
+    <p:sldId id="259" r:id="rId5"/>
   </p:sldIdLst>
   <p:sldSz cx="12192000" cy="6858000"/>
   <p:notesSz cx="6858000" cy="9144000"/>
@@ -105,7 +110,602 @@
       </a:defRPr>
     </a:lvl9pPr>
   </p:defaultTextStyle>
+  <p:extLst>
+    <p:ext uri="{EFAFB233-063F-42B5-8137-9DF3F51BA10A}">
+      <p15:sldGuideLst xmlns:p15="http://schemas.microsoft.com/office/powerpoint/2012/main"/>
+    </p:ext>
+  </p:extLst>
 </p:presentation>
+</file>
+
+<file path=ppt/notesMasters/notesMaster1.xml><?xml version="1.0" encoding="utf-8"?>
+<p:notesMaster xmlns:a="http://schemas.openxmlformats.org/drawingml/2006/main" xmlns:r="http://schemas.openxmlformats.org/officeDocument/2006/relationships" xmlns:p="http://schemas.openxmlformats.org/presentationml/2006/main">
+  <p:cSld>
+    <p:bg>
+      <p:bgRef idx="1001">
+        <a:schemeClr val="bg1"/>
+      </p:bgRef>
+    </p:bg>
+    <p:spTree>
+      <p:nvGrpSpPr>
+        <p:cNvPr id="1" name=""/>
+        <p:cNvGrpSpPr/>
+        <p:nvPr/>
+      </p:nvGrpSpPr>
+      <p:grpSpPr>
+        <a:xfrm>
+          <a:off x="0" y="0"/>
+          <a:ext cx="0" cy="0"/>
+          <a:chOff x="0" y="0"/>
+          <a:chExt cx="0" cy="0"/>
+        </a:xfrm>
+      </p:grpSpPr>
+      <p:sp>
+        <p:nvSpPr>
+          <p:cNvPr id="2" name="Segnaposto intestazione 1"/>
+          <p:cNvSpPr>
+            <a:spLocks noGrp="1"/>
+          </p:cNvSpPr>
+          <p:nvPr>
+            <p:ph type="hdr" sz="quarter"/>
+          </p:nvPr>
+        </p:nvSpPr>
+        <p:spPr>
+          <a:xfrm>
+            <a:off x="0" y="0"/>
+            <a:ext cx="2971800" cy="458788"/>
+          </a:xfrm>
+          <a:prstGeom prst="rect">
+            <a:avLst/>
+          </a:prstGeom>
+        </p:spPr>
+        <p:txBody>
+          <a:bodyPr vert="horz" lIns="91440" tIns="45720" rIns="91440" bIns="45720" rtlCol="0"/>
+          <a:lstStyle>
+            <a:lvl1pPr algn="l">
+              <a:defRPr sz="1200"/>
+            </a:lvl1pPr>
+          </a:lstStyle>
+          <a:p>
+            <a:endParaRPr lang="it-IT"/>
+          </a:p>
+        </p:txBody>
+      </p:sp>
+      <p:sp>
+        <p:nvSpPr>
+          <p:cNvPr id="3" name="Segnaposto data 2"/>
+          <p:cNvSpPr>
+            <a:spLocks noGrp="1"/>
+          </p:cNvSpPr>
+          <p:nvPr>
+            <p:ph type="dt" idx="1"/>
+          </p:nvPr>
+        </p:nvSpPr>
+        <p:spPr>
+          <a:xfrm>
+            <a:off x="3884613" y="0"/>
+            <a:ext cx="2971800" cy="458788"/>
+          </a:xfrm>
+          <a:prstGeom prst="rect">
+            <a:avLst/>
+          </a:prstGeom>
+        </p:spPr>
+        <p:txBody>
+          <a:bodyPr vert="horz" lIns="91440" tIns="45720" rIns="91440" bIns="45720" rtlCol="0"/>
+          <a:lstStyle>
+            <a:lvl1pPr algn="r">
+              <a:defRPr sz="1200"/>
+            </a:lvl1pPr>
+          </a:lstStyle>
+          <a:p>
+            <a:fld id="{5D86E91A-6C9D-48EA-9EAF-BBA9F3961CF9}" type="datetimeFigureOut">
+              <a:rPr lang="it-IT" smtClean="0"/>
+              <a:t>14/03/2022</a:t>
+            </a:fld>
+            <a:endParaRPr lang="it-IT"/>
+          </a:p>
+        </p:txBody>
+      </p:sp>
+      <p:sp>
+        <p:nvSpPr>
+          <p:cNvPr id="4" name="Segnaposto immagine diapositiva 3"/>
+          <p:cNvSpPr>
+            <a:spLocks noGrp="1" noRot="1" noChangeAspect="1"/>
+          </p:cNvSpPr>
+          <p:nvPr>
+            <p:ph type="sldImg" idx="2"/>
+          </p:nvPr>
+        </p:nvSpPr>
+        <p:spPr>
+          <a:xfrm>
+            <a:off x="685800" y="1143000"/>
+            <a:ext cx="5486400" cy="3086100"/>
+          </a:xfrm>
+          <a:prstGeom prst="rect">
+            <a:avLst/>
+          </a:prstGeom>
+          <a:noFill/>
+          <a:ln w="12700">
+            <a:solidFill>
+              <a:prstClr val="black"/>
+            </a:solidFill>
+          </a:ln>
+        </p:spPr>
+        <p:txBody>
+          <a:bodyPr vert="horz" lIns="91440" tIns="45720" rIns="91440" bIns="45720" rtlCol="0" anchor="ctr"/>
+          <a:lstStyle/>
+          <a:p>
+            <a:endParaRPr lang="it-IT"/>
+          </a:p>
+        </p:txBody>
+      </p:sp>
+      <p:sp>
+        <p:nvSpPr>
+          <p:cNvPr id="5" name="Segnaposto note 4"/>
+          <p:cNvSpPr>
+            <a:spLocks noGrp="1"/>
+          </p:cNvSpPr>
+          <p:nvPr>
+            <p:ph type="body" sz="quarter" idx="3"/>
+          </p:nvPr>
+        </p:nvSpPr>
+        <p:spPr>
+          <a:xfrm>
+            <a:off x="685800" y="4400550"/>
+            <a:ext cx="5486400" cy="3600450"/>
+          </a:xfrm>
+          <a:prstGeom prst="rect">
+            <a:avLst/>
+          </a:prstGeom>
+        </p:spPr>
+        <p:txBody>
+          <a:bodyPr vert="horz" lIns="91440" tIns="45720" rIns="91440" bIns="45720" rtlCol="0"/>
+          <a:lstStyle/>
+          <a:p>
+            <a:pPr lvl="0"/>
+            <a:r>
+              <a:rPr lang="it-IT"/>
+              <a:t>Fare clic per modificare gli stili del testo dello schema</a:t>
+            </a:r>
+          </a:p>
+          <a:p>
+            <a:pPr lvl="1"/>
+            <a:r>
+              <a:rPr lang="it-IT"/>
+              <a:t>Secondo livello</a:t>
+            </a:r>
+          </a:p>
+          <a:p>
+            <a:pPr lvl="2"/>
+            <a:r>
+              <a:rPr lang="it-IT"/>
+              <a:t>Terzo livello</a:t>
+            </a:r>
+          </a:p>
+          <a:p>
+            <a:pPr lvl="3"/>
+            <a:r>
+              <a:rPr lang="it-IT"/>
+              <a:t>Quarto livello</a:t>
+            </a:r>
+          </a:p>
+          <a:p>
+            <a:pPr lvl="4"/>
+            <a:r>
+              <a:rPr lang="it-IT"/>
+              <a:t>Quinto livello</a:t>
+            </a:r>
+          </a:p>
+        </p:txBody>
+      </p:sp>
+      <p:sp>
+        <p:nvSpPr>
+          <p:cNvPr id="6" name="Segnaposto piè di pagina 5"/>
+          <p:cNvSpPr>
+            <a:spLocks noGrp="1"/>
+          </p:cNvSpPr>
+          <p:nvPr>
+            <p:ph type="ftr" sz="quarter" idx="4"/>
+          </p:nvPr>
+        </p:nvSpPr>
+        <p:spPr>
+          <a:xfrm>
+            <a:off x="0" y="8685213"/>
+            <a:ext cx="2971800" cy="458787"/>
+          </a:xfrm>
+          <a:prstGeom prst="rect">
+            <a:avLst/>
+          </a:prstGeom>
+        </p:spPr>
+        <p:txBody>
+          <a:bodyPr vert="horz" lIns="91440" tIns="45720" rIns="91440" bIns="45720" rtlCol="0" anchor="b"/>
+          <a:lstStyle>
+            <a:lvl1pPr algn="l">
+              <a:defRPr sz="1200"/>
+            </a:lvl1pPr>
+          </a:lstStyle>
+          <a:p>
+            <a:endParaRPr lang="it-IT"/>
+          </a:p>
+        </p:txBody>
+      </p:sp>
+      <p:sp>
+        <p:nvSpPr>
+          <p:cNvPr id="7" name="Segnaposto numero diapositiva 6"/>
+          <p:cNvSpPr>
+            <a:spLocks noGrp="1"/>
+          </p:cNvSpPr>
+          <p:nvPr>
+            <p:ph type="sldNum" sz="quarter" idx="5"/>
+          </p:nvPr>
+        </p:nvSpPr>
+        <p:spPr>
+          <a:xfrm>
+            <a:off x="3884613" y="8685213"/>
+            <a:ext cx="2971800" cy="458787"/>
+          </a:xfrm>
+          <a:prstGeom prst="rect">
+            <a:avLst/>
+          </a:prstGeom>
+        </p:spPr>
+        <p:txBody>
+          <a:bodyPr vert="horz" lIns="91440" tIns="45720" rIns="91440" bIns="45720" rtlCol="0" anchor="b"/>
+          <a:lstStyle>
+            <a:lvl1pPr algn="r">
+              <a:defRPr sz="1200"/>
+            </a:lvl1pPr>
+          </a:lstStyle>
+          <a:p>
+            <a:fld id="{7B9EF5EE-42ED-4142-B01A-B637985E9B70}" type="slidenum">
+              <a:rPr lang="it-IT" smtClean="0"/>
+              <a:t>‹N›</a:t>
+            </a:fld>
+            <a:endParaRPr lang="it-IT"/>
+          </a:p>
+        </p:txBody>
+      </p:sp>
+    </p:spTree>
+    <p:extLst>
+      <p:ext uri="{BB962C8B-B14F-4D97-AF65-F5344CB8AC3E}">
+        <p14:creationId xmlns:p14="http://schemas.microsoft.com/office/powerpoint/2010/main" val="3793254147"/>
+      </p:ext>
+    </p:extLst>
+  </p:cSld>
+  <p:clrMap bg1="lt1" tx1="dk1" bg2="lt2" tx2="dk2" accent1="accent1" accent2="accent2" accent3="accent3" accent4="accent4" accent5="accent5" accent6="accent6" hlink="hlink" folHlink="folHlink"/>
+  <p:notesStyle>
+    <a:lvl1pPr marL="0" algn="l" defTabSz="914400" rtl="0" eaLnBrk="1" latinLnBrk="0" hangingPunct="1">
+      <a:defRPr sz="1200" kern="1200">
+        <a:solidFill>
+          <a:schemeClr val="tx1"/>
+        </a:solidFill>
+        <a:latin typeface="+mn-lt"/>
+        <a:ea typeface="+mn-ea"/>
+        <a:cs typeface="+mn-cs"/>
+      </a:defRPr>
+    </a:lvl1pPr>
+    <a:lvl2pPr marL="457200" algn="l" defTabSz="914400" rtl="0" eaLnBrk="1" latinLnBrk="0" hangingPunct="1">
+      <a:defRPr sz="1200" kern="1200">
+        <a:solidFill>
+          <a:schemeClr val="tx1"/>
+        </a:solidFill>
+        <a:latin typeface="+mn-lt"/>
+        <a:ea typeface="+mn-ea"/>
+        <a:cs typeface="+mn-cs"/>
+      </a:defRPr>
+    </a:lvl2pPr>
+    <a:lvl3pPr marL="914400" algn="l" defTabSz="914400" rtl="0" eaLnBrk="1" latinLnBrk="0" hangingPunct="1">
+      <a:defRPr sz="1200" kern="1200">
+        <a:solidFill>
+          <a:schemeClr val="tx1"/>
+        </a:solidFill>
+        <a:latin typeface="+mn-lt"/>
+        <a:ea typeface="+mn-ea"/>
+        <a:cs typeface="+mn-cs"/>
+      </a:defRPr>
+    </a:lvl3pPr>
+    <a:lvl4pPr marL="1371600" algn="l" defTabSz="914400" rtl="0" eaLnBrk="1" latinLnBrk="0" hangingPunct="1">
+      <a:defRPr sz="1200" kern="1200">
+        <a:solidFill>
+          <a:schemeClr val="tx1"/>
+        </a:solidFill>
+        <a:latin typeface="+mn-lt"/>
+        <a:ea typeface="+mn-ea"/>
+        <a:cs typeface="+mn-cs"/>
+      </a:defRPr>
+    </a:lvl4pPr>
+    <a:lvl5pPr marL="1828800" algn="l" defTabSz="914400" rtl="0" eaLnBrk="1" latinLnBrk="0" hangingPunct="1">
+      <a:defRPr sz="1200" kern="1200">
+        <a:solidFill>
+          <a:schemeClr val="tx1"/>
+        </a:solidFill>
+        <a:latin typeface="+mn-lt"/>
+        <a:ea typeface="+mn-ea"/>
+        <a:cs typeface="+mn-cs"/>
+      </a:defRPr>
+    </a:lvl5pPr>
+    <a:lvl6pPr marL="2286000" algn="l" defTabSz="914400" rtl="0" eaLnBrk="1" latinLnBrk="0" hangingPunct="1">
+      <a:defRPr sz="1200" kern="1200">
+        <a:solidFill>
+          <a:schemeClr val="tx1"/>
+        </a:solidFill>
+        <a:latin typeface="+mn-lt"/>
+        <a:ea typeface="+mn-ea"/>
+        <a:cs typeface="+mn-cs"/>
+      </a:defRPr>
+    </a:lvl6pPr>
+    <a:lvl7pPr marL="2743200" algn="l" defTabSz="914400" rtl="0" eaLnBrk="1" latinLnBrk="0" hangingPunct="1">
+      <a:defRPr sz="1200" kern="1200">
+        <a:solidFill>
+          <a:schemeClr val="tx1"/>
+        </a:solidFill>
+        <a:latin typeface="+mn-lt"/>
+        <a:ea typeface="+mn-ea"/>
+        <a:cs typeface="+mn-cs"/>
+      </a:defRPr>
+    </a:lvl7pPr>
+    <a:lvl8pPr marL="3200400" algn="l" defTabSz="914400" rtl="0" eaLnBrk="1" latinLnBrk="0" hangingPunct="1">
+      <a:defRPr sz="1200" kern="1200">
+        <a:solidFill>
+          <a:schemeClr val="tx1"/>
+        </a:solidFill>
+        <a:latin typeface="+mn-lt"/>
+        <a:ea typeface="+mn-ea"/>
+        <a:cs typeface="+mn-cs"/>
+      </a:defRPr>
+    </a:lvl8pPr>
+    <a:lvl9pPr marL="3657600" algn="l" defTabSz="914400" rtl="0" eaLnBrk="1" latinLnBrk="0" hangingPunct="1">
+      <a:defRPr sz="1200" kern="1200">
+        <a:solidFill>
+          <a:schemeClr val="tx1"/>
+        </a:solidFill>
+        <a:latin typeface="+mn-lt"/>
+        <a:ea typeface="+mn-ea"/>
+        <a:cs typeface="+mn-cs"/>
+      </a:defRPr>
+    </a:lvl9pPr>
+  </p:notesStyle>
+</p:notesMaster>
+</file>
+
+<file path=ppt/notesSlides/notesSlide1.xml><?xml version="1.0" encoding="utf-8"?>
+<p:notes xmlns:a="http://schemas.openxmlformats.org/drawingml/2006/main" xmlns:r="http://schemas.openxmlformats.org/officeDocument/2006/relationships" xmlns:p="http://schemas.openxmlformats.org/presentationml/2006/main">
+  <p:cSld>
+    <p:spTree>
+      <p:nvGrpSpPr>
+        <p:cNvPr id="1" name=""/>
+        <p:cNvGrpSpPr/>
+        <p:nvPr/>
+      </p:nvGrpSpPr>
+      <p:grpSpPr>
+        <a:xfrm>
+          <a:off x="0" y="0"/>
+          <a:ext cx="0" cy="0"/>
+          <a:chOff x="0" y="0"/>
+          <a:chExt cx="0" cy="0"/>
+        </a:xfrm>
+      </p:grpSpPr>
+      <p:sp>
+        <p:nvSpPr>
+          <p:cNvPr id="2" name="Segnaposto immagine diapositiva 1"/>
+          <p:cNvSpPr>
+            <a:spLocks noGrp="1" noRot="1" noChangeAspect="1"/>
+          </p:cNvSpPr>
+          <p:nvPr>
+            <p:ph type="sldImg"/>
+          </p:nvPr>
+        </p:nvSpPr>
+        <p:spPr/>
+      </p:sp>
+      <p:sp>
+        <p:nvSpPr>
+          <p:cNvPr id="3" name="Segnaposto note 2"/>
+          <p:cNvSpPr>
+            <a:spLocks noGrp="1"/>
+          </p:cNvSpPr>
+          <p:nvPr>
+            <p:ph type="body" idx="1"/>
+          </p:nvPr>
+        </p:nvSpPr>
+        <p:spPr/>
+        <p:txBody>
+          <a:bodyPr/>
+          <a:lstStyle/>
+          <a:p>
+            <a:pPr marL="0" marR="0" lvl="0" indent="0" algn="l" defTabSz="914400" rtl="0" eaLnBrk="1" fontAlgn="auto" latinLnBrk="0" hangingPunct="1">
+              <a:lnSpc>
+                <a:spcPct val="100000"/>
+              </a:lnSpc>
+              <a:spcBef>
+                <a:spcPts val="0"/>
+              </a:spcBef>
+              <a:spcAft>
+                <a:spcPts val="0"/>
+              </a:spcAft>
+              <a:buClrTx/>
+              <a:buSzTx/>
+              <a:buFontTx/>
+              <a:buNone/>
+              <a:tabLst/>
+              <a:defRPr/>
+            </a:pPr>
+            <a:r>
+              <a:rPr lang="en-US" b="1" dirty="0"/>
+              <a:t>MongoDB</a:t>
+            </a:r>
+            <a:r>
+              <a:rPr lang="en-US" dirty="0"/>
+              <a:t> is a document-oriented NoSQL database used for high volume data storage. Instead of using tables and rows as in the traditional relational databases, MongoDB makes use of collections and documents. Documents consist of key-value pairs which are the basic unit of data in MongoDB. Collections contain sets of documents and function which is the equivalent of relational database tables. MongoDB is a database which came into light around the mid-2000s.</a:t>
+            </a:r>
+            <a:endParaRPr lang="it-IT" dirty="0"/>
+          </a:p>
+          <a:p>
+            <a:endParaRPr lang="it-IT" dirty="0"/>
+          </a:p>
+        </p:txBody>
+      </p:sp>
+      <p:sp>
+        <p:nvSpPr>
+          <p:cNvPr id="4" name="Segnaposto numero diapositiva 3"/>
+          <p:cNvSpPr>
+            <a:spLocks noGrp="1"/>
+          </p:cNvSpPr>
+          <p:nvPr>
+            <p:ph type="sldNum" sz="quarter" idx="5"/>
+          </p:nvPr>
+        </p:nvSpPr>
+        <p:spPr/>
+        <p:txBody>
+          <a:bodyPr/>
+          <a:lstStyle/>
+          <a:p>
+            <a:fld id="{7B9EF5EE-42ED-4142-B01A-B637985E9B70}" type="slidenum">
+              <a:rPr lang="it-IT" smtClean="0"/>
+              <a:t>3</a:t>
+            </a:fld>
+            <a:endParaRPr lang="it-IT"/>
+          </a:p>
+        </p:txBody>
+      </p:sp>
+    </p:spTree>
+    <p:extLst>
+      <p:ext uri="{BB962C8B-B14F-4D97-AF65-F5344CB8AC3E}">
+        <p14:creationId xmlns:p14="http://schemas.microsoft.com/office/powerpoint/2010/main" val="41518323"/>
+      </p:ext>
+    </p:extLst>
+  </p:cSld>
+  <p:clrMapOvr>
+    <a:masterClrMapping/>
+  </p:clrMapOvr>
+</p:notes>
+</file>
+
+<file path=ppt/notesSlides/notesSlide2.xml><?xml version="1.0" encoding="utf-8"?>
+<p:notes xmlns:a="http://schemas.openxmlformats.org/drawingml/2006/main" xmlns:r="http://schemas.openxmlformats.org/officeDocument/2006/relationships" xmlns:p="http://schemas.openxmlformats.org/presentationml/2006/main">
+  <p:cSld>
+    <p:spTree>
+      <p:nvGrpSpPr>
+        <p:cNvPr id="1" name=""/>
+        <p:cNvGrpSpPr/>
+        <p:nvPr/>
+      </p:nvGrpSpPr>
+      <p:grpSpPr>
+        <a:xfrm>
+          <a:off x="0" y="0"/>
+          <a:ext cx="0" cy="0"/>
+          <a:chOff x="0" y="0"/>
+          <a:chExt cx="0" cy="0"/>
+        </a:xfrm>
+      </p:grpSpPr>
+      <p:sp>
+        <p:nvSpPr>
+          <p:cNvPr id="2" name="Segnaposto immagine diapositiva 1"/>
+          <p:cNvSpPr>
+            <a:spLocks noGrp="1" noRot="1" noChangeAspect="1"/>
+          </p:cNvSpPr>
+          <p:nvPr>
+            <p:ph type="sldImg"/>
+          </p:nvPr>
+        </p:nvSpPr>
+        <p:spPr/>
+      </p:sp>
+      <p:sp>
+        <p:nvSpPr>
+          <p:cNvPr id="3" name="Segnaposto note 2"/>
+          <p:cNvSpPr>
+            <a:spLocks noGrp="1"/>
+          </p:cNvSpPr>
+          <p:nvPr>
+            <p:ph type="body" idx="1"/>
+          </p:nvPr>
+        </p:nvSpPr>
+        <p:spPr/>
+        <p:txBody>
+          <a:bodyPr/>
+          <a:lstStyle/>
+          <a:p>
+            <a:pPr marL="228600" indent="-228600">
+              <a:buAutoNum type="arabicParenR"/>
+            </a:pPr>
+            <a:r>
+              <a:rPr lang="it-IT" dirty="0"/>
+              <a:t>Ogni database contiene diverse </a:t>
+            </a:r>
+            <a:r>
+              <a:rPr lang="it-IT" dirty="0" err="1"/>
+              <a:t>collections</a:t>
+            </a:r>
+            <a:r>
+              <a:rPr lang="it-IT" dirty="0"/>
+              <a:t> che a loro volta contengono dei </a:t>
+            </a:r>
+            <a:r>
+              <a:rPr lang="it-IT" dirty="0" err="1"/>
+              <a:t>documents</a:t>
+            </a:r>
+            <a:r>
+              <a:rPr lang="it-IT" dirty="0"/>
+              <a:t>. Ogni </a:t>
+            </a:r>
+            <a:r>
+              <a:rPr lang="it-IT" dirty="0" err="1"/>
+              <a:t>documents</a:t>
+            </a:r>
+            <a:r>
+              <a:rPr lang="it-IT" dirty="0"/>
+              <a:t> può essere diverso con un numero variabile di fields. Le dimensioni e il contenuto di ciascun documento possono essere diversi l'uno dall'altro. </a:t>
+            </a:r>
+          </a:p>
+          <a:p>
+            <a:pPr marL="228600" indent="-228600">
+              <a:buAutoNum type="arabicParenR"/>
+            </a:pPr>
+            <a:r>
+              <a:rPr lang="it-IT" dirty="0"/>
+              <a:t>Basta pensare alla coppia chiave valore</a:t>
+            </a:r>
+          </a:p>
+          <a:p>
+            <a:pPr marL="228600" indent="-228600">
+              <a:buAutoNum type="arabicParenR"/>
+            </a:pPr>
+            <a:endParaRPr lang="it-IT" dirty="0"/>
+          </a:p>
+        </p:txBody>
+      </p:sp>
+      <p:sp>
+        <p:nvSpPr>
+          <p:cNvPr id="4" name="Segnaposto numero diapositiva 3"/>
+          <p:cNvSpPr>
+            <a:spLocks noGrp="1"/>
+          </p:cNvSpPr>
+          <p:nvPr>
+            <p:ph type="sldNum" sz="quarter" idx="5"/>
+          </p:nvPr>
+        </p:nvSpPr>
+        <p:spPr/>
+        <p:txBody>
+          <a:bodyPr/>
+          <a:lstStyle/>
+          <a:p>
+            <a:fld id="{7B9EF5EE-42ED-4142-B01A-B637985E9B70}" type="slidenum">
+              <a:rPr lang="it-IT" smtClean="0"/>
+              <a:t>4</a:t>
+            </a:fld>
+            <a:endParaRPr lang="it-IT"/>
+          </a:p>
+        </p:txBody>
+      </p:sp>
+    </p:spTree>
+    <p:extLst>
+      <p:ext uri="{BB962C8B-B14F-4D97-AF65-F5344CB8AC3E}">
+        <p14:creationId xmlns:p14="http://schemas.microsoft.com/office/powerpoint/2010/main" val="3010035820"/>
+      </p:ext>
+    </p:extLst>
+  </p:cSld>
+  <p:clrMapOvr>
+    <a:masterClrMapping/>
+  </p:clrMapOvr>
+</p:notes>
 </file>
 
 <file path=ppt/slideLayouts/slideLayout1.xml><?xml version="1.0" encoding="utf-8"?>
@@ -830,7 +1430,7 @@
           <a:p>
             <a:fld id="{5EEC1FBE-7A50-402B-9218-00262FCB5F53}" type="datetimeFigureOut">
               <a:rPr lang="it-IT" smtClean="0"/>
-              <a:t>09/03/2022</a:t>
+              <a:t>14/03/2022</a:t>
             </a:fld>
             <a:endParaRPr lang="it-IT"/>
           </a:p>
@@ -1081,7 +1681,7 @@
           <a:p>
             <a:fld id="{5EEC1FBE-7A50-402B-9218-00262FCB5F53}" type="datetimeFigureOut">
               <a:rPr lang="it-IT" smtClean="0"/>
-              <a:t>09/03/2022</a:t>
+              <a:t>14/03/2022</a:t>
             </a:fld>
             <a:endParaRPr lang="it-IT"/>
           </a:p>
@@ -1395,7 +1995,7 @@
           <a:p>
             <a:fld id="{5EEC1FBE-7A50-402B-9218-00262FCB5F53}" type="datetimeFigureOut">
               <a:rPr lang="it-IT" smtClean="0"/>
-              <a:t>09/03/2022</a:t>
+              <a:t>14/03/2022</a:t>
             </a:fld>
             <a:endParaRPr lang="it-IT"/>
           </a:p>
@@ -1736,7 +2336,7 @@
           <a:p>
             <a:fld id="{5EEC1FBE-7A50-402B-9218-00262FCB5F53}" type="datetimeFigureOut">
               <a:rPr lang="it-IT" smtClean="0"/>
-              <a:t>09/03/2022</a:t>
+              <a:t>14/03/2022</a:t>
             </a:fld>
             <a:endParaRPr lang="it-IT"/>
           </a:p>
@@ -2050,7 +2650,7 @@
           <a:p>
             <a:fld id="{5EEC1FBE-7A50-402B-9218-00262FCB5F53}" type="datetimeFigureOut">
               <a:rPr lang="it-IT" smtClean="0"/>
-              <a:t>09/03/2022</a:t>
+              <a:t>14/03/2022</a:t>
             </a:fld>
             <a:endParaRPr lang="it-IT"/>
           </a:p>
@@ -2443,7 +3043,7 @@
           <a:p>
             <a:fld id="{5EEC1FBE-7A50-402B-9218-00262FCB5F53}" type="datetimeFigureOut">
               <a:rPr lang="it-IT" smtClean="0"/>
-              <a:t>09/03/2022</a:t>
+              <a:t>14/03/2022</a:t>
             </a:fld>
             <a:endParaRPr lang="it-IT"/>
           </a:p>
@@ -2613,7 +3213,7 @@
           <a:p>
             <a:fld id="{5EEC1FBE-7A50-402B-9218-00262FCB5F53}" type="datetimeFigureOut">
               <a:rPr lang="it-IT" smtClean="0"/>
-              <a:t>09/03/2022</a:t>
+              <a:t>14/03/2022</a:t>
             </a:fld>
             <a:endParaRPr lang="it-IT"/>
           </a:p>
@@ -2793,7 +3393,7 @@
           <a:p>
             <a:fld id="{5EEC1FBE-7A50-402B-9218-00262FCB5F53}" type="datetimeFigureOut">
               <a:rPr lang="it-IT" smtClean="0"/>
-              <a:t>09/03/2022</a:t>
+              <a:t>14/03/2022</a:t>
             </a:fld>
             <a:endParaRPr lang="it-IT"/>
           </a:p>
@@ -2969,7 +3569,7 @@
           <a:p>
             <a:fld id="{5EEC1FBE-7A50-402B-9218-00262FCB5F53}" type="datetimeFigureOut">
               <a:rPr lang="it-IT" smtClean="0"/>
-              <a:t>09/03/2022</a:t>
+              <a:t>14/03/2022</a:t>
             </a:fld>
             <a:endParaRPr lang="it-IT"/>
           </a:p>
@@ -3216,7 +3816,7 @@
           <a:p>
             <a:fld id="{5EEC1FBE-7A50-402B-9218-00262FCB5F53}" type="datetimeFigureOut">
               <a:rPr lang="it-IT" smtClean="0"/>
-              <a:t>09/03/2022</a:t>
+              <a:t>14/03/2022</a:t>
             </a:fld>
             <a:endParaRPr lang="it-IT"/>
           </a:p>
@@ -3448,7 +4048,7 @@
           <a:p>
             <a:fld id="{5EEC1FBE-7A50-402B-9218-00262FCB5F53}" type="datetimeFigureOut">
               <a:rPr lang="it-IT" smtClean="0"/>
-              <a:t>09/03/2022</a:t>
+              <a:t>14/03/2022</a:t>
             </a:fld>
             <a:endParaRPr lang="it-IT"/>
           </a:p>
@@ -3822,7 +4422,7 @@
           <a:p>
             <a:fld id="{5EEC1FBE-7A50-402B-9218-00262FCB5F53}" type="datetimeFigureOut">
               <a:rPr lang="it-IT" smtClean="0"/>
-              <a:t>09/03/2022</a:t>
+              <a:t>14/03/2022</a:t>
             </a:fld>
             <a:endParaRPr lang="it-IT"/>
           </a:p>
@@ -3945,7 +4545,7 @@
           <a:p>
             <a:fld id="{5EEC1FBE-7A50-402B-9218-00262FCB5F53}" type="datetimeFigureOut">
               <a:rPr lang="it-IT" smtClean="0"/>
-              <a:t>09/03/2022</a:t>
+              <a:t>14/03/2022</a:t>
             </a:fld>
             <a:endParaRPr lang="it-IT"/>
           </a:p>
@@ -4040,7 +4640,7 @@
           <a:p>
             <a:fld id="{5EEC1FBE-7A50-402B-9218-00262FCB5F53}" type="datetimeFigureOut">
               <a:rPr lang="it-IT" smtClean="0"/>
-              <a:t>09/03/2022</a:t>
+              <a:t>14/03/2022</a:t>
             </a:fld>
             <a:endParaRPr lang="it-IT"/>
           </a:p>
@@ -4295,7 +4895,7 @@
           <a:p>
             <a:fld id="{5EEC1FBE-7A50-402B-9218-00262FCB5F53}" type="datetimeFigureOut">
               <a:rPr lang="it-IT" smtClean="0"/>
-              <a:t>09/03/2022</a:t>
+              <a:t>14/03/2022</a:t>
             </a:fld>
             <a:endParaRPr lang="it-IT"/>
           </a:p>
@@ -4558,7 +5158,7 @@
           <a:p>
             <a:fld id="{5EEC1FBE-7A50-402B-9218-00262FCB5F53}" type="datetimeFigureOut">
               <a:rPr lang="it-IT" smtClean="0"/>
-              <a:t>09/03/2022</a:t>
+              <a:t>14/03/2022</a:t>
             </a:fld>
             <a:endParaRPr lang="it-IT"/>
           </a:p>
@@ -5301,7 +5901,7 @@
           <a:p>
             <a:fld id="{5EEC1FBE-7A50-402B-9218-00262FCB5F53}" type="datetimeFigureOut">
               <a:rPr lang="it-IT" smtClean="0"/>
-              <a:t>09/03/2022</a:t>
+              <a:t>14/03/2022</a:t>
             </a:fld>
             <a:endParaRPr lang="it-IT"/>
           </a:p>
@@ -6215,13 +6815,8 @@
           <a:p>
             <a:r>
               <a:rPr lang="it-IT" dirty="0"/>
-              <a:t>Data </a:t>
-            </a:r>
-            <a:r>
-              <a:rPr lang="it-IT"/>
-              <a:t>Modeling</a:t>
-            </a:r>
-            <a:endParaRPr lang="it-IT" dirty="0"/>
+              <a:t>Indice</a:t>
+            </a:r>
           </a:p>
         </p:txBody>
       </p:sp>
@@ -6251,6 +6846,34 @@
           <a:bodyPr/>
           <a:lstStyle/>
           <a:p>
+            <a:r>
+              <a:rPr lang="it-IT" u="sng" dirty="0"/>
+              <a:t>Cos’è </a:t>
+            </a:r>
+            <a:r>
+              <a:rPr lang="it-IT" u="sng" dirty="0" err="1"/>
+              <a:t>MongoDB</a:t>
+            </a:r>
+            <a:endParaRPr lang="it-IT" u="sng" dirty="0"/>
+          </a:p>
+          <a:p>
+            <a:r>
+              <a:rPr lang="it-IT" u="sng" dirty="0"/>
+              <a:t>Data Models</a:t>
+            </a:r>
+          </a:p>
+          <a:p>
+            <a:r>
+              <a:rPr lang="it-IT" u="sng" dirty="0" err="1"/>
+              <a:t>Replications</a:t>
+            </a:r>
+            <a:endParaRPr lang="it-IT" u="sng" dirty="0"/>
+          </a:p>
+          <a:p>
+            <a:r>
+              <a:rPr lang="it-IT" u="sng" dirty="0" err="1"/>
+              <a:t>Sharding</a:t>
+            </a:r>
             <a:endParaRPr lang="it-IT" u="sng" dirty="0"/>
           </a:p>
         </p:txBody>
@@ -6259,6 +6882,508 @@
     <p:extLst>
       <p:ext uri="{BB962C8B-B14F-4D97-AF65-F5344CB8AC3E}">
         <p14:creationId xmlns:p14="http://schemas.microsoft.com/office/powerpoint/2010/main" val="2974307821"/>
+      </p:ext>
+    </p:extLst>
+  </p:cSld>
+  <p:clrMapOvr>
+    <a:masterClrMapping/>
+  </p:clrMapOvr>
+</p:sld>
+</file>
+
+<file path=ppt/slides/slide3.xml><?xml version="1.0" encoding="utf-8"?>
+<p:sld xmlns:a="http://schemas.openxmlformats.org/drawingml/2006/main" xmlns:r="http://schemas.openxmlformats.org/officeDocument/2006/relationships" xmlns:p="http://schemas.openxmlformats.org/presentationml/2006/main">
+  <p:cSld>
+    <p:spTree>
+      <p:nvGrpSpPr>
+        <p:cNvPr id="1" name=""/>
+        <p:cNvGrpSpPr/>
+        <p:nvPr/>
+      </p:nvGrpSpPr>
+      <p:grpSpPr>
+        <a:xfrm>
+          <a:off x="0" y="0"/>
+          <a:ext cx="0" cy="0"/>
+          <a:chOff x="0" y="0"/>
+          <a:chExt cx="0" cy="0"/>
+        </a:xfrm>
+      </p:grpSpPr>
+      <p:sp>
+        <p:nvSpPr>
+          <p:cNvPr id="2" name="Titolo 1">
+            <a:extLst>
+              <a:ext uri="{FF2B5EF4-FFF2-40B4-BE49-F238E27FC236}">
+                <a16:creationId xmlns:a16="http://schemas.microsoft.com/office/drawing/2014/main" id="{BF6C4018-40B4-479D-93E4-E96B145B960B}"/>
+              </a:ext>
+            </a:extLst>
+          </p:cNvPr>
+          <p:cNvSpPr>
+            <a:spLocks noGrp="1"/>
+          </p:cNvSpPr>
+          <p:nvPr>
+            <p:ph type="title"/>
+          </p:nvPr>
+        </p:nvSpPr>
+        <p:spPr/>
+        <p:txBody>
+          <a:bodyPr/>
+          <a:lstStyle/>
+          <a:p>
+            <a:r>
+              <a:rPr lang="it-IT" dirty="0"/>
+              <a:t>Introduzione a </a:t>
+            </a:r>
+            <a:r>
+              <a:rPr lang="it-IT" dirty="0" err="1"/>
+              <a:t>MongoDB</a:t>
+            </a:r>
+            <a:endParaRPr lang="it-IT" dirty="0"/>
+          </a:p>
+        </p:txBody>
+      </p:sp>
+      <p:sp>
+        <p:nvSpPr>
+          <p:cNvPr id="9" name="CasellaDiTesto 8">
+            <a:extLst>
+              <a:ext uri="{FF2B5EF4-FFF2-40B4-BE49-F238E27FC236}">
+                <a16:creationId xmlns:a16="http://schemas.microsoft.com/office/drawing/2014/main" id="{3A5273BE-9FB3-48AA-8E7F-8508EFFF30BE}"/>
+              </a:ext>
+            </a:extLst>
+          </p:cNvPr>
+          <p:cNvSpPr txBox="1"/>
+          <p:nvPr/>
+        </p:nvSpPr>
+        <p:spPr>
+          <a:xfrm>
+            <a:off x="677334" y="1544328"/>
+            <a:ext cx="5501250" cy="646331"/>
+          </a:xfrm>
+          <a:prstGeom prst="rect">
+            <a:avLst/>
+          </a:prstGeom>
+          <a:noFill/>
+        </p:spPr>
+        <p:txBody>
+          <a:bodyPr wrap="none" rtlCol="0">
+            <a:spAutoFit/>
+          </a:bodyPr>
+          <a:lstStyle/>
+          <a:p>
+            <a:r>
+              <a:rPr lang="it-IT" dirty="0" err="1"/>
+              <a:t>MongoDB</a:t>
+            </a:r>
+            <a:r>
+              <a:rPr lang="it-IT" dirty="0"/>
+              <a:t> è un </a:t>
+            </a:r>
+            <a:r>
+              <a:rPr lang="it-IT" dirty="0" err="1"/>
+              <a:t>Document-oriented</a:t>
+            </a:r>
+            <a:r>
+              <a:rPr lang="it-IT" dirty="0"/>
+              <a:t> </a:t>
+            </a:r>
+            <a:r>
+              <a:rPr lang="it-IT" dirty="0" err="1"/>
+              <a:t>NoSQL</a:t>
+            </a:r>
+            <a:r>
+              <a:rPr lang="it-IT" dirty="0"/>
+              <a:t> database.</a:t>
+            </a:r>
+          </a:p>
+          <a:p>
+            <a:endParaRPr lang="it-IT" dirty="0"/>
+          </a:p>
+        </p:txBody>
+      </p:sp>
+      <p:pic>
+        <p:nvPicPr>
+          <p:cNvPr id="19" name="Immagine 18" descr="Immagine che contiene testo&#10;&#10;Descrizione generata automaticamente">
+            <a:extLst>
+              <a:ext uri="{FF2B5EF4-FFF2-40B4-BE49-F238E27FC236}">
+                <a16:creationId xmlns:a16="http://schemas.microsoft.com/office/drawing/2014/main" id="{39F93FF2-B7F4-42C8-868C-0E0FDEC74E69}"/>
+              </a:ext>
+            </a:extLst>
+          </p:cNvPr>
+          <p:cNvPicPr>
+            <a:picLocks noChangeAspect="1"/>
+          </p:cNvPicPr>
+          <p:nvPr/>
+        </p:nvPicPr>
+        <p:blipFill>
+          <a:blip r:embed="rId3">
+            <a:extLst>
+              <a:ext uri="{28A0092B-C50C-407E-A947-70E740481C1C}">
+                <a14:useLocalDpi xmlns:a14="http://schemas.microsoft.com/office/drawing/2010/main" val="0"/>
+              </a:ext>
+            </a:extLst>
+          </a:blip>
+          <a:stretch>
+            <a:fillRect/>
+          </a:stretch>
+        </p:blipFill>
+        <p:spPr>
+          <a:xfrm>
+            <a:off x="5744757" y="2079253"/>
+            <a:ext cx="2595716" cy="2595716"/>
+          </a:xfrm>
+          <a:prstGeom prst="rect">
+            <a:avLst/>
+          </a:prstGeom>
+        </p:spPr>
+      </p:pic>
+      <p:pic>
+        <p:nvPicPr>
+          <p:cNvPr id="21" name="Immagine 20">
+            <a:extLst>
+              <a:ext uri="{FF2B5EF4-FFF2-40B4-BE49-F238E27FC236}">
+                <a16:creationId xmlns:a16="http://schemas.microsoft.com/office/drawing/2014/main" id="{E8E69D09-0282-4A14-AB48-ABEF3A6BDC9C}"/>
+              </a:ext>
+            </a:extLst>
+          </p:cNvPr>
+          <p:cNvPicPr>
+            <a:picLocks noChangeAspect="1"/>
+          </p:cNvPicPr>
+          <p:nvPr/>
+        </p:nvPicPr>
+        <p:blipFill>
+          <a:blip r:embed="rId4">
+            <a:extLst>
+              <a:ext uri="{28A0092B-C50C-407E-A947-70E740481C1C}">
+                <a14:useLocalDpi xmlns:a14="http://schemas.microsoft.com/office/drawing/2010/main" val="0"/>
+              </a:ext>
+            </a:extLst>
+          </a:blip>
+          <a:stretch>
+            <a:fillRect/>
+          </a:stretch>
+        </p:blipFill>
+        <p:spPr>
+          <a:xfrm>
+            <a:off x="1268361" y="2445473"/>
+            <a:ext cx="1691149" cy="1691149"/>
+          </a:xfrm>
+          <a:prstGeom prst="rect">
+            <a:avLst/>
+          </a:prstGeom>
+        </p:spPr>
+      </p:pic>
+      <p:cxnSp>
+        <p:nvCxnSpPr>
+          <p:cNvPr id="23" name="Connettore 2 22">
+            <a:extLst>
+              <a:ext uri="{FF2B5EF4-FFF2-40B4-BE49-F238E27FC236}">
+                <a16:creationId xmlns:a16="http://schemas.microsoft.com/office/drawing/2014/main" id="{7B8F183A-09E5-4039-9CBC-CEF53611CEE0}"/>
+              </a:ext>
+            </a:extLst>
+          </p:cNvPr>
+          <p:cNvCxnSpPr/>
+          <p:nvPr/>
+        </p:nvCxnSpPr>
+        <p:spPr>
+          <a:xfrm>
+            <a:off x="3537491" y="3184829"/>
+            <a:ext cx="2595716" cy="0"/>
+          </a:xfrm>
+          <a:prstGeom prst="straightConnector1">
+            <a:avLst/>
+          </a:prstGeom>
+          <a:ln w="57150">
+            <a:tailEnd type="triangle"/>
+          </a:ln>
+        </p:spPr>
+        <p:style>
+          <a:lnRef idx="1">
+            <a:schemeClr val="accent2"/>
+          </a:lnRef>
+          <a:fillRef idx="0">
+            <a:schemeClr val="accent2"/>
+          </a:fillRef>
+          <a:effectRef idx="0">
+            <a:schemeClr val="accent2"/>
+          </a:effectRef>
+          <a:fontRef idx="minor">
+            <a:schemeClr val="tx1"/>
+          </a:fontRef>
+        </p:style>
+      </p:cxnSp>
+      <p:pic>
+        <p:nvPicPr>
+          <p:cNvPr id="29" name="Elemento grafico 28" descr="Segnale di divieto contorno">
+            <a:extLst>
+              <a:ext uri="{FF2B5EF4-FFF2-40B4-BE49-F238E27FC236}">
+                <a16:creationId xmlns:a16="http://schemas.microsoft.com/office/drawing/2014/main" id="{FED54B1B-D9E5-48A0-A60C-DCFE26A91CCF}"/>
+              </a:ext>
+            </a:extLst>
+          </p:cNvPr>
+          <p:cNvPicPr>
+            <a:picLocks noChangeAspect="1"/>
+          </p:cNvPicPr>
+          <p:nvPr/>
+        </p:nvPicPr>
+        <p:blipFill>
+          <a:blip r:embed="rId5">
+            <a:extLst>
+              <a:ext uri="{28A0092B-C50C-407E-A947-70E740481C1C}">
+                <a14:useLocalDpi xmlns:a14="http://schemas.microsoft.com/office/drawing/2010/main" val="0"/>
+              </a:ext>
+              <a:ext uri="{96DAC541-7B7A-43D3-8B79-37D633B846F1}">
+                <asvg:svgBlip xmlns:asvg="http://schemas.microsoft.com/office/drawing/2016/SVG/main" r:embed="rId6"/>
+              </a:ext>
+            </a:extLst>
+          </a:blip>
+          <a:stretch>
+            <a:fillRect/>
+          </a:stretch>
+        </p:blipFill>
+        <p:spPr>
+          <a:xfrm>
+            <a:off x="690381" y="1867493"/>
+            <a:ext cx="2847110" cy="2847110"/>
+          </a:xfrm>
+          <a:prstGeom prst="rect">
+            <a:avLst/>
+          </a:prstGeom>
+        </p:spPr>
+      </p:pic>
+      <p:sp>
+        <p:nvSpPr>
+          <p:cNvPr id="30" name="Parentesi graffa chiusa 29">
+            <a:extLst>
+              <a:ext uri="{FF2B5EF4-FFF2-40B4-BE49-F238E27FC236}">
+                <a16:creationId xmlns:a16="http://schemas.microsoft.com/office/drawing/2014/main" id="{407D0CC5-DF1D-4751-9857-6122275F37E6}"/>
+              </a:ext>
+            </a:extLst>
+          </p:cNvPr>
+          <p:cNvSpPr/>
+          <p:nvPr/>
+        </p:nvSpPr>
+        <p:spPr>
+          <a:xfrm rot="16200000">
+            <a:off x="6734812" y="2680867"/>
+            <a:ext cx="644769" cy="4163056"/>
+          </a:xfrm>
+          <a:prstGeom prst="rightBrace">
+            <a:avLst/>
+          </a:prstGeom>
+        </p:spPr>
+        <p:style>
+          <a:lnRef idx="1">
+            <a:schemeClr val="accent1"/>
+          </a:lnRef>
+          <a:fillRef idx="0">
+            <a:schemeClr val="accent1"/>
+          </a:fillRef>
+          <a:effectRef idx="0">
+            <a:schemeClr val="accent1"/>
+          </a:effectRef>
+          <a:fontRef idx="minor">
+            <a:schemeClr val="tx1"/>
+          </a:fontRef>
+        </p:style>
+        <p:txBody>
+          <a:bodyPr rtlCol="0" anchor="ctr"/>
+          <a:lstStyle/>
+          <a:p>
+            <a:pPr algn="ctr"/>
+            <a:endParaRPr lang="it-IT"/>
+          </a:p>
+        </p:txBody>
+      </p:sp>
+      <p:sp>
+        <p:nvSpPr>
+          <p:cNvPr id="31" name="CasellaDiTesto 30">
+            <a:extLst>
+              <a:ext uri="{FF2B5EF4-FFF2-40B4-BE49-F238E27FC236}">
+                <a16:creationId xmlns:a16="http://schemas.microsoft.com/office/drawing/2014/main" id="{62EC8ECE-C9D1-4637-8FA1-BEEA0EEE72D3}"/>
+              </a:ext>
+            </a:extLst>
+          </p:cNvPr>
+          <p:cNvSpPr txBox="1"/>
+          <p:nvPr/>
+        </p:nvSpPr>
+        <p:spPr>
+          <a:xfrm>
+            <a:off x="5165185" y="4899256"/>
+            <a:ext cx="4108817" cy="646331"/>
+          </a:xfrm>
+          <a:prstGeom prst="rect">
+            <a:avLst/>
+          </a:prstGeom>
+          <a:noFill/>
+        </p:spPr>
+        <p:txBody>
+          <a:bodyPr wrap="none" rtlCol="0">
+            <a:spAutoFit/>
+          </a:bodyPr>
+          <a:lstStyle/>
+          <a:p>
+            <a:r>
+              <a:rPr lang="it-IT" dirty="0"/>
+              <a:t>Formati da coppia chiave-valore per </a:t>
+            </a:r>
+          </a:p>
+          <a:p>
+            <a:r>
+              <a:rPr lang="it-IT" dirty="0"/>
+              <a:t>incrementare le prestazioni di ricerca</a:t>
+            </a:r>
+          </a:p>
+        </p:txBody>
+      </p:sp>
+    </p:spTree>
+    <p:extLst>
+      <p:ext uri="{BB962C8B-B14F-4D97-AF65-F5344CB8AC3E}">
+        <p14:creationId xmlns:p14="http://schemas.microsoft.com/office/powerpoint/2010/main" val="4125597397"/>
+      </p:ext>
+    </p:extLst>
+  </p:cSld>
+  <p:clrMapOvr>
+    <a:masterClrMapping/>
+  </p:clrMapOvr>
+</p:sld>
+</file>
+
+<file path=ppt/slides/slide4.xml><?xml version="1.0" encoding="utf-8"?>
+<p:sld xmlns:a="http://schemas.openxmlformats.org/drawingml/2006/main" xmlns:r="http://schemas.openxmlformats.org/officeDocument/2006/relationships" xmlns:p="http://schemas.openxmlformats.org/presentationml/2006/main">
+  <p:cSld>
+    <p:spTree>
+      <p:nvGrpSpPr>
+        <p:cNvPr id="1" name=""/>
+        <p:cNvGrpSpPr/>
+        <p:nvPr/>
+      </p:nvGrpSpPr>
+      <p:grpSpPr>
+        <a:xfrm>
+          <a:off x="0" y="0"/>
+          <a:ext cx="0" cy="0"/>
+          <a:chOff x="0" y="0"/>
+          <a:chExt cx="0" cy="0"/>
+        </a:xfrm>
+      </p:grpSpPr>
+      <p:sp>
+        <p:nvSpPr>
+          <p:cNvPr id="2" name="Titolo 1">
+            <a:extLst>
+              <a:ext uri="{FF2B5EF4-FFF2-40B4-BE49-F238E27FC236}">
+                <a16:creationId xmlns:a16="http://schemas.microsoft.com/office/drawing/2014/main" id="{4EC9AA5C-8EC2-47D0-AC90-F260725B5224}"/>
+              </a:ext>
+            </a:extLst>
+          </p:cNvPr>
+          <p:cNvSpPr>
+            <a:spLocks noGrp="1"/>
+          </p:cNvSpPr>
+          <p:nvPr>
+            <p:ph type="title"/>
+          </p:nvPr>
+        </p:nvSpPr>
+        <p:spPr>
+          <a:xfrm>
+            <a:off x="677334" y="609600"/>
+            <a:ext cx="8596668" cy="762000"/>
+          </a:xfrm>
+        </p:spPr>
+        <p:txBody>
+          <a:bodyPr/>
+          <a:lstStyle/>
+          <a:p>
+            <a:r>
+              <a:rPr lang="it-IT" dirty="0"/>
+              <a:t>Caratteristiche principali</a:t>
+            </a:r>
+          </a:p>
+        </p:txBody>
+      </p:sp>
+      <p:sp>
+        <p:nvSpPr>
+          <p:cNvPr id="3" name="Segnaposto contenuto 2">
+            <a:extLst>
+              <a:ext uri="{FF2B5EF4-FFF2-40B4-BE49-F238E27FC236}">
+                <a16:creationId xmlns:a16="http://schemas.microsoft.com/office/drawing/2014/main" id="{F647C8AD-B187-4B6F-82DA-45F9751B8FA4}"/>
+              </a:ext>
+            </a:extLst>
+          </p:cNvPr>
+          <p:cNvSpPr>
+            <a:spLocks noGrp="1"/>
+          </p:cNvSpPr>
+          <p:nvPr>
+            <p:ph idx="1"/>
+          </p:nvPr>
+        </p:nvSpPr>
+        <p:spPr>
+          <a:xfrm>
+            <a:off x="677334" y="1371601"/>
+            <a:ext cx="8596668" cy="3962400"/>
+          </a:xfrm>
+        </p:spPr>
+        <p:txBody>
+          <a:bodyPr>
+            <a:normAutofit/>
+          </a:bodyPr>
+          <a:lstStyle/>
+          <a:p>
+            <a:r>
+              <a:rPr lang="it-IT" dirty="0"/>
+              <a:t>Estremamente flessibile nella rappresentazione e gestione del dato.</a:t>
+            </a:r>
+          </a:p>
+          <a:p>
+            <a:r>
+              <a:rPr lang="it-IT" dirty="0"/>
+              <a:t>La struttura del documento è più in linea con il modo in cui gli sviluppatori costruiscono le loro classi e oggetti nei rispettivi linguaggi di programmazione.</a:t>
+            </a:r>
+          </a:p>
+          <a:p>
+            <a:r>
+              <a:rPr lang="it-IT" dirty="0"/>
+              <a:t>Non è necessario che i </a:t>
+            </a:r>
+            <a:r>
+              <a:rPr lang="it-IT" dirty="0" err="1"/>
+              <a:t>documents</a:t>
+            </a:r>
+            <a:r>
+              <a:rPr lang="it-IT" dirty="0"/>
+              <a:t> abbiano uno schema definito in anticipo. Invece, i fields possono essere creati al volo.</a:t>
+            </a:r>
+          </a:p>
+          <a:p>
+            <a:r>
+              <a:rPr lang="it-IT" dirty="0"/>
+              <a:t>Il modello di dati disponibile all'interno di </a:t>
+            </a:r>
+            <a:r>
+              <a:rPr lang="it-IT" dirty="0" err="1"/>
+              <a:t>MongoDB</a:t>
+            </a:r>
+            <a:r>
+              <a:rPr lang="it-IT" dirty="0"/>
+              <a:t> consente di rappresentare più facilmente relazioni gerarchiche, memorizzare array e altre strutture più complesse.</a:t>
+            </a:r>
+          </a:p>
+          <a:p>
+            <a:r>
+              <a:rPr lang="it-IT" dirty="0"/>
+              <a:t>Scalabilità – Gli ambienti </a:t>
+            </a:r>
+            <a:r>
+              <a:rPr lang="it-IT" dirty="0" err="1"/>
+              <a:t>MongoDB</a:t>
+            </a:r>
+            <a:r>
+              <a:rPr lang="it-IT" dirty="0"/>
+              <a:t> sono molto scalabili. Le aziende di tutto il mondo hanno definito cluster con alcuni di loro che eseguono oltre 100 nodi con circa milioni di documenti all'interno del database.</a:t>
+            </a:r>
+          </a:p>
+        </p:txBody>
+      </p:sp>
+    </p:spTree>
+    <p:extLst>
+      <p:ext uri="{BB962C8B-B14F-4D97-AF65-F5344CB8AC3E}">
+        <p14:creationId xmlns:p14="http://schemas.microsoft.com/office/powerpoint/2010/main" val="2344025804"/>
       </p:ext>
     </p:extLst>
   </p:cSld>
@@ -6523,4 +7648,299 @@
     </a:ext>
   </a:extLst>
 </a:theme>
+</file>
+
+<file path=ppt/theme/theme2.xml><?xml version="1.0" encoding="utf-8"?>
+<a:theme xmlns:a="http://schemas.openxmlformats.org/drawingml/2006/main" name="Tema di Office">
+  <a:themeElements>
+    <a:clrScheme name="Office">
+      <a:dk1>
+        <a:sysClr val="windowText" lastClr="000000"/>
+      </a:dk1>
+      <a:lt1>
+        <a:sysClr val="window" lastClr="FFFFFF"/>
+      </a:lt1>
+      <a:dk2>
+        <a:srgbClr val="44546A"/>
+      </a:dk2>
+      <a:lt2>
+        <a:srgbClr val="E7E6E6"/>
+      </a:lt2>
+      <a:accent1>
+        <a:srgbClr val="4472C4"/>
+      </a:accent1>
+      <a:accent2>
+        <a:srgbClr val="ED7D31"/>
+      </a:accent2>
+      <a:accent3>
+        <a:srgbClr val="A5A5A5"/>
+      </a:accent3>
+      <a:accent4>
+        <a:srgbClr val="FFC000"/>
+      </a:accent4>
+      <a:accent5>
+        <a:srgbClr val="5B9BD5"/>
+      </a:accent5>
+      <a:accent6>
+        <a:srgbClr val="70AD47"/>
+      </a:accent6>
+      <a:hlink>
+        <a:srgbClr val="0563C1"/>
+      </a:hlink>
+      <a:folHlink>
+        <a:srgbClr val="954F72"/>
+      </a:folHlink>
+    </a:clrScheme>
+    <a:fontScheme name="Office">
+      <a:majorFont>
+        <a:latin typeface="Calibri Light" panose="020F0302020204030204"/>
+        <a:ea typeface=""/>
+        <a:cs typeface=""/>
+        <a:font script="Jpan" typeface="游ゴシック Light"/>
+        <a:font script="Hang" typeface="맑은 고딕"/>
+        <a:font script="Hans" typeface="等线 Light"/>
+        <a:font script="Hant" typeface="新細明體"/>
+        <a:font script="Arab" typeface="Times New Roman"/>
+        <a:font script="Hebr" typeface="Times New Roman"/>
+        <a:font script="Thai" typeface="Angsana New"/>
+        <a:font script="Ethi" typeface="Nyala"/>
+        <a:font script="Beng" typeface="Vrinda"/>
+        <a:font script="Gujr" typeface="Shruti"/>
+        <a:font script="Khmr" typeface="MoolBoran"/>
+        <a:font script="Knda" typeface="Tunga"/>
+        <a:font script="Guru" typeface="Raavi"/>
+        <a:font script="Cans" typeface="Euphemia"/>
+        <a:font script="Cher" typeface="Plantagenet Cherokee"/>
+        <a:font script="Yiii" typeface="Microsoft Yi Baiti"/>
+        <a:font script="Tibt" typeface="Microsoft Himalaya"/>
+        <a:font script="Thaa" typeface="MV Boli"/>
+        <a:font script="Deva" typeface="Mangal"/>
+        <a:font script="Telu" typeface="Gautami"/>
+        <a:font script="Taml" typeface="Latha"/>
+        <a:font script="Syrc" typeface="Estrangelo Edessa"/>
+        <a:font script="Orya" typeface="Kalinga"/>
+        <a:font script="Mlym" typeface="Kartika"/>
+        <a:font script="Laoo" typeface="DokChampa"/>
+        <a:font script="Sinh" typeface="Iskoola Pota"/>
+        <a:font script="Mong" typeface="Mongolian Baiti"/>
+        <a:font script="Viet" typeface="Times New Roman"/>
+        <a:font script="Uigh" typeface="Microsoft Uighur"/>
+        <a:font script="Geor" typeface="Sylfaen"/>
+        <a:font script="Armn" typeface="Arial"/>
+        <a:font script="Bugi" typeface="Leelawadee UI"/>
+        <a:font script="Bopo" typeface="Microsoft JhengHei"/>
+        <a:font script="Java" typeface="Javanese Text"/>
+        <a:font script="Lisu" typeface="Segoe UI"/>
+        <a:font script="Mymr" typeface="Myanmar Text"/>
+        <a:font script="Nkoo" typeface="Ebrima"/>
+        <a:font script="Olck" typeface="Nirmala UI"/>
+        <a:font script="Osma" typeface="Ebrima"/>
+        <a:font script="Phag" typeface="Phagspa"/>
+        <a:font script="Syrn" typeface="Estrangelo Edessa"/>
+        <a:font script="Syrj" typeface="Estrangelo Edessa"/>
+        <a:font script="Syre" typeface="Estrangelo Edessa"/>
+        <a:font script="Sora" typeface="Nirmala UI"/>
+        <a:font script="Tale" typeface="Microsoft Tai Le"/>
+        <a:font script="Talu" typeface="Microsoft New Tai Lue"/>
+        <a:font script="Tfng" typeface="Ebrima"/>
+      </a:majorFont>
+      <a:minorFont>
+        <a:latin typeface="Calibri" panose="020F0502020204030204"/>
+        <a:ea typeface=""/>
+        <a:cs typeface=""/>
+        <a:font script="Jpan" typeface="游ゴシック"/>
+        <a:font script="Hang" typeface="맑은 고딕"/>
+        <a:font script="Hans" typeface="等线"/>
+        <a:font script="Hant" typeface="新細明體"/>
+        <a:font script="Arab" typeface="Arial"/>
+        <a:font script="Hebr" typeface="Arial"/>
+        <a:font script="Thai" typeface="Cordia New"/>
+        <a:font script="Ethi" typeface="Nyala"/>
+        <a:font script="Beng" typeface="Vrinda"/>
+        <a:font script="Gujr" typeface="Shruti"/>
+        <a:font script="Khmr" typeface="DaunPenh"/>
+        <a:font script="Knda" typeface="Tunga"/>
+        <a:font script="Guru" typeface="Raavi"/>
+        <a:font script="Cans" typeface="Euphemia"/>
+        <a:font script="Cher" typeface="Plantagenet Cherokee"/>
+        <a:font script="Yiii" typeface="Microsoft Yi Baiti"/>
+        <a:font script="Tibt" typeface="Microsoft Himalaya"/>
+        <a:font script="Thaa" typeface="MV Boli"/>
+        <a:font script="Deva" typeface="Mangal"/>
+        <a:font script="Telu" typeface="Gautami"/>
+        <a:font script="Taml" typeface="Latha"/>
+        <a:font script="Syrc" typeface="Estrangelo Edessa"/>
+        <a:font script="Orya" typeface="Kalinga"/>
+        <a:font script="Mlym" typeface="Kartika"/>
+        <a:font script="Laoo" typeface="DokChampa"/>
+        <a:font script="Sinh" typeface="Iskoola Pota"/>
+        <a:font script="Mong" typeface="Mongolian Baiti"/>
+        <a:font script="Viet" typeface="Arial"/>
+        <a:font script="Uigh" typeface="Microsoft Uighur"/>
+        <a:font script="Geor" typeface="Sylfaen"/>
+        <a:font script="Armn" typeface="Arial"/>
+        <a:font script="Bugi" typeface="Leelawadee UI"/>
+        <a:font script="Bopo" typeface="Microsoft JhengHei"/>
+        <a:font script="Java" typeface="Javanese Text"/>
+        <a:font script="Lisu" typeface="Segoe UI"/>
+        <a:font script="Mymr" typeface="Myanmar Text"/>
+        <a:font script="Nkoo" typeface="Ebrima"/>
+        <a:font script="Olck" typeface="Nirmala UI"/>
+        <a:font script="Osma" typeface="Ebrima"/>
+        <a:font script="Phag" typeface="Phagspa"/>
+        <a:font script="Syrn" typeface="Estrangelo Edessa"/>
+        <a:font script="Syrj" typeface="Estrangelo Edessa"/>
+        <a:font script="Syre" typeface="Estrangelo Edessa"/>
+        <a:font script="Sora" typeface="Nirmala UI"/>
+        <a:font script="Tale" typeface="Microsoft Tai Le"/>
+        <a:font script="Talu" typeface="Microsoft New Tai Lue"/>
+        <a:font script="Tfng" typeface="Ebrima"/>
+      </a:minorFont>
+    </a:fontScheme>
+    <a:fmtScheme name="Office">
+      <a:fillStyleLst>
+        <a:solidFill>
+          <a:schemeClr val="phClr"/>
+        </a:solidFill>
+        <a:gradFill rotWithShape="1">
+          <a:gsLst>
+            <a:gs pos="0">
+              <a:schemeClr val="phClr">
+                <a:lumMod val="110000"/>
+                <a:satMod val="105000"/>
+                <a:tint val="67000"/>
+              </a:schemeClr>
+            </a:gs>
+            <a:gs pos="50000">
+              <a:schemeClr val="phClr">
+                <a:lumMod val="105000"/>
+                <a:satMod val="103000"/>
+                <a:tint val="73000"/>
+              </a:schemeClr>
+            </a:gs>
+            <a:gs pos="100000">
+              <a:schemeClr val="phClr">
+                <a:lumMod val="105000"/>
+                <a:satMod val="109000"/>
+                <a:tint val="81000"/>
+              </a:schemeClr>
+            </a:gs>
+          </a:gsLst>
+          <a:lin ang="5400000" scaled="0"/>
+        </a:gradFill>
+        <a:gradFill rotWithShape="1">
+          <a:gsLst>
+            <a:gs pos="0">
+              <a:schemeClr val="phClr">
+                <a:satMod val="103000"/>
+                <a:lumMod val="102000"/>
+                <a:tint val="94000"/>
+              </a:schemeClr>
+            </a:gs>
+            <a:gs pos="50000">
+              <a:schemeClr val="phClr">
+                <a:satMod val="110000"/>
+                <a:lumMod val="100000"/>
+                <a:shade val="100000"/>
+              </a:schemeClr>
+            </a:gs>
+            <a:gs pos="100000">
+              <a:schemeClr val="phClr">
+                <a:lumMod val="99000"/>
+                <a:satMod val="120000"/>
+                <a:shade val="78000"/>
+              </a:schemeClr>
+            </a:gs>
+          </a:gsLst>
+          <a:lin ang="5400000" scaled="0"/>
+        </a:gradFill>
+      </a:fillStyleLst>
+      <a:lnStyleLst>
+        <a:ln w="6350" cap="flat" cmpd="sng" algn="ctr">
+          <a:solidFill>
+            <a:schemeClr val="phClr"/>
+          </a:solidFill>
+          <a:prstDash val="solid"/>
+          <a:miter lim="800000"/>
+        </a:ln>
+        <a:ln w="12700" cap="flat" cmpd="sng" algn="ctr">
+          <a:solidFill>
+            <a:schemeClr val="phClr"/>
+          </a:solidFill>
+          <a:prstDash val="solid"/>
+          <a:miter lim="800000"/>
+        </a:ln>
+        <a:ln w="19050" cap="flat" cmpd="sng" algn="ctr">
+          <a:solidFill>
+            <a:schemeClr val="phClr"/>
+          </a:solidFill>
+          <a:prstDash val="solid"/>
+          <a:miter lim="800000"/>
+        </a:ln>
+      </a:lnStyleLst>
+      <a:effectStyleLst>
+        <a:effectStyle>
+          <a:effectLst/>
+        </a:effectStyle>
+        <a:effectStyle>
+          <a:effectLst/>
+        </a:effectStyle>
+        <a:effectStyle>
+          <a:effectLst>
+            <a:outerShdw blurRad="57150" dist="19050" dir="5400000" algn="ctr" rotWithShape="0">
+              <a:srgbClr val="000000">
+                <a:alpha val="63000"/>
+              </a:srgbClr>
+            </a:outerShdw>
+          </a:effectLst>
+        </a:effectStyle>
+      </a:effectStyleLst>
+      <a:bgFillStyleLst>
+        <a:solidFill>
+          <a:schemeClr val="phClr"/>
+        </a:solidFill>
+        <a:solidFill>
+          <a:schemeClr val="phClr">
+            <a:tint val="95000"/>
+            <a:satMod val="170000"/>
+          </a:schemeClr>
+        </a:solidFill>
+        <a:gradFill rotWithShape="1">
+          <a:gsLst>
+            <a:gs pos="0">
+              <a:schemeClr val="phClr">
+                <a:tint val="93000"/>
+                <a:satMod val="150000"/>
+                <a:shade val="98000"/>
+                <a:lumMod val="102000"/>
+              </a:schemeClr>
+            </a:gs>
+            <a:gs pos="50000">
+              <a:schemeClr val="phClr">
+                <a:tint val="98000"/>
+                <a:satMod val="130000"/>
+                <a:shade val="90000"/>
+                <a:lumMod val="103000"/>
+              </a:schemeClr>
+            </a:gs>
+            <a:gs pos="100000">
+              <a:schemeClr val="phClr">
+                <a:shade val="63000"/>
+                <a:satMod val="120000"/>
+              </a:schemeClr>
+            </a:gs>
+          </a:gsLst>
+          <a:lin ang="5400000" scaled="0"/>
+        </a:gradFill>
+      </a:bgFillStyleLst>
+    </a:fmtScheme>
+  </a:themeElements>
+  <a:objectDefaults/>
+  <a:extraClrSchemeLst/>
+  <a:extLst>
+    <a:ext uri="{05A4C25C-085E-4340-85A3-A5531E510DB2}">
+      <thm15:themeFamily xmlns:thm15="http://schemas.microsoft.com/office/thememl/2012/main" name="Office Theme" id="{62F939B6-93AF-4DB8-9C6B-D6C7DFDC589F}" vid="{4A3C46E8-61CC-4603-A589-7422A47A8E4A}"/>
+    </a:ext>
+  </a:extLst>
+</a:theme>
 </file>
</xml_diff>

<commit_message>
Update Presentazioe struttura dati
</commit_message>
<xml_diff>
--- a/Presentazione_progetto.pptx
+++ b/Presentazione_progetto.pptx
@@ -5,13 +5,17 @@
     <p:sldMasterId id="2147483672" r:id="rId1"/>
   </p:sldMasterIdLst>
   <p:notesMasterIdLst>
-    <p:notesMasterId r:id="rId6"/>
+    <p:notesMasterId r:id="rId10"/>
   </p:notesMasterIdLst>
   <p:sldIdLst>
     <p:sldId id="256" r:id="rId2"/>
     <p:sldId id="257" r:id="rId3"/>
     <p:sldId id="258" r:id="rId4"/>
-    <p:sldId id="259" r:id="rId5"/>
+    <p:sldId id="260" r:id="rId5"/>
+    <p:sldId id="261" r:id="rId6"/>
+    <p:sldId id="262" r:id="rId7"/>
+    <p:sldId id="263" r:id="rId8"/>
+    <p:sldId id="259" r:id="rId9"/>
   </p:sldIdLst>
   <p:sldSz cx="12192000" cy="6858000"/>
   <p:notesSz cx="6858000" cy="9144000"/>
@@ -200,7 +204,7 @@
           <a:p>
             <a:fld id="{5D86E91A-6C9D-48EA-9EAF-BBA9F3961CF9}" type="datetimeFigureOut">
               <a:rPr lang="it-IT" smtClean="0"/>
-              <a:t>14/03/2022</a:t>
+              <a:t>15/03/2022</a:t>
             </a:fld>
             <a:endParaRPr lang="it-IT"/>
           </a:p>
@@ -539,6 +543,33 @@
             <a:endParaRPr lang="it-IT" dirty="0"/>
           </a:p>
           <a:p>
+            <a:pPr marL="0" marR="0" lvl="0" indent="0" algn="l" defTabSz="914400" rtl="0" eaLnBrk="1" fontAlgn="auto" latinLnBrk="0" hangingPunct="1">
+              <a:lnSpc>
+                <a:spcPct val="100000"/>
+              </a:lnSpc>
+              <a:spcBef>
+                <a:spcPts val="0"/>
+              </a:spcBef>
+              <a:spcAft>
+                <a:spcPts val="0"/>
+              </a:spcAft>
+              <a:buClrTx/>
+              <a:buSzTx/>
+              <a:buFontTx/>
+              <a:buNone/>
+              <a:tabLst/>
+              <a:defRPr/>
+            </a:pPr>
+            <a:r>
+              <a:rPr lang="it-IT" b="1" dirty="0"/>
+              <a:t>BSON</a:t>
+            </a:r>
+            <a:r>
+              <a:rPr lang="it-IT" dirty="0"/>
+              <a:t> è una rappresentazione binaria dei documento JSON</a:t>
+            </a:r>
+          </a:p>
+          <a:p>
             <a:endParaRPr lang="it-IT" dirty="0"/>
           </a:p>
         </p:txBody>
@@ -623,6 +654,338 @@
           <a:bodyPr/>
           <a:lstStyle/>
           <a:p>
+            <a:r>
+              <a:rPr lang="it-IT" dirty="0"/>
+              <a:t>1) La Collection contiene i documenti che a loro volta contengono i campi, che a loro volta sono coppie chiave-valore</a:t>
+            </a:r>
+          </a:p>
+        </p:txBody>
+      </p:sp>
+      <p:sp>
+        <p:nvSpPr>
+          <p:cNvPr id="4" name="Segnaposto numero diapositiva 3"/>
+          <p:cNvSpPr>
+            <a:spLocks noGrp="1"/>
+          </p:cNvSpPr>
+          <p:nvPr>
+            <p:ph type="sldNum" sz="quarter" idx="5"/>
+          </p:nvPr>
+        </p:nvSpPr>
+        <p:spPr/>
+        <p:txBody>
+          <a:bodyPr/>
+          <a:lstStyle/>
+          <a:p>
+            <a:fld id="{7B9EF5EE-42ED-4142-B01A-B637985E9B70}" type="slidenum">
+              <a:rPr lang="it-IT" smtClean="0"/>
+              <a:t>4</a:t>
+            </a:fld>
+            <a:endParaRPr lang="it-IT"/>
+          </a:p>
+        </p:txBody>
+      </p:sp>
+    </p:spTree>
+    <p:extLst>
+      <p:ext uri="{BB962C8B-B14F-4D97-AF65-F5344CB8AC3E}">
+        <p14:creationId xmlns:p14="http://schemas.microsoft.com/office/powerpoint/2010/main" val="104391915"/>
+      </p:ext>
+    </p:extLst>
+  </p:cSld>
+  <p:clrMapOvr>
+    <a:masterClrMapping/>
+  </p:clrMapOvr>
+</p:notes>
+</file>
+
+<file path=ppt/notesSlides/notesSlide3.xml><?xml version="1.0" encoding="utf-8"?>
+<p:notes xmlns:a="http://schemas.openxmlformats.org/drawingml/2006/main" xmlns:r="http://schemas.openxmlformats.org/officeDocument/2006/relationships" xmlns:p="http://schemas.openxmlformats.org/presentationml/2006/main">
+  <p:cSld>
+    <p:spTree>
+      <p:nvGrpSpPr>
+        <p:cNvPr id="1" name=""/>
+        <p:cNvGrpSpPr/>
+        <p:nvPr/>
+      </p:nvGrpSpPr>
+      <p:grpSpPr>
+        <a:xfrm>
+          <a:off x="0" y="0"/>
+          <a:ext cx="0" cy="0"/>
+          <a:chOff x="0" y="0"/>
+          <a:chExt cx="0" cy="0"/>
+        </a:xfrm>
+      </p:grpSpPr>
+      <p:sp>
+        <p:nvSpPr>
+          <p:cNvPr id="2" name="Segnaposto immagine diapositiva 1"/>
+          <p:cNvSpPr>
+            <a:spLocks noGrp="1" noRot="1" noChangeAspect="1"/>
+          </p:cNvSpPr>
+          <p:nvPr>
+            <p:ph type="sldImg"/>
+          </p:nvPr>
+        </p:nvSpPr>
+        <p:spPr/>
+      </p:sp>
+      <p:sp>
+        <p:nvSpPr>
+          <p:cNvPr id="3" name="Segnaposto note 2"/>
+          <p:cNvSpPr>
+            <a:spLocks noGrp="1"/>
+          </p:cNvSpPr>
+          <p:nvPr>
+            <p:ph type="body" idx="1"/>
+          </p:nvPr>
+        </p:nvSpPr>
+        <p:spPr/>
+        <p:txBody>
+          <a:bodyPr/>
+          <a:lstStyle/>
+          <a:p>
+            <a:r>
+              <a:rPr lang="it-IT" dirty="0"/>
+              <a:t>2) Il documento è visto come un oggetto</a:t>
+            </a:r>
+          </a:p>
+        </p:txBody>
+      </p:sp>
+      <p:sp>
+        <p:nvSpPr>
+          <p:cNvPr id="4" name="Segnaposto numero diapositiva 3"/>
+          <p:cNvSpPr>
+            <a:spLocks noGrp="1"/>
+          </p:cNvSpPr>
+          <p:nvPr>
+            <p:ph type="sldNum" sz="quarter" idx="5"/>
+          </p:nvPr>
+        </p:nvSpPr>
+        <p:spPr/>
+        <p:txBody>
+          <a:bodyPr/>
+          <a:lstStyle/>
+          <a:p>
+            <a:fld id="{7B9EF5EE-42ED-4142-B01A-B637985E9B70}" type="slidenum">
+              <a:rPr lang="it-IT" smtClean="0"/>
+              <a:t>5</a:t>
+            </a:fld>
+            <a:endParaRPr lang="it-IT"/>
+          </a:p>
+        </p:txBody>
+      </p:sp>
+    </p:spTree>
+    <p:extLst>
+      <p:ext uri="{BB962C8B-B14F-4D97-AF65-F5344CB8AC3E}">
+        <p14:creationId xmlns:p14="http://schemas.microsoft.com/office/powerpoint/2010/main" val="4056490047"/>
+      </p:ext>
+    </p:extLst>
+  </p:cSld>
+  <p:clrMapOvr>
+    <a:masterClrMapping/>
+  </p:clrMapOvr>
+</p:notes>
+</file>
+
+<file path=ppt/notesSlides/notesSlide4.xml><?xml version="1.0" encoding="utf-8"?>
+<p:notes xmlns:a="http://schemas.openxmlformats.org/drawingml/2006/main" xmlns:r="http://schemas.openxmlformats.org/officeDocument/2006/relationships" xmlns:p="http://schemas.openxmlformats.org/presentationml/2006/main">
+  <p:cSld>
+    <p:spTree>
+      <p:nvGrpSpPr>
+        <p:cNvPr id="1" name=""/>
+        <p:cNvGrpSpPr/>
+        <p:nvPr/>
+      </p:nvGrpSpPr>
+      <p:grpSpPr>
+        <a:xfrm>
+          <a:off x="0" y="0"/>
+          <a:ext cx="0" cy="0"/>
+          <a:chOff x="0" y="0"/>
+          <a:chExt cx="0" cy="0"/>
+        </a:xfrm>
+      </p:grpSpPr>
+      <p:sp>
+        <p:nvSpPr>
+          <p:cNvPr id="2" name="Segnaposto immagine diapositiva 1"/>
+          <p:cNvSpPr>
+            <a:spLocks noGrp="1" noRot="1" noChangeAspect="1"/>
+          </p:cNvSpPr>
+          <p:nvPr>
+            <p:ph type="sldImg"/>
+          </p:nvPr>
+        </p:nvSpPr>
+        <p:spPr/>
+      </p:sp>
+      <p:sp>
+        <p:nvSpPr>
+          <p:cNvPr id="3" name="Segnaposto note 2"/>
+          <p:cNvSpPr>
+            <a:spLocks noGrp="1"/>
+          </p:cNvSpPr>
+          <p:nvPr>
+            <p:ph type="body" idx="1"/>
+          </p:nvPr>
+        </p:nvSpPr>
+        <p:spPr/>
+        <p:txBody>
+          <a:bodyPr/>
+          <a:lstStyle/>
+          <a:p>
+            <a:r>
+              <a:rPr lang="it-IT" b="1" dirty="0"/>
+              <a:t>Replica set</a:t>
+            </a:r>
+            <a:r>
+              <a:rPr lang="it-IT" dirty="0"/>
+              <a:t>: è un gruppo di server </a:t>
+            </a:r>
+            <a:r>
+              <a:rPr lang="it-IT" dirty="0" err="1"/>
+              <a:t>MongoDB</a:t>
+            </a:r>
+            <a:r>
+              <a:rPr lang="it-IT" dirty="0"/>
+              <a:t> che mantengono lo stesso set di dati, fornendo ridondanza e aumentando la disponibilità dei dati. </a:t>
+            </a:r>
+          </a:p>
+          <a:p>
+            <a:r>
+              <a:rPr lang="it-IT" b="1" dirty="0"/>
+              <a:t>Scalabilità orizzontale</a:t>
+            </a:r>
+            <a:r>
+              <a:rPr lang="it-IT" dirty="0"/>
+              <a:t>: Ridimensionare orizzontalmente equivale a ridimensionare aggiungendo più macchine a un pool o risorse, ma invece di aggiungere più potenza, CPU o RAM, si ridimensiona all'infrastruttura esistente. Il ridimensionamento orizzontale ti consente di ridimensionare i tuoi dati con più risorse di quelle che puoi aggiungere utilizzando il ridimensionamento verticale.</a:t>
+            </a:r>
+          </a:p>
+          <a:p>
+            <a:r>
+              <a:rPr lang="it-IT" b="1" u="none" dirty="0">
+                <a:solidFill>
+                  <a:srgbClr val="0563C1"/>
+                </a:solidFill>
+                <a:hlinkClick r:id="rId3">
+                  <a:extLst>
+                    <a:ext uri="{A12FA001-AC4F-418D-AE19-62706E023703}">
+                      <ahyp:hlinkClr xmlns:ahyp="http://schemas.microsoft.com/office/drawing/2018/hyperlinkcolor" val="tx"/>
+                    </a:ext>
+                  </a:extLst>
+                </a:hlinkClick>
+              </a:rPr>
+              <a:t>storage </a:t>
+            </a:r>
+            <a:r>
+              <a:rPr lang="it-IT" b="1" u="none" dirty="0" err="1">
+                <a:solidFill>
+                  <a:schemeClr val="tx1"/>
+                </a:solidFill>
+                <a:hlinkClick r:id="rId3">
+                  <a:extLst>
+                    <a:ext uri="{A12FA001-AC4F-418D-AE19-62706E023703}">
+                      <ahyp:hlinkClr xmlns:ahyp="http://schemas.microsoft.com/office/drawing/2018/hyperlinkcolor" val="tx"/>
+                    </a:ext>
+                  </a:extLst>
+                </a:hlinkClick>
+              </a:rPr>
+              <a:t>engine</a:t>
+            </a:r>
+            <a:r>
+              <a:rPr lang="it-IT" b="1" u="none" dirty="0">
+                <a:solidFill>
+                  <a:schemeClr val="tx1"/>
+                </a:solidFill>
+              </a:rPr>
+              <a:t> : </a:t>
+            </a:r>
+            <a:r>
+              <a:rPr lang="it-IT" dirty="0"/>
+              <a:t>La parte di un database responsabile della gestione delle modalità di archiviazione e accesso ai dati, sia in memoria che su disco. Motori di archiviazione diversi funzionano meglio per carichi di lavoro specifici. </a:t>
+            </a:r>
+            <a:endParaRPr lang="it-IT" b="1" u="none" dirty="0">
+              <a:solidFill>
+                <a:schemeClr val="tx1"/>
+              </a:solidFill>
+            </a:endParaRPr>
+          </a:p>
+        </p:txBody>
+      </p:sp>
+      <p:sp>
+        <p:nvSpPr>
+          <p:cNvPr id="4" name="Segnaposto numero diapositiva 3"/>
+          <p:cNvSpPr>
+            <a:spLocks noGrp="1"/>
+          </p:cNvSpPr>
+          <p:nvPr>
+            <p:ph type="sldNum" sz="quarter" idx="5"/>
+          </p:nvPr>
+        </p:nvSpPr>
+        <p:spPr/>
+        <p:txBody>
+          <a:bodyPr/>
+          <a:lstStyle/>
+          <a:p>
+            <a:fld id="{7B9EF5EE-42ED-4142-B01A-B637985E9B70}" type="slidenum">
+              <a:rPr lang="it-IT" smtClean="0"/>
+              <a:t>6</a:t>
+            </a:fld>
+            <a:endParaRPr lang="it-IT"/>
+          </a:p>
+        </p:txBody>
+      </p:sp>
+    </p:spTree>
+    <p:extLst>
+      <p:ext uri="{BB962C8B-B14F-4D97-AF65-F5344CB8AC3E}">
+        <p14:creationId xmlns:p14="http://schemas.microsoft.com/office/powerpoint/2010/main" val="384873747"/>
+      </p:ext>
+    </p:extLst>
+  </p:cSld>
+  <p:clrMapOvr>
+    <a:masterClrMapping/>
+  </p:clrMapOvr>
+</p:notes>
+</file>
+
+<file path=ppt/notesSlides/notesSlide5.xml><?xml version="1.0" encoding="utf-8"?>
+<p:notes xmlns:a="http://schemas.openxmlformats.org/drawingml/2006/main" xmlns:r="http://schemas.openxmlformats.org/officeDocument/2006/relationships" xmlns:p="http://schemas.openxmlformats.org/presentationml/2006/main">
+  <p:cSld>
+    <p:spTree>
+      <p:nvGrpSpPr>
+        <p:cNvPr id="1" name=""/>
+        <p:cNvGrpSpPr/>
+        <p:nvPr/>
+      </p:nvGrpSpPr>
+      <p:grpSpPr>
+        <a:xfrm>
+          <a:off x="0" y="0"/>
+          <a:ext cx="0" cy="0"/>
+          <a:chOff x="0" y="0"/>
+          <a:chExt cx="0" cy="0"/>
+        </a:xfrm>
+      </p:grpSpPr>
+      <p:sp>
+        <p:nvSpPr>
+          <p:cNvPr id="2" name="Segnaposto immagine diapositiva 1"/>
+          <p:cNvSpPr>
+            <a:spLocks noGrp="1" noRot="1" noChangeAspect="1"/>
+          </p:cNvSpPr>
+          <p:nvPr>
+            <p:ph type="sldImg"/>
+          </p:nvPr>
+        </p:nvSpPr>
+        <p:spPr/>
+      </p:sp>
+      <p:sp>
+        <p:nvSpPr>
+          <p:cNvPr id="3" name="Segnaposto note 2"/>
+          <p:cNvSpPr>
+            <a:spLocks noGrp="1"/>
+          </p:cNvSpPr>
+          <p:nvPr>
+            <p:ph type="body" idx="1"/>
+          </p:nvPr>
+        </p:nvSpPr>
+        <p:spPr/>
+        <p:txBody>
+          <a:bodyPr/>
+          <a:lstStyle/>
+          <a:p>
             <a:pPr marL="228600" indent="-228600">
               <a:buAutoNum type="arabicParenR"/>
             </a:pPr>
@@ -689,7 +1052,7 @@
           <a:p>
             <a:fld id="{7B9EF5EE-42ED-4142-B01A-B637985E9B70}" type="slidenum">
               <a:rPr lang="it-IT" smtClean="0"/>
-              <a:t>4</a:t>
+              <a:t>8</a:t>
             </a:fld>
             <a:endParaRPr lang="it-IT"/>
           </a:p>
@@ -1430,7 +1793,7 @@
           <a:p>
             <a:fld id="{5EEC1FBE-7A50-402B-9218-00262FCB5F53}" type="datetimeFigureOut">
               <a:rPr lang="it-IT" smtClean="0"/>
-              <a:t>14/03/2022</a:t>
+              <a:t>15/03/2022</a:t>
             </a:fld>
             <a:endParaRPr lang="it-IT"/>
           </a:p>
@@ -1681,7 +2044,7 @@
           <a:p>
             <a:fld id="{5EEC1FBE-7A50-402B-9218-00262FCB5F53}" type="datetimeFigureOut">
               <a:rPr lang="it-IT" smtClean="0"/>
-              <a:t>14/03/2022</a:t>
+              <a:t>15/03/2022</a:t>
             </a:fld>
             <a:endParaRPr lang="it-IT"/>
           </a:p>
@@ -1995,7 +2358,7 @@
           <a:p>
             <a:fld id="{5EEC1FBE-7A50-402B-9218-00262FCB5F53}" type="datetimeFigureOut">
               <a:rPr lang="it-IT" smtClean="0"/>
-              <a:t>14/03/2022</a:t>
+              <a:t>15/03/2022</a:t>
             </a:fld>
             <a:endParaRPr lang="it-IT"/>
           </a:p>
@@ -2336,7 +2699,7 @@
           <a:p>
             <a:fld id="{5EEC1FBE-7A50-402B-9218-00262FCB5F53}" type="datetimeFigureOut">
               <a:rPr lang="it-IT" smtClean="0"/>
-              <a:t>14/03/2022</a:t>
+              <a:t>15/03/2022</a:t>
             </a:fld>
             <a:endParaRPr lang="it-IT"/>
           </a:p>
@@ -2650,7 +3013,7 @@
           <a:p>
             <a:fld id="{5EEC1FBE-7A50-402B-9218-00262FCB5F53}" type="datetimeFigureOut">
               <a:rPr lang="it-IT" smtClean="0"/>
-              <a:t>14/03/2022</a:t>
+              <a:t>15/03/2022</a:t>
             </a:fld>
             <a:endParaRPr lang="it-IT"/>
           </a:p>
@@ -3043,7 +3406,7 @@
           <a:p>
             <a:fld id="{5EEC1FBE-7A50-402B-9218-00262FCB5F53}" type="datetimeFigureOut">
               <a:rPr lang="it-IT" smtClean="0"/>
-              <a:t>14/03/2022</a:t>
+              <a:t>15/03/2022</a:t>
             </a:fld>
             <a:endParaRPr lang="it-IT"/>
           </a:p>
@@ -3213,7 +3576,7 @@
           <a:p>
             <a:fld id="{5EEC1FBE-7A50-402B-9218-00262FCB5F53}" type="datetimeFigureOut">
               <a:rPr lang="it-IT" smtClean="0"/>
-              <a:t>14/03/2022</a:t>
+              <a:t>15/03/2022</a:t>
             </a:fld>
             <a:endParaRPr lang="it-IT"/>
           </a:p>
@@ -3393,7 +3756,7 @@
           <a:p>
             <a:fld id="{5EEC1FBE-7A50-402B-9218-00262FCB5F53}" type="datetimeFigureOut">
               <a:rPr lang="it-IT" smtClean="0"/>
-              <a:t>14/03/2022</a:t>
+              <a:t>15/03/2022</a:t>
             </a:fld>
             <a:endParaRPr lang="it-IT"/>
           </a:p>
@@ -3569,7 +3932,7 @@
           <a:p>
             <a:fld id="{5EEC1FBE-7A50-402B-9218-00262FCB5F53}" type="datetimeFigureOut">
               <a:rPr lang="it-IT" smtClean="0"/>
-              <a:t>14/03/2022</a:t>
+              <a:t>15/03/2022</a:t>
             </a:fld>
             <a:endParaRPr lang="it-IT"/>
           </a:p>
@@ -3816,7 +4179,7 @@
           <a:p>
             <a:fld id="{5EEC1FBE-7A50-402B-9218-00262FCB5F53}" type="datetimeFigureOut">
               <a:rPr lang="it-IT" smtClean="0"/>
-              <a:t>14/03/2022</a:t>
+              <a:t>15/03/2022</a:t>
             </a:fld>
             <a:endParaRPr lang="it-IT"/>
           </a:p>
@@ -4048,7 +4411,7 @@
           <a:p>
             <a:fld id="{5EEC1FBE-7A50-402B-9218-00262FCB5F53}" type="datetimeFigureOut">
               <a:rPr lang="it-IT" smtClean="0"/>
-              <a:t>14/03/2022</a:t>
+              <a:t>15/03/2022</a:t>
             </a:fld>
             <a:endParaRPr lang="it-IT"/>
           </a:p>
@@ -4422,7 +4785,7 @@
           <a:p>
             <a:fld id="{5EEC1FBE-7A50-402B-9218-00262FCB5F53}" type="datetimeFigureOut">
               <a:rPr lang="it-IT" smtClean="0"/>
-              <a:t>14/03/2022</a:t>
+              <a:t>15/03/2022</a:t>
             </a:fld>
             <a:endParaRPr lang="it-IT"/>
           </a:p>
@@ -4545,7 +4908,7 @@
           <a:p>
             <a:fld id="{5EEC1FBE-7A50-402B-9218-00262FCB5F53}" type="datetimeFigureOut">
               <a:rPr lang="it-IT" smtClean="0"/>
-              <a:t>14/03/2022</a:t>
+              <a:t>15/03/2022</a:t>
             </a:fld>
             <a:endParaRPr lang="it-IT"/>
           </a:p>
@@ -4640,7 +5003,7 @@
           <a:p>
             <a:fld id="{5EEC1FBE-7A50-402B-9218-00262FCB5F53}" type="datetimeFigureOut">
               <a:rPr lang="it-IT" smtClean="0"/>
-              <a:t>14/03/2022</a:t>
+              <a:t>15/03/2022</a:t>
             </a:fld>
             <a:endParaRPr lang="it-IT"/>
           </a:p>
@@ -4895,7 +5258,7 @@
           <a:p>
             <a:fld id="{5EEC1FBE-7A50-402B-9218-00262FCB5F53}" type="datetimeFigureOut">
               <a:rPr lang="it-IT" smtClean="0"/>
-              <a:t>14/03/2022</a:t>
+              <a:t>15/03/2022</a:t>
             </a:fld>
             <a:endParaRPr lang="it-IT"/>
           </a:p>
@@ -5158,7 +5521,7 @@
           <a:p>
             <a:fld id="{5EEC1FBE-7A50-402B-9218-00262FCB5F53}" type="datetimeFigureOut">
               <a:rPr lang="it-IT" smtClean="0"/>
-              <a:t>14/03/2022</a:t>
+              <a:t>15/03/2022</a:t>
             </a:fld>
             <a:endParaRPr lang="it-IT"/>
           </a:p>
@@ -5901,7 +6264,7 @@
           <a:p>
             <a:fld id="{5EEC1FBE-7A50-402B-9218-00262FCB5F53}" type="datetimeFigureOut">
               <a:rPr lang="it-IT" smtClean="0"/>
-              <a:t>14/03/2022</a:t>
+              <a:t>15/03/2022</a:t>
             </a:fld>
             <a:endParaRPr lang="it-IT"/>
           </a:p>
@@ -6857,6 +7220,40 @@
             <a:endParaRPr lang="it-IT" u="sng" dirty="0"/>
           </a:p>
           <a:p>
+            <a:pPr lvl="1"/>
+            <a:r>
+              <a:rPr lang="it-IT" u="sng" dirty="0"/>
+              <a:t>Differenza della struttura del dato rispetto a RDBMS</a:t>
+            </a:r>
+          </a:p>
+          <a:p>
+            <a:pPr lvl="1"/>
+            <a:r>
+              <a:rPr lang="it-IT" u="sng" dirty="0"/>
+              <a:t>Vantaggi </a:t>
+            </a:r>
+            <a:r>
+              <a:rPr lang="it-IT" u="sng" dirty="0" err="1"/>
+              <a:t>Document</a:t>
+            </a:r>
+            <a:r>
+              <a:rPr lang="it-IT" u="sng" dirty="0"/>
+              <a:t> Database</a:t>
+            </a:r>
+          </a:p>
+          <a:p>
+            <a:pPr lvl="1"/>
+            <a:r>
+              <a:rPr lang="it-IT" u="sng" dirty="0"/>
+              <a:t>Caratteristiche principali di </a:t>
+            </a:r>
+            <a:r>
+              <a:rPr lang="it-IT" u="sng" dirty="0" err="1"/>
+              <a:t>MongoDB</a:t>
+            </a:r>
+            <a:endParaRPr lang="it-IT" u="sng" dirty="0"/>
+          </a:p>
+          <a:p>
             <a:r>
               <a:rPr lang="it-IT" u="sng" dirty="0"/>
               <a:t>Data Models</a:t>
@@ -7207,8 +7604,8 @@
         </p:nvSpPr>
         <p:spPr>
           <a:xfrm>
-            <a:off x="5165185" y="4899256"/>
-            <a:ext cx="4108817" cy="646331"/>
+            <a:off x="5029908" y="4862320"/>
+            <a:ext cx="4193777" cy="646331"/>
           </a:xfrm>
           <a:prstGeom prst="rect">
             <a:avLst/>
@@ -7229,7 +7626,46 @@
           <a:p>
             <a:r>
               <a:rPr lang="it-IT" dirty="0"/>
-              <a:t>incrementare le prestazioni di ricerca</a:t>
+              <a:t>incrementare le prestazioni di ricerca.</a:t>
+            </a:r>
+          </a:p>
+        </p:txBody>
+      </p:sp>
+      <p:sp>
+        <p:nvSpPr>
+          <p:cNvPr id="11" name="CasellaDiTesto 10">
+            <a:extLst>
+              <a:ext uri="{FF2B5EF4-FFF2-40B4-BE49-F238E27FC236}">
+                <a16:creationId xmlns:a16="http://schemas.microsoft.com/office/drawing/2014/main" id="{72EC5378-4AE5-4898-A7C3-D3F17E8915C0}"/>
+              </a:ext>
+            </a:extLst>
+          </p:cNvPr>
+          <p:cNvSpPr txBox="1"/>
+          <p:nvPr/>
+        </p:nvSpPr>
+        <p:spPr>
+          <a:xfrm>
+            <a:off x="5029908" y="5434181"/>
+            <a:ext cx="4733780" cy="646331"/>
+          </a:xfrm>
+          <a:prstGeom prst="rect">
+            <a:avLst/>
+          </a:prstGeom>
+          <a:noFill/>
+        </p:spPr>
+        <p:txBody>
+          <a:bodyPr wrap="square">
+            <a:spAutoFit/>
+          </a:bodyPr>
+          <a:lstStyle/>
+          <a:p>
+            <a:r>
+              <a:rPr lang="it-IT" dirty="0" err="1"/>
+              <a:t>MongoDB</a:t>
+            </a:r>
+            <a:r>
+              <a:rPr lang="it-IT" dirty="0"/>
+              <a:t> immagazzina i dati come documenti di tipo BSON.</a:t>
             </a:r>
           </a:p>
         </p:txBody>
@@ -7269,6 +7705,1201 @@
           <p:cNvPr id="2" name="Titolo 1">
             <a:extLst>
               <a:ext uri="{FF2B5EF4-FFF2-40B4-BE49-F238E27FC236}">
+                <a16:creationId xmlns:a16="http://schemas.microsoft.com/office/drawing/2014/main" id="{DEEE2D37-8E06-4E72-A33E-A0384AF7F666}"/>
+              </a:ext>
+            </a:extLst>
+          </p:cNvPr>
+          <p:cNvSpPr>
+            <a:spLocks noGrp="1"/>
+          </p:cNvSpPr>
+          <p:nvPr>
+            <p:ph type="title"/>
+          </p:nvPr>
+        </p:nvSpPr>
+        <p:spPr/>
+        <p:txBody>
+          <a:bodyPr/>
+          <a:lstStyle/>
+          <a:p>
+            <a:r>
+              <a:rPr lang="it-IT" dirty="0"/>
+              <a:t>Differenza con RDBMS</a:t>
+            </a:r>
+          </a:p>
+        </p:txBody>
+      </p:sp>
+      <p:graphicFrame>
+        <p:nvGraphicFramePr>
+          <p:cNvPr id="4" name="Tabella 4">
+            <a:extLst>
+              <a:ext uri="{FF2B5EF4-FFF2-40B4-BE49-F238E27FC236}">
+                <a16:creationId xmlns:a16="http://schemas.microsoft.com/office/drawing/2014/main" id="{B03B79CB-6D0C-4102-9A55-FA6140D4105F}"/>
+              </a:ext>
+            </a:extLst>
+          </p:cNvPr>
+          <p:cNvGraphicFramePr>
+            <a:graphicFrameLocks noGrp="1"/>
+          </p:cNvGraphicFramePr>
+          <p:nvPr>
+            <p:ph idx="1"/>
+            <p:extLst>
+              <p:ext uri="{D42A27DB-BD31-4B8C-83A1-F6EECF244321}">
+                <p14:modId xmlns:p14="http://schemas.microsoft.com/office/powerpoint/2010/main" val="2499120824"/>
+              </p:ext>
+            </p:extLst>
+          </p:nvPr>
+        </p:nvGraphicFramePr>
+        <p:xfrm>
+          <a:off x="302537" y="1270000"/>
+          <a:ext cx="11212129" cy="4046688"/>
+        </p:xfrm>
+        <a:graphic>
+          <a:graphicData uri="http://schemas.openxmlformats.org/drawingml/2006/table">
+            <a:tbl>
+              <a:tblPr firstRow="1" bandRow="1">
+                <a:tableStyleId>{5C22544A-7EE6-4342-B048-85BDC9FD1C3A}</a:tableStyleId>
+              </a:tblPr>
+              <a:tblGrid>
+                <a:gridCol w="1840555">
+                  <a:extLst>
+                    <a:ext uri="{9D8B030D-6E8A-4147-A177-3AD203B41FA5}">
+                      <a16:colId xmlns:a16="http://schemas.microsoft.com/office/drawing/2014/main" val="3946425782"/>
+                    </a:ext>
+                  </a:extLst>
+                </a:gridCol>
+                <a:gridCol w="1622792">
+                  <a:extLst>
+                    <a:ext uri="{9D8B030D-6E8A-4147-A177-3AD203B41FA5}">
+                      <a16:colId xmlns:a16="http://schemas.microsoft.com/office/drawing/2014/main" val="569302220"/>
+                    </a:ext>
+                  </a:extLst>
+                </a:gridCol>
+                <a:gridCol w="7748782">
+                  <a:extLst>
+                    <a:ext uri="{9D8B030D-6E8A-4147-A177-3AD203B41FA5}">
+                      <a16:colId xmlns:a16="http://schemas.microsoft.com/office/drawing/2014/main" val="823549173"/>
+                    </a:ext>
+                  </a:extLst>
+                </a:gridCol>
+              </a:tblGrid>
+              <a:tr h="645912">
+                <a:tc>
+                  <a:txBody>
+                    <a:bodyPr/>
+                    <a:lstStyle/>
+                    <a:p>
+                      <a:r>
+                        <a:rPr lang="it-IT" dirty="0"/>
+                        <a:t>RDBBMS</a:t>
+                      </a:r>
+                    </a:p>
+                  </a:txBody>
+                  <a:tcPr/>
+                </a:tc>
+                <a:tc>
+                  <a:txBody>
+                    <a:bodyPr/>
+                    <a:lstStyle/>
+                    <a:p>
+                      <a:r>
+                        <a:rPr lang="it-IT" dirty="0" err="1"/>
+                        <a:t>MongoDB</a:t>
+                      </a:r>
+                      <a:endParaRPr lang="it-IT" dirty="0"/>
+                    </a:p>
+                  </a:txBody>
+                  <a:tcPr/>
+                </a:tc>
+                <a:tc>
+                  <a:txBody>
+                    <a:bodyPr/>
+                    <a:lstStyle/>
+                    <a:p>
+                      <a:r>
+                        <a:rPr lang="it-IT" dirty="0"/>
+                        <a:t>Differenza</a:t>
+                      </a:r>
+                    </a:p>
+                  </a:txBody>
+                  <a:tcPr/>
+                </a:tc>
+                <a:extLst>
+                  <a:ext uri="{0D108BD9-81ED-4DB2-BD59-A6C34878D82A}">
+                    <a16:rowId xmlns:a16="http://schemas.microsoft.com/office/drawing/2014/main" val="1317938149"/>
+                  </a:ext>
+                </a:extLst>
+              </a:tr>
+              <a:tr h="645912">
+                <a:tc>
+                  <a:txBody>
+                    <a:bodyPr/>
+                    <a:lstStyle/>
+                    <a:p>
+                      <a:r>
+                        <a:rPr lang="it-IT" dirty="0" err="1"/>
+                        <a:t>Table</a:t>
+                      </a:r>
+                      <a:endParaRPr lang="it-IT" dirty="0"/>
+                    </a:p>
+                  </a:txBody>
+                  <a:tcPr/>
+                </a:tc>
+                <a:tc>
+                  <a:txBody>
+                    <a:bodyPr/>
+                    <a:lstStyle/>
+                    <a:p>
+                      <a:r>
+                        <a:rPr lang="it-IT" dirty="0"/>
+                        <a:t>Collection</a:t>
+                      </a:r>
+                    </a:p>
+                  </a:txBody>
+                  <a:tcPr/>
+                </a:tc>
+                <a:tc>
+                  <a:txBody>
+                    <a:bodyPr/>
+                    <a:lstStyle/>
+                    <a:p>
+                      <a:r>
+                        <a:rPr lang="it-IT" dirty="0"/>
+                        <a:t>In RDBMS, le tabelle contengono le colonne e le righe usate per registrare il dato, in </a:t>
+                      </a:r>
+                      <a:r>
+                        <a:rPr lang="it-IT" dirty="0" err="1"/>
+                        <a:t>MongoDB</a:t>
+                      </a:r>
+                      <a:r>
+                        <a:rPr lang="it-IT" dirty="0"/>
+                        <a:t>, questa struttura si chiama Collection. </a:t>
+                      </a:r>
+                    </a:p>
+                  </a:txBody>
+                  <a:tcPr/>
+                </a:tc>
+                <a:extLst>
+                  <a:ext uri="{0D108BD9-81ED-4DB2-BD59-A6C34878D82A}">
+                    <a16:rowId xmlns:a16="http://schemas.microsoft.com/office/drawing/2014/main" val="2737845455"/>
+                  </a:ext>
+                </a:extLst>
+              </a:tr>
+              <a:tr h="645912">
+                <a:tc>
+                  <a:txBody>
+                    <a:bodyPr/>
+                    <a:lstStyle/>
+                    <a:p>
+                      <a:pPr algn="l"/>
+                      <a:r>
+                        <a:rPr lang="it-IT" dirty="0" err="1"/>
+                        <a:t>Row</a:t>
+                      </a:r>
+                      <a:r>
+                        <a:rPr lang="it-IT" dirty="0"/>
+                        <a:t>/Record</a:t>
+                      </a:r>
+                    </a:p>
+                  </a:txBody>
+                  <a:tcPr/>
+                </a:tc>
+                <a:tc>
+                  <a:txBody>
+                    <a:bodyPr/>
+                    <a:lstStyle/>
+                    <a:p>
+                      <a:r>
+                        <a:rPr lang="it-IT" dirty="0" err="1"/>
+                        <a:t>Document</a:t>
+                      </a:r>
+                      <a:endParaRPr lang="it-IT" dirty="0"/>
+                    </a:p>
+                  </a:txBody>
+                  <a:tcPr/>
+                </a:tc>
+                <a:tc>
+                  <a:txBody>
+                    <a:bodyPr/>
+                    <a:lstStyle/>
+                    <a:p>
+                      <a:r>
+                        <a:rPr lang="it-IT" dirty="0"/>
+                        <a:t>In RDBMS, la </a:t>
+                      </a:r>
+                      <a:r>
+                        <a:rPr lang="it-IT" dirty="0" err="1"/>
+                        <a:t>righa</a:t>
+                      </a:r>
+                      <a:r>
+                        <a:rPr lang="it-IT" dirty="0"/>
+                        <a:t> rappresenta un singolo elemento di dati strutturato nella tabella. In </a:t>
+                      </a:r>
+                      <a:r>
+                        <a:rPr lang="it-IT" dirty="0" err="1"/>
+                        <a:t>MongoDB</a:t>
+                      </a:r>
+                      <a:r>
+                        <a:rPr lang="it-IT" dirty="0"/>
+                        <a:t>, i dati vengono archiviati nei documenti.</a:t>
+                      </a:r>
+                    </a:p>
+                  </a:txBody>
+                  <a:tcPr/>
+                </a:tc>
+                <a:extLst>
+                  <a:ext uri="{0D108BD9-81ED-4DB2-BD59-A6C34878D82A}">
+                    <a16:rowId xmlns:a16="http://schemas.microsoft.com/office/drawing/2014/main" val="1537402499"/>
+                  </a:ext>
+                </a:extLst>
+              </a:tr>
+              <a:tr h="645912">
+                <a:tc>
+                  <a:txBody>
+                    <a:bodyPr/>
+                    <a:lstStyle/>
+                    <a:p>
+                      <a:r>
+                        <a:rPr lang="it-IT" dirty="0" err="1"/>
+                        <a:t>Column</a:t>
+                      </a:r>
+                      <a:endParaRPr lang="it-IT" dirty="0"/>
+                    </a:p>
+                  </a:txBody>
+                  <a:tcPr/>
+                </a:tc>
+                <a:tc>
+                  <a:txBody>
+                    <a:bodyPr/>
+                    <a:lstStyle/>
+                    <a:p>
+                      <a:r>
+                        <a:rPr lang="it-IT" dirty="0" err="1"/>
+                        <a:t>Filed</a:t>
+                      </a:r>
+                      <a:endParaRPr lang="it-IT" dirty="0"/>
+                    </a:p>
+                  </a:txBody>
+                  <a:tcPr/>
+                </a:tc>
+                <a:tc>
+                  <a:txBody>
+                    <a:bodyPr/>
+                    <a:lstStyle/>
+                    <a:p>
+                      <a:r>
+                        <a:rPr lang="it-IT" dirty="0"/>
+                        <a:t>In RDBMS, la colonna denota un set di valori. In </a:t>
+                      </a:r>
+                      <a:r>
+                        <a:rPr lang="it-IT" dirty="0" err="1"/>
+                        <a:t>MongoDB</a:t>
+                      </a:r>
+                      <a:r>
+                        <a:rPr lang="it-IT" dirty="0"/>
+                        <a:t>, sono conosciuti come campi.</a:t>
+                      </a:r>
+                    </a:p>
+                  </a:txBody>
+                  <a:tcPr/>
+                </a:tc>
+                <a:extLst>
+                  <a:ext uri="{0D108BD9-81ED-4DB2-BD59-A6C34878D82A}">
+                    <a16:rowId xmlns:a16="http://schemas.microsoft.com/office/drawing/2014/main" val="3542496028"/>
+                  </a:ext>
+                </a:extLst>
+              </a:tr>
+              <a:tr h="645912">
+                <a:tc>
+                  <a:txBody>
+                    <a:bodyPr/>
+                    <a:lstStyle/>
+                    <a:p>
+                      <a:r>
+                        <a:rPr lang="it-IT" dirty="0"/>
+                        <a:t>Joins</a:t>
+                      </a:r>
+                    </a:p>
+                  </a:txBody>
+                  <a:tcPr/>
+                </a:tc>
+                <a:tc>
+                  <a:txBody>
+                    <a:bodyPr/>
+                    <a:lstStyle/>
+                    <a:p>
+                      <a:r>
+                        <a:rPr lang="it-IT" dirty="0"/>
+                        <a:t>Embedded </a:t>
+                      </a:r>
+                      <a:r>
+                        <a:rPr lang="it-IT" dirty="0" err="1"/>
+                        <a:t>documents</a:t>
+                      </a:r>
+                      <a:endParaRPr lang="it-IT" dirty="0"/>
+                    </a:p>
+                  </a:txBody>
+                  <a:tcPr/>
+                </a:tc>
+                <a:tc>
+                  <a:txBody>
+                    <a:bodyPr/>
+                    <a:lstStyle/>
+                    <a:p>
+                      <a:r>
+                        <a:rPr lang="it-IT" dirty="0"/>
+                        <a:t>In RDBMS, i dati a volte sono distribuiti su varie tabelle e per mostrare una vista completa di tutti i dati, a volte viene formato un join tra tabelle per ottenere i dati. In </a:t>
+                      </a:r>
+                      <a:r>
+                        <a:rPr lang="it-IT" dirty="0" err="1"/>
+                        <a:t>MongoDB</a:t>
+                      </a:r>
+                      <a:r>
+                        <a:rPr lang="it-IT" dirty="0"/>
+                        <a:t>, i dati vengono normalmente archiviati in un’unica raccolta, ma separati utilizzando documenti incorporati. Quindi non esiste il concetto di join in </a:t>
+                      </a:r>
+                      <a:r>
+                        <a:rPr lang="it-IT" dirty="0" err="1"/>
+                        <a:t>MongoDB</a:t>
+                      </a:r>
+                      <a:endParaRPr lang="it-IT" dirty="0"/>
+                    </a:p>
+                  </a:txBody>
+                  <a:tcPr/>
+                </a:tc>
+                <a:extLst>
+                  <a:ext uri="{0D108BD9-81ED-4DB2-BD59-A6C34878D82A}">
+                    <a16:rowId xmlns:a16="http://schemas.microsoft.com/office/drawing/2014/main" val="3462587373"/>
+                  </a:ext>
+                </a:extLst>
+              </a:tr>
+            </a:tbl>
+          </a:graphicData>
+        </a:graphic>
+      </p:graphicFrame>
+    </p:spTree>
+    <p:extLst>
+      <p:ext uri="{BB962C8B-B14F-4D97-AF65-F5344CB8AC3E}">
+        <p14:creationId xmlns:p14="http://schemas.microsoft.com/office/powerpoint/2010/main" val="3183540222"/>
+      </p:ext>
+    </p:extLst>
+  </p:cSld>
+  <p:clrMapOvr>
+    <a:masterClrMapping/>
+  </p:clrMapOvr>
+</p:sld>
+</file>
+
+<file path=ppt/slides/slide5.xml><?xml version="1.0" encoding="utf-8"?>
+<p:sld xmlns:a="http://schemas.openxmlformats.org/drawingml/2006/main" xmlns:r="http://schemas.openxmlformats.org/officeDocument/2006/relationships" xmlns:p="http://schemas.openxmlformats.org/presentationml/2006/main">
+  <p:cSld>
+    <p:spTree>
+      <p:nvGrpSpPr>
+        <p:cNvPr id="1" name=""/>
+        <p:cNvGrpSpPr/>
+        <p:nvPr/>
+      </p:nvGrpSpPr>
+      <p:grpSpPr>
+        <a:xfrm>
+          <a:off x="0" y="0"/>
+          <a:ext cx="0" cy="0"/>
+          <a:chOff x="0" y="0"/>
+          <a:chExt cx="0" cy="0"/>
+        </a:xfrm>
+      </p:grpSpPr>
+      <p:sp>
+        <p:nvSpPr>
+          <p:cNvPr id="2" name="Titolo 1">
+            <a:extLst>
+              <a:ext uri="{FF2B5EF4-FFF2-40B4-BE49-F238E27FC236}">
+                <a16:creationId xmlns:a16="http://schemas.microsoft.com/office/drawing/2014/main" id="{EA7127D0-0D6F-44E0-8CA6-20CE58F7CA29}"/>
+              </a:ext>
+            </a:extLst>
+          </p:cNvPr>
+          <p:cNvSpPr>
+            <a:spLocks noGrp="1"/>
+          </p:cNvSpPr>
+          <p:nvPr>
+            <p:ph type="title"/>
+          </p:nvPr>
+        </p:nvSpPr>
+        <p:spPr>
+          <a:xfrm>
+            <a:off x="436703" y="312821"/>
+            <a:ext cx="8596668" cy="807954"/>
+          </a:xfrm>
+        </p:spPr>
+        <p:txBody>
+          <a:bodyPr>
+            <a:normAutofit/>
+          </a:bodyPr>
+          <a:lstStyle/>
+          <a:p>
+            <a:r>
+              <a:rPr lang="it-IT" dirty="0"/>
+              <a:t>Vantaggi </a:t>
+            </a:r>
+            <a:r>
+              <a:rPr lang="it-IT" dirty="0" err="1"/>
+              <a:t>Document</a:t>
+            </a:r>
+            <a:r>
+              <a:rPr lang="it-IT" dirty="0"/>
+              <a:t> </a:t>
+            </a:r>
+            <a:r>
+              <a:rPr lang="it-IT" dirty="0" err="1"/>
+              <a:t>DataBase</a:t>
+            </a:r>
+            <a:endParaRPr lang="it-IT" dirty="0"/>
+          </a:p>
+        </p:txBody>
+      </p:sp>
+      <p:pic>
+        <p:nvPicPr>
+          <p:cNvPr id="5" name="Segnaposto contenuto 4">
+            <a:extLst>
+              <a:ext uri="{FF2B5EF4-FFF2-40B4-BE49-F238E27FC236}">
+                <a16:creationId xmlns:a16="http://schemas.microsoft.com/office/drawing/2014/main" id="{73F4FCAF-D629-4D78-B3B7-ACB51CFC1E06}"/>
+              </a:ext>
+            </a:extLst>
+          </p:cNvPr>
+          <p:cNvPicPr>
+            <a:picLocks noGrp="1" noChangeAspect="1"/>
+          </p:cNvPicPr>
+          <p:nvPr>
+            <p:ph idx="1"/>
+          </p:nvPr>
+        </p:nvPicPr>
+        <p:blipFill>
+          <a:blip r:embed="rId3">
+            <a:extLst>
+              <a:ext uri="{28A0092B-C50C-407E-A947-70E740481C1C}">
+                <a14:useLocalDpi xmlns:a14="http://schemas.microsoft.com/office/drawing/2010/main" val="0"/>
+              </a:ext>
+              <a:ext uri="{96DAC541-7B7A-43D3-8B79-37D633B846F1}">
+                <asvg:svgBlip xmlns:asvg="http://schemas.microsoft.com/office/drawing/2016/SVG/main" r:embed="rId4"/>
+              </a:ext>
+            </a:extLst>
+          </a:blip>
+          <a:stretch>
+            <a:fillRect/>
+          </a:stretch>
+        </p:blipFill>
+        <p:spPr>
+          <a:xfrm>
+            <a:off x="491456" y="1120775"/>
+            <a:ext cx="5429250" cy="1619250"/>
+          </a:xfrm>
+        </p:spPr>
+      </p:pic>
+      <p:sp>
+        <p:nvSpPr>
+          <p:cNvPr id="6" name="Segnaposto contenuto 2">
+            <a:extLst>
+              <a:ext uri="{FF2B5EF4-FFF2-40B4-BE49-F238E27FC236}">
+                <a16:creationId xmlns:a16="http://schemas.microsoft.com/office/drawing/2014/main" id="{2133E7B9-47F7-4451-91FB-77DEB1E48BA2}"/>
+              </a:ext>
+            </a:extLst>
+          </p:cNvPr>
+          <p:cNvSpPr txBox="1">
+            <a:spLocks/>
+          </p:cNvSpPr>
+          <p:nvPr/>
+        </p:nvSpPr>
+        <p:spPr>
+          <a:xfrm>
+            <a:off x="436703" y="2899110"/>
+            <a:ext cx="8596668" cy="3646069"/>
+          </a:xfrm>
+          <a:prstGeom prst="rect">
+            <a:avLst/>
+          </a:prstGeom>
+        </p:spPr>
+        <p:txBody>
+          <a:bodyPr vert="horz" lIns="91440" tIns="45720" rIns="91440" bIns="45720" rtlCol="0">
+            <a:normAutofit/>
+          </a:bodyPr>
+          <a:lstStyle>
+            <a:lvl1pPr marL="342900" indent="-342900" algn="l" defTabSz="457200" rtl="0" eaLnBrk="1" latinLnBrk="0" hangingPunct="1">
+              <a:spcBef>
+                <a:spcPts val="1000"/>
+              </a:spcBef>
+              <a:spcAft>
+                <a:spcPts val="0"/>
+              </a:spcAft>
+              <a:buClr>
+                <a:schemeClr val="accent1"/>
+              </a:buClr>
+              <a:buSzPct val="80000"/>
+              <a:buFont typeface="Wingdings 3" charset="2"/>
+              <a:buChar char=""/>
+              <a:defRPr sz="1800" kern="1200">
+                <a:solidFill>
+                  <a:schemeClr val="tx1">
+                    <a:lumMod val="75000"/>
+                    <a:lumOff val="25000"/>
+                  </a:schemeClr>
+                </a:solidFill>
+                <a:latin typeface="+mn-lt"/>
+                <a:ea typeface="+mn-ea"/>
+                <a:cs typeface="+mn-cs"/>
+              </a:defRPr>
+            </a:lvl1pPr>
+            <a:lvl2pPr marL="742950" indent="-285750" algn="l" defTabSz="457200" rtl="0" eaLnBrk="1" latinLnBrk="0" hangingPunct="1">
+              <a:spcBef>
+                <a:spcPts val="1000"/>
+              </a:spcBef>
+              <a:spcAft>
+                <a:spcPts val="0"/>
+              </a:spcAft>
+              <a:buClr>
+                <a:schemeClr val="accent1"/>
+              </a:buClr>
+              <a:buSzPct val="80000"/>
+              <a:buFont typeface="Wingdings 3" charset="2"/>
+              <a:buChar char=""/>
+              <a:defRPr sz="1600" kern="1200">
+                <a:solidFill>
+                  <a:schemeClr val="tx1">
+                    <a:lumMod val="75000"/>
+                    <a:lumOff val="25000"/>
+                  </a:schemeClr>
+                </a:solidFill>
+                <a:latin typeface="+mn-lt"/>
+                <a:ea typeface="+mn-ea"/>
+                <a:cs typeface="+mn-cs"/>
+              </a:defRPr>
+            </a:lvl2pPr>
+            <a:lvl3pPr marL="1143000" indent="-228600" algn="l" defTabSz="457200" rtl="0" eaLnBrk="1" latinLnBrk="0" hangingPunct="1">
+              <a:spcBef>
+                <a:spcPts val="1000"/>
+              </a:spcBef>
+              <a:spcAft>
+                <a:spcPts val="0"/>
+              </a:spcAft>
+              <a:buClr>
+                <a:schemeClr val="accent1"/>
+              </a:buClr>
+              <a:buSzPct val="80000"/>
+              <a:buFont typeface="Wingdings 3" charset="2"/>
+              <a:buChar char=""/>
+              <a:defRPr sz="1400" kern="1200">
+                <a:solidFill>
+                  <a:schemeClr val="tx1">
+                    <a:lumMod val="75000"/>
+                    <a:lumOff val="25000"/>
+                  </a:schemeClr>
+                </a:solidFill>
+                <a:latin typeface="+mn-lt"/>
+                <a:ea typeface="+mn-ea"/>
+                <a:cs typeface="+mn-cs"/>
+              </a:defRPr>
+            </a:lvl3pPr>
+            <a:lvl4pPr marL="1600200" indent="-228600" algn="l" defTabSz="457200" rtl="0" eaLnBrk="1" latinLnBrk="0" hangingPunct="1">
+              <a:spcBef>
+                <a:spcPts val="1000"/>
+              </a:spcBef>
+              <a:spcAft>
+                <a:spcPts val="0"/>
+              </a:spcAft>
+              <a:buClr>
+                <a:schemeClr val="accent1"/>
+              </a:buClr>
+              <a:buSzPct val="80000"/>
+              <a:buFont typeface="Wingdings 3" charset="2"/>
+              <a:buChar char=""/>
+              <a:defRPr sz="1200" kern="1200">
+                <a:solidFill>
+                  <a:schemeClr val="tx1">
+                    <a:lumMod val="75000"/>
+                    <a:lumOff val="25000"/>
+                  </a:schemeClr>
+                </a:solidFill>
+                <a:latin typeface="+mn-lt"/>
+                <a:ea typeface="+mn-ea"/>
+                <a:cs typeface="+mn-cs"/>
+              </a:defRPr>
+            </a:lvl4pPr>
+            <a:lvl5pPr marL="2057400" indent="-228600" algn="l" defTabSz="457200" rtl="0" eaLnBrk="1" latinLnBrk="0" hangingPunct="1">
+              <a:spcBef>
+                <a:spcPts val="1000"/>
+              </a:spcBef>
+              <a:spcAft>
+                <a:spcPts val="0"/>
+              </a:spcAft>
+              <a:buClr>
+                <a:schemeClr val="accent1"/>
+              </a:buClr>
+              <a:buSzPct val="80000"/>
+              <a:buFont typeface="Wingdings 3" charset="2"/>
+              <a:buChar char=""/>
+              <a:defRPr sz="1200" kern="1200">
+                <a:solidFill>
+                  <a:schemeClr val="tx1">
+                    <a:lumMod val="75000"/>
+                    <a:lumOff val="25000"/>
+                  </a:schemeClr>
+                </a:solidFill>
+                <a:latin typeface="+mn-lt"/>
+                <a:ea typeface="+mn-ea"/>
+                <a:cs typeface="+mn-cs"/>
+              </a:defRPr>
+            </a:lvl5pPr>
+            <a:lvl6pPr marL="2514600" indent="-228600" algn="l" defTabSz="457200" rtl="0" eaLnBrk="1" latinLnBrk="0" hangingPunct="1">
+              <a:spcBef>
+                <a:spcPts val="1000"/>
+              </a:spcBef>
+              <a:spcAft>
+                <a:spcPts val="0"/>
+              </a:spcAft>
+              <a:buClr>
+                <a:schemeClr val="accent1"/>
+              </a:buClr>
+              <a:buSzPct val="80000"/>
+              <a:buFont typeface="Wingdings 3" charset="2"/>
+              <a:buChar char=""/>
+              <a:defRPr sz="1200" kern="1200">
+                <a:solidFill>
+                  <a:schemeClr val="tx1">
+                    <a:lumMod val="75000"/>
+                    <a:lumOff val="25000"/>
+                  </a:schemeClr>
+                </a:solidFill>
+                <a:latin typeface="+mn-lt"/>
+                <a:ea typeface="+mn-ea"/>
+                <a:cs typeface="+mn-cs"/>
+              </a:defRPr>
+            </a:lvl6pPr>
+            <a:lvl7pPr marL="2971800" indent="-228600" algn="l" defTabSz="457200" rtl="0" eaLnBrk="1" latinLnBrk="0" hangingPunct="1">
+              <a:spcBef>
+                <a:spcPts val="1000"/>
+              </a:spcBef>
+              <a:spcAft>
+                <a:spcPts val="0"/>
+              </a:spcAft>
+              <a:buClr>
+                <a:schemeClr val="accent1"/>
+              </a:buClr>
+              <a:buSzPct val="80000"/>
+              <a:buFont typeface="Wingdings 3" charset="2"/>
+              <a:buChar char=""/>
+              <a:defRPr sz="1200" kern="1200">
+                <a:solidFill>
+                  <a:schemeClr val="tx1">
+                    <a:lumMod val="75000"/>
+                    <a:lumOff val="25000"/>
+                  </a:schemeClr>
+                </a:solidFill>
+                <a:latin typeface="+mn-lt"/>
+                <a:ea typeface="+mn-ea"/>
+                <a:cs typeface="+mn-cs"/>
+              </a:defRPr>
+            </a:lvl7pPr>
+            <a:lvl8pPr marL="3429000" indent="-228600" algn="l" defTabSz="457200" rtl="0" eaLnBrk="1" latinLnBrk="0" hangingPunct="1">
+              <a:spcBef>
+                <a:spcPts val="1000"/>
+              </a:spcBef>
+              <a:spcAft>
+                <a:spcPts val="0"/>
+              </a:spcAft>
+              <a:buClr>
+                <a:schemeClr val="accent1"/>
+              </a:buClr>
+              <a:buSzPct val="80000"/>
+              <a:buFont typeface="Wingdings 3" charset="2"/>
+              <a:buChar char=""/>
+              <a:defRPr sz="1200" kern="1200">
+                <a:solidFill>
+                  <a:schemeClr val="tx1">
+                    <a:lumMod val="75000"/>
+                    <a:lumOff val="25000"/>
+                  </a:schemeClr>
+                </a:solidFill>
+                <a:latin typeface="+mn-lt"/>
+                <a:ea typeface="+mn-ea"/>
+                <a:cs typeface="+mn-cs"/>
+              </a:defRPr>
+            </a:lvl8pPr>
+            <a:lvl9pPr marL="3886200" indent="-228600" algn="l" defTabSz="457200" rtl="0" eaLnBrk="1" latinLnBrk="0" hangingPunct="1">
+              <a:spcBef>
+                <a:spcPts val="1000"/>
+              </a:spcBef>
+              <a:spcAft>
+                <a:spcPts val="0"/>
+              </a:spcAft>
+              <a:buClr>
+                <a:schemeClr val="accent1"/>
+              </a:buClr>
+              <a:buSzPct val="80000"/>
+              <a:buFont typeface="Wingdings 3" charset="2"/>
+              <a:buChar char=""/>
+              <a:defRPr sz="1200" kern="1200">
+                <a:solidFill>
+                  <a:schemeClr val="tx1">
+                    <a:lumMod val="75000"/>
+                    <a:lumOff val="25000"/>
+                  </a:schemeClr>
+                </a:solidFill>
+                <a:latin typeface="+mn-lt"/>
+                <a:ea typeface="+mn-ea"/>
+                <a:cs typeface="+mn-cs"/>
+              </a:defRPr>
+            </a:lvl9pPr>
+          </a:lstStyle>
+          <a:p>
+            <a:r>
+              <a:rPr lang="it-IT" dirty="0"/>
+              <a:t>Estremamente flessibile nella rappresentazione e gestione del dato.</a:t>
+            </a:r>
+          </a:p>
+          <a:p>
+            <a:r>
+              <a:rPr lang="it-IT" dirty="0"/>
+              <a:t>La struttura del documento è più in linea con il modo in cui gli sviluppatori costruiscono le loro classi e oggetti nei rispettivi linguaggi di programmazione.</a:t>
+            </a:r>
+          </a:p>
+          <a:p>
+            <a:r>
+              <a:rPr lang="it-IT" dirty="0"/>
+              <a:t>Non è necessario che i </a:t>
+            </a:r>
+            <a:r>
+              <a:rPr lang="it-IT" dirty="0" err="1"/>
+              <a:t>documents</a:t>
+            </a:r>
+            <a:r>
+              <a:rPr lang="it-IT" dirty="0"/>
+              <a:t> abbiano uno schema definito in anticipo. Infatti, i fields possono essere creati al volo.</a:t>
+            </a:r>
+          </a:p>
+          <a:p>
+            <a:r>
+              <a:rPr lang="it-IT" dirty="0"/>
+              <a:t>Il modello di dati disponibile all'interno di </a:t>
+            </a:r>
+            <a:r>
+              <a:rPr lang="it-IT" dirty="0" err="1"/>
+              <a:t>MongoDB</a:t>
+            </a:r>
+            <a:r>
+              <a:rPr lang="it-IT" dirty="0"/>
+              <a:t> consente di rappresentare più facilmente relazioni gerarchiche, memorizzare array e altre strutture più complesse.</a:t>
+            </a:r>
+          </a:p>
+        </p:txBody>
+      </p:sp>
+    </p:spTree>
+    <p:extLst>
+      <p:ext uri="{BB962C8B-B14F-4D97-AF65-F5344CB8AC3E}">
+        <p14:creationId xmlns:p14="http://schemas.microsoft.com/office/powerpoint/2010/main" val="3854799690"/>
+      </p:ext>
+    </p:extLst>
+  </p:cSld>
+  <p:clrMapOvr>
+    <a:masterClrMapping/>
+  </p:clrMapOvr>
+</p:sld>
+</file>
+
+<file path=ppt/slides/slide6.xml><?xml version="1.0" encoding="utf-8"?>
+<p:sld xmlns:a="http://schemas.openxmlformats.org/drawingml/2006/main" xmlns:r="http://schemas.openxmlformats.org/officeDocument/2006/relationships" xmlns:p="http://schemas.openxmlformats.org/presentationml/2006/main">
+  <p:cSld>
+    <p:spTree>
+      <p:nvGrpSpPr>
+        <p:cNvPr id="1" name=""/>
+        <p:cNvGrpSpPr/>
+        <p:nvPr/>
+      </p:nvGrpSpPr>
+      <p:grpSpPr>
+        <a:xfrm>
+          <a:off x="0" y="0"/>
+          <a:ext cx="0" cy="0"/>
+          <a:chOff x="0" y="0"/>
+          <a:chExt cx="0" cy="0"/>
+        </a:xfrm>
+      </p:grpSpPr>
+      <p:sp>
+        <p:nvSpPr>
+          <p:cNvPr id="2" name="Titolo 1">
+            <a:extLst>
+              <a:ext uri="{FF2B5EF4-FFF2-40B4-BE49-F238E27FC236}">
+                <a16:creationId xmlns:a16="http://schemas.microsoft.com/office/drawing/2014/main" id="{C2043950-A15A-4ABF-AF3C-DA57B25F75F4}"/>
+              </a:ext>
+            </a:extLst>
+          </p:cNvPr>
+          <p:cNvSpPr>
+            <a:spLocks noGrp="1"/>
+          </p:cNvSpPr>
+          <p:nvPr>
+            <p:ph type="title"/>
+          </p:nvPr>
+        </p:nvSpPr>
+        <p:spPr>
+          <a:xfrm>
+            <a:off x="577515" y="132348"/>
+            <a:ext cx="8596668" cy="665747"/>
+          </a:xfrm>
+        </p:spPr>
+        <p:txBody>
+          <a:bodyPr/>
+          <a:lstStyle/>
+          <a:p>
+            <a:r>
+              <a:rPr lang="it-IT" dirty="0"/>
+              <a:t>Caratteristiche principali di </a:t>
+            </a:r>
+            <a:r>
+              <a:rPr lang="it-IT" dirty="0" err="1"/>
+              <a:t>MongoDB</a:t>
+            </a:r>
+            <a:endParaRPr lang="it-IT" dirty="0"/>
+          </a:p>
+        </p:txBody>
+      </p:sp>
+      <p:sp>
+        <p:nvSpPr>
+          <p:cNvPr id="3" name="Segnaposto contenuto 2">
+            <a:extLst>
+              <a:ext uri="{FF2B5EF4-FFF2-40B4-BE49-F238E27FC236}">
+                <a16:creationId xmlns:a16="http://schemas.microsoft.com/office/drawing/2014/main" id="{EE31C18A-A597-414F-8E94-7FF51BB96553}"/>
+              </a:ext>
+            </a:extLst>
+          </p:cNvPr>
+          <p:cNvSpPr>
+            <a:spLocks noGrp="1"/>
+          </p:cNvSpPr>
+          <p:nvPr>
+            <p:ph idx="1"/>
+          </p:nvPr>
+        </p:nvSpPr>
+        <p:spPr>
+          <a:xfrm>
+            <a:off x="577515" y="998621"/>
+            <a:ext cx="9276347" cy="5727031"/>
+          </a:xfrm>
+        </p:spPr>
+        <p:txBody>
+          <a:bodyPr>
+            <a:normAutofit lnSpcReduction="10000"/>
+          </a:bodyPr>
+          <a:lstStyle/>
+          <a:p>
+            <a:r>
+              <a:rPr lang="it-IT" dirty="0"/>
+              <a:t>Elevate prestazioni: </a:t>
+            </a:r>
+            <a:r>
+              <a:rPr lang="it-IT" dirty="0" err="1"/>
+              <a:t>MongoDB</a:t>
+            </a:r>
+            <a:r>
+              <a:rPr lang="it-IT" dirty="0"/>
+              <a:t> </a:t>
+            </a:r>
+            <a:r>
+              <a:rPr lang="it-IT" dirty="0" err="1"/>
+              <a:t>fornische</a:t>
+            </a:r>
+            <a:r>
+              <a:rPr lang="it-IT" dirty="0"/>
+              <a:t> la persistenza dei dati ad alte prestazioni. In particolare:</a:t>
+            </a:r>
+          </a:p>
+          <a:p>
+            <a:pPr lvl="1"/>
+            <a:r>
+              <a:rPr lang="it-IT" dirty="0"/>
+              <a:t>Il supporto per i dati embedded riduce l’</a:t>
+            </a:r>
+            <a:r>
+              <a:rPr lang="it-IT" dirty="0" err="1"/>
+              <a:t>attivatà</a:t>
+            </a:r>
+            <a:r>
+              <a:rPr lang="it-IT" dirty="0"/>
+              <a:t> I/O sul sistema di database.</a:t>
+            </a:r>
+          </a:p>
+          <a:p>
+            <a:pPr lvl="1"/>
+            <a:r>
+              <a:rPr lang="it-IT" dirty="0"/>
+              <a:t>Gli indici supportano query più veloci e possono includere chiavi da embedded </a:t>
+            </a:r>
+            <a:r>
+              <a:rPr lang="it-IT" dirty="0" err="1"/>
+              <a:t>documents</a:t>
+            </a:r>
+            <a:r>
+              <a:rPr lang="it-IT" dirty="0"/>
+              <a:t> e arrays.</a:t>
+            </a:r>
+          </a:p>
+          <a:p>
+            <a:r>
+              <a:rPr lang="it-IT" dirty="0"/>
+              <a:t>Linguaggio di Query avanzato per supportare le operazioni di lettura e scrittura:</a:t>
+            </a:r>
+          </a:p>
+          <a:p>
+            <a:pPr lvl="1"/>
+            <a:r>
+              <a:rPr lang="it-IT" dirty="0"/>
+              <a:t>Aggregazione dei dati.</a:t>
+            </a:r>
+          </a:p>
+          <a:p>
+            <a:pPr lvl="1"/>
+            <a:r>
+              <a:rPr lang="it-IT" dirty="0"/>
+              <a:t>Ricerca di testo e Queries Geospaziali.</a:t>
+            </a:r>
+          </a:p>
+          <a:p>
+            <a:r>
+              <a:rPr lang="it-IT" dirty="0"/>
+              <a:t>Elevata </a:t>
+            </a:r>
+            <a:r>
+              <a:rPr lang="it-IT" dirty="0" err="1"/>
+              <a:t>Availability</a:t>
+            </a:r>
+            <a:r>
+              <a:rPr lang="it-IT" dirty="0"/>
+              <a:t>: ho funzione replica set che </a:t>
+            </a:r>
+            <a:r>
+              <a:rPr lang="it-IT" dirty="0" err="1"/>
+              <a:t>fornische</a:t>
+            </a:r>
+            <a:r>
+              <a:rPr lang="it-IT" dirty="0"/>
+              <a:t>:</a:t>
+            </a:r>
+          </a:p>
+          <a:p>
+            <a:pPr lvl="1"/>
+            <a:r>
+              <a:rPr lang="it-IT" dirty="0" err="1"/>
+              <a:t>Automatic</a:t>
+            </a:r>
+            <a:r>
+              <a:rPr lang="it-IT" dirty="0"/>
+              <a:t> </a:t>
+            </a:r>
+            <a:r>
+              <a:rPr lang="it-IT" dirty="0" err="1"/>
+              <a:t>failover</a:t>
+            </a:r>
+            <a:r>
+              <a:rPr lang="it-IT" dirty="0"/>
+              <a:t>.</a:t>
+            </a:r>
+          </a:p>
+          <a:p>
+            <a:pPr lvl="1"/>
+            <a:r>
+              <a:rPr lang="it-IT" dirty="0"/>
+              <a:t>Data </a:t>
+            </a:r>
+            <a:r>
+              <a:rPr lang="it-IT" dirty="0" err="1"/>
+              <a:t>redundancy</a:t>
+            </a:r>
+            <a:r>
+              <a:rPr lang="it-IT" dirty="0"/>
+              <a:t>.</a:t>
+            </a:r>
+          </a:p>
+          <a:p>
+            <a:r>
+              <a:rPr lang="it-IT" dirty="0"/>
+              <a:t>Scalabilità orizzontale: è una della parti principale della sue funzionalità.</a:t>
+            </a:r>
+          </a:p>
+          <a:p>
+            <a:pPr lvl="1"/>
+            <a:r>
+              <a:rPr lang="en-US" dirty="0" err="1"/>
+              <a:t>Sharding</a:t>
+            </a:r>
+            <a:r>
+              <a:rPr lang="en-US" dirty="0"/>
+              <a:t> distributes data across a cluster of machines</a:t>
+            </a:r>
+            <a:r>
+              <a:rPr lang="it-IT" dirty="0"/>
+              <a:t>.</a:t>
+            </a:r>
+          </a:p>
+          <a:p>
+            <a:r>
+              <a:rPr lang="it-IT" dirty="0"/>
+              <a:t>Supporto per Multiple Storage </a:t>
+            </a:r>
+            <a:r>
+              <a:rPr lang="it-IT" dirty="0" err="1"/>
+              <a:t>Engines</a:t>
+            </a:r>
+            <a:r>
+              <a:rPr lang="it-IT" dirty="0"/>
+              <a:t>:</a:t>
+            </a:r>
+          </a:p>
+          <a:p>
+            <a:pPr lvl="1"/>
+            <a:r>
+              <a:rPr lang="it-IT" dirty="0" err="1"/>
+              <a:t>WiredTiger</a:t>
+            </a:r>
+            <a:r>
+              <a:rPr lang="it-IT" dirty="0"/>
+              <a:t> Storage Engine.</a:t>
+            </a:r>
+          </a:p>
+          <a:p>
+            <a:pPr lvl="1"/>
+            <a:r>
+              <a:rPr lang="it-IT" dirty="0"/>
+              <a:t>In-Memory Storage Engine.</a:t>
+            </a:r>
+          </a:p>
+          <a:p>
+            <a:endParaRPr lang="it-IT" dirty="0"/>
+          </a:p>
+        </p:txBody>
+      </p:sp>
+    </p:spTree>
+    <p:extLst>
+      <p:ext uri="{BB962C8B-B14F-4D97-AF65-F5344CB8AC3E}">
+        <p14:creationId xmlns:p14="http://schemas.microsoft.com/office/powerpoint/2010/main" val="550609295"/>
+      </p:ext>
+    </p:extLst>
+  </p:cSld>
+  <p:clrMapOvr>
+    <a:masterClrMapping/>
+  </p:clrMapOvr>
+</p:sld>
+</file>
+
+<file path=ppt/slides/slide7.xml><?xml version="1.0" encoding="utf-8"?>
+<p:sld xmlns:a="http://schemas.openxmlformats.org/drawingml/2006/main" xmlns:r="http://schemas.openxmlformats.org/officeDocument/2006/relationships" xmlns:p="http://schemas.openxmlformats.org/presentationml/2006/main">
+  <p:cSld>
+    <p:spTree>
+      <p:nvGrpSpPr>
+        <p:cNvPr id="1" name=""/>
+        <p:cNvGrpSpPr/>
+        <p:nvPr/>
+      </p:nvGrpSpPr>
+      <p:grpSpPr>
+        <a:xfrm>
+          <a:off x="0" y="0"/>
+          <a:ext cx="0" cy="0"/>
+          <a:chOff x="0" y="0"/>
+          <a:chExt cx="0" cy="0"/>
+        </a:xfrm>
+      </p:grpSpPr>
+      <p:sp>
+        <p:nvSpPr>
+          <p:cNvPr id="2" name="Titolo 1">
+            <a:extLst>
+              <a:ext uri="{FF2B5EF4-FFF2-40B4-BE49-F238E27FC236}">
+                <a16:creationId xmlns:a16="http://schemas.microsoft.com/office/drawing/2014/main" id="{DE09E4BC-2C0C-4798-855E-68B380D6C46B}"/>
+              </a:ext>
+            </a:extLst>
+          </p:cNvPr>
+          <p:cNvSpPr>
+            <a:spLocks noGrp="1"/>
+          </p:cNvSpPr>
+          <p:nvPr>
+            <p:ph type="title"/>
+          </p:nvPr>
+        </p:nvSpPr>
+        <p:spPr/>
+        <p:txBody>
+          <a:bodyPr/>
+          <a:lstStyle/>
+          <a:p>
+            <a:r>
+              <a:rPr lang="it-IT" dirty="0"/>
+              <a:t>Architettura distribuita </a:t>
+            </a:r>
+            <a:r>
+              <a:rPr lang="it-IT" dirty="0" err="1"/>
+              <a:t>MongoDB</a:t>
+            </a:r>
+            <a:r>
+              <a:rPr lang="it-IT" dirty="0"/>
+              <a:t>: </a:t>
+            </a:r>
+            <a:r>
+              <a:rPr lang="it-IT" dirty="0" err="1"/>
+              <a:t>Sharding</a:t>
+            </a:r>
+            <a:endParaRPr lang="it-IT" dirty="0"/>
+          </a:p>
+        </p:txBody>
+      </p:sp>
+      <p:sp>
+        <p:nvSpPr>
+          <p:cNvPr id="3" name="Segnaposto contenuto 2">
+            <a:extLst>
+              <a:ext uri="{FF2B5EF4-FFF2-40B4-BE49-F238E27FC236}">
+                <a16:creationId xmlns:a16="http://schemas.microsoft.com/office/drawing/2014/main" id="{5003E044-0272-41A9-8DB5-E499E02E7575}"/>
+              </a:ext>
+            </a:extLst>
+          </p:cNvPr>
+          <p:cNvSpPr>
+            <a:spLocks noGrp="1"/>
+          </p:cNvSpPr>
+          <p:nvPr>
+            <p:ph idx="1"/>
+          </p:nvPr>
+        </p:nvSpPr>
+        <p:spPr/>
+        <p:txBody>
+          <a:bodyPr/>
+          <a:lstStyle/>
+          <a:p>
+            <a:endParaRPr lang="it-IT" dirty="0"/>
+          </a:p>
+        </p:txBody>
+      </p:sp>
+    </p:spTree>
+    <p:extLst>
+      <p:ext uri="{BB962C8B-B14F-4D97-AF65-F5344CB8AC3E}">
+        <p14:creationId xmlns:p14="http://schemas.microsoft.com/office/powerpoint/2010/main" val="1959518528"/>
+      </p:ext>
+    </p:extLst>
+  </p:cSld>
+  <p:clrMapOvr>
+    <a:masterClrMapping/>
+  </p:clrMapOvr>
+</p:sld>
+</file>
+
+<file path=ppt/slides/slide8.xml><?xml version="1.0" encoding="utf-8"?>
+<p:sld xmlns:a="http://schemas.openxmlformats.org/drawingml/2006/main" xmlns:r="http://schemas.openxmlformats.org/officeDocument/2006/relationships" xmlns:p="http://schemas.openxmlformats.org/presentationml/2006/main">
+  <p:cSld>
+    <p:spTree>
+      <p:nvGrpSpPr>
+        <p:cNvPr id="1" name=""/>
+        <p:cNvGrpSpPr/>
+        <p:nvPr/>
+      </p:nvGrpSpPr>
+      <p:grpSpPr>
+        <a:xfrm>
+          <a:off x="0" y="0"/>
+          <a:ext cx="0" cy="0"/>
+          <a:chOff x="0" y="0"/>
+          <a:chExt cx="0" cy="0"/>
+        </a:xfrm>
+      </p:grpSpPr>
+      <p:sp>
+        <p:nvSpPr>
+          <p:cNvPr id="2" name="Titolo 1">
+            <a:extLst>
+              <a:ext uri="{FF2B5EF4-FFF2-40B4-BE49-F238E27FC236}">
                 <a16:creationId xmlns:a16="http://schemas.microsoft.com/office/drawing/2014/main" id="{4EC9AA5C-8EC2-47D0-AC90-F260725B5224}"/>
               </a:ext>
             </a:extLst>
@@ -7315,7 +8946,7 @@
         </p:nvSpPr>
         <p:spPr>
           <a:xfrm>
-            <a:off x="677334" y="1371601"/>
+            <a:off x="677334" y="1600201"/>
             <a:ext cx="8596668" cy="3962400"/>
           </a:xfrm>
         </p:spPr>
@@ -7347,7 +8978,7 @@
             </a:r>
             <a:r>
               <a:rPr lang="it-IT" dirty="0"/>
-              <a:t> abbiano uno schema definito in anticipo. Invece, i fields possono essere creati al volo.</a:t>
+              <a:t> abbiano uno schema definito in anticipo. Infatti, i fields possono essere creati al volo.</a:t>
             </a:r>
           </a:p>
           <a:p>

</xml_diff>

<commit_message>
Parte replica set da terminare
</commit_message>
<xml_diff>
--- a/Presentazione_progetto.pptx
+++ b/Presentazione_progetto.pptx
@@ -5,7 +5,7 @@
     <p:sldMasterId id="2147483672" r:id="rId1"/>
   </p:sldMasterIdLst>
   <p:notesMasterIdLst>
-    <p:notesMasterId r:id="rId10"/>
+    <p:notesMasterId r:id="rId17"/>
   </p:notesMasterIdLst>
   <p:sldIdLst>
     <p:sldId id="256" r:id="rId2"/>
@@ -15,7 +15,14 @@
     <p:sldId id="261" r:id="rId6"/>
     <p:sldId id="262" r:id="rId7"/>
     <p:sldId id="263" r:id="rId8"/>
-    <p:sldId id="259" r:id="rId9"/>
+    <p:sldId id="264" r:id="rId9"/>
+    <p:sldId id="265" r:id="rId10"/>
+    <p:sldId id="266" r:id="rId11"/>
+    <p:sldId id="267" r:id="rId12"/>
+    <p:sldId id="268" r:id="rId13"/>
+    <p:sldId id="269" r:id="rId14"/>
+    <p:sldId id="270" r:id="rId15"/>
+    <p:sldId id="259" r:id="rId16"/>
   </p:sldIdLst>
   <p:sldSz cx="12192000" cy="6858000"/>
   <p:notesSz cx="6858000" cy="9144000"/>
@@ -204,7 +211,7 @@
           <a:p>
             <a:fld id="{5D86E91A-6C9D-48EA-9EAF-BBA9F3961CF9}" type="datetimeFigureOut">
               <a:rPr lang="it-IT" smtClean="0"/>
-              <a:t>15/03/2022</a:t>
+              <a:t>16/03/2022</a:t>
             </a:fld>
             <a:endParaRPr lang="it-IT"/>
           </a:p>
@@ -986,6 +993,442 @@
           <a:bodyPr/>
           <a:lstStyle/>
           <a:p>
+            <a:pPr marL="0" marR="0" lvl="0" indent="0" algn="l" defTabSz="914400" rtl="0" eaLnBrk="1" fontAlgn="auto" latinLnBrk="0" hangingPunct="1">
+              <a:lnSpc>
+                <a:spcPct val="100000"/>
+              </a:lnSpc>
+              <a:spcBef>
+                <a:spcPts val="0"/>
+              </a:spcBef>
+              <a:spcAft>
+                <a:spcPts val="0"/>
+              </a:spcAft>
+              <a:buClrTx/>
+              <a:buSzTx/>
+              <a:buFontTx/>
+              <a:buNone/>
+              <a:tabLst/>
+              <a:defRPr/>
+            </a:pPr>
+            <a:r>
+              <a:rPr lang="it-IT" dirty="0"/>
+              <a:t>È inoltre possibile mantenere copie aggiuntive per scopi dedicati, come il ripristino di emergenza, la creazione di report o il backup. </a:t>
+            </a:r>
+          </a:p>
+          <a:p>
+            <a:pPr marL="0" marR="0" lvl="0" indent="0" algn="l" defTabSz="914400" rtl="0" eaLnBrk="1" fontAlgn="auto" latinLnBrk="0" hangingPunct="1">
+              <a:lnSpc>
+                <a:spcPct val="100000"/>
+              </a:lnSpc>
+              <a:spcBef>
+                <a:spcPts val="0"/>
+              </a:spcBef>
+              <a:spcAft>
+                <a:spcPts val="0"/>
+              </a:spcAft>
+              <a:buClrTx/>
+              <a:buSzTx/>
+              <a:buFontTx/>
+              <a:buNone/>
+              <a:tabLst/>
+              <a:defRPr/>
+            </a:pPr>
+            <a:r>
+              <a:rPr lang="it-IT" b="1" dirty="0"/>
+              <a:t>Un set di repliche = </a:t>
+            </a:r>
+            <a:r>
+              <a:rPr lang="it-IT" dirty="0"/>
+              <a:t>gruppo di istanze </a:t>
+            </a:r>
+            <a:r>
+              <a:rPr lang="it-IT" dirty="0" err="1"/>
+              <a:t>mongod</a:t>
+            </a:r>
+            <a:r>
+              <a:rPr lang="it-IT" dirty="0"/>
+              <a:t> che mantengono lo stesso set di dati. Un set di repliche contiene diversi nodi portanti dati e facoltativamente un nodo arbitro. Dei nodi portanti dati, uno e un solo membro è considerato il nodo primario, mentre gli altri nodi sono considerati nodi secondari.</a:t>
+            </a:r>
+          </a:p>
+          <a:p>
+            <a:pPr marL="0" marR="0" lvl="0" indent="0" algn="l" defTabSz="914400" rtl="0" eaLnBrk="1" fontAlgn="auto" latinLnBrk="0" hangingPunct="1">
+              <a:lnSpc>
+                <a:spcPct val="100000"/>
+              </a:lnSpc>
+              <a:spcBef>
+                <a:spcPts val="0"/>
+              </a:spcBef>
+              <a:spcAft>
+                <a:spcPts val="0"/>
+              </a:spcAft>
+              <a:buClrTx/>
+              <a:buSzTx/>
+              <a:buFontTx/>
+              <a:buNone/>
+              <a:tabLst/>
+              <a:defRPr/>
+            </a:pPr>
+            <a:r>
+              <a:rPr lang="it-IT" b="1" dirty="0" err="1"/>
+              <a:t>Mongod</a:t>
+            </a:r>
+            <a:r>
+              <a:rPr lang="it-IT" dirty="0"/>
+              <a:t> =  processo </a:t>
+            </a:r>
+            <a:r>
+              <a:rPr lang="it-IT" dirty="0" err="1"/>
+              <a:t>deamon</a:t>
+            </a:r>
+            <a:r>
+              <a:rPr lang="it-IT" dirty="0"/>
+              <a:t>  principale per il sistema </a:t>
+            </a:r>
+            <a:r>
+              <a:rPr lang="it-IT" dirty="0" err="1"/>
+              <a:t>MongoDB</a:t>
+            </a:r>
+            <a:r>
+              <a:rPr lang="it-IT" dirty="0"/>
+              <a:t>. Gestisce le richieste di dati, gestisce l'accesso ai dati ed esegue operazioni di gestione in background. </a:t>
+            </a:r>
+          </a:p>
+          <a:p>
+            <a:endParaRPr lang="it-IT" dirty="0"/>
+          </a:p>
+        </p:txBody>
+      </p:sp>
+      <p:sp>
+        <p:nvSpPr>
+          <p:cNvPr id="4" name="Segnaposto numero diapositiva 3"/>
+          <p:cNvSpPr>
+            <a:spLocks noGrp="1"/>
+          </p:cNvSpPr>
+          <p:nvPr>
+            <p:ph type="sldNum" sz="quarter" idx="5"/>
+          </p:nvPr>
+        </p:nvSpPr>
+        <p:spPr/>
+        <p:txBody>
+          <a:bodyPr/>
+          <a:lstStyle/>
+          <a:p>
+            <a:fld id="{7B9EF5EE-42ED-4142-B01A-B637985E9B70}" type="slidenum">
+              <a:rPr lang="it-IT" smtClean="0"/>
+              <a:t>8</a:t>
+            </a:fld>
+            <a:endParaRPr lang="it-IT"/>
+          </a:p>
+        </p:txBody>
+      </p:sp>
+    </p:spTree>
+    <p:extLst>
+      <p:ext uri="{BB962C8B-B14F-4D97-AF65-F5344CB8AC3E}">
+        <p14:creationId xmlns:p14="http://schemas.microsoft.com/office/powerpoint/2010/main" val="3616458286"/>
+      </p:ext>
+    </p:extLst>
+  </p:cSld>
+  <p:clrMapOvr>
+    <a:masterClrMapping/>
+  </p:clrMapOvr>
+</p:notes>
+</file>
+
+<file path=ppt/notesSlides/notesSlide6.xml><?xml version="1.0" encoding="utf-8"?>
+<p:notes xmlns:a="http://schemas.openxmlformats.org/drawingml/2006/main" xmlns:r="http://schemas.openxmlformats.org/officeDocument/2006/relationships" xmlns:p="http://schemas.openxmlformats.org/presentationml/2006/main">
+  <p:cSld>
+    <p:spTree>
+      <p:nvGrpSpPr>
+        <p:cNvPr id="1" name=""/>
+        <p:cNvGrpSpPr/>
+        <p:nvPr/>
+      </p:nvGrpSpPr>
+      <p:grpSpPr>
+        <a:xfrm>
+          <a:off x="0" y="0"/>
+          <a:ext cx="0" cy="0"/>
+          <a:chOff x="0" y="0"/>
+          <a:chExt cx="0" cy="0"/>
+        </a:xfrm>
+      </p:grpSpPr>
+      <p:sp>
+        <p:nvSpPr>
+          <p:cNvPr id="2" name="Segnaposto immagine diapositiva 1"/>
+          <p:cNvSpPr>
+            <a:spLocks noGrp="1" noRot="1" noChangeAspect="1"/>
+          </p:cNvSpPr>
+          <p:nvPr>
+            <p:ph type="sldImg"/>
+          </p:nvPr>
+        </p:nvSpPr>
+        <p:spPr/>
+      </p:sp>
+      <p:sp>
+        <p:nvSpPr>
+          <p:cNvPr id="3" name="Segnaposto note 2"/>
+          <p:cNvSpPr>
+            <a:spLocks noGrp="1"/>
+          </p:cNvSpPr>
+          <p:nvPr>
+            <p:ph type="body" idx="1"/>
+          </p:nvPr>
+        </p:nvSpPr>
+        <p:spPr/>
+        <p:txBody>
+          <a:bodyPr/>
+          <a:lstStyle/>
+          <a:p>
+            <a:r>
+              <a:rPr lang="it-IT" sz="1200" b="1" dirty="0" err="1"/>
+              <a:t>secondaryDelaySecs</a:t>
+            </a:r>
+            <a:r>
+              <a:rPr lang="it-IT" sz="1200" b="1" dirty="0"/>
+              <a:t>: </a:t>
+            </a:r>
+            <a:r>
+              <a:rPr lang="it-IT" dirty="0"/>
+              <a:t>l numero di secondi "dietro" l'elemento primario in cui questo membro del set di repliche deve essere "ritardo". Utilizzare questa opzione per creare membri ritardati. I membri ritardati conservano una copia dei dati che riflette lo stato dei dati in un determinato momento del passato.</a:t>
+            </a:r>
+          </a:p>
+          <a:p>
+            <a:r>
+              <a:rPr lang="it-IT" sz="1200" b="1" dirty="0" err="1"/>
+              <a:t>chainingAllowed</a:t>
+            </a:r>
+            <a:r>
+              <a:rPr lang="it-IT" sz="1200" dirty="0"/>
+              <a:t>: </a:t>
+            </a:r>
+            <a:r>
+              <a:rPr lang="en-US" dirty="0"/>
+              <a:t>replica set </a:t>
+            </a:r>
+            <a:r>
+              <a:rPr lang="en-US" dirty="0">
+                <a:hlinkClick r:id="rId3"/>
+              </a:rPr>
+              <a:t>secondary</a:t>
+            </a:r>
+            <a:r>
+              <a:rPr lang="en-US" dirty="0"/>
+              <a:t> members can replicate data from other secondary members.</a:t>
+            </a:r>
+          </a:p>
+          <a:p>
+            <a:r>
+              <a:rPr lang="it-IT" sz="1200" b="1" dirty="0" err="1"/>
+              <a:t>heartbeatTimeoutSecs</a:t>
+            </a:r>
+            <a:r>
+              <a:rPr lang="it-IT" sz="1200" dirty="0"/>
+              <a:t>: </a:t>
+            </a:r>
+            <a:r>
+              <a:rPr lang="en-US" dirty="0"/>
+              <a:t>Number of seconds that the replica set members wait for a successful heartbeat from each other. If a member does not respond in time, other members mark the delinquent member as inaccessible.</a:t>
+            </a:r>
+          </a:p>
+          <a:p>
+            <a:r>
+              <a:rPr lang="it-IT" sz="1200" b="1" dirty="0" err="1"/>
+              <a:t>catchUpTimeoutMillis</a:t>
+            </a:r>
+            <a:r>
+              <a:rPr lang="it-IT" sz="1200" dirty="0" err="1"/>
+              <a:t>:</a:t>
+            </a:r>
+            <a:r>
+              <a:rPr lang="it-IT" dirty="0" err="1"/>
+              <a:t>Tempo</a:t>
+            </a:r>
+            <a:r>
+              <a:rPr lang="it-IT" dirty="0"/>
+              <a:t> di attesa per un neo-eletto </a:t>
+            </a:r>
+            <a:r>
+              <a:rPr lang="it-IT" dirty="0" err="1"/>
+              <a:t>primary</a:t>
+            </a:r>
+            <a:r>
+              <a:rPr lang="it-IT" dirty="0"/>
+              <a:t> </a:t>
+            </a:r>
+            <a:r>
+              <a:rPr lang="it-IT" dirty="0" err="1"/>
+              <a:t>node</a:t>
+            </a:r>
+            <a:r>
+              <a:rPr lang="it-IT" dirty="0"/>
+              <a:t> per sincronizzarsi con gli altri membri che hanno scritture più recenti.</a:t>
+            </a:r>
+          </a:p>
+        </p:txBody>
+      </p:sp>
+      <p:sp>
+        <p:nvSpPr>
+          <p:cNvPr id="4" name="Segnaposto numero diapositiva 3"/>
+          <p:cNvSpPr>
+            <a:spLocks noGrp="1"/>
+          </p:cNvSpPr>
+          <p:nvPr>
+            <p:ph type="sldNum" sz="quarter" idx="5"/>
+          </p:nvPr>
+        </p:nvSpPr>
+        <p:spPr/>
+        <p:txBody>
+          <a:bodyPr/>
+          <a:lstStyle/>
+          <a:p>
+            <a:fld id="{7B9EF5EE-42ED-4142-B01A-B637985E9B70}" type="slidenum">
+              <a:rPr lang="it-IT" smtClean="0"/>
+              <a:t>10</a:t>
+            </a:fld>
+            <a:endParaRPr lang="it-IT"/>
+          </a:p>
+        </p:txBody>
+      </p:sp>
+    </p:spTree>
+    <p:extLst>
+      <p:ext uri="{BB962C8B-B14F-4D97-AF65-F5344CB8AC3E}">
+        <p14:creationId xmlns:p14="http://schemas.microsoft.com/office/powerpoint/2010/main" val="4089409589"/>
+      </p:ext>
+    </p:extLst>
+  </p:cSld>
+  <p:clrMapOvr>
+    <a:masterClrMapping/>
+  </p:clrMapOvr>
+</p:notes>
+</file>
+
+<file path=ppt/notesSlides/notesSlide7.xml><?xml version="1.0" encoding="utf-8"?>
+<p:notes xmlns:a="http://schemas.openxmlformats.org/drawingml/2006/main" xmlns:r="http://schemas.openxmlformats.org/officeDocument/2006/relationships" xmlns:p="http://schemas.openxmlformats.org/presentationml/2006/main">
+  <p:cSld>
+    <p:spTree>
+      <p:nvGrpSpPr>
+        <p:cNvPr id="1" name=""/>
+        <p:cNvGrpSpPr/>
+        <p:nvPr/>
+      </p:nvGrpSpPr>
+      <p:grpSpPr>
+        <a:xfrm>
+          <a:off x="0" y="0"/>
+          <a:ext cx="0" cy="0"/>
+          <a:chOff x="0" y="0"/>
+          <a:chExt cx="0" cy="0"/>
+        </a:xfrm>
+      </p:grpSpPr>
+      <p:sp>
+        <p:nvSpPr>
+          <p:cNvPr id="2" name="Segnaposto immagine diapositiva 1"/>
+          <p:cNvSpPr>
+            <a:spLocks noGrp="1" noRot="1" noChangeAspect="1"/>
+          </p:cNvSpPr>
+          <p:nvPr>
+            <p:ph type="sldImg"/>
+          </p:nvPr>
+        </p:nvSpPr>
+        <p:spPr/>
+      </p:sp>
+      <p:sp>
+        <p:nvSpPr>
+          <p:cNvPr id="3" name="Segnaposto note 2"/>
+          <p:cNvSpPr>
+            <a:spLocks noGrp="1"/>
+          </p:cNvSpPr>
+          <p:nvPr>
+            <p:ph type="body" idx="1"/>
+          </p:nvPr>
+        </p:nvSpPr>
+        <p:spPr/>
+        <p:txBody>
+          <a:bodyPr/>
+          <a:lstStyle/>
+          <a:p>
+            <a:endParaRPr lang="it-IT" dirty="0"/>
+          </a:p>
+        </p:txBody>
+      </p:sp>
+      <p:sp>
+        <p:nvSpPr>
+          <p:cNvPr id="4" name="Segnaposto numero diapositiva 3"/>
+          <p:cNvSpPr>
+            <a:spLocks noGrp="1"/>
+          </p:cNvSpPr>
+          <p:nvPr>
+            <p:ph type="sldNum" sz="quarter" idx="5"/>
+          </p:nvPr>
+        </p:nvSpPr>
+        <p:spPr/>
+        <p:txBody>
+          <a:bodyPr/>
+          <a:lstStyle/>
+          <a:p>
+            <a:fld id="{7B9EF5EE-42ED-4142-B01A-B637985E9B70}" type="slidenum">
+              <a:rPr lang="it-IT" smtClean="0"/>
+              <a:t>11</a:t>
+            </a:fld>
+            <a:endParaRPr lang="it-IT"/>
+          </a:p>
+        </p:txBody>
+      </p:sp>
+    </p:spTree>
+    <p:extLst>
+      <p:ext uri="{BB962C8B-B14F-4D97-AF65-F5344CB8AC3E}">
+        <p14:creationId xmlns:p14="http://schemas.microsoft.com/office/powerpoint/2010/main" val="3336313248"/>
+      </p:ext>
+    </p:extLst>
+  </p:cSld>
+  <p:clrMapOvr>
+    <a:masterClrMapping/>
+  </p:clrMapOvr>
+</p:notes>
+</file>
+
+<file path=ppt/notesSlides/notesSlide8.xml><?xml version="1.0" encoding="utf-8"?>
+<p:notes xmlns:a="http://schemas.openxmlformats.org/drawingml/2006/main" xmlns:r="http://schemas.openxmlformats.org/officeDocument/2006/relationships" xmlns:p="http://schemas.openxmlformats.org/presentationml/2006/main">
+  <p:cSld>
+    <p:spTree>
+      <p:nvGrpSpPr>
+        <p:cNvPr id="1" name=""/>
+        <p:cNvGrpSpPr/>
+        <p:nvPr/>
+      </p:nvGrpSpPr>
+      <p:grpSpPr>
+        <a:xfrm>
+          <a:off x="0" y="0"/>
+          <a:ext cx="0" cy="0"/>
+          <a:chOff x="0" y="0"/>
+          <a:chExt cx="0" cy="0"/>
+        </a:xfrm>
+      </p:grpSpPr>
+      <p:sp>
+        <p:nvSpPr>
+          <p:cNvPr id="2" name="Segnaposto immagine diapositiva 1"/>
+          <p:cNvSpPr>
+            <a:spLocks noGrp="1" noRot="1" noChangeAspect="1"/>
+          </p:cNvSpPr>
+          <p:nvPr>
+            <p:ph type="sldImg"/>
+          </p:nvPr>
+        </p:nvSpPr>
+        <p:spPr/>
+      </p:sp>
+      <p:sp>
+        <p:nvSpPr>
+          <p:cNvPr id="3" name="Segnaposto note 2"/>
+          <p:cNvSpPr>
+            <a:spLocks noGrp="1"/>
+          </p:cNvSpPr>
+          <p:nvPr>
+            <p:ph type="body" idx="1"/>
+          </p:nvPr>
+        </p:nvSpPr>
+        <p:spPr/>
+        <p:txBody>
+          <a:bodyPr/>
+          <a:lstStyle/>
+          <a:p>
             <a:pPr marL="228600" indent="-228600">
               <a:buAutoNum type="arabicParenR"/>
             </a:pPr>
@@ -1052,7 +1495,7 @@
           <a:p>
             <a:fld id="{7B9EF5EE-42ED-4142-B01A-B637985E9B70}" type="slidenum">
               <a:rPr lang="it-IT" smtClean="0"/>
-              <a:t>8</a:t>
+              <a:t>15</a:t>
             </a:fld>
             <a:endParaRPr lang="it-IT"/>
           </a:p>
@@ -1793,7 +2236,7 @@
           <a:p>
             <a:fld id="{5EEC1FBE-7A50-402B-9218-00262FCB5F53}" type="datetimeFigureOut">
               <a:rPr lang="it-IT" smtClean="0"/>
-              <a:t>15/03/2022</a:t>
+              <a:t>16/03/2022</a:t>
             </a:fld>
             <a:endParaRPr lang="it-IT"/>
           </a:p>
@@ -2044,7 +2487,7 @@
           <a:p>
             <a:fld id="{5EEC1FBE-7A50-402B-9218-00262FCB5F53}" type="datetimeFigureOut">
               <a:rPr lang="it-IT" smtClean="0"/>
-              <a:t>15/03/2022</a:t>
+              <a:t>16/03/2022</a:t>
             </a:fld>
             <a:endParaRPr lang="it-IT"/>
           </a:p>
@@ -2358,7 +2801,7 @@
           <a:p>
             <a:fld id="{5EEC1FBE-7A50-402B-9218-00262FCB5F53}" type="datetimeFigureOut">
               <a:rPr lang="it-IT" smtClean="0"/>
-              <a:t>15/03/2022</a:t>
+              <a:t>16/03/2022</a:t>
             </a:fld>
             <a:endParaRPr lang="it-IT"/>
           </a:p>
@@ -2699,7 +3142,7 @@
           <a:p>
             <a:fld id="{5EEC1FBE-7A50-402B-9218-00262FCB5F53}" type="datetimeFigureOut">
               <a:rPr lang="it-IT" smtClean="0"/>
-              <a:t>15/03/2022</a:t>
+              <a:t>16/03/2022</a:t>
             </a:fld>
             <a:endParaRPr lang="it-IT"/>
           </a:p>
@@ -3013,7 +3456,7 @@
           <a:p>
             <a:fld id="{5EEC1FBE-7A50-402B-9218-00262FCB5F53}" type="datetimeFigureOut">
               <a:rPr lang="it-IT" smtClean="0"/>
-              <a:t>15/03/2022</a:t>
+              <a:t>16/03/2022</a:t>
             </a:fld>
             <a:endParaRPr lang="it-IT"/>
           </a:p>
@@ -3406,7 +3849,7 @@
           <a:p>
             <a:fld id="{5EEC1FBE-7A50-402B-9218-00262FCB5F53}" type="datetimeFigureOut">
               <a:rPr lang="it-IT" smtClean="0"/>
-              <a:t>15/03/2022</a:t>
+              <a:t>16/03/2022</a:t>
             </a:fld>
             <a:endParaRPr lang="it-IT"/>
           </a:p>
@@ -3576,7 +4019,7 @@
           <a:p>
             <a:fld id="{5EEC1FBE-7A50-402B-9218-00262FCB5F53}" type="datetimeFigureOut">
               <a:rPr lang="it-IT" smtClean="0"/>
-              <a:t>15/03/2022</a:t>
+              <a:t>16/03/2022</a:t>
             </a:fld>
             <a:endParaRPr lang="it-IT"/>
           </a:p>
@@ -3756,7 +4199,7 @@
           <a:p>
             <a:fld id="{5EEC1FBE-7A50-402B-9218-00262FCB5F53}" type="datetimeFigureOut">
               <a:rPr lang="it-IT" smtClean="0"/>
-              <a:t>15/03/2022</a:t>
+              <a:t>16/03/2022</a:t>
             </a:fld>
             <a:endParaRPr lang="it-IT"/>
           </a:p>
@@ -3932,7 +4375,7 @@
           <a:p>
             <a:fld id="{5EEC1FBE-7A50-402B-9218-00262FCB5F53}" type="datetimeFigureOut">
               <a:rPr lang="it-IT" smtClean="0"/>
-              <a:t>15/03/2022</a:t>
+              <a:t>16/03/2022</a:t>
             </a:fld>
             <a:endParaRPr lang="it-IT"/>
           </a:p>
@@ -4179,7 +4622,7 @@
           <a:p>
             <a:fld id="{5EEC1FBE-7A50-402B-9218-00262FCB5F53}" type="datetimeFigureOut">
               <a:rPr lang="it-IT" smtClean="0"/>
-              <a:t>15/03/2022</a:t>
+              <a:t>16/03/2022</a:t>
             </a:fld>
             <a:endParaRPr lang="it-IT"/>
           </a:p>
@@ -4411,7 +4854,7 @@
           <a:p>
             <a:fld id="{5EEC1FBE-7A50-402B-9218-00262FCB5F53}" type="datetimeFigureOut">
               <a:rPr lang="it-IT" smtClean="0"/>
-              <a:t>15/03/2022</a:t>
+              <a:t>16/03/2022</a:t>
             </a:fld>
             <a:endParaRPr lang="it-IT"/>
           </a:p>
@@ -4785,7 +5228,7 @@
           <a:p>
             <a:fld id="{5EEC1FBE-7A50-402B-9218-00262FCB5F53}" type="datetimeFigureOut">
               <a:rPr lang="it-IT" smtClean="0"/>
-              <a:t>15/03/2022</a:t>
+              <a:t>16/03/2022</a:t>
             </a:fld>
             <a:endParaRPr lang="it-IT"/>
           </a:p>
@@ -4908,7 +5351,7 @@
           <a:p>
             <a:fld id="{5EEC1FBE-7A50-402B-9218-00262FCB5F53}" type="datetimeFigureOut">
               <a:rPr lang="it-IT" smtClean="0"/>
-              <a:t>15/03/2022</a:t>
+              <a:t>16/03/2022</a:t>
             </a:fld>
             <a:endParaRPr lang="it-IT"/>
           </a:p>
@@ -5003,7 +5446,7 @@
           <a:p>
             <a:fld id="{5EEC1FBE-7A50-402B-9218-00262FCB5F53}" type="datetimeFigureOut">
               <a:rPr lang="it-IT" smtClean="0"/>
-              <a:t>15/03/2022</a:t>
+              <a:t>16/03/2022</a:t>
             </a:fld>
             <a:endParaRPr lang="it-IT"/>
           </a:p>
@@ -5258,7 +5701,7 @@
           <a:p>
             <a:fld id="{5EEC1FBE-7A50-402B-9218-00262FCB5F53}" type="datetimeFigureOut">
               <a:rPr lang="it-IT" smtClean="0"/>
-              <a:t>15/03/2022</a:t>
+              <a:t>16/03/2022</a:t>
             </a:fld>
             <a:endParaRPr lang="it-IT"/>
           </a:p>
@@ -5521,7 +5964,7 @@
           <a:p>
             <a:fld id="{5EEC1FBE-7A50-402B-9218-00262FCB5F53}" type="datetimeFigureOut">
               <a:rPr lang="it-IT" smtClean="0"/>
-              <a:t>15/03/2022</a:t>
+              <a:t>16/03/2022</a:t>
             </a:fld>
             <a:endParaRPr lang="it-IT"/>
           </a:p>
@@ -6264,7 +6707,7 @@
           <a:p>
             <a:fld id="{5EEC1FBE-7A50-402B-9218-00262FCB5F53}" type="datetimeFigureOut">
               <a:rPr lang="it-IT" smtClean="0"/>
-              <a:t>15/03/2022</a:t>
+              <a:t>16/03/2022</a:t>
             </a:fld>
             <a:endParaRPr lang="it-IT"/>
           </a:p>
@@ -7133,6 +7576,1684 @@
 </p:sld>
 </file>
 
+<file path=ppt/slides/slide10.xml><?xml version="1.0" encoding="utf-8"?>
+<p:sld xmlns:a="http://schemas.openxmlformats.org/drawingml/2006/main" xmlns:r="http://schemas.openxmlformats.org/officeDocument/2006/relationships" xmlns:p="http://schemas.openxmlformats.org/presentationml/2006/main">
+  <p:cSld>
+    <p:spTree>
+      <p:nvGrpSpPr>
+        <p:cNvPr id="1" name=""/>
+        <p:cNvGrpSpPr/>
+        <p:nvPr/>
+      </p:nvGrpSpPr>
+      <p:grpSpPr>
+        <a:xfrm>
+          <a:off x="0" y="0"/>
+          <a:ext cx="0" cy="0"/>
+          <a:chOff x="0" y="0"/>
+          <a:chExt cx="0" cy="0"/>
+        </a:xfrm>
+      </p:grpSpPr>
+      <p:sp>
+        <p:nvSpPr>
+          <p:cNvPr id="2" name="Titolo 1">
+            <a:extLst>
+              <a:ext uri="{FF2B5EF4-FFF2-40B4-BE49-F238E27FC236}">
+                <a16:creationId xmlns:a16="http://schemas.microsoft.com/office/drawing/2014/main" id="{306E3E34-60AA-447B-AAF0-4A11CEF3540E}"/>
+              </a:ext>
+            </a:extLst>
+          </p:cNvPr>
+          <p:cNvSpPr>
+            <a:spLocks noGrp="1"/>
+          </p:cNvSpPr>
+          <p:nvPr>
+            <p:ph type="title"/>
+          </p:nvPr>
+        </p:nvSpPr>
+        <p:spPr>
+          <a:xfrm>
+            <a:off x="677334" y="609600"/>
+            <a:ext cx="8596668" cy="737937"/>
+          </a:xfrm>
+        </p:spPr>
+        <p:txBody>
+          <a:bodyPr/>
+          <a:lstStyle/>
+          <a:p>
+            <a:r>
+              <a:rPr lang="it-IT" dirty="0"/>
+              <a:t>Configurazione processo di elezione</a:t>
+            </a:r>
+          </a:p>
+        </p:txBody>
+      </p:sp>
+      <p:sp>
+        <p:nvSpPr>
+          <p:cNvPr id="4" name="CasellaDiTesto 3">
+            <a:extLst>
+              <a:ext uri="{FF2B5EF4-FFF2-40B4-BE49-F238E27FC236}">
+                <a16:creationId xmlns:a16="http://schemas.microsoft.com/office/drawing/2014/main" id="{0D9BDB9C-602C-438B-90EE-DFCBBDEDC5BF}"/>
+              </a:ext>
+            </a:extLst>
+          </p:cNvPr>
+          <p:cNvSpPr txBox="1"/>
+          <p:nvPr/>
+        </p:nvSpPr>
+        <p:spPr>
+          <a:xfrm>
+            <a:off x="5812263" y="1191127"/>
+            <a:ext cx="4764446" cy="5016758"/>
+          </a:xfrm>
+          <a:prstGeom prst="rect">
+            <a:avLst/>
+          </a:prstGeom>
+          <a:noFill/>
+        </p:spPr>
+        <p:txBody>
+          <a:bodyPr wrap="none" rtlCol="0">
+            <a:spAutoFit/>
+          </a:bodyPr>
+          <a:lstStyle/>
+          <a:p>
+            <a:r>
+              <a:rPr lang="it-IT" sz="2000" dirty="0"/>
+              <a:t> …</a:t>
+            </a:r>
+          </a:p>
+          <a:p>
+            <a:r>
+              <a:rPr lang="it-IT" sz="2000" dirty="0"/>
+              <a:t>  settings: </a:t>
+            </a:r>
+            <a:r>
+              <a:rPr lang="it-IT" sz="2000" dirty="0">
+                <a:solidFill>
+                  <a:schemeClr val="accent2"/>
+                </a:solidFill>
+              </a:rPr>
+              <a:t>{// settaggio per intero</a:t>
+            </a:r>
+          </a:p>
+          <a:p>
+            <a:r>
+              <a:rPr lang="it-IT" sz="2000" dirty="0">
+                <a:solidFill>
+                  <a:schemeClr val="accent2"/>
+                </a:solidFill>
+              </a:rPr>
+              <a:t>  replica set</a:t>
+            </a:r>
+          </a:p>
+          <a:p>
+            <a:r>
+              <a:rPr lang="it-IT" sz="2000" dirty="0"/>
+              <a:t>    </a:t>
+            </a:r>
+            <a:r>
+              <a:rPr lang="it-IT" sz="2000" dirty="0" err="1"/>
+              <a:t>chainingAllowed</a:t>
+            </a:r>
+            <a:r>
+              <a:rPr lang="it-IT" sz="2000" dirty="0"/>
+              <a:t> : &lt;</a:t>
+            </a:r>
+            <a:r>
+              <a:rPr lang="it-IT" sz="2000" dirty="0" err="1"/>
+              <a:t>boolean</a:t>
+            </a:r>
+            <a:r>
+              <a:rPr lang="it-IT" sz="2000" dirty="0"/>
+              <a:t>&gt;,</a:t>
+            </a:r>
+          </a:p>
+          <a:p>
+            <a:r>
+              <a:rPr lang="it-IT" sz="2000" dirty="0"/>
+              <a:t>    </a:t>
+            </a:r>
+            <a:r>
+              <a:rPr lang="it-IT" sz="2000" dirty="0" err="1"/>
+              <a:t>heartbeatIntervalMillis</a:t>
+            </a:r>
+            <a:r>
+              <a:rPr lang="it-IT" sz="2000" dirty="0"/>
+              <a:t> : &lt;</a:t>
+            </a:r>
+            <a:r>
+              <a:rPr lang="it-IT" sz="2000" dirty="0" err="1"/>
+              <a:t>int</a:t>
+            </a:r>
+            <a:r>
+              <a:rPr lang="it-IT" sz="2000" dirty="0"/>
+              <a:t>&gt;,</a:t>
+            </a:r>
+          </a:p>
+          <a:p>
+            <a:r>
+              <a:rPr lang="it-IT" sz="2000" dirty="0"/>
+              <a:t>    </a:t>
+            </a:r>
+            <a:r>
+              <a:rPr lang="it-IT" sz="2000" dirty="0" err="1"/>
+              <a:t>heartbeatTimeoutSecs</a:t>
+            </a:r>
+            <a:r>
+              <a:rPr lang="it-IT" sz="2000" dirty="0"/>
+              <a:t>: &lt;</a:t>
+            </a:r>
+            <a:r>
+              <a:rPr lang="it-IT" sz="2000" dirty="0" err="1"/>
+              <a:t>int</a:t>
+            </a:r>
+            <a:r>
+              <a:rPr lang="it-IT" sz="2000" dirty="0"/>
+              <a:t>&gt;,</a:t>
+            </a:r>
+          </a:p>
+          <a:p>
+            <a:r>
+              <a:rPr lang="it-IT" sz="2000" dirty="0"/>
+              <a:t>    </a:t>
+            </a:r>
+            <a:r>
+              <a:rPr lang="it-IT" sz="2000" dirty="0">
+                <a:solidFill>
+                  <a:schemeClr val="accent2"/>
+                </a:solidFill>
+              </a:rPr>
+              <a:t>// quanti secondi posso aspettare </a:t>
+            </a:r>
+          </a:p>
+          <a:p>
+            <a:r>
+              <a:rPr lang="it-IT" sz="2000" dirty="0">
+                <a:solidFill>
+                  <a:schemeClr val="accent2"/>
+                </a:solidFill>
+              </a:rPr>
+              <a:t>    per avere un messaggio </a:t>
+            </a:r>
+            <a:r>
+              <a:rPr lang="it-IT" sz="2000" dirty="0" err="1">
+                <a:solidFill>
+                  <a:schemeClr val="accent2"/>
+                </a:solidFill>
+              </a:rPr>
+              <a:t>heartbeat</a:t>
+            </a:r>
+            <a:r>
+              <a:rPr lang="it-IT" sz="2000" dirty="0">
+                <a:solidFill>
+                  <a:schemeClr val="accent2"/>
+                </a:solidFill>
+              </a:rPr>
+              <a:t> di </a:t>
+            </a:r>
+          </a:p>
+          <a:p>
+            <a:r>
+              <a:rPr lang="it-IT" sz="2000" dirty="0">
+                <a:solidFill>
+                  <a:schemeClr val="accent2"/>
+                </a:solidFill>
+              </a:rPr>
+              <a:t>    successo, default=10s</a:t>
+            </a:r>
+          </a:p>
+          <a:p>
+            <a:r>
+              <a:rPr lang="it-IT" sz="2000" dirty="0"/>
+              <a:t>    </a:t>
+            </a:r>
+            <a:r>
+              <a:rPr lang="it-IT" sz="2000" dirty="0" err="1"/>
+              <a:t>electionTimeoutMillis</a:t>
+            </a:r>
+            <a:r>
+              <a:rPr lang="it-IT" sz="2000" dirty="0"/>
+              <a:t> : &lt;</a:t>
+            </a:r>
+            <a:r>
+              <a:rPr lang="it-IT" sz="2000" dirty="0" err="1"/>
+              <a:t>int</a:t>
+            </a:r>
+            <a:r>
+              <a:rPr lang="it-IT" sz="2000" dirty="0"/>
+              <a:t>&gt;, </a:t>
+            </a:r>
+          </a:p>
+          <a:p>
+            <a:r>
+              <a:rPr lang="it-IT" sz="2000" dirty="0"/>
+              <a:t>    </a:t>
+            </a:r>
+            <a:r>
+              <a:rPr lang="it-IT" sz="2000" dirty="0">
+                <a:solidFill>
+                  <a:schemeClr val="accent2"/>
+                </a:solidFill>
+              </a:rPr>
+              <a:t>//identifica quando il </a:t>
+            </a:r>
+            <a:r>
+              <a:rPr lang="it-IT" sz="2000" dirty="0" err="1">
+                <a:solidFill>
+                  <a:schemeClr val="accent2"/>
+                </a:solidFill>
+              </a:rPr>
+              <a:t>primary</a:t>
+            </a:r>
+            <a:r>
+              <a:rPr lang="it-IT" sz="2000" dirty="0">
+                <a:solidFill>
+                  <a:schemeClr val="accent2"/>
+                </a:solidFill>
+              </a:rPr>
+              <a:t> </a:t>
+            </a:r>
+            <a:r>
+              <a:rPr lang="it-IT" sz="2000" dirty="0" err="1">
+                <a:solidFill>
+                  <a:schemeClr val="accent2"/>
+                </a:solidFill>
+              </a:rPr>
+              <a:t>node</a:t>
+            </a:r>
+            <a:r>
+              <a:rPr lang="it-IT" sz="2000" dirty="0">
+                <a:solidFill>
+                  <a:schemeClr val="accent2"/>
+                </a:solidFill>
+              </a:rPr>
+              <a:t> </a:t>
+            </a:r>
+          </a:p>
+          <a:p>
+            <a:r>
+              <a:rPr lang="it-IT" sz="2000" dirty="0">
+                <a:solidFill>
+                  <a:schemeClr val="accent2"/>
+                </a:solidFill>
+              </a:rPr>
+              <a:t>    è irraggiungibile</a:t>
+            </a:r>
+          </a:p>
+          <a:p>
+            <a:r>
+              <a:rPr lang="it-IT" sz="2000" dirty="0"/>
+              <a:t>    </a:t>
+            </a:r>
+            <a:r>
+              <a:rPr lang="it-IT" sz="2000" dirty="0" err="1"/>
+              <a:t>catchUpTimeoutMillis</a:t>
+            </a:r>
+            <a:r>
+              <a:rPr lang="it-IT" sz="2000" dirty="0"/>
+              <a:t> : &lt;</a:t>
+            </a:r>
+            <a:r>
+              <a:rPr lang="it-IT" sz="2000" dirty="0" err="1"/>
+              <a:t>int</a:t>
+            </a:r>
+            <a:r>
+              <a:rPr lang="it-IT" sz="2000" dirty="0"/>
+              <a:t>&gt;,</a:t>
+            </a:r>
+          </a:p>
+          <a:p>
+            <a:r>
+              <a:rPr lang="it-IT" sz="2000" dirty="0"/>
+              <a:t>    </a:t>
+            </a:r>
+            <a:r>
+              <a:rPr lang="it-IT" sz="2000" dirty="0" err="1"/>
+              <a:t>replicaSetId</a:t>
+            </a:r>
+            <a:r>
+              <a:rPr lang="it-IT" sz="2000" dirty="0"/>
+              <a:t>: &lt;</a:t>
+            </a:r>
+            <a:r>
+              <a:rPr lang="it-IT" sz="2000" dirty="0" err="1"/>
+              <a:t>ObjectId</a:t>
+            </a:r>
+            <a:r>
+              <a:rPr lang="it-IT" sz="2000" dirty="0"/>
+              <a:t>&gt;</a:t>
+            </a:r>
+          </a:p>
+          <a:p>
+            <a:r>
+              <a:rPr lang="it-IT" sz="2000" dirty="0"/>
+              <a:t>  }</a:t>
+            </a:r>
+          </a:p>
+          <a:p>
+            <a:r>
+              <a:rPr lang="it-IT" sz="2000" dirty="0"/>
+              <a:t>…</a:t>
+            </a:r>
+          </a:p>
+        </p:txBody>
+      </p:sp>
+      <p:sp>
+        <p:nvSpPr>
+          <p:cNvPr id="5" name="CasellaDiTesto 4">
+            <a:extLst>
+              <a:ext uri="{FF2B5EF4-FFF2-40B4-BE49-F238E27FC236}">
+                <a16:creationId xmlns:a16="http://schemas.microsoft.com/office/drawing/2014/main" id="{D7CF947C-2DE5-44F5-BFBA-033183D7C32E}"/>
+              </a:ext>
+            </a:extLst>
+          </p:cNvPr>
+          <p:cNvSpPr txBox="1"/>
+          <p:nvPr/>
+        </p:nvSpPr>
+        <p:spPr>
+          <a:xfrm>
+            <a:off x="245447" y="1191127"/>
+            <a:ext cx="4807816" cy="5909310"/>
+          </a:xfrm>
+          <a:prstGeom prst="rect">
+            <a:avLst/>
+          </a:prstGeom>
+          <a:noFill/>
+        </p:spPr>
+        <p:txBody>
+          <a:bodyPr wrap="square" rtlCol="0">
+            <a:spAutoFit/>
+          </a:bodyPr>
+          <a:lstStyle/>
+          <a:p>
+            <a:r>
+              <a:rPr lang="it-IT" sz="2000" dirty="0"/>
+              <a:t>…</a:t>
+            </a:r>
+          </a:p>
+          <a:p>
+            <a:r>
+              <a:rPr lang="it-IT" sz="2000" dirty="0" err="1"/>
+              <a:t>members</a:t>
+            </a:r>
+            <a:r>
+              <a:rPr lang="it-IT" sz="2000" dirty="0"/>
+              <a:t>: [ </a:t>
+            </a:r>
+            <a:r>
+              <a:rPr lang="it-IT" sz="2000" dirty="0">
+                <a:solidFill>
+                  <a:schemeClr val="accent2"/>
+                </a:solidFill>
+              </a:rPr>
+              <a:t>//array per ogni membro</a:t>
+            </a:r>
+          </a:p>
+          <a:p>
+            <a:r>
+              <a:rPr lang="it-IT" sz="2000" dirty="0"/>
+              <a:t>    {</a:t>
+            </a:r>
+          </a:p>
+          <a:p>
+            <a:r>
+              <a:rPr lang="it-IT" sz="2000" dirty="0"/>
+              <a:t>      _id: &lt;</a:t>
+            </a:r>
+            <a:r>
+              <a:rPr lang="it-IT" sz="2000" dirty="0" err="1"/>
+              <a:t>int</a:t>
+            </a:r>
+            <a:r>
+              <a:rPr lang="it-IT" sz="2000" dirty="0"/>
+              <a:t>&gt;, </a:t>
+            </a:r>
+            <a:r>
+              <a:rPr lang="it-IT" sz="2000" dirty="0">
+                <a:solidFill>
+                  <a:schemeClr val="accent2"/>
+                </a:solidFill>
+              </a:rPr>
+              <a:t>//Identifica membro</a:t>
+            </a:r>
+          </a:p>
+          <a:p>
+            <a:r>
+              <a:rPr lang="it-IT" sz="2000" dirty="0"/>
+              <a:t>      </a:t>
+            </a:r>
+            <a:r>
+              <a:rPr lang="it-IT" sz="2000" dirty="0" err="1"/>
+              <a:t>host</a:t>
+            </a:r>
+            <a:r>
+              <a:rPr lang="it-IT" sz="2000" dirty="0"/>
+              <a:t>: &lt;</a:t>
+            </a:r>
+            <a:r>
+              <a:rPr lang="it-IT" sz="2000" dirty="0" err="1"/>
+              <a:t>string</a:t>
+            </a:r>
+            <a:r>
+              <a:rPr lang="it-IT" sz="2000" dirty="0"/>
+              <a:t>&gt;, </a:t>
+            </a:r>
+            <a:r>
+              <a:rPr lang="it-IT" sz="2000" dirty="0">
+                <a:solidFill>
+                  <a:schemeClr val="accent2"/>
+                </a:solidFill>
+              </a:rPr>
+              <a:t>// nome </a:t>
+            </a:r>
+            <a:r>
+              <a:rPr lang="it-IT" sz="2000" dirty="0" err="1">
+                <a:solidFill>
+                  <a:schemeClr val="accent2"/>
+                </a:solidFill>
+              </a:rPr>
+              <a:t>host</a:t>
+            </a:r>
+            <a:r>
+              <a:rPr lang="it-IT" sz="2000" dirty="0">
+                <a:solidFill>
+                  <a:schemeClr val="accent2"/>
+                </a:solidFill>
+              </a:rPr>
+              <a:t> e porta</a:t>
+            </a:r>
+          </a:p>
+          <a:p>
+            <a:r>
+              <a:rPr lang="it-IT" sz="2000" dirty="0"/>
+              <a:t>      </a:t>
+            </a:r>
+            <a:r>
+              <a:rPr lang="it-IT" sz="2000" dirty="0" err="1"/>
+              <a:t>arbiterOnly</a:t>
+            </a:r>
+            <a:r>
+              <a:rPr lang="it-IT" sz="2000" dirty="0"/>
+              <a:t>: &lt;</a:t>
+            </a:r>
+            <a:r>
+              <a:rPr lang="it-IT" sz="2000" dirty="0" err="1"/>
+              <a:t>boolean</a:t>
+            </a:r>
+            <a:r>
+              <a:rPr lang="it-IT" sz="2000" dirty="0"/>
+              <a:t>&gt;,</a:t>
+            </a:r>
+          </a:p>
+          <a:p>
+            <a:r>
+              <a:rPr lang="it-IT" sz="2000" dirty="0"/>
+              <a:t>      </a:t>
+            </a:r>
+            <a:r>
+              <a:rPr lang="it-IT" sz="2000" dirty="0" err="1"/>
+              <a:t>buildIndexes</a:t>
+            </a:r>
+            <a:r>
+              <a:rPr lang="it-IT" sz="2000" dirty="0"/>
+              <a:t>: &lt;</a:t>
+            </a:r>
+            <a:r>
+              <a:rPr lang="it-IT" sz="2000" dirty="0" err="1"/>
+              <a:t>boolean</a:t>
+            </a:r>
+            <a:r>
+              <a:rPr lang="it-IT" sz="2000" dirty="0"/>
+              <a:t>&gt;,</a:t>
+            </a:r>
+          </a:p>
+          <a:p>
+            <a:r>
+              <a:rPr lang="it-IT" sz="2000" dirty="0"/>
+              <a:t>      </a:t>
+            </a:r>
+            <a:r>
+              <a:rPr lang="it-IT" sz="2000" dirty="0" err="1"/>
+              <a:t>hidden</a:t>
+            </a:r>
+            <a:r>
+              <a:rPr lang="it-IT" sz="2000" dirty="0"/>
+              <a:t>: &lt;</a:t>
+            </a:r>
+            <a:r>
+              <a:rPr lang="it-IT" sz="2000" dirty="0" err="1"/>
+              <a:t>boolean</a:t>
+            </a:r>
+            <a:r>
+              <a:rPr lang="it-IT" sz="2000" dirty="0"/>
+              <a:t>&gt;,</a:t>
+            </a:r>
+          </a:p>
+          <a:p>
+            <a:r>
+              <a:rPr lang="it-IT" sz="2000" dirty="0"/>
+              <a:t>      </a:t>
+            </a:r>
+            <a:r>
+              <a:rPr lang="it-IT" sz="2000" dirty="0" err="1"/>
+              <a:t>priority</a:t>
+            </a:r>
+            <a:r>
+              <a:rPr lang="it-IT" sz="2000" dirty="0"/>
+              <a:t>: &lt;</a:t>
+            </a:r>
+            <a:r>
+              <a:rPr lang="it-IT" sz="2000" dirty="0" err="1"/>
+              <a:t>number</a:t>
+            </a:r>
+            <a:r>
+              <a:rPr lang="it-IT" sz="2000" dirty="0"/>
+              <a:t>&gt; </a:t>
+            </a:r>
+            <a:r>
+              <a:rPr lang="it-IT" sz="2000" dirty="0">
+                <a:solidFill>
+                  <a:schemeClr val="accent2"/>
+                </a:solidFill>
+              </a:rPr>
+              <a:t>// Un numero 	che indica l'idoneità relativa di un 	membro a diventare primario.(0-	1000)</a:t>
+            </a:r>
+          </a:p>
+          <a:p>
+            <a:r>
+              <a:rPr lang="it-IT" sz="2000" dirty="0"/>
+              <a:t>      tags: &lt;</a:t>
+            </a:r>
+            <a:r>
+              <a:rPr lang="it-IT" sz="2000" dirty="0" err="1"/>
+              <a:t>document</a:t>
+            </a:r>
+            <a:r>
+              <a:rPr lang="it-IT" sz="2000" dirty="0"/>
+              <a:t>&gt;,</a:t>
+            </a:r>
+          </a:p>
+          <a:p>
+            <a:r>
+              <a:rPr lang="it-IT" sz="2000" dirty="0"/>
+              <a:t>      </a:t>
+            </a:r>
+            <a:r>
+              <a:rPr lang="it-IT" sz="2000" dirty="0" err="1"/>
+              <a:t>secondaryDelaySecs</a:t>
+            </a:r>
+            <a:r>
+              <a:rPr lang="it-IT" sz="2000" dirty="0"/>
+              <a:t>: &lt;</a:t>
+            </a:r>
+            <a:r>
+              <a:rPr lang="it-IT" sz="2000" dirty="0" err="1"/>
+              <a:t>int</a:t>
+            </a:r>
+            <a:r>
+              <a:rPr lang="it-IT" sz="2000" dirty="0"/>
+              <a:t>&gt;,</a:t>
+            </a:r>
+          </a:p>
+          <a:p>
+            <a:r>
+              <a:rPr lang="it-IT" sz="2000" dirty="0"/>
+              <a:t>      </a:t>
+            </a:r>
+            <a:r>
+              <a:rPr lang="it-IT" sz="2000" dirty="0" err="1"/>
+              <a:t>votes</a:t>
+            </a:r>
+            <a:r>
+              <a:rPr lang="it-IT" sz="2000" dirty="0"/>
+              <a:t>: &lt;</a:t>
+            </a:r>
+            <a:r>
+              <a:rPr lang="it-IT" sz="2000" dirty="0" err="1"/>
+              <a:t>number</a:t>
+            </a:r>
+            <a:r>
+              <a:rPr lang="it-IT" sz="2000" dirty="0">
+                <a:solidFill>
+                  <a:schemeClr val="accent2"/>
+                </a:solidFill>
+              </a:rPr>
+              <a:t>&gt;// Il numero di voti 	che un server esprimerà in 	un'elezione (0-1) </a:t>
+            </a:r>
+            <a:r>
+              <a:rPr lang="it-IT" sz="2000" dirty="0"/>
+              <a:t>},</a:t>
+            </a:r>
+          </a:p>
+          <a:p>
+            <a:r>
+              <a:rPr lang="it-IT" sz="2000" dirty="0"/>
+              <a:t>    ...</a:t>
+            </a:r>
+          </a:p>
+          <a:p>
+            <a:endParaRPr lang="it-IT" dirty="0"/>
+          </a:p>
+        </p:txBody>
+      </p:sp>
+    </p:spTree>
+    <p:extLst>
+      <p:ext uri="{BB962C8B-B14F-4D97-AF65-F5344CB8AC3E}">
+        <p14:creationId xmlns:p14="http://schemas.microsoft.com/office/powerpoint/2010/main" val="2529083846"/>
+      </p:ext>
+    </p:extLst>
+  </p:cSld>
+  <p:clrMapOvr>
+    <a:masterClrMapping/>
+  </p:clrMapOvr>
+</p:sld>
+</file>
+
+<file path=ppt/slides/slide11.xml><?xml version="1.0" encoding="utf-8"?>
+<p:sld xmlns:a="http://schemas.openxmlformats.org/drawingml/2006/main" xmlns:r="http://schemas.openxmlformats.org/officeDocument/2006/relationships" xmlns:p="http://schemas.openxmlformats.org/presentationml/2006/main">
+  <p:cSld>
+    <p:spTree>
+      <p:nvGrpSpPr>
+        <p:cNvPr id="1" name=""/>
+        <p:cNvGrpSpPr/>
+        <p:nvPr/>
+      </p:nvGrpSpPr>
+      <p:grpSpPr>
+        <a:xfrm>
+          <a:off x="0" y="0"/>
+          <a:ext cx="0" cy="0"/>
+          <a:chOff x="0" y="0"/>
+          <a:chExt cx="0" cy="0"/>
+        </a:xfrm>
+      </p:grpSpPr>
+      <p:sp>
+        <p:nvSpPr>
+          <p:cNvPr id="2" name="Titolo 1">
+            <a:extLst>
+              <a:ext uri="{FF2B5EF4-FFF2-40B4-BE49-F238E27FC236}">
+                <a16:creationId xmlns:a16="http://schemas.microsoft.com/office/drawing/2014/main" id="{F244B3B0-61DC-4CFD-A0B4-267EB08F29D1}"/>
+              </a:ext>
+            </a:extLst>
+          </p:cNvPr>
+          <p:cNvSpPr>
+            <a:spLocks noGrp="1"/>
+          </p:cNvSpPr>
+          <p:nvPr>
+            <p:ph type="title"/>
+          </p:nvPr>
+        </p:nvSpPr>
+        <p:spPr>
+          <a:xfrm>
+            <a:off x="532955" y="204787"/>
+            <a:ext cx="8596668" cy="809625"/>
+          </a:xfrm>
+        </p:spPr>
+        <p:txBody>
+          <a:bodyPr/>
+          <a:lstStyle/>
+          <a:p>
+            <a:r>
+              <a:rPr lang="it-IT" dirty="0"/>
+              <a:t>Struttura replica set</a:t>
+            </a:r>
+          </a:p>
+        </p:txBody>
+      </p:sp>
+      <p:pic>
+        <p:nvPicPr>
+          <p:cNvPr id="5" name="Elemento grafico 4">
+            <a:extLst>
+              <a:ext uri="{FF2B5EF4-FFF2-40B4-BE49-F238E27FC236}">
+                <a16:creationId xmlns:a16="http://schemas.microsoft.com/office/drawing/2014/main" id="{E3A37F38-44E8-4A84-923B-B7EB3B8CD4FC}"/>
+              </a:ext>
+            </a:extLst>
+          </p:cNvPr>
+          <p:cNvPicPr>
+            <a:picLocks noChangeAspect="1"/>
+          </p:cNvPicPr>
+          <p:nvPr/>
+        </p:nvPicPr>
+        <p:blipFill>
+          <a:blip r:embed="rId3">
+            <a:extLst>
+              <a:ext uri="{28A0092B-C50C-407E-A947-70E740481C1C}">
+                <a14:useLocalDpi xmlns:a14="http://schemas.microsoft.com/office/drawing/2010/main" val="0"/>
+              </a:ext>
+              <a:ext uri="{96DAC541-7B7A-43D3-8B79-37D633B846F1}">
+                <asvg:svgBlip xmlns:asvg="http://schemas.microsoft.com/office/drawing/2016/SVG/main" r:embed="rId4"/>
+              </a:ext>
+            </a:extLst>
+          </a:blip>
+          <a:stretch>
+            <a:fillRect/>
+          </a:stretch>
+        </p:blipFill>
+        <p:spPr>
+          <a:xfrm>
+            <a:off x="2000808" y="1167063"/>
+            <a:ext cx="5905500" cy="5117432"/>
+          </a:xfrm>
+          <a:prstGeom prst="rect">
+            <a:avLst/>
+          </a:prstGeom>
+        </p:spPr>
+      </p:pic>
+      <p:sp>
+        <p:nvSpPr>
+          <p:cNvPr id="6" name="CasellaDiTesto 5">
+            <a:extLst>
+              <a:ext uri="{FF2B5EF4-FFF2-40B4-BE49-F238E27FC236}">
+                <a16:creationId xmlns:a16="http://schemas.microsoft.com/office/drawing/2014/main" id="{84AA12C0-871F-4DBC-B65F-FEA76EDD7BDF}"/>
+              </a:ext>
+            </a:extLst>
+          </p:cNvPr>
+          <p:cNvSpPr txBox="1"/>
+          <p:nvPr/>
+        </p:nvSpPr>
+        <p:spPr>
+          <a:xfrm>
+            <a:off x="7267552" y="1662208"/>
+            <a:ext cx="2455525" cy="923330"/>
+          </a:xfrm>
+          <a:prstGeom prst="rect">
+            <a:avLst/>
+          </a:prstGeom>
+          <a:noFill/>
+        </p:spPr>
+        <p:txBody>
+          <a:bodyPr wrap="square" rtlCol="0">
+            <a:spAutoFit/>
+          </a:bodyPr>
+          <a:lstStyle/>
+          <a:p>
+            <a:r>
+              <a:rPr lang="en-US" dirty="0"/>
+              <a:t>Salva tutti </a:t>
+            </a:r>
+            <a:r>
+              <a:rPr lang="en-US" dirty="0" err="1"/>
+              <a:t>i</a:t>
+            </a:r>
+            <a:r>
+              <a:rPr lang="en-US" dirty="0"/>
+              <a:t> </a:t>
+            </a:r>
+            <a:r>
+              <a:rPr lang="en-US" dirty="0" err="1"/>
+              <a:t>cambimenti</a:t>
+            </a:r>
+            <a:r>
+              <a:rPr lang="en-US" dirty="0"/>
+              <a:t> </a:t>
+            </a:r>
+            <a:r>
+              <a:rPr lang="en-US" dirty="0" err="1"/>
+              <a:t>nel</a:t>
+            </a:r>
+            <a:r>
+              <a:rPr lang="en-US" dirty="0"/>
+              <a:t> </a:t>
+            </a:r>
+            <a:r>
+              <a:rPr lang="en-US" dirty="0" err="1"/>
+              <a:t>suo</a:t>
+            </a:r>
+            <a:r>
+              <a:rPr lang="en-US" dirty="0"/>
+              <a:t> file di log </a:t>
+            </a:r>
+            <a:r>
+              <a:rPr lang="en-US" dirty="0" err="1"/>
+              <a:t>detto</a:t>
+            </a:r>
+            <a:r>
+              <a:rPr lang="en-US" dirty="0"/>
+              <a:t> </a:t>
+            </a:r>
+            <a:r>
+              <a:rPr lang="en-US" dirty="0" err="1">
+                <a:solidFill>
+                  <a:schemeClr val="accent2"/>
+                </a:solidFill>
+              </a:rPr>
+              <a:t>oplog</a:t>
+            </a:r>
+            <a:endParaRPr lang="it-IT" dirty="0">
+              <a:solidFill>
+                <a:schemeClr val="accent2"/>
+              </a:solidFill>
+            </a:endParaRPr>
+          </a:p>
+        </p:txBody>
+      </p:sp>
+      <p:sp>
+        <p:nvSpPr>
+          <p:cNvPr id="9" name="Figura a mano libera: forma 8">
+            <a:extLst>
+              <a:ext uri="{FF2B5EF4-FFF2-40B4-BE49-F238E27FC236}">
+                <a16:creationId xmlns:a16="http://schemas.microsoft.com/office/drawing/2014/main" id="{F2EBC905-DEC7-40F5-968B-B9EB51DEBCCF}"/>
+              </a:ext>
+            </a:extLst>
+          </p:cNvPr>
+          <p:cNvSpPr/>
+          <p:nvPr/>
+        </p:nvSpPr>
+        <p:spPr>
+          <a:xfrm>
+            <a:off x="5883442" y="2598821"/>
+            <a:ext cx="1624263" cy="1126958"/>
+          </a:xfrm>
+          <a:custGeom>
+            <a:avLst/>
+            <a:gdLst>
+              <a:gd name="connsiteX0" fmla="*/ 0 w 1624263"/>
+              <a:gd name="connsiteY0" fmla="*/ 1010653 h 1010653"/>
+              <a:gd name="connsiteX1" fmla="*/ 1070811 w 1624263"/>
+              <a:gd name="connsiteY1" fmla="*/ 697832 h 1010653"/>
+              <a:gd name="connsiteX2" fmla="*/ 1624263 w 1624263"/>
+              <a:gd name="connsiteY2" fmla="*/ 0 h 1010653"/>
+            </a:gdLst>
+            <a:ahLst/>
+            <a:cxnLst>
+              <a:cxn ang="0">
+                <a:pos x="connsiteX0" y="connsiteY0"/>
+              </a:cxn>
+              <a:cxn ang="0">
+                <a:pos x="connsiteX1" y="connsiteY1"/>
+              </a:cxn>
+              <a:cxn ang="0">
+                <a:pos x="connsiteX2" y="connsiteY2"/>
+              </a:cxn>
+            </a:cxnLst>
+            <a:rect l="l" t="t" r="r" b="b"/>
+            <a:pathLst>
+              <a:path w="1624263" h="1010653">
+                <a:moveTo>
+                  <a:pt x="0" y="1010653"/>
+                </a:moveTo>
+                <a:cubicBezTo>
+                  <a:pt x="400050" y="938463"/>
+                  <a:pt x="800101" y="866274"/>
+                  <a:pt x="1070811" y="697832"/>
+                </a:cubicBezTo>
+                <a:cubicBezTo>
+                  <a:pt x="1341521" y="529390"/>
+                  <a:pt x="1482892" y="264695"/>
+                  <a:pt x="1624263" y="0"/>
+                </a:cubicBezTo>
+              </a:path>
+            </a:pathLst>
+          </a:custGeom>
+          <a:noFill/>
+          <a:ln>
+            <a:headEnd type="none" w="med" len="med"/>
+            <a:tailEnd type="arrow" w="med" len="med"/>
+          </a:ln>
+        </p:spPr>
+        <p:style>
+          <a:lnRef idx="2">
+            <a:schemeClr val="accent1">
+              <a:shade val="50000"/>
+            </a:schemeClr>
+          </a:lnRef>
+          <a:fillRef idx="1">
+            <a:schemeClr val="accent1"/>
+          </a:fillRef>
+          <a:effectRef idx="0">
+            <a:schemeClr val="accent1"/>
+          </a:effectRef>
+          <a:fontRef idx="minor">
+            <a:schemeClr val="lt1"/>
+          </a:fontRef>
+        </p:style>
+        <p:txBody>
+          <a:bodyPr rtlCol="0" anchor="ctr"/>
+          <a:lstStyle/>
+          <a:p>
+            <a:pPr algn="ctr"/>
+            <a:endParaRPr lang="it-IT"/>
+          </a:p>
+        </p:txBody>
+      </p:sp>
+      <p:sp>
+        <p:nvSpPr>
+          <p:cNvPr id="10" name="CasellaDiTesto 9">
+            <a:extLst>
+              <a:ext uri="{FF2B5EF4-FFF2-40B4-BE49-F238E27FC236}">
+                <a16:creationId xmlns:a16="http://schemas.microsoft.com/office/drawing/2014/main" id="{3433BF1C-FBF6-4B1E-BC35-163DBF2F4A17}"/>
+              </a:ext>
+            </a:extLst>
+          </p:cNvPr>
+          <p:cNvSpPr txBox="1"/>
+          <p:nvPr/>
+        </p:nvSpPr>
+        <p:spPr>
+          <a:xfrm>
+            <a:off x="373882" y="2452591"/>
+            <a:ext cx="2198213" cy="1754326"/>
+          </a:xfrm>
+          <a:prstGeom prst="rect">
+            <a:avLst/>
+          </a:prstGeom>
+          <a:noFill/>
+        </p:spPr>
+        <p:txBody>
+          <a:bodyPr wrap="square" rtlCol="0">
+            <a:spAutoFit/>
+          </a:bodyPr>
+          <a:lstStyle/>
+          <a:p>
+            <a:r>
+              <a:rPr lang="it-IT" dirty="0"/>
+              <a:t>Copiano </a:t>
+            </a:r>
+            <a:r>
+              <a:rPr lang="it-IT" dirty="0" err="1"/>
+              <a:t>oplog</a:t>
+            </a:r>
+            <a:r>
+              <a:rPr lang="it-IT" dirty="0"/>
+              <a:t> dal primario ed effettuano i cambiamenti. La </a:t>
+            </a:r>
+            <a:r>
+              <a:rPr lang="it-IT" dirty="0" err="1"/>
+              <a:t>relica</a:t>
+            </a:r>
+            <a:r>
+              <a:rPr lang="it-IT" dirty="0"/>
+              <a:t> </a:t>
+            </a:r>
+            <a:r>
+              <a:rPr lang="it-IT" dirty="0" err="1"/>
+              <a:t>avviena</a:t>
+            </a:r>
+            <a:r>
+              <a:rPr lang="it-IT" dirty="0"/>
+              <a:t> in maniera asincrona</a:t>
+            </a:r>
+          </a:p>
+        </p:txBody>
+      </p:sp>
+      <p:sp>
+        <p:nvSpPr>
+          <p:cNvPr id="12" name="Figura a mano libera: forma 11">
+            <a:extLst>
+              <a:ext uri="{FF2B5EF4-FFF2-40B4-BE49-F238E27FC236}">
+                <a16:creationId xmlns:a16="http://schemas.microsoft.com/office/drawing/2014/main" id="{FE31D480-2EFF-4B3D-B75F-317352BF15D9}"/>
+              </a:ext>
+            </a:extLst>
+          </p:cNvPr>
+          <p:cNvSpPr/>
+          <p:nvPr/>
+        </p:nvSpPr>
+        <p:spPr>
+          <a:xfrm>
+            <a:off x="945169" y="4283242"/>
+            <a:ext cx="1256610" cy="1455821"/>
+          </a:xfrm>
+          <a:custGeom>
+            <a:avLst/>
+            <a:gdLst>
+              <a:gd name="connsiteX0" fmla="*/ 1256610 w 1256610"/>
+              <a:gd name="connsiteY0" fmla="*/ 1455821 h 1455821"/>
+              <a:gd name="connsiteX1" fmla="*/ 77515 w 1256610"/>
+              <a:gd name="connsiteY1" fmla="*/ 1118937 h 1455821"/>
+              <a:gd name="connsiteX2" fmla="*/ 209863 w 1256610"/>
+              <a:gd name="connsiteY2" fmla="*/ 0 h 1455821"/>
+            </a:gdLst>
+            <a:ahLst/>
+            <a:cxnLst>
+              <a:cxn ang="0">
+                <a:pos x="connsiteX0" y="connsiteY0"/>
+              </a:cxn>
+              <a:cxn ang="0">
+                <a:pos x="connsiteX1" y="connsiteY1"/>
+              </a:cxn>
+              <a:cxn ang="0">
+                <a:pos x="connsiteX2" y="connsiteY2"/>
+              </a:cxn>
+            </a:cxnLst>
+            <a:rect l="l" t="t" r="r" b="b"/>
+            <a:pathLst>
+              <a:path w="1256610" h="1455821">
+                <a:moveTo>
+                  <a:pt x="1256610" y="1455821"/>
+                </a:moveTo>
+                <a:cubicBezTo>
+                  <a:pt x="754291" y="1408697"/>
+                  <a:pt x="251973" y="1361574"/>
+                  <a:pt x="77515" y="1118937"/>
+                </a:cubicBezTo>
+                <a:cubicBezTo>
+                  <a:pt x="-96943" y="876300"/>
+                  <a:pt x="56460" y="438150"/>
+                  <a:pt x="209863" y="0"/>
+                </a:cubicBezTo>
+              </a:path>
+            </a:pathLst>
+          </a:custGeom>
+          <a:noFill/>
+          <a:ln>
+            <a:headEnd type="none" w="med" len="med"/>
+            <a:tailEnd type="arrow" w="med" len="med"/>
+          </a:ln>
+        </p:spPr>
+        <p:style>
+          <a:lnRef idx="2">
+            <a:schemeClr val="accent1">
+              <a:shade val="50000"/>
+            </a:schemeClr>
+          </a:lnRef>
+          <a:fillRef idx="1">
+            <a:schemeClr val="accent1"/>
+          </a:fillRef>
+          <a:effectRef idx="0">
+            <a:schemeClr val="accent1"/>
+          </a:effectRef>
+          <a:fontRef idx="minor">
+            <a:schemeClr val="lt1"/>
+          </a:fontRef>
+        </p:style>
+        <p:txBody>
+          <a:bodyPr rtlCol="0" anchor="ctr"/>
+          <a:lstStyle/>
+          <a:p>
+            <a:pPr algn="ctr"/>
+            <a:endParaRPr lang="it-IT"/>
+          </a:p>
+        </p:txBody>
+      </p:sp>
+    </p:spTree>
+    <p:extLst>
+      <p:ext uri="{BB962C8B-B14F-4D97-AF65-F5344CB8AC3E}">
+        <p14:creationId xmlns:p14="http://schemas.microsoft.com/office/powerpoint/2010/main" val="849608979"/>
+      </p:ext>
+    </p:extLst>
+  </p:cSld>
+  <p:clrMapOvr>
+    <a:masterClrMapping/>
+  </p:clrMapOvr>
+</p:sld>
+</file>
+
+<file path=ppt/slides/slide12.xml><?xml version="1.0" encoding="utf-8"?>
+<p:sld xmlns:a="http://schemas.openxmlformats.org/drawingml/2006/main" xmlns:r="http://schemas.openxmlformats.org/officeDocument/2006/relationships" xmlns:p="http://schemas.openxmlformats.org/presentationml/2006/main">
+  <p:cSld>
+    <p:spTree>
+      <p:nvGrpSpPr>
+        <p:cNvPr id="1" name=""/>
+        <p:cNvGrpSpPr/>
+        <p:nvPr/>
+      </p:nvGrpSpPr>
+      <p:grpSpPr>
+        <a:xfrm>
+          <a:off x="0" y="0"/>
+          <a:ext cx="0" cy="0"/>
+          <a:chOff x="0" y="0"/>
+          <a:chExt cx="0" cy="0"/>
+        </a:xfrm>
+      </p:grpSpPr>
+      <p:sp>
+        <p:nvSpPr>
+          <p:cNvPr id="2" name="Titolo 1">
+            <a:extLst>
+              <a:ext uri="{FF2B5EF4-FFF2-40B4-BE49-F238E27FC236}">
+                <a16:creationId xmlns:a16="http://schemas.microsoft.com/office/drawing/2014/main" id="{09345BFD-B712-4330-BDB3-5CC029C1FFCB}"/>
+              </a:ext>
+            </a:extLst>
+          </p:cNvPr>
+          <p:cNvSpPr>
+            <a:spLocks noGrp="1"/>
+          </p:cNvSpPr>
+          <p:nvPr>
+            <p:ph type="title"/>
+          </p:nvPr>
+        </p:nvSpPr>
+        <p:spPr/>
+        <p:txBody>
+          <a:bodyPr/>
+          <a:lstStyle/>
+          <a:p>
+            <a:r>
+              <a:rPr lang="it-IT" dirty="0" err="1"/>
+              <a:t>Heartbeat</a:t>
+            </a:r>
+            <a:r>
+              <a:rPr lang="it-IT" dirty="0"/>
+              <a:t> </a:t>
+            </a:r>
+            <a:r>
+              <a:rPr lang="it-IT" dirty="0" err="1"/>
+              <a:t>protocol</a:t>
+            </a:r>
+            <a:endParaRPr lang="it-IT" dirty="0"/>
+          </a:p>
+        </p:txBody>
+      </p:sp>
+      <p:pic>
+        <p:nvPicPr>
+          <p:cNvPr id="5" name="Elemento grafico 4">
+            <a:extLst>
+              <a:ext uri="{FF2B5EF4-FFF2-40B4-BE49-F238E27FC236}">
+                <a16:creationId xmlns:a16="http://schemas.microsoft.com/office/drawing/2014/main" id="{246A548C-5A2B-40F7-965A-213530075FEA}"/>
+              </a:ext>
+            </a:extLst>
+          </p:cNvPr>
+          <p:cNvPicPr>
+            <a:picLocks noChangeAspect="1"/>
+          </p:cNvPicPr>
+          <p:nvPr/>
+        </p:nvPicPr>
+        <p:blipFill>
+          <a:blip r:embed="rId2">
+            <a:extLst>
+              <a:ext uri="{28A0092B-C50C-407E-A947-70E740481C1C}">
+                <a14:useLocalDpi xmlns:a14="http://schemas.microsoft.com/office/drawing/2010/main" val="0"/>
+              </a:ext>
+              <a:ext uri="{96DAC541-7B7A-43D3-8B79-37D633B846F1}">
+                <asvg:svgBlip xmlns:asvg="http://schemas.microsoft.com/office/drawing/2016/SVG/main" r:embed="rId3"/>
+              </a:ext>
+            </a:extLst>
+          </a:blip>
+          <a:stretch>
+            <a:fillRect/>
+          </a:stretch>
+        </p:blipFill>
+        <p:spPr>
+          <a:xfrm>
+            <a:off x="1127960" y="3429000"/>
+            <a:ext cx="7048500" cy="2819400"/>
+          </a:xfrm>
+          <a:prstGeom prst="rect">
+            <a:avLst/>
+          </a:prstGeom>
+        </p:spPr>
+      </p:pic>
+      <p:sp>
+        <p:nvSpPr>
+          <p:cNvPr id="6" name="Segnaposto contenuto 2">
+            <a:extLst>
+              <a:ext uri="{FF2B5EF4-FFF2-40B4-BE49-F238E27FC236}">
+                <a16:creationId xmlns:a16="http://schemas.microsoft.com/office/drawing/2014/main" id="{28E3148F-0742-4EDB-A480-790871A466A2}"/>
+              </a:ext>
+            </a:extLst>
+          </p:cNvPr>
+          <p:cNvSpPr>
+            <a:spLocks noGrp="1"/>
+          </p:cNvSpPr>
+          <p:nvPr>
+            <p:ph idx="1"/>
+          </p:nvPr>
+        </p:nvSpPr>
+        <p:spPr>
+          <a:xfrm>
+            <a:off x="353876" y="1487488"/>
+            <a:ext cx="8596668" cy="1592596"/>
+          </a:xfrm>
+        </p:spPr>
+        <p:txBody>
+          <a:bodyPr>
+            <a:noAutofit/>
+          </a:bodyPr>
+          <a:lstStyle/>
+          <a:p>
+            <a:r>
+              <a:rPr lang="it-IT" sz="2000" dirty="0"/>
+              <a:t>I membri di un replica set comunicano frequentemente attraverso messaggi di </a:t>
+            </a:r>
+            <a:r>
+              <a:rPr lang="it-IT" sz="2000" dirty="0" err="1"/>
+              <a:t>ping</a:t>
+            </a:r>
+            <a:r>
+              <a:rPr lang="it-IT" sz="2000" dirty="0"/>
+              <a:t> chiamati </a:t>
+            </a:r>
+            <a:r>
+              <a:rPr lang="it-IT" sz="2000" dirty="0" err="1">
+                <a:solidFill>
+                  <a:schemeClr val="accent2"/>
+                </a:solidFill>
+              </a:rPr>
+              <a:t>heartbeat</a:t>
+            </a:r>
+            <a:r>
+              <a:rPr lang="it-IT" sz="2000" dirty="0">
+                <a:solidFill>
+                  <a:schemeClr val="accent2"/>
+                </a:solidFill>
+              </a:rPr>
+              <a:t> </a:t>
+            </a:r>
+            <a:r>
+              <a:rPr lang="it-IT" sz="2000" dirty="0" err="1">
+                <a:solidFill>
+                  <a:schemeClr val="accent2"/>
+                </a:solidFill>
+              </a:rPr>
+              <a:t>message</a:t>
+            </a:r>
+            <a:r>
+              <a:rPr lang="it-IT" sz="2000" dirty="0">
+                <a:solidFill>
+                  <a:schemeClr val="tx1"/>
+                </a:solidFill>
+              </a:rPr>
+              <a:t>.</a:t>
+            </a:r>
+            <a:r>
+              <a:rPr lang="it-IT" sz="2000" dirty="0">
+                <a:solidFill>
+                  <a:schemeClr val="accent2"/>
+                </a:solidFill>
+              </a:rPr>
+              <a:t> </a:t>
+            </a:r>
+            <a:r>
+              <a:rPr lang="it-IT" sz="2000" dirty="0"/>
+              <a:t>Se un nodo non esegue il </a:t>
+            </a:r>
+            <a:r>
+              <a:rPr lang="it-IT" sz="2000" dirty="0" err="1"/>
+              <a:t>ping</a:t>
+            </a:r>
+            <a:r>
+              <a:rPr lang="it-IT" sz="2000" dirty="0"/>
+              <a:t> entro 10s (default), gli altri nodi nel set di repliche lo contrassegnano come inaccessibile. Questa funzionalità è fondamentale per capire se il nodo primario è </a:t>
+            </a:r>
+            <a:r>
+              <a:rPr lang="it-IT" sz="2000" dirty="0" err="1"/>
+              <a:t>irragiungibile</a:t>
+            </a:r>
+            <a:r>
+              <a:rPr lang="it-IT" sz="2000" dirty="0"/>
+              <a:t>, allora avrò una nuova elezione. </a:t>
+            </a:r>
+            <a:endParaRPr lang="it-IT" sz="2000" dirty="0">
+              <a:solidFill>
+                <a:schemeClr val="accent2"/>
+              </a:solidFill>
+            </a:endParaRPr>
+          </a:p>
+        </p:txBody>
+      </p:sp>
+    </p:spTree>
+    <p:extLst>
+      <p:ext uri="{BB962C8B-B14F-4D97-AF65-F5344CB8AC3E}">
+        <p14:creationId xmlns:p14="http://schemas.microsoft.com/office/powerpoint/2010/main" val="742333452"/>
+      </p:ext>
+    </p:extLst>
+  </p:cSld>
+  <p:clrMapOvr>
+    <a:masterClrMapping/>
+  </p:clrMapOvr>
+</p:sld>
+</file>
+
+<file path=ppt/slides/slide13.xml><?xml version="1.0" encoding="utf-8"?>
+<p:sld xmlns:a="http://schemas.openxmlformats.org/drawingml/2006/main" xmlns:r="http://schemas.openxmlformats.org/officeDocument/2006/relationships" xmlns:p="http://schemas.openxmlformats.org/presentationml/2006/main">
+  <p:cSld>
+    <p:spTree>
+      <p:nvGrpSpPr>
+        <p:cNvPr id="1" name=""/>
+        <p:cNvGrpSpPr/>
+        <p:nvPr/>
+      </p:nvGrpSpPr>
+      <p:grpSpPr>
+        <a:xfrm>
+          <a:off x="0" y="0"/>
+          <a:ext cx="0" cy="0"/>
+          <a:chOff x="0" y="0"/>
+          <a:chExt cx="0" cy="0"/>
+        </a:xfrm>
+      </p:grpSpPr>
+      <p:sp>
+        <p:nvSpPr>
+          <p:cNvPr id="2" name="Titolo 1">
+            <a:extLst>
+              <a:ext uri="{FF2B5EF4-FFF2-40B4-BE49-F238E27FC236}">
+                <a16:creationId xmlns:a16="http://schemas.microsoft.com/office/drawing/2014/main" id="{5288044F-3D2D-4AB2-8F19-5F406FB84B15}"/>
+              </a:ext>
+            </a:extLst>
+          </p:cNvPr>
+          <p:cNvSpPr>
+            <a:spLocks noGrp="1"/>
+          </p:cNvSpPr>
+          <p:nvPr>
+            <p:ph type="title"/>
+          </p:nvPr>
+        </p:nvSpPr>
+        <p:spPr/>
+        <p:txBody>
+          <a:bodyPr/>
+          <a:lstStyle/>
+          <a:p>
+            <a:r>
+              <a:rPr lang="it-IT" dirty="0"/>
+              <a:t>Arbitri</a:t>
+            </a:r>
+          </a:p>
+        </p:txBody>
+      </p:sp>
+      <p:sp>
+        <p:nvSpPr>
+          <p:cNvPr id="3" name="Segnaposto contenuto 2">
+            <a:extLst>
+              <a:ext uri="{FF2B5EF4-FFF2-40B4-BE49-F238E27FC236}">
+                <a16:creationId xmlns:a16="http://schemas.microsoft.com/office/drawing/2014/main" id="{83EB69F4-E59A-4DB0-8E9C-3622D58F31FF}"/>
+              </a:ext>
+            </a:extLst>
+          </p:cNvPr>
+          <p:cNvSpPr>
+            <a:spLocks noGrp="1"/>
+          </p:cNvSpPr>
+          <p:nvPr>
+            <p:ph idx="1"/>
+          </p:nvPr>
+        </p:nvSpPr>
+        <p:spPr>
+          <a:xfrm>
+            <a:off x="593113" y="1334170"/>
+            <a:ext cx="8596668" cy="2148304"/>
+          </a:xfrm>
+        </p:spPr>
+        <p:txBody>
+          <a:bodyPr/>
+          <a:lstStyle/>
+          <a:p>
+            <a:r>
+              <a:rPr lang="it-IT" dirty="0"/>
+              <a:t>Questa tipologia di nodi vengono creati quando non si ha la possibilità fisica di allocare un altra istanza di </a:t>
+            </a:r>
+            <a:r>
+              <a:rPr lang="it-IT" dirty="0" err="1"/>
+              <a:t>mongod</a:t>
+            </a:r>
+            <a:r>
+              <a:rPr lang="it-IT" dirty="0"/>
+              <a:t> che contenga una replica dei dati. Gli arbitri, infatti, sono nodi che non contengono dati e che perciò non possono essere eletti primari. Nonostante ciò, posso partecipare all’elezione del primario con voto pari a 1. L’idea di inserire un arbitro è per mantenere un numero di voti dispari durante l’elezione del primario evitando un pareggio.</a:t>
+            </a:r>
+          </a:p>
+        </p:txBody>
+      </p:sp>
+      <p:pic>
+        <p:nvPicPr>
+          <p:cNvPr id="5" name="Elemento grafico 4">
+            <a:extLst>
+              <a:ext uri="{FF2B5EF4-FFF2-40B4-BE49-F238E27FC236}">
+                <a16:creationId xmlns:a16="http://schemas.microsoft.com/office/drawing/2014/main" id="{E752A82D-2A51-46B1-9375-3E55A381D4BA}"/>
+              </a:ext>
+            </a:extLst>
+          </p:cNvPr>
+          <p:cNvPicPr>
+            <a:picLocks noChangeAspect="1"/>
+          </p:cNvPicPr>
+          <p:nvPr/>
+        </p:nvPicPr>
+        <p:blipFill>
+          <a:blip r:embed="rId2">
+            <a:extLst>
+              <a:ext uri="{28A0092B-C50C-407E-A947-70E740481C1C}">
+                <a14:useLocalDpi xmlns:a14="http://schemas.microsoft.com/office/drawing/2010/main" val="0"/>
+              </a:ext>
+              <a:ext uri="{96DAC541-7B7A-43D3-8B79-37D633B846F1}">
+                <asvg:svgBlip xmlns:asvg="http://schemas.microsoft.com/office/drawing/2016/SVG/main" r:embed="rId3"/>
+              </a:ext>
+            </a:extLst>
+          </a:blip>
+          <a:stretch>
+            <a:fillRect/>
+          </a:stretch>
+        </p:blipFill>
+        <p:spPr>
+          <a:xfrm>
+            <a:off x="1451418" y="3429000"/>
+            <a:ext cx="7048500" cy="2667000"/>
+          </a:xfrm>
+          <a:prstGeom prst="rect">
+            <a:avLst/>
+          </a:prstGeom>
+        </p:spPr>
+      </p:pic>
+    </p:spTree>
+    <p:extLst>
+      <p:ext uri="{BB962C8B-B14F-4D97-AF65-F5344CB8AC3E}">
+        <p14:creationId xmlns:p14="http://schemas.microsoft.com/office/powerpoint/2010/main" val="1552268980"/>
+      </p:ext>
+    </p:extLst>
+  </p:cSld>
+  <p:clrMapOvr>
+    <a:masterClrMapping/>
+  </p:clrMapOvr>
+</p:sld>
+</file>
+
+<file path=ppt/slides/slide14.xml><?xml version="1.0" encoding="utf-8"?>
+<p:sld xmlns:a="http://schemas.openxmlformats.org/drawingml/2006/main" xmlns:r="http://schemas.openxmlformats.org/officeDocument/2006/relationships" xmlns:p="http://schemas.openxmlformats.org/presentationml/2006/main">
+  <p:cSld>
+    <p:spTree>
+      <p:nvGrpSpPr>
+        <p:cNvPr id="1" name=""/>
+        <p:cNvGrpSpPr/>
+        <p:nvPr/>
+      </p:nvGrpSpPr>
+      <p:grpSpPr>
+        <a:xfrm>
+          <a:off x="0" y="0"/>
+          <a:ext cx="0" cy="0"/>
+          <a:chOff x="0" y="0"/>
+          <a:chExt cx="0" cy="0"/>
+        </a:xfrm>
+      </p:grpSpPr>
+      <p:sp>
+        <p:nvSpPr>
+          <p:cNvPr id="2" name="Titolo 1">
+            <a:extLst>
+              <a:ext uri="{FF2B5EF4-FFF2-40B4-BE49-F238E27FC236}">
+                <a16:creationId xmlns:a16="http://schemas.microsoft.com/office/drawing/2014/main" id="{66C4FCBD-52C8-47AD-8601-E027FE8F274A}"/>
+              </a:ext>
+            </a:extLst>
+          </p:cNvPr>
+          <p:cNvSpPr>
+            <a:spLocks noGrp="1"/>
+          </p:cNvSpPr>
+          <p:nvPr>
+            <p:ph type="title"/>
+          </p:nvPr>
+        </p:nvSpPr>
+        <p:spPr/>
+        <p:txBody>
+          <a:bodyPr/>
+          <a:lstStyle/>
+          <a:p>
+            <a:r>
+              <a:rPr lang="it-IT"/>
+              <a:t>Replication Lag</a:t>
+            </a:r>
+          </a:p>
+        </p:txBody>
+      </p:sp>
+      <p:sp>
+        <p:nvSpPr>
+          <p:cNvPr id="3" name="Segnaposto contenuto 2">
+            <a:extLst>
+              <a:ext uri="{FF2B5EF4-FFF2-40B4-BE49-F238E27FC236}">
+                <a16:creationId xmlns:a16="http://schemas.microsoft.com/office/drawing/2014/main" id="{9A82F802-1553-4021-AC1B-82416F4BC753}"/>
+              </a:ext>
+            </a:extLst>
+          </p:cNvPr>
+          <p:cNvSpPr>
+            <a:spLocks noGrp="1"/>
+          </p:cNvSpPr>
+          <p:nvPr>
+            <p:ph idx="1"/>
+          </p:nvPr>
+        </p:nvSpPr>
+        <p:spPr/>
+        <p:txBody>
+          <a:bodyPr/>
+          <a:lstStyle/>
+          <a:p>
+            <a:endParaRPr lang="it-IT"/>
+          </a:p>
+        </p:txBody>
+      </p:sp>
+    </p:spTree>
+    <p:extLst>
+      <p:ext uri="{BB962C8B-B14F-4D97-AF65-F5344CB8AC3E}">
+        <p14:creationId xmlns:p14="http://schemas.microsoft.com/office/powerpoint/2010/main" val="295965617"/>
+      </p:ext>
+    </p:extLst>
+  </p:cSld>
+  <p:clrMapOvr>
+    <a:masterClrMapping/>
+  </p:clrMapOvr>
+</p:sld>
+</file>
+
+<file path=ppt/slides/slide15.xml><?xml version="1.0" encoding="utf-8"?>
+<p:sld xmlns:a="http://schemas.openxmlformats.org/drawingml/2006/main" xmlns:r="http://schemas.openxmlformats.org/officeDocument/2006/relationships" xmlns:p="http://schemas.openxmlformats.org/presentationml/2006/main">
+  <p:cSld>
+    <p:spTree>
+      <p:nvGrpSpPr>
+        <p:cNvPr id="1" name=""/>
+        <p:cNvGrpSpPr/>
+        <p:nvPr/>
+      </p:nvGrpSpPr>
+      <p:grpSpPr>
+        <a:xfrm>
+          <a:off x="0" y="0"/>
+          <a:ext cx="0" cy="0"/>
+          <a:chOff x="0" y="0"/>
+          <a:chExt cx="0" cy="0"/>
+        </a:xfrm>
+      </p:grpSpPr>
+      <p:sp>
+        <p:nvSpPr>
+          <p:cNvPr id="2" name="Titolo 1">
+            <a:extLst>
+              <a:ext uri="{FF2B5EF4-FFF2-40B4-BE49-F238E27FC236}">
+                <a16:creationId xmlns:a16="http://schemas.microsoft.com/office/drawing/2014/main" id="{4EC9AA5C-8EC2-47D0-AC90-F260725B5224}"/>
+              </a:ext>
+            </a:extLst>
+          </p:cNvPr>
+          <p:cNvSpPr>
+            <a:spLocks noGrp="1"/>
+          </p:cNvSpPr>
+          <p:nvPr>
+            <p:ph type="title"/>
+          </p:nvPr>
+        </p:nvSpPr>
+        <p:spPr>
+          <a:xfrm>
+            <a:off x="677334" y="609600"/>
+            <a:ext cx="8596668" cy="762000"/>
+          </a:xfrm>
+        </p:spPr>
+        <p:txBody>
+          <a:bodyPr/>
+          <a:lstStyle/>
+          <a:p>
+            <a:r>
+              <a:rPr lang="it-IT" dirty="0"/>
+              <a:t>Caratteristiche principali</a:t>
+            </a:r>
+          </a:p>
+        </p:txBody>
+      </p:sp>
+      <p:sp>
+        <p:nvSpPr>
+          <p:cNvPr id="3" name="Segnaposto contenuto 2">
+            <a:extLst>
+              <a:ext uri="{FF2B5EF4-FFF2-40B4-BE49-F238E27FC236}">
+                <a16:creationId xmlns:a16="http://schemas.microsoft.com/office/drawing/2014/main" id="{F647C8AD-B187-4B6F-82DA-45F9751B8FA4}"/>
+              </a:ext>
+            </a:extLst>
+          </p:cNvPr>
+          <p:cNvSpPr>
+            <a:spLocks noGrp="1"/>
+          </p:cNvSpPr>
+          <p:nvPr>
+            <p:ph idx="1"/>
+          </p:nvPr>
+        </p:nvSpPr>
+        <p:spPr>
+          <a:xfrm>
+            <a:off x="677334" y="1600201"/>
+            <a:ext cx="8596668" cy="3962400"/>
+          </a:xfrm>
+        </p:spPr>
+        <p:txBody>
+          <a:bodyPr>
+            <a:normAutofit/>
+          </a:bodyPr>
+          <a:lstStyle/>
+          <a:p>
+            <a:r>
+              <a:rPr lang="it-IT" dirty="0"/>
+              <a:t>Estremamente flessibile nella rappresentazione e gestione del dato.</a:t>
+            </a:r>
+          </a:p>
+          <a:p>
+            <a:r>
+              <a:rPr lang="it-IT" dirty="0"/>
+              <a:t>La struttura del documento è più in linea con il modo in cui gli sviluppatori costruiscono le loro classi e oggetti nei rispettivi linguaggi di programmazione.</a:t>
+            </a:r>
+          </a:p>
+          <a:p>
+            <a:r>
+              <a:rPr lang="it-IT" dirty="0"/>
+              <a:t>Non è necessario che i </a:t>
+            </a:r>
+            <a:r>
+              <a:rPr lang="it-IT" dirty="0" err="1"/>
+              <a:t>documents</a:t>
+            </a:r>
+            <a:r>
+              <a:rPr lang="it-IT" dirty="0"/>
+              <a:t> abbiano uno schema definito in anticipo. Infatti, i fields possono essere creati al volo.</a:t>
+            </a:r>
+          </a:p>
+          <a:p>
+            <a:r>
+              <a:rPr lang="it-IT" dirty="0"/>
+              <a:t>Il modello di dati disponibile all'interno di </a:t>
+            </a:r>
+            <a:r>
+              <a:rPr lang="it-IT" dirty="0" err="1"/>
+              <a:t>MongoDB</a:t>
+            </a:r>
+            <a:r>
+              <a:rPr lang="it-IT" dirty="0"/>
+              <a:t> consente di rappresentare più facilmente relazioni gerarchiche, memorizzare array e altre strutture più complesse.</a:t>
+            </a:r>
+          </a:p>
+          <a:p>
+            <a:r>
+              <a:rPr lang="it-IT" dirty="0"/>
+              <a:t>Scalabilità – Gli ambienti </a:t>
+            </a:r>
+            <a:r>
+              <a:rPr lang="it-IT" dirty="0" err="1"/>
+              <a:t>MongoDB</a:t>
+            </a:r>
+            <a:r>
+              <a:rPr lang="it-IT" dirty="0"/>
+              <a:t> sono molto scalabili. Le aziende di tutto il mondo hanno definito cluster con alcuni di loro che eseguono oltre 100 nodi con circa milioni di documenti all'interno del database.</a:t>
+            </a:r>
+          </a:p>
+        </p:txBody>
+      </p:sp>
+    </p:spTree>
+    <p:extLst>
+      <p:ext uri="{BB962C8B-B14F-4D97-AF65-F5344CB8AC3E}">
+        <p14:creationId xmlns:p14="http://schemas.microsoft.com/office/powerpoint/2010/main" val="2344025804"/>
+      </p:ext>
+    </p:extLst>
+  </p:cSld>
+  <p:clrMapOvr>
+    <a:masterClrMapping/>
+  </p:clrMapOvr>
+</p:sld>
+</file>
+
 <file path=ppt/slides/slide2.xml><?xml version="1.0" encoding="utf-8"?>
 <p:sld xmlns:a="http://schemas.openxmlformats.org/drawingml/2006/main" xmlns:r="http://schemas.openxmlformats.org/officeDocument/2006/relationships" xmlns:p="http://schemas.openxmlformats.org/presentationml/2006/main">
   <p:cSld>
@@ -8900,7 +11021,7 @@
           <p:cNvPr id="2" name="Titolo 1">
             <a:extLst>
               <a:ext uri="{FF2B5EF4-FFF2-40B4-BE49-F238E27FC236}">
-                <a16:creationId xmlns:a16="http://schemas.microsoft.com/office/drawing/2014/main" id="{4EC9AA5C-8EC2-47D0-AC90-F260725B5224}"/>
+                <a16:creationId xmlns:a16="http://schemas.microsoft.com/office/drawing/2014/main" id="{3D50023E-F3FC-459D-8DD9-7F6E87F4BED5}"/>
               </a:ext>
             </a:extLst>
           </p:cNvPr>
@@ -8914,7 +11035,7 @@
         <p:spPr>
           <a:xfrm>
             <a:off x="677334" y="609600"/>
-            <a:ext cx="8596668" cy="762000"/>
+            <a:ext cx="8596668" cy="725905"/>
           </a:xfrm>
         </p:spPr>
         <p:txBody>
@@ -8923,7 +11044,7 @@
           <a:p>
             <a:r>
               <a:rPr lang="it-IT" dirty="0"/>
-              <a:t>Caratteristiche principali</a:t>
+              <a:t>Replication</a:t>
             </a:r>
           </a:p>
         </p:txBody>
@@ -8933,7 +11054,7 @@
           <p:cNvPr id="3" name="Segnaposto contenuto 2">
             <a:extLst>
               <a:ext uri="{FF2B5EF4-FFF2-40B4-BE49-F238E27FC236}">
-                <a16:creationId xmlns:a16="http://schemas.microsoft.com/office/drawing/2014/main" id="{F647C8AD-B187-4B6F-82DA-45F9751B8FA4}"/>
+                <a16:creationId xmlns:a16="http://schemas.microsoft.com/office/drawing/2014/main" id="{37820A38-C9C9-4A99-80D6-447D8B02A018}"/>
               </a:ext>
             </a:extLst>
           </p:cNvPr>
@@ -8946,8 +11067,8 @@
         </p:nvSpPr>
         <p:spPr>
           <a:xfrm>
-            <a:off x="677334" y="1600201"/>
-            <a:ext cx="8596668" cy="3962400"/>
+            <a:off x="520923" y="1335506"/>
+            <a:ext cx="9212624" cy="6136106"/>
           </a:xfrm>
         </p:spPr>
         <p:txBody>
@@ -8957,56 +11078,79 @@
           <a:lstStyle/>
           <a:p>
             <a:r>
-              <a:rPr lang="it-IT" dirty="0"/>
-              <a:t>Estremamente flessibile nella rappresentazione e gestione del dato.</a:t>
-            </a:r>
-          </a:p>
-          <a:p>
-            <a:r>
-              <a:rPr lang="it-IT" dirty="0"/>
-              <a:t>La struttura del documento è più in linea con il modo in cui gli sviluppatori costruiscono le loro classi e oggetti nei rispettivi linguaggi di programmazione.</a:t>
-            </a:r>
-          </a:p>
-          <a:p>
-            <a:r>
-              <a:rPr lang="it-IT" dirty="0"/>
-              <a:t>Non è necessario che i </a:t>
-            </a:r>
-            <a:r>
-              <a:rPr lang="it-IT" dirty="0" err="1"/>
-              <a:t>documents</a:t>
-            </a:r>
-            <a:r>
-              <a:rPr lang="it-IT" dirty="0"/>
-              <a:t> abbiano uno schema definito in anticipo. Infatti, i fields possono essere creati al volo.</a:t>
-            </a:r>
-          </a:p>
-          <a:p>
-            <a:r>
-              <a:rPr lang="it-IT" dirty="0"/>
-              <a:t>Il modello di dati disponibile all'interno di </a:t>
-            </a:r>
-            <a:r>
-              <a:rPr lang="it-IT" dirty="0" err="1"/>
+              <a:rPr lang="it-IT" sz="2000" dirty="0"/>
+              <a:t>Scopi principali della replicazione:</a:t>
+            </a:r>
+          </a:p>
+          <a:p>
+            <a:pPr lvl="1"/>
+            <a:r>
+              <a:rPr lang="it-IT" sz="2000" dirty="0"/>
+              <a:t>Fornisce ridondanza dei dati, così ho un livello di tolleranza agli errori contro la perdita di un singolo server (</a:t>
+            </a:r>
+            <a:r>
+              <a:rPr lang="it-IT" sz="2000" dirty="0" err="1"/>
+              <a:t>Availability</a:t>
+            </a:r>
+            <a:r>
+              <a:rPr lang="it-IT" sz="2000" dirty="0"/>
+              <a:t>).</a:t>
+            </a:r>
+          </a:p>
+          <a:p>
+            <a:pPr lvl="1"/>
+            <a:r>
+              <a:rPr lang="it-IT" sz="2000" dirty="0"/>
+              <a:t>Maggiore capacità di lettura, infatti i client possono inviare operazioni di lettura a server diversi.</a:t>
+            </a:r>
+          </a:p>
+          <a:p>
+            <a:pPr lvl="1"/>
+            <a:r>
+              <a:rPr lang="it-IT" sz="2000" dirty="0"/>
+              <a:t>Maggiore disponibilità per applicazioni distribuite.</a:t>
+            </a:r>
+          </a:p>
+          <a:p>
+            <a:pPr lvl="1"/>
+            <a:r>
+              <a:rPr lang="it-IT" sz="2000" dirty="0"/>
+              <a:t>Scopi dedicati come il backup</a:t>
+            </a:r>
+          </a:p>
+          <a:p>
+            <a:r>
+              <a:rPr lang="it-IT" sz="2000" dirty="0"/>
+              <a:t>Come funzione in </a:t>
+            </a:r>
+            <a:r>
+              <a:rPr lang="it-IT" sz="2000" dirty="0" err="1"/>
               <a:t>MongoDB</a:t>
             </a:r>
             <a:r>
-              <a:rPr lang="it-IT" dirty="0"/>
-              <a:t> consente di rappresentare più facilmente relazioni gerarchiche, memorizzare array e altre strutture più complesse.</a:t>
-            </a:r>
-          </a:p>
-          <a:p>
-            <a:r>
-              <a:rPr lang="it-IT" dirty="0"/>
-              <a:t>Scalabilità – Gli ambienti </a:t>
-            </a:r>
-            <a:r>
-              <a:rPr lang="it-IT" dirty="0" err="1"/>
-              <a:t>MongoDB</a:t>
-            </a:r>
-            <a:r>
-              <a:rPr lang="it-IT" dirty="0"/>
-              <a:t> sono molto scalabili. Le aziende di tutto il mondo hanno definito cluster con alcuni di loro che eseguono oltre 100 nodi con circa milioni di documenti all'interno del database.</a:t>
+              <a:rPr lang="it-IT" sz="2000" dirty="0"/>
+              <a:t>:</a:t>
+            </a:r>
+          </a:p>
+          <a:p>
+            <a:pPr lvl="1"/>
+            <a:r>
+              <a:rPr lang="it-IT" sz="2000" dirty="0"/>
+              <a:t>Ho un replica set che mantiene lo stesso set di dati.</a:t>
+            </a:r>
+          </a:p>
+          <a:p>
+            <a:pPr lvl="1"/>
+            <a:r>
+              <a:rPr lang="it-IT" sz="2000" dirty="0"/>
+              <a:t>Un replica set ha diversi nodi portanti e un nodo arbitro facoltativo.</a:t>
+            </a:r>
+          </a:p>
+          <a:p>
+            <a:pPr lvl="1"/>
+            <a:r>
+              <a:rPr lang="it-IT" sz="2000" dirty="0"/>
+              <a:t>Dei nodi portanti uno solo è considerato primario, mentre gli altri nodi sono considerati secondari.</a:t>
             </a:r>
           </a:p>
         </p:txBody>
@@ -9014,7 +11158,454 @@
     </p:spTree>
     <p:extLst>
       <p:ext uri="{BB962C8B-B14F-4D97-AF65-F5344CB8AC3E}">
-        <p14:creationId xmlns:p14="http://schemas.microsoft.com/office/powerpoint/2010/main" val="2344025804"/>
+        <p14:creationId xmlns:p14="http://schemas.microsoft.com/office/powerpoint/2010/main" val="3419229553"/>
+      </p:ext>
+    </p:extLst>
+  </p:cSld>
+  <p:clrMapOvr>
+    <a:masterClrMapping/>
+  </p:clrMapOvr>
+</p:sld>
+</file>
+
+<file path=ppt/slides/slide9.xml><?xml version="1.0" encoding="utf-8"?>
+<p:sld xmlns:a="http://schemas.openxmlformats.org/drawingml/2006/main" xmlns:r="http://schemas.openxmlformats.org/officeDocument/2006/relationships" xmlns:p="http://schemas.openxmlformats.org/presentationml/2006/main">
+  <p:cSld>
+    <p:spTree>
+      <p:nvGrpSpPr>
+        <p:cNvPr id="1" name=""/>
+        <p:cNvGrpSpPr/>
+        <p:nvPr/>
+      </p:nvGrpSpPr>
+      <p:grpSpPr>
+        <a:xfrm>
+          <a:off x="0" y="0"/>
+          <a:ext cx="0" cy="0"/>
+          <a:chOff x="0" y="0"/>
+          <a:chExt cx="0" cy="0"/>
+        </a:xfrm>
+      </p:grpSpPr>
+      <p:sp>
+        <p:nvSpPr>
+          <p:cNvPr id="2" name="Titolo 1">
+            <a:extLst>
+              <a:ext uri="{FF2B5EF4-FFF2-40B4-BE49-F238E27FC236}">
+                <a16:creationId xmlns:a16="http://schemas.microsoft.com/office/drawing/2014/main" id="{C34BB43E-7C0E-4277-AB2D-6D41651B4CF5}"/>
+              </a:ext>
+            </a:extLst>
+          </p:cNvPr>
+          <p:cNvSpPr>
+            <a:spLocks noGrp="1"/>
+          </p:cNvSpPr>
+          <p:nvPr>
+            <p:ph type="title"/>
+          </p:nvPr>
+        </p:nvSpPr>
+        <p:spPr>
+          <a:xfrm>
+            <a:off x="581081" y="164432"/>
+            <a:ext cx="8596668" cy="617621"/>
+          </a:xfrm>
+        </p:spPr>
+        <p:txBody>
+          <a:bodyPr>
+            <a:normAutofit fontScale="90000"/>
+          </a:bodyPr>
+          <a:lstStyle/>
+          <a:p>
+            <a:r>
+              <a:rPr lang="it-IT" dirty="0"/>
+              <a:t>Nodi primari e Nodi secondari</a:t>
+            </a:r>
+          </a:p>
+        </p:txBody>
+      </p:sp>
+      <p:sp>
+        <p:nvSpPr>
+          <p:cNvPr id="3" name="Segnaposto contenuto 2">
+            <a:extLst>
+              <a:ext uri="{FF2B5EF4-FFF2-40B4-BE49-F238E27FC236}">
+                <a16:creationId xmlns:a16="http://schemas.microsoft.com/office/drawing/2014/main" id="{3F921689-5397-4128-9266-7EE889DB9C07}"/>
+              </a:ext>
+            </a:extLst>
+          </p:cNvPr>
+          <p:cNvSpPr>
+            <a:spLocks noGrp="1"/>
+          </p:cNvSpPr>
+          <p:nvPr>
+            <p:ph idx="1"/>
+          </p:nvPr>
+        </p:nvSpPr>
+        <p:spPr>
+          <a:xfrm>
+            <a:off x="581081" y="955048"/>
+            <a:ext cx="8596668" cy="1660358"/>
+          </a:xfrm>
+        </p:spPr>
+        <p:txBody>
+          <a:bodyPr>
+            <a:noAutofit/>
+          </a:bodyPr>
+          <a:lstStyle/>
+          <a:p>
+            <a:r>
+              <a:rPr lang="it-IT" sz="2000" dirty="0"/>
+              <a:t>Il Nodo primario riceve tutte le operazioni di scrittura. Di default anche quelle di lettura, ma quest’ultime posso essere dirette anche ai nodi secondari.</a:t>
+            </a:r>
+          </a:p>
+          <a:p>
+            <a:r>
+              <a:rPr lang="it-IT" sz="2000" dirty="0"/>
+              <a:t>Un Nodo di un replica set diventa il nodo primario attraverso un processo di elezioni.</a:t>
+            </a:r>
+          </a:p>
+        </p:txBody>
+      </p:sp>
+      <p:sp>
+        <p:nvSpPr>
+          <p:cNvPr id="6" name="CasellaDiTesto 5">
+            <a:extLst>
+              <a:ext uri="{FF2B5EF4-FFF2-40B4-BE49-F238E27FC236}">
+                <a16:creationId xmlns:a16="http://schemas.microsoft.com/office/drawing/2014/main" id="{1436BC69-C58B-40DB-975B-B9949D7085B5}"/>
+              </a:ext>
+            </a:extLst>
+          </p:cNvPr>
+          <p:cNvSpPr txBox="1"/>
+          <p:nvPr/>
+        </p:nvSpPr>
+        <p:spPr>
+          <a:xfrm>
+            <a:off x="581081" y="2967335"/>
+            <a:ext cx="5514919" cy="461665"/>
+          </a:xfrm>
+          <a:prstGeom prst="rect">
+            <a:avLst/>
+          </a:prstGeom>
+          <a:noFill/>
+        </p:spPr>
+        <p:txBody>
+          <a:bodyPr wrap="square" rtlCol="0">
+            <a:spAutoFit/>
+          </a:bodyPr>
+          <a:lstStyle/>
+          <a:p>
+            <a:r>
+              <a:rPr lang="it-IT" sz="2400" dirty="0"/>
+              <a:t>Replica sete </a:t>
+            </a:r>
+            <a:r>
+              <a:rPr lang="it-IT" sz="2400" dirty="0" err="1"/>
+              <a:t>Elections</a:t>
+            </a:r>
+            <a:r>
+              <a:rPr lang="it-IT" sz="2400" dirty="0"/>
+              <a:t>:</a:t>
+            </a:r>
+          </a:p>
+        </p:txBody>
+      </p:sp>
+      <p:sp>
+        <p:nvSpPr>
+          <p:cNvPr id="8" name="Segnaposto contenuto 2">
+            <a:extLst>
+              <a:ext uri="{FF2B5EF4-FFF2-40B4-BE49-F238E27FC236}">
+                <a16:creationId xmlns:a16="http://schemas.microsoft.com/office/drawing/2014/main" id="{1289CDAC-1B35-4F01-BCE6-D1B3DBD5F38D}"/>
+              </a:ext>
+            </a:extLst>
+          </p:cNvPr>
+          <p:cNvSpPr txBox="1">
+            <a:spLocks/>
+          </p:cNvSpPr>
+          <p:nvPr/>
+        </p:nvSpPr>
+        <p:spPr>
+          <a:xfrm>
+            <a:off x="581081" y="3951019"/>
+            <a:ext cx="8596668" cy="3681662"/>
+          </a:xfrm>
+          <a:prstGeom prst="rect">
+            <a:avLst/>
+          </a:prstGeom>
+        </p:spPr>
+        <p:txBody>
+          <a:bodyPr vert="horz" lIns="91440" tIns="45720" rIns="91440" bIns="45720" rtlCol="0">
+            <a:normAutofit/>
+          </a:bodyPr>
+          <a:lstStyle>
+            <a:lvl1pPr marL="342900" indent="-342900" algn="l" defTabSz="457200" rtl="0" eaLnBrk="1" latinLnBrk="0" hangingPunct="1">
+              <a:spcBef>
+                <a:spcPts val="1000"/>
+              </a:spcBef>
+              <a:spcAft>
+                <a:spcPts val="0"/>
+              </a:spcAft>
+              <a:buClr>
+                <a:schemeClr val="accent1"/>
+              </a:buClr>
+              <a:buSzPct val="80000"/>
+              <a:buFont typeface="Wingdings 3" charset="2"/>
+              <a:buChar char=""/>
+              <a:defRPr sz="1800" kern="1200">
+                <a:solidFill>
+                  <a:schemeClr val="tx1">
+                    <a:lumMod val="75000"/>
+                    <a:lumOff val="25000"/>
+                  </a:schemeClr>
+                </a:solidFill>
+                <a:latin typeface="+mn-lt"/>
+                <a:ea typeface="+mn-ea"/>
+                <a:cs typeface="+mn-cs"/>
+              </a:defRPr>
+            </a:lvl1pPr>
+            <a:lvl2pPr marL="742950" indent="-285750" algn="l" defTabSz="457200" rtl="0" eaLnBrk="1" latinLnBrk="0" hangingPunct="1">
+              <a:spcBef>
+                <a:spcPts val="1000"/>
+              </a:spcBef>
+              <a:spcAft>
+                <a:spcPts val="0"/>
+              </a:spcAft>
+              <a:buClr>
+                <a:schemeClr val="accent1"/>
+              </a:buClr>
+              <a:buSzPct val="80000"/>
+              <a:buFont typeface="Wingdings 3" charset="2"/>
+              <a:buChar char=""/>
+              <a:defRPr sz="1600" kern="1200">
+                <a:solidFill>
+                  <a:schemeClr val="tx1">
+                    <a:lumMod val="75000"/>
+                    <a:lumOff val="25000"/>
+                  </a:schemeClr>
+                </a:solidFill>
+                <a:latin typeface="+mn-lt"/>
+                <a:ea typeface="+mn-ea"/>
+                <a:cs typeface="+mn-cs"/>
+              </a:defRPr>
+            </a:lvl2pPr>
+            <a:lvl3pPr marL="1143000" indent="-228600" algn="l" defTabSz="457200" rtl="0" eaLnBrk="1" latinLnBrk="0" hangingPunct="1">
+              <a:spcBef>
+                <a:spcPts val="1000"/>
+              </a:spcBef>
+              <a:spcAft>
+                <a:spcPts val="0"/>
+              </a:spcAft>
+              <a:buClr>
+                <a:schemeClr val="accent1"/>
+              </a:buClr>
+              <a:buSzPct val="80000"/>
+              <a:buFont typeface="Wingdings 3" charset="2"/>
+              <a:buChar char=""/>
+              <a:defRPr sz="1400" kern="1200">
+                <a:solidFill>
+                  <a:schemeClr val="tx1">
+                    <a:lumMod val="75000"/>
+                    <a:lumOff val="25000"/>
+                  </a:schemeClr>
+                </a:solidFill>
+                <a:latin typeface="+mn-lt"/>
+                <a:ea typeface="+mn-ea"/>
+                <a:cs typeface="+mn-cs"/>
+              </a:defRPr>
+            </a:lvl3pPr>
+            <a:lvl4pPr marL="1600200" indent="-228600" algn="l" defTabSz="457200" rtl="0" eaLnBrk="1" latinLnBrk="0" hangingPunct="1">
+              <a:spcBef>
+                <a:spcPts val="1000"/>
+              </a:spcBef>
+              <a:spcAft>
+                <a:spcPts val="0"/>
+              </a:spcAft>
+              <a:buClr>
+                <a:schemeClr val="accent1"/>
+              </a:buClr>
+              <a:buSzPct val="80000"/>
+              <a:buFont typeface="Wingdings 3" charset="2"/>
+              <a:buChar char=""/>
+              <a:defRPr sz="1200" kern="1200">
+                <a:solidFill>
+                  <a:schemeClr val="tx1">
+                    <a:lumMod val="75000"/>
+                    <a:lumOff val="25000"/>
+                  </a:schemeClr>
+                </a:solidFill>
+                <a:latin typeface="+mn-lt"/>
+                <a:ea typeface="+mn-ea"/>
+                <a:cs typeface="+mn-cs"/>
+              </a:defRPr>
+            </a:lvl4pPr>
+            <a:lvl5pPr marL="2057400" indent="-228600" algn="l" defTabSz="457200" rtl="0" eaLnBrk="1" latinLnBrk="0" hangingPunct="1">
+              <a:spcBef>
+                <a:spcPts val="1000"/>
+              </a:spcBef>
+              <a:spcAft>
+                <a:spcPts val="0"/>
+              </a:spcAft>
+              <a:buClr>
+                <a:schemeClr val="accent1"/>
+              </a:buClr>
+              <a:buSzPct val="80000"/>
+              <a:buFont typeface="Wingdings 3" charset="2"/>
+              <a:buChar char=""/>
+              <a:defRPr sz="1200" kern="1200">
+                <a:solidFill>
+                  <a:schemeClr val="tx1">
+                    <a:lumMod val="75000"/>
+                    <a:lumOff val="25000"/>
+                  </a:schemeClr>
+                </a:solidFill>
+                <a:latin typeface="+mn-lt"/>
+                <a:ea typeface="+mn-ea"/>
+                <a:cs typeface="+mn-cs"/>
+              </a:defRPr>
+            </a:lvl5pPr>
+            <a:lvl6pPr marL="2514600" indent="-228600" algn="l" defTabSz="457200" rtl="0" eaLnBrk="1" latinLnBrk="0" hangingPunct="1">
+              <a:spcBef>
+                <a:spcPts val="1000"/>
+              </a:spcBef>
+              <a:spcAft>
+                <a:spcPts val="0"/>
+              </a:spcAft>
+              <a:buClr>
+                <a:schemeClr val="accent1"/>
+              </a:buClr>
+              <a:buSzPct val="80000"/>
+              <a:buFont typeface="Wingdings 3" charset="2"/>
+              <a:buChar char=""/>
+              <a:defRPr sz="1200" kern="1200">
+                <a:solidFill>
+                  <a:schemeClr val="tx1">
+                    <a:lumMod val="75000"/>
+                    <a:lumOff val="25000"/>
+                  </a:schemeClr>
+                </a:solidFill>
+                <a:latin typeface="+mn-lt"/>
+                <a:ea typeface="+mn-ea"/>
+                <a:cs typeface="+mn-cs"/>
+              </a:defRPr>
+            </a:lvl6pPr>
+            <a:lvl7pPr marL="2971800" indent="-228600" algn="l" defTabSz="457200" rtl="0" eaLnBrk="1" latinLnBrk="0" hangingPunct="1">
+              <a:spcBef>
+                <a:spcPts val="1000"/>
+              </a:spcBef>
+              <a:spcAft>
+                <a:spcPts val="0"/>
+              </a:spcAft>
+              <a:buClr>
+                <a:schemeClr val="accent1"/>
+              </a:buClr>
+              <a:buSzPct val="80000"/>
+              <a:buFont typeface="Wingdings 3" charset="2"/>
+              <a:buChar char=""/>
+              <a:defRPr sz="1200" kern="1200">
+                <a:solidFill>
+                  <a:schemeClr val="tx1">
+                    <a:lumMod val="75000"/>
+                    <a:lumOff val="25000"/>
+                  </a:schemeClr>
+                </a:solidFill>
+                <a:latin typeface="+mn-lt"/>
+                <a:ea typeface="+mn-ea"/>
+                <a:cs typeface="+mn-cs"/>
+              </a:defRPr>
+            </a:lvl7pPr>
+            <a:lvl8pPr marL="3429000" indent="-228600" algn="l" defTabSz="457200" rtl="0" eaLnBrk="1" latinLnBrk="0" hangingPunct="1">
+              <a:spcBef>
+                <a:spcPts val="1000"/>
+              </a:spcBef>
+              <a:spcAft>
+                <a:spcPts val="0"/>
+              </a:spcAft>
+              <a:buClr>
+                <a:schemeClr val="accent1"/>
+              </a:buClr>
+              <a:buSzPct val="80000"/>
+              <a:buFont typeface="Wingdings 3" charset="2"/>
+              <a:buChar char=""/>
+              <a:defRPr sz="1200" kern="1200">
+                <a:solidFill>
+                  <a:schemeClr val="tx1">
+                    <a:lumMod val="75000"/>
+                    <a:lumOff val="25000"/>
+                  </a:schemeClr>
+                </a:solidFill>
+                <a:latin typeface="+mn-lt"/>
+                <a:ea typeface="+mn-ea"/>
+                <a:cs typeface="+mn-cs"/>
+              </a:defRPr>
+            </a:lvl8pPr>
+            <a:lvl9pPr marL="3886200" indent="-228600" algn="l" defTabSz="457200" rtl="0" eaLnBrk="1" latinLnBrk="0" hangingPunct="1">
+              <a:spcBef>
+                <a:spcPts val="1000"/>
+              </a:spcBef>
+              <a:spcAft>
+                <a:spcPts val="0"/>
+              </a:spcAft>
+              <a:buClr>
+                <a:schemeClr val="accent1"/>
+              </a:buClr>
+              <a:buSzPct val="80000"/>
+              <a:buFont typeface="Wingdings 3" charset="2"/>
+              <a:buChar char=""/>
+              <a:defRPr sz="1200" kern="1200">
+                <a:solidFill>
+                  <a:schemeClr val="tx1">
+                    <a:lumMod val="75000"/>
+                    <a:lumOff val="25000"/>
+                  </a:schemeClr>
+                </a:solidFill>
+                <a:latin typeface="+mn-lt"/>
+                <a:ea typeface="+mn-ea"/>
+                <a:cs typeface="+mn-cs"/>
+              </a:defRPr>
+            </a:lvl9pPr>
+          </a:lstStyle>
+          <a:p>
+            <a:r>
+              <a:rPr lang="it-IT" sz="2000" dirty="0"/>
+              <a:t>Posso avere un’elezione nei seguenti casi:</a:t>
+            </a:r>
+          </a:p>
+          <a:p>
+            <a:pPr lvl="1"/>
+            <a:r>
+              <a:rPr lang="it-IT" sz="2000" dirty="0"/>
+              <a:t>Aggiungendo un nuovo nodo al set di repliche.</a:t>
+            </a:r>
+          </a:p>
+          <a:p>
+            <a:pPr lvl="1"/>
+            <a:r>
+              <a:rPr lang="it-IT" sz="2000" dirty="0"/>
+              <a:t>Inizializzare un set di repliche.</a:t>
+            </a:r>
+          </a:p>
+          <a:p>
+            <a:pPr lvl="1"/>
+            <a:r>
+              <a:rPr lang="it-IT" sz="2000" dirty="0"/>
+              <a:t> Eseguire la manutenzione del set di repliche.</a:t>
+            </a:r>
+          </a:p>
+          <a:p>
+            <a:pPr lvl="1"/>
+            <a:r>
+              <a:rPr lang="it-IT" sz="2000" dirty="0"/>
+              <a:t> I nodi secondari perdono la connettività al primario per più del </a:t>
+            </a:r>
+            <a:r>
+              <a:rPr lang="it-IT" sz="2000" dirty="0" err="1"/>
+              <a:t>timeout</a:t>
+            </a:r>
+            <a:r>
+              <a:rPr lang="it-IT" sz="2000" dirty="0"/>
+              <a:t> configurato (10 secondi per default). </a:t>
+            </a:r>
+          </a:p>
+        </p:txBody>
+      </p:sp>
+    </p:spTree>
+    <p:extLst>
+      <p:ext uri="{BB962C8B-B14F-4D97-AF65-F5344CB8AC3E}">
+        <p14:creationId xmlns:p14="http://schemas.microsoft.com/office/powerpoint/2010/main" val="1275923587"/>
       </p:ext>
     </p:extLst>
   </p:cSld>

</xml_diff>

<commit_message>
Replicazione Ok, fai sharding
</commit_message>
<xml_diff>
--- a/Presentazione_progetto.pptx
+++ b/Presentazione_progetto.pptx
@@ -5,7 +5,7 @@
     <p:sldMasterId id="2147483672" r:id="rId1"/>
   </p:sldMasterIdLst>
   <p:notesMasterIdLst>
-    <p:notesMasterId r:id="rId19"/>
+    <p:notesMasterId r:id="rId20"/>
   </p:notesMasterIdLst>
   <p:sldIdLst>
     <p:sldId id="256" r:id="rId2"/>
@@ -14,17 +14,18 @@
     <p:sldId id="260" r:id="rId5"/>
     <p:sldId id="261" r:id="rId6"/>
     <p:sldId id="262" r:id="rId7"/>
-    <p:sldId id="263" r:id="rId8"/>
-    <p:sldId id="264" r:id="rId9"/>
-    <p:sldId id="265" r:id="rId10"/>
-    <p:sldId id="266" r:id="rId11"/>
-    <p:sldId id="267" r:id="rId12"/>
-    <p:sldId id="268" r:id="rId13"/>
-    <p:sldId id="269" r:id="rId14"/>
-    <p:sldId id="270" r:id="rId15"/>
-    <p:sldId id="271" r:id="rId16"/>
-    <p:sldId id="272" r:id="rId17"/>
-    <p:sldId id="259" r:id="rId18"/>
+    <p:sldId id="264" r:id="rId8"/>
+    <p:sldId id="265" r:id="rId9"/>
+    <p:sldId id="266" r:id="rId10"/>
+    <p:sldId id="267" r:id="rId11"/>
+    <p:sldId id="268" r:id="rId12"/>
+    <p:sldId id="269" r:id="rId13"/>
+    <p:sldId id="270" r:id="rId14"/>
+    <p:sldId id="271" r:id="rId15"/>
+    <p:sldId id="272" r:id="rId16"/>
+    <p:sldId id="273" r:id="rId17"/>
+    <p:sldId id="274" r:id="rId18"/>
+    <p:sldId id="263" r:id="rId19"/>
   </p:sldIdLst>
   <p:sldSz cx="12192000" cy="6858000"/>
   <p:notesSz cx="6858000" cy="9144000"/>
@@ -213,7 +214,7 @@
           <a:p>
             <a:fld id="{5D86E91A-6C9D-48EA-9EAF-BBA9F3961CF9}" type="datetimeFigureOut">
               <a:rPr lang="it-IT" smtClean="0"/>
-              <a:t>16/03/2022</a:t>
+              <a:t>18/03/2022</a:t>
             </a:fld>
             <a:endParaRPr lang="it-IT"/>
           </a:p>
@@ -663,50 +664,65 @@
           <a:bodyPr/>
           <a:lstStyle/>
           <a:p>
-            <a:pPr marL="228600" indent="-228600">
-              <a:buAutoNum type="arabicParenR"/>
+            <a:pPr marL="0" marR="0" lvl="0" indent="0" algn="l" defTabSz="914400" rtl="0" eaLnBrk="1" fontAlgn="auto" latinLnBrk="0" hangingPunct="1">
+              <a:lnSpc>
+                <a:spcPct val="100000"/>
+              </a:lnSpc>
+              <a:spcBef>
+                <a:spcPts val="0"/>
+              </a:spcBef>
+              <a:spcAft>
+                <a:spcPts val="0"/>
+              </a:spcAft>
+              <a:buClrTx/>
+              <a:buSzTx/>
+              <a:buFontTx/>
+              <a:buNone/>
+              <a:tabLst/>
+              <a:defRPr/>
             </a:pPr>
             <a:r>
+              <a:rPr lang="it-IT" b="1" dirty="0"/>
+              <a:t>on-disk journal</a:t>
+            </a:r>
+            <a:r>
               <a:rPr lang="it-IT" dirty="0"/>
-              <a:t>Ogni database contiene diverse </a:t>
+              <a:t>: Per garantire la durabilità in caso di errore, </a:t>
             </a:r>
             <a:r>
               <a:rPr lang="it-IT" dirty="0" err="1"/>
-              <a:t>collections</a:t>
+              <a:t>MongoDB</a:t>
             </a:r>
             <a:r>
               <a:rPr lang="it-IT" dirty="0"/>
-              <a:t> che a loro volta contengono dei </a:t>
+              <a:t> utilizza la registrazione in anticipo della scrittura sui file journal su disco. Cioè </a:t>
             </a:r>
             <a:r>
               <a:rPr lang="it-IT" dirty="0" err="1"/>
-              <a:t>documents</a:t>
+              <a:t>write-ahead</a:t>
             </a:r>
             <a:r>
               <a:rPr lang="it-IT" dirty="0"/>
-              <a:t>. Ogni </a:t>
-            </a:r>
-            <a:r>
-              <a:rPr lang="it-IT" dirty="0" err="1"/>
-              <a:t>documents</a:t>
-            </a:r>
-            <a:r>
-              <a:rPr lang="it-IT" dirty="0"/>
-              <a:t> può essere diverso con un numero variabile di fields. Le dimensioni e il contenuto di ciascun documento possono essere diversi l'uno dall'altro. </a:t>
-            </a:r>
-          </a:p>
-          <a:p>
-            <a:pPr marL="228600" indent="-228600">
-              <a:buAutoNum type="arabicParenR"/>
-            </a:pPr>
-            <a:r>
-              <a:rPr lang="it-IT" dirty="0"/>
-              <a:t>Basta pensare alla coppia chiave valore</a:t>
-            </a:r>
-          </a:p>
-          <a:p>
-            <a:pPr marL="228600" indent="-228600">
-              <a:buAutoNum type="arabicParenR"/>
+              <a:t> log(WAL) registro di Log, operazioni scritte prima di essere eseguite.</a:t>
+            </a:r>
+          </a:p>
+          <a:p>
+            <a:pPr marL="0" marR="0" lvl="0" indent="0" algn="l" defTabSz="914400" rtl="0" eaLnBrk="1" fontAlgn="auto" latinLnBrk="0" hangingPunct="1">
+              <a:lnSpc>
+                <a:spcPct val="100000"/>
+              </a:lnSpc>
+              <a:spcBef>
+                <a:spcPts val="0"/>
+              </a:spcBef>
+              <a:spcAft>
+                <a:spcPts val="0"/>
+              </a:spcAft>
+              <a:buClrTx/>
+              <a:buSzTx/>
+              <a:buFontTx/>
+              <a:buNone/>
+              <a:tabLst/>
+              <a:defRPr/>
             </a:pPr>
             <a:endParaRPr lang="it-IT" dirty="0"/>
           </a:p>
@@ -738,7 +754,7 @@
     </p:spTree>
     <p:extLst>
       <p:ext uri="{BB962C8B-B14F-4D97-AF65-F5344CB8AC3E}">
-        <p14:creationId xmlns:p14="http://schemas.microsoft.com/office/powerpoint/2010/main" val="3010035820"/>
+        <p14:creationId xmlns:p14="http://schemas.microsoft.com/office/powerpoint/2010/main" val="1108071276"/>
       </p:ext>
     </p:extLst>
   </p:cSld>
@@ -1246,7 +1262,7 @@
           <a:p>
             <a:fld id="{7B9EF5EE-42ED-4142-B01A-B637985E9B70}" type="slidenum">
               <a:rPr lang="it-IT" smtClean="0"/>
-              <a:t>8</a:t>
+              <a:t>7</a:t>
             </a:fld>
             <a:endParaRPr lang="it-IT"/>
           </a:p>
@@ -1413,7 +1429,7 @@
           <a:p>
             <a:fld id="{7B9EF5EE-42ED-4142-B01A-B637985E9B70}" type="slidenum">
               <a:rPr lang="it-IT" smtClean="0"/>
-              <a:t>10</a:t>
+              <a:t>9</a:t>
             </a:fld>
             <a:endParaRPr lang="it-IT"/>
           </a:p>
@@ -1476,7 +1492,18 @@
           <a:bodyPr/>
           <a:lstStyle/>
           <a:p>
-            <a:endParaRPr lang="it-IT" dirty="0"/>
+            <a:r>
+              <a:rPr lang="it-IT" dirty="0"/>
+              <a:t>In maniera asincrona nel senso che una lettura del </a:t>
+            </a:r>
+            <a:r>
+              <a:rPr lang="it-IT" dirty="0" err="1"/>
+              <a:t>secondary</a:t>
+            </a:r>
+            <a:r>
+              <a:rPr lang="it-IT" dirty="0"/>
+              <a:t> potrebbe restituire i dati in maniera non aggiornata.</a:t>
+            </a:r>
           </a:p>
         </p:txBody>
       </p:sp>
@@ -1497,7 +1524,7 @@
           <a:p>
             <a:fld id="{7B9EF5EE-42ED-4142-B01A-B637985E9B70}" type="slidenum">
               <a:rPr lang="it-IT" smtClean="0"/>
-              <a:t>11</a:t>
+              <a:t>10</a:t>
             </a:fld>
             <a:endParaRPr lang="it-IT"/>
           </a:p>
@@ -1618,7 +1645,7 @@
           <a:p>
             <a:fld id="{7B9EF5EE-42ED-4142-B01A-B637985E9B70}" type="slidenum">
               <a:rPr lang="it-IT" smtClean="0"/>
-              <a:t>14</a:t>
+              <a:t>13</a:t>
             </a:fld>
             <a:endParaRPr lang="it-IT"/>
           </a:p>
@@ -1702,7 +1729,7 @@
           <a:p>
             <a:fld id="{7B9EF5EE-42ED-4142-B01A-B637985E9B70}" type="slidenum">
               <a:rPr lang="it-IT" smtClean="0"/>
-              <a:t>16</a:t>
+              <a:t>15</a:t>
             </a:fld>
             <a:endParaRPr lang="it-IT"/>
           </a:p>
@@ -2443,7 +2470,7 @@
           <a:p>
             <a:fld id="{5EEC1FBE-7A50-402B-9218-00262FCB5F53}" type="datetimeFigureOut">
               <a:rPr lang="it-IT" smtClean="0"/>
-              <a:t>16/03/2022</a:t>
+              <a:t>18/03/2022</a:t>
             </a:fld>
             <a:endParaRPr lang="it-IT"/>
           </a:p>
@@ -2694,7 +2721,7 @@
           <a:p>
             <a:fld id="{5EEC1FBE-7A50-402B-9218-00262FCB5F53}" type="datetimeFigureOut">
               <a:rPr lang="it-IT" smtClean="0"/>
-              <a:t>16/03/2022</a:t>
+              <a:t>18/03/2022</a:t>
             </a:fld>
             <a:endParaRPr lang="it-IT"/>
           </a:p>
@@ -3008,7 +3035,7 @@
           <a:p>
             <a:fld id="{5EEC1FBE-7A50-402B-9218-00262FCB5F53}" type="datetimeFigureOut">
               <a:rPr lang="it-IT" smtClean="0"/>
-              <a:t>16/03/2022</a:t>
+              <a:t>18/03/2022</a:t>
             </a:fld>
             <a:endParaRPr lang="it-IT"/>
           </a:p>
@@ -3349,7 +3376,7 @@
           <a:p>
             <a:fld id="{5EEC1FBE-7A50-402B-9218-00262FCB5F53}" type="datetimeFigureOut">
               <a:rPr lang="it-IT" smtClean="0"/>
-              <a:t>16/03/2022</a:t>
+              <a:t>18/03/2022</a:t>
             </a:fld>
             <a:endParaRPr lang="it-IT"/>
           </a:p>
@@ -3663,7 +3690,7 @@
           <a:p>
             <a:fld id="{5EEC1FBE-7A50-402B-9218-00262FCB5F53}" type="datetimeFigureOut">
               <a:rPr lang="it-IT" smtClean="0"/>
-              <a:t>16/03/2022</a:t>
+              <a:t>18/03/2022</a:t>
             </a:fld>
             <a:endParaRPr lang="it-IT"/>
           </a:p>
@@ -4056,7 +4083,7 @@
           <a:p>
             <a:fld id="{5EEC1FBE-7A50-402B-9218-00262FCB5F53}" type="datetimeFigureOut">
               <a:rPr lang="it-IT" smtClean="0"/>
-              <a:t>16/03/2022</a:t>
+              <a:t>18/03/2022</a:t>
             </a:fld>
             <a:endParaRPr lang="it-IT"/>
           </a:p>
@@ -4226,7 +4253,7 @@
           <a:p>
             <a:fld id="{5EEC1FBE-7A50-402B-9218-00262FCB5F53}" type="datetimeFigureOut">
               <a:rPr lang="it-IT" smtClean="0"/>
-              <a:t>16/03/2022</a:t>
+              <a:t>18/03/2022</a:t>
             </a:fld>
             <a:endParaRPr lang="it-IT"/>
           </a:p>
@@ -4406,7 +4433,7 @@
           <a:p>
             <a:fld id="{5EEC1FBE-7A50-402B-9218-00262FCB5F53}" type="datetimeFigureOut">
               <a:rPr lang="it-IT" smtClean="0"/>
-              <a:t>16/03/2022</a:t>
+              <a:t>18/03/2022</a:t>
             </a:fld>
             <a:endParaRPr lang="it-IT"/>
           </a:p>
@@ -4582,7 +4609,7 @@
           <a:p>
             <a:fld id="{5EEC1FBE-7A50-402B-9218-00262FCB5F53}" type="datetimeFigureOut">
               <a:rPr lang="it-IT" smtClean="0"/>
-              <a:t>16/03/2022</a:t>
+              <a:t>18/03/2022</a:t>
             </a:fld>
             <a:endParaRPr lang="it-IT"/>
           </a:p>
@@ -4829,7 +4856,7 @@
           <a:p>
             <a:fld id="{5EEC1FBE-7A50-402B-9218-00262FCB5F53}" type="datetimeFigureOut">
               <a:rPr lang="it-IT" smtClean="0"/>
-              <a:t>16/03/2022</a:t>
+              <a:t>18/03/2022</a:t>
             </a:fld>
             <a:endParaRPr lang="it-IT"/>
           </a:p>
@@ -5061,7 +5088,7 @@
           <a:p>
             <a:fld id="{5EEC1FBE-7A50-402B-9218-00262FCB5F53}" type="datetimeFigureOut">
               <a:rPr lang="it-IT" smtClean="0"/>
-              <a:t>16/03/2022</a:t>
+              <a:t>18/03/2022</a:t>
             </a:fld>
             <a:endParaRPr lang="it-IT"/>
           </a:p>
@@ -5435,7 +5462,7 @@
           <a:p>
             <a:fld id="{5EEC1FBE-7A50-402B-9218-00262FCB5F53}" type="datetimeFigureOut">
               <a:rPr lang="it-IT" smtClean="0"/>
-              <a:t>16/03/2022</a:t>
+              <a:t>18/03/2022</a:t>
             </a:fld>
             <a:endParaRPr lang="it-IT"/>
           </a:p>
@@ -5558,7 +5585,7 @@
           <a:p>
             <a:fld id="{5EEC1FBE-7A50-402B-9218-00262FCB5F53}" type="datetimeFigureOut">
               <a:rPr lang="it-IT" smtClean="0"/>
-              <a:t>16/03/2022</a:t>
+              <a:t>18/03/2022</a:t>
             </a:fld>
             <a:endParaRPr lang="it-IT"/>
           </a:p>
@@ -5653,7 +5680,7 @@
           <a:p>
             <a:fld id="{5EEC1FBE-7A50-402B-9218-00262FCB5F53}" type="datetimeFigureOut">
               <a:rPr lang="it-IT" smtClean="0"/>
-              <a:t>16/03/2022</a:t>
+              <a:t>18/03/2022</a:t>
             </a:fld>
             <a:endParaRPr lang="it-IT"/>
           </a:p>
@@ -5908,7 +5935,7 @@
           <a:p>
             <a:fld id="{5EEC1FBE-7A50-402B-9218-00262FCB5F53}" type="datetimeFigureOut">
               <a:rPr lang="it-IT" smtClean="0"/>
-              <a:t>16/03/2022</a:t>
+              <a:t>18/03/2022</a:t>
             </a:fld>
             <a:endParaRPr lang="it-IT"/>
           </a:p>
@@ -6171,7 +6198,7 @@
           <a:p>
             <a:fld id="{5EEC1FBE-7A50-402B-9218-00262FCB5F53}" type="datetimeFigureOut">
               <a:rPr lang="it-IT" smtClean="0"/>
-              <a:t>16/03/2022</a:t>
+              <a:t>18/03/2022</a:t>
             </a:fld>
             <a:endParaRPr lang="it-IT"/>
           </a:p>
@@ -6914,7 +6941,7 @@
           <a:p>
             <a:fld id="{5EEC1FBE-7A50-402B-9218-00262FCB5F53}" type="datetimeFigureOut">
               <a:rPr lang="it-IT" smtClean="0"/>
-              <a:t>16/03/2022</a:t>
+              <a:t>18/03/2022</a:t>
             </a:fld>
             <a:endParaRPr lang="it-IT"/>
           </a:p>
@@ -7805,676 +7832,6 @@
           <p:cNvPr id="2" name="Titolo 1">
             <a:extLst>
               <a:ext uri="{FF2B5EF4-FFF2-40B4-BE49-F238E27FC236}">
-                <a16:creationId xmlns:a16="http://schemas.microsoft.com/office/drawing/2014/main" id="{306E3E34-60AA-447B-AAF0-4A11CEF3540E}"/>
-              </a:ext>
-            </a:extLst>
-          </p:cNvPr>
-          <p:cNvSpPr>
-            <a:spLocks noGrp="1"/>
-          </p:cNvSpPr>
-          <p:nvPr>
-            <p:ph type="title"/>
-          </p:nvPr>
-        </p:nvSpPr>
-        <p:spPr>
-          <a:xfrm>
-            <a:off x="677334" y="609600"/>
-            <a:ext cx="8596668" cy="737937"/>
-          </a:xfrm>
-        </p:spPr>
-        <p:txBody>
-          <a:bodyPr/>
-          <a:lstStyle/>
-          <a:p>
-            <a:r>
-              <a:rPr lang="it-IT" dirty="0"/>
-              <a:t>Configurazione processo di elezione</a:t>
-            </a:r>
-          </a:p>
-        </p:txBody>
-      </p:sp>
-      <p:sp>
-        <p:nvSpPr>
-          <p:cNvPr id="4" name="CasellaDiTesto 3">
-            <a:extLst>
-              <a:ext uri="{FF2B5EF4-FFF2-40B4-BE49-F238E27FC236}">
-                <a16:creationId xmlns:a16="http://schemas.microsoft.com/office/drawing/2014/main" id="{0D9BDB9C-602C-438B-90EE-DFCBBDEDC5BF}"/>
-              </a:ext>
-            </a:extLst>
-          </p:cNvPr>
-          <p:cNvSpPr txBox="1"/>
-          <p:nvPr/>
-        </p:nvSpPr>
-        <p:spPr>
-          <a:xfrm>
-            <a:off x="5812263" y="1191127"/>
-            <a:ext cx="4764446" cy="5016758"/>
-          </a:xfrm>
-          <a:prstGeom prst="rect">
-            <a:avLst/>
-          </a:prstGeom>
-          <a:noFill/>
-        </p:spPr>
-        <p:txBody>
-          <a:bodyPr wrap="none" rtlCol="0">
-            <a:spAutoFit/>
-          </a:bodyPr>
-          <a:lstStyle/>
-          <a:p>
-            <a:r>
-              <a:rPr lang="it-IT" sz="2000" dirty="0"/>
-              <a:t> …</a:t>
-            </a:r>
-          </a:p>
-          <a:p>
-            <a:r>
-              <a:rPr lang="it-IT" sz="2000" dirty="0"/>
-              <a:t>  settings: </a:t>
-            </a:r>
-            <a:r>
-              <a:rPr lang="it-IT" sz="2000" dirty="0">
-                <a:solidFill>
-                  <a:schemeClr val="accent2"/>
-                </a:solidFill>
-              </a:rPr>
-              <a:t>{// settaggio per intero</a:t>
-            </a:r>
-          </a:p>
-          <a:p>
-            <a:r>
-              <a:rPr lang="it-IT" sz="2000" dirty="0">
-                <a:solidFill>
-                  <a:schemeClr val="accent2"/>
-                </a:solidFill>
-              </a:rPr>
-              <a:t>  replica set</a:t>
-            </a:r>
-          </a:p>
-          <a:p>
-            <a:r>
-              <a:rPr lang="it-IT" sz="2000" dirty="0"/>
-              <a:t>    </a:t>
-            </a:r>
-            <a:r>
-              <a:rPr lang="it-IT" sz="2000" dirty="0" err="1"/>
-              <a:t>chainingAllowed</a:t>
-            </a:r>
-            <a:r>
-              <a:rPr lang="it-IT" sz="2000" dirty="0"/>
-              <a:t> : &lt;</a:t>
-            </a:r>
-            <a:r>
-              <a:rPr lang="it-IT" sz="2000" dirty="0" err="1"/>
-              <a:t>boolean</a:t>
-            </a:r>
-            <a:r>
-              <a:rPr lang="it-IT" sz="2000" dirty="0"/>
-              <a:t>&gt;,</a:t>
-            </a:r>
-          </a:p>
-          <a:p>
-            <a:r>
-              <a:rPr lang="it-IT" sz="2000" dirty="0"/>
-              <a:t>    </a:t>
-            </a:r>
-            <a:r>
-              <a:rPr lang="it-IT" sz="2000" dirty="0" err="1"/>
-              <a:t>heartbeatIntervalMillis</a:t>
-            </a:r>
-            <a:r>
-              <a:rPr lang="it-IT" sz="2000" dirty="0"/>
-              <a:t> : &lt;</a:t>
-            </a:r>
-            <a:r>
-              <a:rPr lang="it-IT" sz="2000" dirty="0" err="1"/>
-              <a:t>int</a:t>
-            </a:r>
-            <a:r>
-              <a:rPr lang="it-IT" sz="2000" dirty="0"/>
-              <a:t>&gt;,</a:t>
-            </a:r>
-          </a:p>
-          <a:p>
-            <a:r>
-              <a:rPr lang="it-IT" sz="2000" dirty="0"/>
-              <a:t>    </a:t>
-            </a:r>
-            <a:r>
-              <a:rPr lang="it-IT" sz="2000" dirty="0" err="1"/>
-              <a:t>heartbeatTimeoutSecs</a:t>
-            </a:r>
-            <a:r>
-              <a:rPr lang="it-IT" sz="2000" dirty="0"/>
-              <a:t>: &lt;</a:t>
-            </a:r>
-            <a:r>
-              <a:rPr lang="it-IT" sz="2000" dirty="0" err="1"/>
-              <a:t>int</a:t>
-            </a:r>
-            <a:r>
-              <a:rPr lang="it-IT" sz="2000" dirty="0"/>
-              <a:t>&gt;,</a:t>
-            </a:r>
-          </a:p>
-          <a:p>
-            <a:r>
-              <a:rPr lang="it-IT" sz="2000" dirty="0"/>
-              <a:t>    </a:t>
-            </a:r>
-            <a:r>
-              <a:rPr lang="it-IT" sz="2000" dirty="0">
-                <a:solidFill>
-                  <a:schemeClr val="accent2"/>
-                </a:solidFill>
-              </a:rPr>
-              <a:t>// quanti secondi posso aspettare </a:t>
-            </a:r>
-          </a:p>
-          <a:p>
-            <a:r>
-              <a:rPr lang="it-IT" sz="2000" dirty="0">
-                <a:solidFill>
-                  <a:schemeClr val="accent2"/>
-                </a:solidFill>
-              </a:rPr>
-              <a:t>    per avere un messaggio </a:t>
-            </a:r>
-            <a:r>
-              <a:rPr lang="it-IT" sz="2000" dirty="0" err="1">
-                <a:solidFill>
-                  <a:schemeClr val="accent2"/>
-                </a:solidFill>
-              </a:rPr>
-              <a:t>heartbeat</a:t>
-            </a:r>
-            <a:r>
-              <a:rPr lang="it-IT" sz="2000" dirty="0">
-                <a:solidFill>
-                  <a:schemeClr val="accent2"/>
-                </a:solidFill>
-              </a:rPr>
-              <a:t> di </a:t>
-            </a:r>
-          </a:p>
-          <a:p>
-            <a:r>
-              <a:rPr lang="it-IT" sz="2000" dirty="0">
-                <a:solidFill>
-                  <a:schemeClr val="accent2"/>
-                </a:solidFill>
-              </a:rPr>
-              <a:t>    successo, default=10s</a:t>
-            </a:r>
-          </a:p>
-          <a:p>
-            <a:r>
-              <a:rPr lang="it-IT" sz="2000" dirty="0"/>
-              <a:t>    </a:t>
-            </a:r>
-            <a:r>
-              <a:rPr lang="it-IT" sz="2000" dirty="0" err="1"/>
-              <a:t>electionTimeoutMillis</a:t>
-            </a:r>
-            <a:r>
-              <a:rPr lang="it-IT" sz="2000" dirty="0"/>
-              <a:t> : &lt;</a:t>
-            </a:r>
-            <a:r>
-              <a:rPr lang="it-IT" sz="2000" dirty="0" err="1"/>
-              <a:t>int</a:t>
-            </a:r>
-            <a:r>
-              <a:rPr lang="it-IT" sz="2000" dirty="0"/>
-              <a:t>&gt;, </a:t>
-            </a:r>
-          </a:p>
-          <a:p>
-            <a:r>
-              <a:rPr lang="it-IT" sz="2000" dirty="0"/>
-              <a:t>    </a:t>
-            </a:r>
-            <a:r>
-              <a:rPr lang="it-IT" sz="2000" dirty="0">
-                <a:solidFill>
-                  <a:schemeClr val="accent2"/>
-                </a:solidFill>
-              </a:rPr>
-              <a:t>//identifica quando il </a:t>
-            </a:r>
-            <a:r>
-              <a:rPr lang="it-IT" sz="2000" dirty="0" err="1">
-                <a:solidFill>
-                  <a:schemeClr val="accent2"/>
-                </a:solidFill>
-              </a:rPr>
-              <a:t>primary</a:t>
-            </a:r>
-            <a:r>
-              <a:rPr lang="it-IT" sz="2000" dirty="0">
-                <a:solidFill>
-                  <a:schemeClr val="accent2"/>
-                </a:solidFill>
-              </a:rPr>
-              <a:t> </a:t>
-            </a:r>
-            <a:r>
-              <a:rPr lang="it-IT" sz="2000" dirty="0" err="1">
-                <a:solidFill>
-                  <a:schemeClr val="accent2"/>
-                </a:solidFill>
-              </a:rPr>
-              <a:t>node</a:t>
-            </a:r>
-            <a:r>
-              <a:rPr lang="it-IT" sz="2000" dirty="0">
-                <a:solidFill>
-                  <a:schemeClr val="accent2"/>
-                </a:solidFill>
-              </a:rPr>
-              <a:t> </a:t>
-            </a:r>
-          </a:p>
-          <a:p>
-            <a:r>
-              <a:rPr lang="it-IT" sz="2000" dirty="0">
-                <a:solidFill>
-                  <a:schemeClr val="accent2"/>
-                </a:solidFill>
-              </a:rPr>
-              <a:t>    è irraggiungibile</a:t>
-            </a:r>
-          </a:p>
-          <a:p>
-            <a:r>
-              <a:rPr lang="it-IT" sz="2000" dirty="0"/>
-              <a:t>    </a:t>
-            </a:r>
-            <a:r>
-              <a:rPr lang="it-IT" sz="2000" dirty="0" err="1"/>
-              <a:t>catchUpTimeoutMillis</a:t>
-            </a:r>
-            <a:r>
-              <a:rPr lang="it-IT" sz="2000" dirty="0"/>
-              <a:t> : &lt;</a:t>
-            </a:r>
-            <a:r>
-              <a:rPr lang="it-IT" sz="2000" dirty="0" err="1"/>
-              <a:t>int</a:t>
-            </a:r>
-            <a:r>
-              <a:rPr lang="it-IT" sz="2000" dirty="0"/>
-              <a:t>&gt;,</a:t>
-            </a:r>
-          </a:p>
-          <a:p>
-            <a:r>
-              <a:rPr lang="it-IT" sz="2000" dirty="0"/>
-              <a:t>    </a:t>
-            </a:r>
-            <a:r>
-              <a:rPr lang="it-IT" sz="2000" dirty="0" err="1"/>
-              <a:t>replicaSetId</a:t>
-            </a:r>
-            <a:r>
-              <a:rPr lang="it-IT" sz="2000" dirty="0"/>
-              <a:t>: &lt;</a:t>
-            </a:r>
-            <a:r>
-              <a:rPr lang="it-IT" sz="2000" dirty="0" err="1"/>
-              <a:t>ObjectId</a:t>
-            </a:r>
-            <a:r>
-              <a:rPr lang="it-IT" sz="2000" dirty="0"/>
-              <a:t>&gt;</a:t>
-            </a:r>
-          </a:p>
-          <a:p>
-            <a:r>
-              <a:rPr lang="it-IT" sz="2000" dirty="0"/>
-              <a:t>  }</a:t>
-            </a:r>
-          </a:p>
-          <a:p>
-            <a:r>
-              <a:rPr lang="it-IT" sz="2000" dirty="0"/>
-              <a:t>…</a:t>
-            </a:r>
-          </a:p>
-        </p:txBody>
-      </p:sp>
-      <p:sp>
-        <p:nvSpPr>
-          <p:cNvPr id="5" name="CasellaDiTesto 4">
-            <a:extLst>
-              <a:ext uri="{FF2B5EF4-FFF2-40B4-BE49-F238E27FC236}">
-                <a16:creationId xmlns:a16="http://schemas.microsoft.com/office/drawing/2014/main" id="{D7CF947C-2DE5-44F5-BFBA-033183D7C32E}"/>
-              </a:ext>
-            </a:extLst>
-          </p:cNvPr>
-          <p:cNvSpPr txBox="1"/>
-          <p:nvPr/>
-        </p:nvSpPr>
-        <p:spPr>
-          <a:xfrm>
-            <a:off x="245447" y="1191127"/>
-            <a:ext cx="4807816" cy="5909310"/>
-          </a:xfrm>
-          <a:prstGeom prst="rect">
-            <a:avLst/>
-          </a:prstGeom>
-          <a:noFill/>
-        </p:spPr>
-        <p:txBody>
-          <a:bodyPr wrap="square" rtlCol="0">
-            <a:spAutoFit/>
-          </a:bodyPr>
-          <a:lstStyle/>
-          <a:p>
-            <a:r>
-              <a:rPr lang="it-IT" sz="2000" dirty="0"/>
-              <a:t>…</a:t>
-            </a:r>
-          </a:p>
-          <a:p>
-            <a:r>
-              <a:rPr lang="it-IT" sz="2000" dirty="0" err="1"/>
-              <a:t>members</a:t>
-            </a:r>
-            <a:r>
-              <a:rPr lang="it-IT" sz="2000" dirty="0"/>
-              <a:t>: [ </a:t>
-            </a:r>
-            <a:r>
-              <a:rPr lang="it-IT" sz="2000" dirty="0">
-                <a:solidFill>
-                  <a:schemeClr val="accent2"/>
-                </a:solidFill>
-              </a:rPr>
-              <a:t>//array per ogni membro</a:t>
-            </a:r>
-          </a:p>
-          <a:p>
-            <a:r>
-              <a:rPr lang="it-IT" sz="2000" dirty="0"/>
-              <a:t>    {</a:t>
-            </a:r>
-          </a:p>
-          <a:p>
-            <a:r>
-              <a:rPr lang="it-IT" sz="2000" dirty="0"/>
-              <a:t>      _id: &lt;</a:t>
-            </a:r>
-            <a:r>
-              <a:rPr lang="it-IT" sz="2000" dirty="0" err="1"/>
-              <a:t>int</a:t>
-            </a:r>
-            <a:r>
-              <a:rPr lang="it-IT" sz="2000" dirty="0"/>
-              <a:t>&gt;, </a:t>
-            </a:r>
-            <a:r>
-              <a:rPr lang="it-IT" sz="2000" dirty="0">
-                <a:solidFill>
-                  <a:schemeClr val="accent2"/>
-                </a:solidFill>
-              </a:rPr>
-              <a:t>//Identifica membro</a:t>
-            </a:r>
-          </a:p>
-          <a:p>
-            <a:r>
-              <a:rPr lang="it-IT" sz="2000" dirty="0"/>
-              <a:t>      </a:t>
-            </a:r>
-            <a:r>
-              <a:rPr lang="it-IT" sz="2000" dirty="0" err="1"/>
-              <a:t>host</a:t>
-            </a:r>
-            <a:r>
-              <a:rPr lang="it-IT" sz="2000" dirty="0"/>
-              <a:t>: &lt;</a:t>
-            </a:r>
-            <a:r>
-              <a:rPr lang="it-IT" sz="2000" dirty="0" err="1"/>
-              <a:t>string</a:t>
-            </a:r>
-            <a:r>
-              <a:rPr lang="it-IT" sz="2000" dirty="0"/>
-              <a:t>&gt;, </a:t>
-            </a:r>
-            <a:r>
-              <a:rPr lang="it-IT" sz="2000" dirty="0">
-                <a:solidFill>
-                  <a:schemeClr val="accent2"/>
-                </a:solidFill>
-              </a:rPr>
-              <a:t>// nome </a:t>
-            </a:r>
-            <a:r>
-              <a:rPr lang="it-IT" sz="2000" dirty="0" err="1">
-                <a:solidFill>
-                  <a:schemeClr val="accent2"/>
-                </a:solidFill>
-              </a:rPr>
-              <a:t>host</a:t>
-            </a:r>
-            <a:r>
-              <a:rPr lang="it-IT" sz="2000" dirty="0">
-                <a:solidFill>
-                  <a:schemeClr val="accent2"/>
-                </a:solidFill>
-              </a:rPr>
-              <a:t> e porta</a:t>
-            </a:r>
-          </a:p>
-          <a:p>
-            <a:r>
-              <a:rPr lang="it-IT" sz="2000" dirty="0"/>
-              <a:t>      </a:t>
-            </a:r>
-            <a:r>
-              <a:rPr lang="it-IT" sz="2000" dirty="0" err="1"/>
-              <a:t>arbiterOnly</a:t>
-            </a:r>
-            <a:r>
-              <a:rPr lang="it-IT" sz="2000" dirty="0"/>
-              <a:t>: &lt;</a:t>
-            </a:r>
-            <a:r>
-              <a:rPr lang="it-IT" sz="2000" dirty="0" err="1"/>
-              <a:t>boolean</a:t>
-            </a:r>
-            <a:r>
-              <a:rPr lang="it-IT" sz="2000" dirty="0"/>
-              <a:t>&gt;,</a:t>
-            </a:r>
-          </a:p>
-          <a:p>
-            <a:r>
-              <a:rPr lang="it-IT" sz="2000" dirty="0"/>
-              <a:t>      </a:t>
-            </a:r>
-            <a:r>
-              <a:rPr lang="it-IT" sz="2000" dirty="0" err="1"/>
-              <a:t>buildIndexes</a:t>
-            </a:r>
-            <a:r>
-              <a:rPr lang="it-IT" sz="2000" dirty="0"/>
-              <a:t>: &lt;</a:t>
-            </a:r>
-            <a:r>
-              <a:rPr lang="it-IT" sz="2000" dirty="0" err="1"/>
-              <a:t>boolean</a:t>
-            </a:r>
-            <a:r>
-              <a:rPr lang="it-IT" sz="2000" dirty="0"/>
-              <a:t>&gt;,</a:t>
-            </a:r>
-          </a:p>
-          <a:p>
-            <a:r>
-              <a:rPr lang="it-IT" sz="2000" dirty="0"/>
-              <a:t>      </a:t>
-            </a:r>
-            <a:r>
-              <a:rPr lang="it-IT" sz="2000" dirty="0" err="1"/>
-              <a:t>hidden</a:t>
-            </a:r>
-            <a:r>
-              <a:rPr lang="it-IT" sz="2000" dirty="0"/>
-              <a:t>: &lt;</a:t>
-            </a:r>
-            <a:r>
-              <a:rPr lang="it-IT" sz="2000" dirty="0" err="1"/>
-              <a:t>boolean</a:t>
-            </a:r>
-            <a:r>
-              <a:rPr lang="it-IT" sz="2000" dirty="0"/>
-              <a:t>&gt;,</a:t>
-            </a:r>
-          </a:p>
-          <a:p>
-            <a:r>
-              <a:rPr lang="it-IT" sz="2000" dirty="0"/>
-              <a:t>      </a:t>
-            </a:r>
-            <a:r>
-              <a:rPr lang="it-IT" sz="2000" dirty="0" err="1"/>
-              <a:t>priority</a:t>
-            </a:r>
-            <a:r>
-              <a:rPr lang="it-IT" sz="2000" dirty="0"/>
-              <a:t>: &lt;</a:t>
-            </a:r>
-            <a:r>
-              <a:rPr lang="it-IT" sz="2000" dirty="0" err="1"/>
-              <a:t>number</a:t>
-            </a:r>
-            <a:r>
-              <a:rPr lang="it-IT" sz="2000" dirty="0"/>
-              <a:t>&gt; </a:t>
-            </a:r>
-            <a:r>
-              <a:rPr lang="it-IT" sz="2000" dirty="0">
-                <a:solidFill>
-                  <a:schemeClr val="accent2"/>
-                </a:solidFill>
-              </a:rPr>
-              <a:t>// Un numero 	che indica l'idoneità relativa di un 	membro a diventare primario.(0-	1000)</a:t>
-            </a:r>
-          </a:p>
-          <a:p>
-            <a:r>
-              <a:rPr lang="it-IT" sz="2000" dirty="0"/>
-              <a:t>      tags: &lt;</a:t>
-            </a:r>
-            <a:r>
-              <a:rPr lang="it-IT" sz="2000" dirty="0" err="1"/>
-              <a:t>document</a:t>
-            </a:r>
-            <a:r>
-              <a:rPr lang="it-IT" sz="2000" dirty="0"/>
-              <a:t>&gt;,</a:t>
-            </a:r>
-          </a:p>
-          <a:p>
-            <a:r>
-              <a:rPr lang="it-IT" sz="2000" dirty="0"/>
-              <a:t>      </a:t>
-            </a:r>
-            <a:r>
-              <a:rPr lang="it-IT" sz="2000" dirty="0" err="1"/>
-              <a:t>secondaryDelaySecs</a:t>
-            </a:r>
-            <a:r>
-              <a:rPr lang="it-IT" sz="2000" dirty="0"/>
-              <a:t>: &lt;</a:t>
-            </a:r>
-            <a:r>
-              <a:rPr lang="it-IT" sz="2000" dirty="0" err="1"/>
-              <a:t>int</a:t>
-            </a:r>
-            <a:r>
-              <a:rPr lang="it-IT" sz="2000" dirty="0"/>
-              <a:t>&gt;,</a:t>
-            </a:r>
-          </a:p>
-          <a:p>
-            <a:r>
-              <a:rPr lang="it-IT" sz="2000" dirty="0"/>
-              <a:t>      </a:t>
-            </a:r>
-            <a:r>
-              <a:rPr lang="it-IT" sz="2000" dirty="0" err="1"/>
-              <a:t>votes</a:t>
-            </a:r>
-            <a:r>
-              <a:rPr lang="it-IT" sz="2000" dirty="0"/>
-              <a:t>: &lt;</a:t>
-            </a:r>
-            <a:r>
-              <a:rPr lang="it-IT" sz="2000" dirty="0" err="1"/>
-              <a:t>number</a:t>
-            </a:r>
-            <a:r>
-              <a:rPr lang="it-IT" sz="2000" dirty="0">
-                <a:solidFill>
-                  <a:schemeClr val="accent2"/>
-                </a:solidFill>
-              </a:rPr>
-              <a:t>&gt;// Il numero di voti 	che un server esprimerà in 	un'elezione (0-1) </a:t>
-            </a:r>
-            <a:r>
-              <a:rPr lang="it-IT" sz="2000" dirty="0"/>
-              <a:t>},</a:t>
-            </a:r>
-          </a:p>
-          <a:p>
-            <a:r>
-              <a:rPr lang="it-IT" sz="2000" dirty="0"/>
-              <a:t>    ...</a:t>
-            </a:r>
-          </a:p>
-          <a:p>
-            <a:endParaRPr lang="it-IT" dirty="0"/>
-          </a:p>
-        </p:txBody>
-      </p:sp>
-    </p:spTree>
-    <p:extLst>
-      <p:ext uri="{BB962C8B-B14F-4D97-AF65-F5344CB8AC3E}">
-        <p14:creationId xmlns:p14="http://schemas.microsoft.com/office/powerpoint/2010/main" val="2529083846"/>
-      </p:ext>
-    </p:extLst>
-  </p:cSld>
-  <p:clrMapOvr>
-    <a:masterClrMapping/>
-  </p:clrMapOvr>
-</p:sld>
-</file>
-
-<file path=ppt/slides/slide11.xml><?xml version="1.0" encoding="utf-8"?>
-<p:sld xmlns:a="http://schemas.openxmlformats.org/drawingml/2006/main" xmlns:r="http://schemas.openxmlformats.org/officeDocument/2006/relationships" xmlns:p="http://schemas.openxmlformats.org/presentationml/2006/main">
-  <p:cSld>
-    <p:spTree>
-      <p:nvGrpSpPr>
-        <p:cNvPr id="1" name=""/>
-        <p:cNvGrpSpPr/>
-        <p:nvPr/>
-      </p:nvGrpSpPr>
-      <p:grpSpPr>
-        <a:xfrm>
-          <a:off x="0" y="0"/>
-          <a:ext cx="0" cy="0"/>
-          <a:chOff x="0" y="0"/>
-          <a:chExt cx="0" cy="0"/>
-        </a:xfrm>
-      </p:grpSpPr>
-      <p:sp>
-        <p:nvSpPr>
-          <p:cNvPr id="2" name="Titolo 1">
-            <a:extLst>
-              <a:ext uri="{FF2B5EF4-FFF2-40B4-BE49-F238E27FC236}">
                 <a16:creationId xmlns:a16="http://schemas.microsoft.com/office/drawing/2014/main" id="{F244B3B0-61DC-4CFD-A0B4-267EB08F29D1}"/>
               </a:ext>
             </a:extLst>
@@ -8765,23 +8122,7 @@
             </a:r>
             <a:r>
               <a:rPr lang="it-IT" dirty="0"/>
-              <a:t> dal primario ed effettuano i cambiamenti. La </a:t>
-            </a:r>
-            <a:r>
-              <a:rPr lang="it-IT" dirty="0" err="1"/>
-              <a:t>relica</a:t>
-            </a:r>
-            <a:r>
-              <a:rPr lang="it-IT" dirty="0"/>
-              <a:t> </a:t>
-            </a:r>
-            <a:r>
-              <a:rPr lang="it-IT" dirty="0" err="1"/>
-              <a:t>avviena</a:t>
-            </a:r>
-            <a:r>
-              <a:rPr lang="it-IT" dirty="0"/>
-              <a:t> in maniera asincrona.</a:t>
+              <a:t> dal primario ed effettuano i cambiamenti. La replica avviene in maniera asincrona.</a:t>
             </a:r>
           </a:p>
         </p:txBody>
@@ -9012,7 +8353,7 @@
 </p:sld>
 </file>
 
-<file path=ppt/slides/slide12.xml><?xml version="1.0" encoding="utf-8"?>
+<file path=ppt/slides/slide11.xml><?xml version="1.0" encoding="utf-8"?>
 <p:sld xmlns:a="http://schemas.openxmlformats.org/drawingml/2006/main" xmlns:r="http://schemas.openxmlformats.org/officeDocument/2006/relationships" xmlns:p="http://schemas.openxmlformats.org/presentationml/2006/main">
   <p:cSld>
     <p:spTree>
@@ -9226,7 +8567,7 @@
 </p:sld>
 </file>
 
-<file path=ppt/slides/slide13.xml><?xml version="1.0" encoding="utf-8"?>
+<file path=ppt/slides/slide12.xml><?xml version="1.0" encoding="utf-8"?>
 <p:sld xmlns:a="http://schemas.openxmlformats.org/drawingml/2006/main" xmlns:r="http://schemas.openxmlformats.org/officeDocument/2006/relationships" xmlns:p="http://schemas.openxmlformats.org/presentationml/2006/main">
   <p:cSld>
     <p:spTree>
@@ -9364,7 +8705,7 @@
 </p:sld>
 </file>
 
-<file path=ppt/slides/slide14.xml><?xml version="1.0" encoding="utf-8"?>
+<file path=ppt/slides/slide13.xml><?xml version="1.0" encoding="utf-8"?>
 <p:sld xmlns:a="http://schemas.openxmlformats.org/drawingml/2006/main" xmlns:r="http://schemas.openxmlformats.org/officeDocument/2006/relationships" xmlns:p="http://schemas.openxmlformats.org/presentationml/2006/main">
   <p:cSld>
     <p:spTree>
@@ -9703,7 +9044,7 @@
 </p:sld>
 </file>
 
-<file path=ppt/slides/slide15.xml><?xml version="1.0" encoding="utf-8"?>
+<file path=ppt/slides/slide14.xml><?xml version="1.0" encoding="utf-8"?>
 <p:sld xmlns:a="http://schemas.openxmlformats.org/drawingml/2006/main" xmlns:r="http://schemas.openxmlformats.org/officeDocument/2006/relationships" xmlns:p="http://schemas.openxmlformats.org/presentationml/2006/main">
   <p:cSld>
     <p:spTree>
@@ -9804,7 +9145,7 @@
 </p:sld>
 </file>
 
-<file path=ppt/slides/slide16.xml><?xml version="1.0" encoding="utf-8"?>
+<file path=ppt/slides/slide15.xml><?xml version="1.0" encoding="utf-8"?>
 <p:sld xmlns:a="http://schemas.openxmlformats.org/drawingml/2006/main" xmlns:r="http://schemas.openxmlformats.org/officeDocument/2006/relationships" xmlns:p="http://schemas.openxmlformats.org/presentationml/2006/main">
   <p:cSld>
     <p:spTree>
@@ -9900,6 +9241,297 @@
 </p:sld>
 </file>
 
+<file path=ppt/slides/slide16.xml><?xml version="1.0" encoding="utf-8"?>
+<p:sld xmlns:a="http://schemas.openxmlformats.org/drawingml/2006/main" xmlns:r="http://schemas.openxmlformats.org/officeDocument/2006/relationships" xmlns:p="http://schemas.openxmlformats.org/presentationml/2006/main">
+  <p:cSld>
+    <p:spTree>
+      <p:nvGrpSpPr>
+        <p:cNvPr id="1" name=""/>
+        <p:cNvGrpSpPr/>
+        <p:nvPr/>
+      </p:nvGrpSpPr>
+      <p:grpSpPr>
+        <a:xfrm>
+          <a:off x="0" y="0"/>
+          <a:ext cx="0" cy="0"/>
+          <a:chOff x="0" y="0"/>
+          <a:chExt cx="0" cy="0"/>
+        </a:xfrm>
+      </p:grpSpPr>
+      <p:graphicFrame>
+        <p:nvGraphicFramePr>
+          <p:cNvPr id="5" name="Tabella 5">
+            <a:extLst>
+              <a:ext uri="{FF2B5EF4-FFF2-40B4-BE49-F238E27FC236}">
+                <a16:creationId xmlns:a16="http://schemas.microsoft.com/office/drawing/2014/main" id="{A7AD5D19-47E1-43A3-BAA1-192BDA0EBBB1}"/>
+              </a:ext>
+            </a:extLst>
+          </p:cNvPr>
+          <p:cNvGraphicFramePr>
+            <a:graphicFrameLocks noGrp="1"/>
+          </p:cNvGraphicFramePr>
+          <p:nvPr>
+            <p:extLst>
+              <p:ext uri="{D42A27DB-BD31-4B8C-83A1-F6EECF244321}">
+                <p14:modId xmlns:p14="http://schemas.microsoft.com/office/powerpoint/2010/main" val="3778607298"/>
+              </p:ext>
+            </p:extLst>
+          </p:nvPr>
+        </p:nvGraphicFramePr>
+        <p:xfrm>
+          <a:off x="641683" y="719665"/>
+          <a:ext cx="8875296" cy="5246109"/>
+        </p:xfrm>
+        <a:graphic>
+          <a:graphicData uri="http://schemas.openxmlformats.org/drawingml/2006/table">
+            <a:tbl>
+              <a:tblPr firstRow="1" bandRow="1">
+                <a:tableStyleId>{5C22544A-7EE6-4342-B048-85BDC9FD1C3A}</a:tableStyleId>
+              </a:tblPr>
+              <a:tblGrid>
+                <a:gridCol w="4437648">
+                  <a:extLst>
+                    <a:ext uri="{9D8B030D-6E8A-4147-A177-3AD203B41FA5}">
+                      <a16:colId xmlns:a16="http://schemas.microsoft.com/office/drawing/2014/main" val="4064643162"/>
+                    </a:ext>
+                  </a:extLst>
+                </a:gridCol>
+                <a:gridCol w="4437648">
+                  <a:extLst>
+                    <a:ext uri="{9D8B030D-6E8A-4147-A177-3AD203B41FA5}">
+                      <a16:colId xmlns:a16="http://schemas.microsoft.com/office/drawing/2014/main" val="1290418245"/>
+                    </a:ext>
+                  </a:extLst>
+                </a:gridCol>
+              </a:tblGrid>
+              <a:tr h="834303">
+                <a:tc>
+                  <a:txBody>
+                    <a:bodyPr/>
+                    <a:lstStyle/>
+                    <a:p>
+                      <a:r>
+                        <a:rPr lang="it-IT" dirty="0"/>
+                        <a:t>Parametro</a:t>
+                      </a:r>
+                    </a:p>
+                  </a:txBody>
+                  <a:tcPr/>
+                </a:tc>
+                <a:tc>
+                  <a:txBody>
+                    <a:bodyPr/>
+                    <a:lstStyle/>
+                    <a:p>
+                      <a:r>
+                        <a:rPr lang="it-IT" dirty="0"/>
+                        <a:t>Descrizione</a:t>
+                      </a:r>
+                    </a:p>
+                  </a:txBody>
+                  <a:tcPr/>
+                </a:tc>
+                <a:extLst>
+                  <a:ext uri="{0D108BD9-81ED-4DB2-BD59-A6C34878D82A}">
+                    <a16:rowId xmlns:a16="http://schemas.microsoft.com/office/drawing/2014/main" val="3403489867"/>
+                  </a:ext>
+                </a:extLst>
+              </a:tr>
+              <a:tr h="866903">
+                <a:tc>
+                  <a:txBody>
+                    <a:bodyPr/>
+                    <a:lstStyle/>
+                    <a:p>
+                      <a:r>
+                        <a:rPr lang="it-IT" dirty="0" err="1"/>
+                        <a:t>PrimaryPreferred</a:t>
+                      </a:r>
+                      <a:endParaRPr lang="it-IT" dirty="0"/>
+                    </a:p>
+                  </a:txBody>
+                  <a:tcPr/>
+                </a:tc>
+                <a:tc>
+                  <a:txBody>
+                    <a:bodyPr/>
+                    <a:lstStyle/>
+                    <a:p>
+                      <a:r>
+                        <a:rPr lang="it-IT" dirty="0"/>
+                        <a:t>Nella maggior parte delle situazioni legge dal primario, ma non è raggiungibile legge al secondo.</a:t>
+                      </a:r>
+                    </a:p>
+                  </a:txBody>
+                  <a:tcPr/>
+                </a:tc>
+                <a:extLst>
+                  <a:ext uri="{0D108BD9-81ED-4DB2-BD59-A6C34878D82A}">
+                    <a16:rowId xmlns:a16="http://schemas.microsoft.com/office/drawing/2014/main" val="1840548417"/>
+                  </a:ext>
+                </a:extLst>
+              </a:tr>
+              <a:tr h="834303">
+                <a:tc>
+                  <a:txBody>
+                    <a:bodyPr/>
+                    <a:lstStyle/>
+                    <a:p>
+                      <a:r>
+                        <a:rPr lang="it-IT" dirty="0" err="1"/>
+                        <a:t>Secondary</a:t>
+                      </a:r>
+                      <a:endParaRPr lang="it-IT" dirty="0"/>
+                    </a:p>
+                  </a:txBody>
+                  <a:tcPr/>
+                </a:tc>
+                <a:tc>
+                  <a:txBody>
+                    <a:bodyPr/>
+                    <a:lstStyle/>
+                    <a:p>
+                      <a:r>
+                        <a:rPr lang="it-IT" dirty="0"/>
+                        <a:t>Tutte le operazioni di lettura vanno ai membri secondari del replica set.</a:t>
+                      </a:r>
+                    </a:p>
+                  </a:txBody>
+                  <a:tcPr/>
+                </a:tc>
+                <a:extLst>
+                  <a:ext uri="{0D108BD9-81ED-4DB2-BD59-A6C34878D82A}">
+                    <a16:rowId xmlns:a16="http://schemas.microsoft.com/office/drawing/2014/main" val="1700543559"/>
+                  </a:ext>
+                </a:extLst>
+              </a:tr>
+              <a:tr h="866903">
+                <a:tc>
+                  <a:txBody>
+                    <a:bodyPr/>
+                    <a:lstStyle/>
+                    <a:p>
+                      <a:r>
+                        <a:rPr lang="it-IT" dirty="0" err="1"/>
+                        <a:t>SecondaryPreferred</a:t>
+                      </a:r>
+                      <a:endParaRPr lang="it-IT" dirty="0"/>
+                    </a:p>
+                  </a:txBody>
+                  <a:tcPr/>
+                </a:tc>
+                <a:tc>
+                  <a:txBody>
+                    <a:bodyPr/>
+                    <a:lstStyle/>
+                    <a:p>
+                      <a:r>
+                        <a:rPr lang="it-IT" dirty="0"/>
+                        <a:t>Nella maggior parte delle situazioni legge dai membri secondari, ma se non sono raggiungibili legge dal primario.</a:t>
+                      </a:r>
+                    </a:p>
+                  </a:txBody>
+                  <a:tcPr/>
+                </a:tc>
+                <a:extLst>
+                  <a:ext uri="{0D108BD9-81ED-4DB2-BD59-A6C34878D82A}">
+                    <a16:rowId xmlns:a16="http://schemas.microsoft.com/office/drawing/2014/main" val="3480365757"/>
+                  </a:ext>
+                </a:extLst>
+              </a:tr>
+              <a:tr h="866903">
+                <a:tc>
+                  <a:txBody>
+                    <a:bodyPr/>
+                    <a:lstStyle/>
+                    <a:p>
+                      <a:r>
+                        <a:rPr lang="it-IT" dirty="0" err="1"/>
+                        <a:t>Nearest</a:t>
+                      </a:r>
+                      <a:endParaRPr lang="it-IT" dirty="0"/>
+                    </a:p>
+                  </a:txBody>
+                  <a:tcPr/>
+                </a:tc>
+                <a:tc>
+                  <a:txBody>
+                    <a:bodyPr/>
+                    <a:lstStyle/>
+                    <a:p>
+                      <a:r>
+                        <a:rPr lang="it-IT" dirty="0"/>
+                        <a:t>L’operazione di lettura viene assegnata ad un membro del replica set in base ad un specifico </a:t>
+                      </a:r>
+                      <a:r>
+                        <a:rPr lang="it-IT" dirty="0" err="1"/>
+                        <a:t>threshold</a:t>
+                      </a:r>
+                      <a:r>
+                        <a:rPr lang="it-IT" dirty="0"/>
+                        <a:t> di latenza.</a:t>
+                      </a:r>
+                    </a:p>
+                  </a:txBody>
+                  <a:tcPr/>
+                </a:tc>
+                <a:extLst>
+                  <a:ext uri="{0D108BD9-81ED-4DB2-BD59-A6C34878D82A}">
+                    <a16:rowId xmlns:a16="http://schemas.microsoft.com/office/drawing/2014/main" val="2752792633"/>
+                  </a:ext>
+                </a:extLst>
+              </a:tr>
+              <a:tr h="834303">
+                <a:tc>
+                  <a:txBody>
+                    <a:bodyPr/>
+                    <a:lstStyle/>
+                    <a:p>
+                      <a:r>
+                        <a:rPr lang="it-IT" dirty="0" err="1"/>
+                        <a:t>Primary</a:t>
+                      </a:r>
+                      <a:endParaRPr lang="it-IT" dirty="0"/>
+                    </a:p>
+                  </a:txBody>
+                  <a:tcPr/>
+                </a:tc>
+                <a:tc>
+                  <a:txBody>
+                    <a:bodyPr/>
+                    <a:lstStyle/>
+                    <a:p>
+                      <a:r>
+                        <a:rPr lang="it-IT" dirty="0"/>
+                        <a:t>Default mode. Tutte le operazioni di lettura vanno al primario.</a:t>
+                      </a:r>
+                    </a:p>
+                  </a:txBody>
+                  <a:tcPr/>
+                </a:tc>
+                <a:extLst>
+                  <a:ext uri="{0D108BD9-81ED-4DB2-BD59-A6C34878D82A}">
+                    <a16:rowId xmlns:a16="http://schemas.microsoft.com/office/drawing/2014/main" val="3735603622"/>
+                  </a:ext>
+                </a:extLst>
+              </a:tr>
+            </a:tbl>
+          </a:graphicData>
+        </a:graphic>
+      </p:graphicFrame>
+    </p:spTree>
+    <p:extLst>
+      <p:ext uri="{BB962C8B-B14F-4D97-AF65-F5344CB8AC3E}">
+        <p14:creationId xmlns:p14="http://schemas.microsoft.com/office/powerpoint/2010/main" val="1184498167"/>
+      </p:ext>
+    </p:extLst>
+  </p:cSld>
+  <p:clrMapOvr>
+    <a:masterClrMapping/>
+  </p:clrMapOvr>
+</p:sld>
+</file>
+
 <file path=ppt/slides/slide17.xml><?xml version="1.0" encoding="utf-8"?>
 <p:sld xmlns:a="http://schemas.openxmlformats.org/drawingml/2006/main" xmlns:r="http://schemas.openxmlformats.org/officeDocument/2006/relationships" xmlns:p="http://schemas.openxmlformats.org/presentationml/2006/main">
   <p:cSld>
@@ -9922,7 +9554,7 @@
           <p:cNvPr id="2" name="Titolo 1">
             <a:extLst>
               <a:ext uri="{FF2B5EF4-FFF2-40B4-BE49-F238E27FC236}">
-                <a16:creationId xmlns:a16="http://schemas.microsoft.com/office/drawing/2014/main" id="{4EC9AA5C-8EC2-47D0-AC90-F260725B5224}"/>
+                <a16:creationId xmlns:a16="http://schemas.microsoft.com/office/drawing/2014/main" id="{0A8D62DF-EDB2-4A17-9E5D-5D8E4DF83D48}"/>
               </a:ext>
             </a:extLst>
           </p:cNvPr>
@@ -9933,19 +9565,14 @@
             <p:ph type="title"/>
           </p:nvPr>
         </p:nvSpPr>
-        <p:spPr>
-          <a:xfrm>
-            <a:off x="677334" y="609600"/>
-            <a:ext cx="8596668" cy="762000"/>
-          </a:xfrm>
-        </p:spPr>
+        <p:spPr/>
         <p:txBody>
           <a:bodyPr/>
           <a:lstStyle/>
           <a:p>
             <a:r>
               <a:rPr lang="it-IT" dirty="0"/>
-              <a:t>Caratteristiche principali</a:t>
+              <a:t>Operazioni di scrittura</a:t>
             </a:r>
           </a:p>
         </p:txBody>
@@ -9955,7 +9582,7 @@
           <p:cNvPr id="3" name="Segnaposto contenuto 2">
             <a:extLst>
               <a:ext uri="{FF2B5EF4-FFF2-40B4-BE49-F238E27FC236}">
-                <a16:creationId xmlns:a16="http://schemas.microsoft.com/office/drawing/2014/main" id="{F647C8AD-B187-4B6F-82DA-45F9751B8FA4}"/>
+                <a16:creationId xmlns:a16="http://schemas.microsoft.com/office/drawing/2014/main" id="{252E30D6-5BA6-4FB3-9031-AB2564CB3953}"/>
               </a:ext>
             </a:extLst>
           </p:cNvPr>
@@ -9968,8 +9595,8 @@
         </p:nvSpPr>
         <p:spPr>
           <a:xfrm>
-            <a:off x="677334" y="1600201"/>
-            <a:ext cx="8596668" cy="3962400"/>
+            <a:off x="677334" y="1488613"/>
+            <a:ext cx="8596668" cy="4659524"/>
           </a:xfrm>
         </p:spPr>
         <p:txBody>
@@ -9980,33 +9607,7 @@
           <a:p>
             <a:r>
               <a:rPr lang="it-IT" dirty="0"/>
-              <a:t>Estremamente flessibile nella rappresentazione e gestione del dato.</a:t>
-            </a:r>
-          </a:p>
-          <a:p>
-            <a:r>
-              <a:rPr lang="it-IT" dirty="0"/>
-              <a:t>La struttura del documento è più in linea con il modo in cui gli sviluppatori costruiscono le loro classi e oggetti nei rispettivi linguaggi di programmazione.</a:t>
-            </a:r>
-          </a:p>
-          <a:p>
-            <a:r>
-              <a:rPr lang="it-IT" dirty="0"/>
-              <a:t>Non è necessario che i </a:t>
-            </a:r>
-            <a:r>
-              <a:rPr lang="it-IT" dirty="0" err="1"/>
-              <a:t>documents</a:t>
-            </a:r>
-            <a:r>
-              <a:rPr lang="it-IT" dirty="0"/>
-              <a:t> abbiano uno schema definito in anticipo. Infatti, i fields possono essere creati al volo.</a:t>
-            </a:r>
-          </a:p>
-          <a:p>
-            <a:r>
-              <a:rPr lang="it-IT" dirty="0"/>
-              <a:t>Il modello di dati disponibile all'interno di </a:t>
+              <a:t>Il problema di scrittura descrive il livello di riconoscimento richiesto da </a:t>
             </a:r>
             <a:r>
               <a:rPr lang="it-IT" dirty="0" err="1"/>
@@ -10014,29 +9615,371 @@
             </a:r>
             <a:r>
               <a:rPr lang="it-IT" dirty="0"/>
-              <a:t> consente di rappresentare più facilmente relazioni gerarchiche, memorizzare array e altre strutture più complesse.</a:t>
-            </a:r>
-          </a:p>
-          <a:p>
+              <a:t> per le operazioni di scrittura su un </a:t>
+            </a:r>
+            <a:r>
+              <a:rPr lang="it-IT" dirty="0" err="1"/>
+              <a:t>mongod</a:t>
+            </a:r>
             <a:r>
               <a:rPr lang="it-IT" dirty="0"/>
-              <a:t>Scalabilità – Gli ambienti </a:t>
+              <a:t> autonomo o su set di repliche o su cluster partizionati. Nei cluster partizionati, le istanze </a:t>
             </a:r>
             <a:r>
               <a:rPr lang="it-IT" dirty="0" err="1"/>
-              <a:t>MongoDB</a:t>
+              <a:t>mongos</a:t>
             </a:r>
             <a:r>
               <a:rPr lang="it-IT" dirty="0"/>
-              <a:t> sono molto scalabili. Le aziende di tutto il mondo hanno definito cluster con alcuni di loro che eseguono oltre 100 nodi con circa milioni di documenti all'interno del database.</a:t>
-            </a:r>
+              <a:t> trasmetteranno il problema di scrittura agli </a:t>
+            </a:r>
+            <a:r>
+              <a:rPr lang="it-IT" dirty="0" err="1"/>
+              <a:t>shard</a:t>
+            </a:r>
+            <a:r>
+              <a:rPr lang="it-IT" dirty="0"/>
+              <a:t>.</a:t>
+            </a:r>
+          </a:p>
+          <a:p>
+            <a:endParaRPr lang="it-IT" dirty="0"/>
+          </a:p>
+          <a:p>
+            <a:pPr marL="0" indent="0">
+              <a:buNone/>
+            </a:pPr>
+            <a:r>
+              <a:rPr lang="en-US" dirty="0"/>
+              <a:t>{ w: &lt;value&gt;, j: &lt;</a:t>
+            </a:r>
+            <a:r>
+              <a:rPr lang="en-US" dirty="0" err="1"/>
+              <a:t>boolean</a:t>
+            </a:r>
+            <a:r>
+              <a:rPr lang="en-US" dirty="0"/>
+              <a:t>&gt;, </a:t>
+            </a:r>
+            <a:r>
+              <a:rPr lang="en-US" dirty="0" err="1"/>
+              <a:t>wtimeout</a:t>
+            </a:r>
+            <a:r>
+              <a:rPr lang="en-US" dirty="0"/>
+              <a:t>: &lt;number&gt; } </a:t>
+            </a:r>
+            <a:r>
+              <a:rPr lang="en-US" dirty="0">
+                <a:solidFill>
+                  <a:srgbClr val="92D050"/>
+                </a:solidFill>
+              </a:rPr>
+              <a:t>// </a:t>
+            </a:r>
+            <a:r>
+              <a:rPr lang="en-US" dirty="0" err="1">
+                <a:solidFill>
+                  <a:srgbClr val="92D050"/>
+                </a:solidFill>
+              </a:rPr>
+              <a:t>configurazione</a:t>
+            </a:r>
+            <a:r>
+              <a:rPr lang="en-US" dirty="0">
+                <a:solidFill>
+                  <a:srgbClr val="92D050"/>
+                </a:solidFill>
+              </a:rPr>
+              <a:t> per client </a:t>
+            </a:r>
+            <a:endParaRPr lang="it-IT" dirty="0"/>
+          </a:p>
+          <a:p>
+            <a:r>
+              <a:rPr lang="it-IT" dirty="0"/>
+              <a:t>W:l'operazione di scrittura si è propagata a un numero specificato di istanze </a:t>
+            </a:r>
+            <a:r>
+              <a:rPr lang="it-IT" dirty="0" err="1"/>
+              <a:t>mongod</a:t>
+            </a:r>
+            <a:r>
+              <a:rPr lang="it-IT" dirty="0"/>
+              <a:t>. </a:t>
+            </a:r>
+          </a:p>
+          <a:p>
+            <a:r>
+              <a:rPr lang="it-IT" dirty="0"/>
+              <a:t>J:per richiedere il riconoscimento che l'operazione di scrittura sia scritta sul on-disk journal.</a:t>
+            </a:r>
+          </a:p>
+          <a:p>
+            <a:r>
+              <a:rPr lang="it-IT" dirty="0" err="1"/>
+              <a:t>Wtimeout:specificare</a:t>
+            </a:r>
+            <a:r>
+              <a:rPr lang="it-IT" dirty="0"/>
+              <a:t> un limite di tempo per impedire il blocco indefinito delle operazioni di scrittura. Dopo un tempo limite ho errore di scrittura.</a:t>
+            </a:r>
+          </a:p>
+          <a:p>
+            <a:endParaRPr lang="it-IT" dirty="0"/>
+          </a:p>
+          <a:p>
+            <a:pPr marL="0" marR="0" lvl="0" indent="0" algn="l" defTabSz="914400" rtl="0" eaLnBrk="0" fontAlgn="base" latinLnBrk="0" hangingPunct="0">
+              <a:lnSpc>
+                <a:spcPct val="100000"/>
+              </a:lnSpc>
+              <a:spcBef>
+                <a:spcPct val="0"/>
+              </a:spcBef>
+              <a:spcAft>
+                <a:spcPct val="0"/>
+              </a:spcAft>
+              <a:buClrTx/>
+              <a:buSzTx/>
+              <a:buFontTx/>
+              <a:buChar char="•"/>
+              <a:tabLst/>
+            </a:pPr>
+            <a:endParaRPr kumimoji="0" lang="it-IT" altLang="it-IT" sz="1800" b="0" i="0" u="none" strike="noStrike" cap="none" normalizeH="0" baseline="0" dirty="0">
+              <a:ln>
+                <a:noFill/>
+              </a:ln>
+              <a:solidFill>
+                <a:schemeClr val="tx1"/>
+              </a:solidFill>
+              <a:effectLst/>
+              <a:latin typeface="Arial" panose="020B0604020202020204" pitchFamily="34" charset="0"/>
+            </a:endParaRPr>
+          </a:p>
+          <a:p>
+            <a:endParaRPr lang="it-IT" dirty="0"/>
+          </a:p>
+        </p:txBody>
+      </p:sp>
+      <p:sp>
+        <p:nvSpPr>
+          <p:cNvPr id="5" name="Rectangle 1">
+            <a:extLst>
+              <a:ext uri="{FF2B5EF4-FFF2-40B4-BE49-F238E27FC236}">
+                <a16:creationId xmlns:a16="http://schemas.microsoft.com/office/drawing/2014/main" id="{F135CDE7-1705-44F2-9634-580429C224DD}"/>
+              </a:ext>
+            </a:extLst>
+          </p:cNvPr>
+          <p:cNvSpPr>
+            <a:spLocks noChangeArrowheads="1"/>
+          </p:cNvSpPr>
+          <p:nvPr/>
+        </p:nvSpPr>
+        <p:spPr bwMode="auto">
+          <a:xfrm>
+            <a:off x="0" y="-323165"/>
+            <a:ext cx="184731" cy="646331"/>
+          </a:xfrm>
+          <a:prstGeom prst="rect">
+            <a:avLst/>
+          </a:prstGeom>
+          <a:noFill/>
+          <a:ln>
+            <a:noFill/>
+          </a:ln>
+          <a:effectLst/>
+          <a:extLst>
+            <a:ext uri="{909E8E84-426E-40DD-AFC4-6F175D3DCCD1}">
+              <a14:hiddenFill xmlns:a14="http://schemas.microsoft.com/office/drawing/2010/main">
+                <a:solidFill>
+                  <a:schemeClr val="accent1"/>
+                </a:solidFill>
+              </a14:hiddenFill>
+            </a:ext>
+            <a:ext uri="{91240B29-F687-4F45-9708-019B960494DF}">
+              <a14:hiddenLine xmlns:a14="http://schemas.microsoft.com/office/drawing/2010/main" w="9525">
+                <a:solidFill>
+                  <a:schemeClr val="tx1"/>
+                </a:solidFill>
+                <a:miter lim="800000"/>
+                <a:headEnd/>
+                <a:tailEnd/>
+              </a14:hiddenLine>
+            </a:ext>
+            <a:ext uri="{AF507438-7753-43E0-B8FC-AC1667EBCBE1}">
+              <a14:hiddenEffects xmlns:a14="http://schemas.microsoft.com/office/drawing/2010/main">
+                <a:effectLst>
+                  <a:outerShdw dist="35921" dir="2700000" algn="ctr" rotWithShape="0">
+                    <a:schemeClr val="bg2"/>
+                  </a:outerShdw>
+                </a:effectLst>
+              </a14:hiddenEffects>
+            </a:ext>
+          </a:extLst>
+        </p:spPr>
+        <p:txBody>
+          <a:bodyPr vert="horz" wrap="none" lIns="91440" tIns="45720" rIns="91440" bIns="45720" numCol="1" anchor="ctr" anchorCtr="0" compatLnSpc="1">
+            <a:prstTxWarp prst="textNoShape">
+              <a:avLst/>
+            </a:prstTxWarp>
+            <a:spAutoFit/>
+          </a:bodyPr>
+          <a:lstStyle/>
+          <a:p>
+            <a:pPr marL="0" marR="0" lvl="0" indent="0" algn="l" defTabSz="914400" rtl="0" eaLnBrk="0" fontAlgn="base" latinLnBrk="0" hangingPunct="0">
+              <a:lnSpc>
+                <a:spcPct val="100000"/>
+              </a:lnSpc>
+              <a:spcBef>
+                <a:spcPct val="0"/>
+              </a:spcBef>
+              <a:spcAft>
+                <a:spcPct val="0"/>
+              </a:spcAft>
+              <a:buClrTx/>
+              <a:buSzTx/>
+              <a:buFontTx/>
+              <a:buNone/>
+              <a:tabLst/>
+            </a:pPr>
+            <a:endParaRPr kumimoji="0" lang="it-IT" altLang="it-IT" sz="1800" b="0" i="0" u="none" strike="noStrike" cap="none" normalizeH="0" baseline="0" dirty="0">
+              <a:ln>
+                <a:noFill/>
+              </a:ln>
+              <a:solidFill>
+                <a:schemeClr val="tx1"/>
+              </a:solidFill>
+              <a:effectLst/>
+              <a:latin typeface="Arial" panose="020B0604020202020204" pitchFamily="34" charset="0"/>
+            </a:endParaRPr>
+          </a:p>
+          <a:p>
+            <a:pPr marL="0" marR="0" lvl="0" indent="0" algn="l" defTabSz="914400" rtl="0" eaLnBrk="0" fontAlgn="base" latinLnBrk="0" hangingPunct="0">
+              <a:lnSpc>
+                <a:spcPct val="100000"/>
+              </a:lnSpc>
+              <a:spcBef>
+                <a:spcPct val="0"/>
+              </a:spcBef>
+              <a:spcAft>
+                <a:spcPct val="0"/>
+              </a:spcAft>
+              <a:buClrTx/>
+              <a:buSzTx/>
+              <a:buFontTx/>
+              <a:buNone/>
+              <a:tabLst/>
+            </a:pPr>
+            <a:endParaRPr kumimoji="0" lang="it-IT" altLang="it-IT" sz="1800" b="0" i="0" u="none" strike="noStrike" cap="none" normalizeH="0" baseline="0" dirty="0">
+              <a:ln>
+                <a:noFill/>
+              </a:ln>
+              <a:solidFill>
+                <a:schemeClr val="tx1"/>
+              </a:solidFill>
+              <a:effectLst/>
+              <a:latin typeface="Arial" panose="020B0604020202020204" pitchFamily="34" charset="0"/>
+            </a:endParaRPr>
           </a:p>
         </p:txBody>
       </p:sp>
     </p:spTree>
     <p:extLst>
       <p:ext uri="{BB962C8B-B14F-4D97-AF65-F5344CB8AC3E}">
-        <p14:creationId xmlns:p14="http://schemas.microsoft.com/office/powerpoint/2010/main" val="2344025804"/>
+        <p14:creationId xmlns:p14="http://schemas.microsoft.com/office/powerpoint/2010/main" val="2501003964"/>
+      </p:ext>
+    </p:extLst>
+  </p:cSld>
+  <p:clrMapOvr>
+    <a:masterClrMapping/>
+  </p:clrMapOvr>
+</p:sld>
+</file>
+
+<file path=ppt/slides/slide18.xml><?xml version="1.0" encoding="utf-8"?>
+<p:sld xmlns:a="http://schemas.openxmlformats.org/drawingml/2006/main" xmlns:r="http://schemas.openxmlformats.org/officeDocument/2006/relationships" xmlns:p="http://schemas.openxmlformats.org/presentationml/2006/main">
+  <p:cSld>
+    <p:spTree>
+      <p:nvGrpSpPr>
+        <p:cNvPr id="1" name=""/>
+        <p:cNvGrpSpPr/>
+        <p:nvPr/>
+      </p:nvGrpSpPr>
+      <p:grpSpPr>
+        <a:xfrm>
+          <a:off x="0" y="0"/>
+          <a:ext cx="0" cy="0"/>
+          <a:chOff x="0" y="0"/>
+          <a:chExt cx="0" cy="0"/>
+        </a:xfrm>
+      </p:grpSpPr>
+      <p:sp>
+        <p:nvSpPr>
+          <p:cNvPr id="2" name="Titolo 1">
+            <a:extLst>
+              <a:ext uri="{FF2B5EF4-FFF2-40B4-BE49-F238E27FC236}">
+                <a16:creationId xmlns:a16="http://schemas.microsoft.com/office/drawing/2014/main" id="{DE09E4BC-2C0C-4798-855E-68B380D6C46B}"/>
+              </a:ext>
+            </a:extLst>
+          </p:cNvPr>
+          <p:cNvSpPr>
+            <a:spLocks noGrp="1"/>
+          </p:cNvSpPr>
+          <p:nvPr>
+            <p:ph type="title"/>
+          </p:nvPr>
+        </p:nvSpPr>
+        <p:spPr>
+          <a:xfrm>
+            <a:off x="677334" y="609600"/>
+            <a:ext cx="8596668" cy="689811"/>
+          </a:xfrm>
+        </p:spPr>
+        <p:txBody>
+          <a:bodyPr/>
+          <a:lstStyle/>
+          <a:p>
+            <a:r>
+              <a:rPr lang="it-IT" dirty="0" err="1"/>
+              <a:t>MongoDB</a:t>
+            </a:r>
+            <a:r>
+              <a:rPr lang="it-IT"/>
+              <a:t> Sharding</a:t>
+            </a:r>
+            <a:endParaRPr lang="it-IT" dirty="0"/>
+          </a:p>
+        </p:txBody>
+      </p:sp>
+      <p:sp>
+        <p:nvSpPr>
+          <p:cNvPr id="3" name="Segnaposto contenuto 2">
+            <a:extLst>
+              <a:ext uri="{FF2B5EF4-FFF2-40B4-BE49-F238E27FC236}">
+                <a16:creationId xmlns:a16="http://schemas.microsoft.com/office/drawing/2014/main" id="{5003E044-0272-41A9-8DB5-E499E02E7575}"/>
+              </a:ext>
+            </a:extLst>
+          </p:cNvPr>
+          <p:cNvSpPr>
+            <a:spLocks noGrp="1"/>
+          </p:cNvSpPr>
+          <p:nvPr>
+            <p:ph idx="1"/>
+          </p:nvPr>
+        </p:nvSpPr>
+        <p:spPr/>
+        <p:txBody>
+          <a:bodyPr/>
+          <a:lstStyle/>
+          <a:p>
+            <a:endParaRPr lang="it-IT" dirty="0"/>
+          </a:p>
+        </p:txBody>
+      </p:sp>
+    </p:spTree>
+    <p:extLst>
+      <p:ext uri="{BB962C8B-B14F-4D97-AF65-F5344CB8AC3E}">
+        <p14:creationId xmlns:p14="http://schemas.microsoft.com/office/powerpoint/2010/main" val="1959518528"/>
       </p:ext>
     </p:extLst>
   </p:cSld>
@@ -11717,7 +11660,7 @@
           <p:cNvPr id="2" name="Titolo 1">
             <a:extLst>
               <a:ext uri="{FF2B5EF4-FFF2-40B4-BE49-F238E27FC236}">
-                <a16:creationId xmlns:a16="http://schemas.microsoft.com/office/drawing/2014/main" id="{DE09E4BC-2C0C-4798-855E-68B380D6C46B}"/>
+                <a16:creationId xmlns:a16="http://schemas.microsoft.com/office/drawing/2014/main" id="{3D50023E-F3FC-459D-8DD9-7F6E87F4BED5}"/>
               </a:ext>
             </a:extLst>
           </p:cNvPr>
@@ -11728,28 +11671,20 @@
             <p:ph type="title"/>
           </p:nvPr>
         </p:nvSpPr>
-        <p:spPr/>
+        <p:spPr>
+          <a:xfrm>
+            <a:off x="677334" y="609600"/>
+            <a:ext cx="8596668" cy="725905"/>
+          </a:xfrm>
+        </p:spPr>
         <p:txBody>
           <a:bodyPr/>
           <a:lstStyle/>
           <a:p>
             <a:r>
               <a:rPr lang="it-IT" dirty="0"/>
-              <a:t>Architettura distribuita </a:t>
-            </a:r>
-            <a:r>
-              <a:rPr lang="it-IT" dirty="0" err="1"/>
-              <a:t>MongoDB</a:t>
-            </a:r>
-            <a:r>
-              <a:rPr lang="it-IT" dirty="0"/>
-              <a:t>: </a:t>
-            </a:r>
-            <a:r>
-              <a:rPr lang="it-IT" dirty="0" err="1"/>
-              <a:t>Sharding</a:t>
-            </a:r>
-            <a:endParaRPr lang="it-IT" dirty="0"/>
+              <a:t>Replication</a:t>
+            </a:r>
           </a:p>
         </p:txBody>
       </p:sp>
@@ -11758,7 +11693,7 @@
           <p:cNvPr id="3" name="Segnaposto contenuto 2">
             <a:extLst>
               <a:ext uri="{FF2B5EF4-FFF2-40B4-BE49-F238E27FC236}">
-                <a16:creationId xmlns:a16="http://schemas.microsoft.com/office/drawing/2014/main" id="{5003E044-0272-41A9-8DB5-E499E02E7575}"/>
+                <a16:creationId xmlns:a16="http://schemas.microsoft.com/office/drawing/2014/main" id="{37820A38-C9C9-4A99-80D6-447D8B02A018}"/>
               </a:ext>
             </a:extLst>
           </p:cNvPr>
@@ -11769,19 +11704,100 @@
             <p:ph idx="1"/>
           </p:nvPr>
         </p:nvSpPr>
-        <p:spPr/>
-        <p:txBody>
-          <a:bodyPr/>
+        <p:spPr>
+          <a:xfrm>
+            <a:off x="520923" y="1335506"/>
+            <a:ext cx="9212624" cy="6136106"/>
+          </a:xfrm>
+        </p:spPr>
+        <p:txBody>
+          <a:bodyPr>
+            <a:normAutofit/>
+          </a:bodyPr>
           <a:lstStyle/>
           <a:p>
-            <a:endParaRPr lang="it-IT" dirty="0"/>
+            <a:r>
+              <a:rPr lang="it-IT" sz="2000" dirty="0"/>
+              <a:t>Scopi principali della replicazione:</a:t>
+            </a:r>
+          </a:p>
+          <a:p>
+            <a:pPr lvl="1"/>
+            <a:r>
+              <a:rPr lang="it-IT" sz="2000" dirty="0"/>
+              <a:t>Fornisce ridondanza dei dati, così ho un livello di tolleranza agli errori contro la perdita di un singolo server (</a:t>
+            </a:r>
+            <a:r>
+              <a:rPr lang="it-IT" sz="2000" dirty="0" err="1"/>
+              <a:t>Availability</a:t>
+            </a:r>
+            <a:r>
+              <a:rPr lang="it-IT" sz="2000" dirty="0"/>
+              <a:t>).</a:t>
+            </a:r>
+          </a:p>
+          <a:p>
+            <a:pPr lvl="1"/>
+            <a:r>
+              <a:rPr lang="it-IT" sz="2000" dirty="0"/>
+              <a:t>Maggiore capacità di lettura, infatti i client possono inviare operazioni di lettura a server diversi.</a:t>
+            </a:r>
+          </a:p>
+          <a:p>
+            <a:pPr lvl="1"/>
+            <a:r>
+              <a:rPr lang="it-IT" sz="2000" dirty="0"/>
+              <a:t>Maggiore disponibilità per applicazioni distribuite.</a:t>
+            </a:r>
+          </a:p>
+          <a:p>
+            <a:pPr lvl="1"/>
+            <a:r>
+              <a:rPr lang="it-IT" sz="2000" dirty="0"/>
+              <a:t>Scopi dedicati come il backup</a:t>
+            </a:r>
+          </a:p>
+          <a:p>
+            <a:r>
+              <a:rPr lang="it-IT" sz="2000" dirty="0"/>
+              <a:t>Come funzione in </a:t>
+            </a:r>
+            <a:r>
+              <a:rPr lang="it-IT" sz="2000" dirty="0" err="1"/>
+              <a:t>MongoDB</a:t>
+            </a:r>
+            <a:r>
+              <a:rPr lang="it-IT" sz="2000" dirty="0"/>
+              <a:t>:</a:t>
+            </a:r>
+          </a:p>
+          <a:p>
+            <a:pPr lvl="1"/>
+            <a:r>
+              <a:rPr lang="it-IT" sz="2000" dirty="0"/>
+              <a:t>Ho un replica set che mantiene lo stesso set di dati.</a:t>
+            </a:r>
+          </a:p>
+          <a:p>
+            <a:pPr lvl="1"/>
+            <a:r>
+              <a:rPr lang="it-IT" sz="2000" dirty="0"/>
+              <a:t>Un replica set ha diversi nodi portanti e un nodo arbitro facoltativo.</a:t>
+            </a:r>
+          </a:p>
+          <a:p>
+            <a:pPr lvl="1"/>
+            <a:r>
+              <a:rPr lang="it-IT" sz="2000" dirty="0"/>
+              <a:t>Dei nodi portanti uno solo è considerato primario, mentre gli altri nodi sono considerati secondari.</a:t>
+            </a:r>
           </a:p>
         </p:txBody>
       </p:sp>
     </p:spTree>
     <p:extLst>
       <p:ext uri="{BB962C8B-B14F-4D97-AF65-F5344CB8AC3E}">
-        <p14:creationId xmlns:p14="http://schemas.microsoft.com/office/powerpoint/2010/main" val="1959518528"/>
+        <p14:creationId xmlns:p14="http://schemas.microsoft.com/office/powerpoint/2010/main" val="3419229553"/>
       </p:ext>
     </p:extLst>
   </p:cSld>
@@ -11813,7 +11829,7 @@
           <p:cNvPr id="2" name="Titolo 1">
             <a:extLst>
               <a:ext uri="{FF2B5EF4-FFF2-40B4-BE49-F238E27FC236}">
-                <a16:creationId xmlns:a16="http://schemas.microsoft.com/office/drawing/2014/main" id="{3D50023E-F3FC-459D-8DD9-7F6E87F4BED5}"/>
+                <a16:creationId xmlns:a16="http://schemas.microsoft.com/office/drawing/2014/main" id="{C34BB43E-7C0E-4277-AB2D-6D41651B4CF5}"/>
               </a:ext>
             </a:extLst>
           </p:cNvPr>
@@ -11826,17 +11842,19 @@
         </p:nvSpPr>
         <p:spPr>
           <a:xfrm>
-            <a:off x="677334" y="609600"/>
-            <a:ext cx="8596668" cy="725905"/>
+            <a:off x="581081" y="164432"/>
+            <a:ext cx="8596668" cy="617621"/>
           </a:xfrm>
         </p:spPr>
         <p:txBody>
-          <a:bodyPr/>
+          <a:bodyPr>
+            <a:normAutofit fontScale="90000"/>
+          </a:bodyPr>
           <a:lstStyle/>
           <a:p>
             <a:r>
               <a:rPr lang="it-IT" dirty="0"/>
-              <a:t>Replication</a:t>
+              <a:t>Nodi primari e Nodi secondari</a:t>
             </a:r>
           </a:p>
         </p:txBody>
@@ -11846,7 +11864,7 @@
           <p:cNvPr id="3" name="Segnaposto contenuto 2">
             <a:extLst>
               <a:ext uri="{FF2B5EF4-FFF2-40B4-BE49-F238E27FC236}">
-                <a16:creationId xmlns:a16="http://schemas.microsoft.com/office/drawing/2014/main" id="{37820A38-C9C9-4A99-80D6-447D8B02A018}"/>
+                <a16:creationId xmlns:a16="http://schemas.microsoft.com/office/drawing/2014/main" id="{3F921689-5397-4128-9266-7EE889DB9C07}"/>
               </a:ext>
             </a:extLst>
           </p:cNvPr>
@@ -11859,90 +11877,366 @@
         </p:nvSpPr>
         <p:spPr>
           <a:xfrm>
-            <a:off x="520923" y="1335506"/>
-            <a:ext cx="9212624" cy="6136106"/>
+            <a:off x="581081" y="955048"/>
+            <a:ext cx="8596668" cy="1660358"/>
           </a:xfrm>
         </p:spPr>
         <p:txBody>
           <a:bodyPr>
+            <a:noAutofit/>
+          </a:bodyPr>
+          <a:lstStyle/>
+          <a:p>
+            <a:r>
+              <a:rPr lang="it-IT" sz="2000" dirty="0"/>
+              <a:t>Il Nodo primario riceve tutte le operazioni di scrittura. Di default anche quelle di lettura, ma quest’ultime posso essere dirette anche ai nodi secondari.</a:t>
+            </a:r>
+          </a:p>
+          <a:p>
+            <a:r>
+              <a:rPr lang="it-IT" sz="2000" dirty="0"/>
+              <a:t>Un Nodo di un replica set diventa il nodo primario attraverso un processo di elezioni.</a:t>
+            </a:r>
+          </a:p>
+        </p:txBody>
+      </p:sp>
+      <p:sp>
+        <p:nvSpPr>
+          <p:cNvPr id="6" name="CasellaDiTesto 5">
+            <a:extLst>
+              <a:ext uri="{FF2B5EF4-FFF2-40B4-BE49-F238E27FC236}">
+                <a16:creationId xmlns:a16="http://schemas.microsoft.com/office/drawing/2014/main" id="{1436BC69-C58B-40DB-975B-B9949D7085B5}"/>
+              </a:ext>
+            </a:extLst>
+          </p:cNvPr>
+          <p:cNvSpPr txBox="1"/>
+          <p:nvPr/>
+        </p:nvSpPr>
+        <p:spPr>
+          <a:xfrm>
+            <a:off x="581081" y="2967335"/>
+            <a:ext cx="5514919" cy="461665"/>
+          </a:xfrm>
+          <a:prstGeom prst="rect">
+            <a:avLst/>
+          </a:prstGeom>
+          <a:noFill/>
+        </p:spPr>
+        <p:txBody>
+          <a:bodyPr wrap="square" rtlCol="0">
+            <a:spAutoFit/>
+          </a:bodyPr>
+          <a:lstStyle/>
+          <a:p>
+            <a:r>
+              <a:rPr lang="it-IT" sz="2400" dirty="0"/>
+              <a:t>Replica sete </a:t>
+            </a:r>
+            <a:r>
+              <a:rPr lang="it-IT" sz="2400" dirty="0" err="1"/>
+              <a:t>Elections</a:t>
+            </a:r>
+            <a:r>
+              <a:rPr lang="it-IT" sz="2400" dirty="0"/>
+              <a:t>:</a:t>
+            </a:r>
+          </a:p>
+        </p:txBody>
+      </p:sp>
+      <p:sp>
+        <p:nvSpPr>
+          <p:cNvPr id="8" name="Segnaposto contenuto 2">
+            <a:extLst>
+              <a:ext uri="{FF2B5EF4-FFF2-40B4-BE49-F238E27FC236}">
+                <a16:creationId xmlns:a16="http://schemas.microsoft.com/office/drawing/2014/main" id="{1289CDAC-1B35-4F01-BCE6-D1B3DBD5F38D}"/>
+              </a:ext>
+            </a:extLst>
+          </p:cNvPr>
+          <p:cNvSpPr txBox="1">
+            <a:spLocks/>
+          </p:cNvSpPr>
+          <p:nvPr/>
+        </p:nvSpPr>
+        <p:spPr>
+          <a:xfrm>
+            <a:off x="581081" y="3951019"/>
+            <a:ext cx="8596668" cy="3681662"/>
+          </a:xfrm>
+          <a:prstGeom prst="rect">
+            <a:avLst/>
+          </a:prstGeom>
+        </p:spPr>
+        <p:txBody>
+          <a:bodyPr vert="horz" lIns="91440" tIns="45720" rIns="91440" bIns="45720" rtlCol="0">
             <a:normAutofit/>
           </a:bodyPr>
-          <a:lstStyle/>
+          <a:lstStyle>
+            <a:lvl1pPr marL="342900" indent="-342900" algn="l" defTabSz="457200" rtl="0" eaLnBrk="1" latinLnBrk="0" hangingPunct="1">
+              <a:spcBef>
+                <a:spcPts val="1000"/>
+              </a:spcBef>
+              <a:spcAft>
+                <a:spcPts val="0"/>
+              </a:spcAft>
+              <a:buClr>
+                <a:schemeClr val="accent1"/>
+              </a:buClr>
+              <a:buSzPct val="80000"/>
+              <a:buFont typeface="Wingdings 3" charset="2"/>
+              <a:buChar char=""/>
+              <a:defRPr sz="1800" kern="1200">
+                <a:solidFill>
+                  <a:schemeClr val="tx1">
+                    <a:lumMod val="75000"/>
+                    <a:lumOff val="25000"/>
+                  </a:schemeClr>
+                </a:solidFill>
+                <a:latin typeface="+mn-lt"/>
+                <a:ea typeface="+mn-ea"/>
+                <a:cs typeface="+mn-cs"/>
+              </a:defRPr>
+            </a:lvl1pPr>
+            <a:lvl2pPr marL="742950" indent="-285750" algn="l" defTabSz="457200" rtl="0" eaLnBrk="1" latinLnBrk="0" hangingPunct="1">
+              <a:spcBef>
+                <a:spcPts val="1000"/>
+              </a:spcBef>
+              <a:spcAft>
+                <a:spcPts val="0"/>
+              </a:spcAft>
+              <a:buClr>
+                <a:schemeClr val="accent1"/>
+              </a:buClr>
+              <a:buSzPct val="80000"/>
+              <a:buFont typeface="Wingdings 3" charset="2"/>
+              <a:buChar char=""/>
+              <a:defRPr sz="1600" kern="1200">
+                <a:solidFill>
+                  <a:schemeClr val="tx1">
+                    <a:lumMod val="75000"/>
+                    <a:lumOff val="25000"/>
+                  </a:schemeClr>
+                </a:solidFill>
+                <a:latin typeface="+mn-lt"/>
+                <a:ea typeface="+mn-ea"/>
+                <a:cs typeface="+mn-cs"/>
+              </a:defRPr>
+            </a:lvl2pPr>
+            <a:lvl3pPr marL="1143000" indent="-228600" algn="l" defTabSz="457200" rtl="0" eaLnBrk="1" latinLnBrk="0" hangingPunct="1">
+              <a:spcBef>
+                <a:spcPts val="1000"/>
+              </a:spcBef>
+              <a:spcAft>
+                <a:spcPts val="0"/>
+              </a:spcAft>
+              <a:buClr>
+                <a:schemeClr val="accent1"/>
+              </a:buClr>
+              <a:buSzPct val="80000"/>
+              <a:buFont typeface="Wingdings 3" charset="2"/>
+              <a:buChar char=""/>
+              <a:defRPr sz="1400" kern="1200">
+                <a:solidFill>
+                  <a:schemeClr val="tx1">
+                    <a:lumMod val="75000"/>
+                    <a:lumOff val="25000"/>
+                  </a:schemeClr>
+                </a:solidFill>
+                <a:latin typeface="+mn-lt"/>
+                <a:ea typeface="+mn-ea"/>
+                <a:cs typeface="+mn-cs"/>
+              </a:defRPr>
+            </a:lvl3pPr>
+            <a:lvl4pPr marL="1600200" indent="-228600" algn="l" defTabSz="457200" rtl="0" eaLnBrk="1" latinLnBrk="0" hangingPunct="1">
+              <a:spcBef>
+                <a:spcPts val="1000"/>
+              </a:spcBef>
+              <a:spcAft>
+                <a:spcPts val="0"/>
+              </a:spcAft>
+              <a:buClr>
+                <a:schemeClr val="accent1"/>
+              </a:buClr>
+              <a:buSzPct val="80000"/>
+              <a:buFont typeface="Wingdings 3" charset="2"/>
+              <a:buChar char=""/>
+              <a:defRPr sz="1200" kern="1200">
+                <a:solidFill>
+                  <a:schemeClr val="tx1">
+                    <a:lumMod val="75000"/>
+                    <a:lumOff val="25000"/>
+                  </a:schemeClr>
+                </a:solidFill>
+                <a:latin typeface="+mn-lt"/>
+                <a:ea typeface="+mn-ea"/>
+                <a:cs typeface="+mn-cs"/>
+              </a:defRPr>
+            </a:lvl4pPr>
+            <a:lvl5pPr marL="2057400" indent="-228600" algn="l" defTabSz="457200" rtl="0" eaLnBrk="1" latinLnBrk="0" hangingPunct="1">
+              <a:spcBef>
+                <a:spcPts val="1000"/>
+              </a:spcBef>
+              <a:spcAft>
+                <a:spcPts val="0"/>
+              </a:spcAft>
+              <a:buClr>
+                <a:schemeClr val="accent1"/>
+              </a:buClr>
+              <a:buSzPct val="80000"/>
+              <a:buFont typeface="Wingdings 3" charset="2"/>
+              <a:buChar char=""/>
+              <a:defRPr sz="1200" kern="1200">
+                <a:solidFill>
+                  <a:schemeClr val="tx1">
+                    <a:lumMod val="75000"/>
+                    <a:lumOff val="25000"/>
+                  </a:schemeClr>
+                </a:solidFill>
+                <a:latin typeface="+mn-lt"/>
+                <a:ea typeface="+mn-ea"/>
+                <a:cs typeface="+mn-cs"/>
+              </a:defRPr>
+            </a:lvl5pPr>
+            <a:lvl6pPr marL="2514600" indent="-228600" algn="l" defTabSz="457200" rtl="0" eaLnBrk="1" latinLnBrk="0" hangingPunct="1">
+              <a:spcBef>
+                <a:spcPts val="1000"/>
+              </a:spcBef>
+              <a:spcAft>
+                <a:spcPts val="0"/>
+              </a:spcAft>
+              <a:buClr>
+                <a:schemeClr val="accent1"/>
+              </a:buClr>
+              <a:buSzPct val="80000"/>
+              <a:buFont typeface="Wingdings 3" charset="2"/>
+              <a:buChar char=""/>
+              <a:defRPr sz="1200" kern="1200">
+                <a:solidFill>
+                  <a:schemeClr val="tx1">
+                    <a:lumMod val="75000"/>
+                    <a:lumOff val="25000"/>
+                  </a:schemeClr>
+                </a:solidFill>
+                <a:latin typeface="+mn-lt"/>
+                <a:ea typeface="+mn-ea"/>
+                <a:cs typeface="+mn-cs"/>
+              </a:defRPr>
+            </a:lvl6pPr>
+            <a:lvl7pPr marL="2971800" indent="-228600" algn="l" defTabSz="457200" rtl="0" eaLnBrk="1" latinLnBrk="0" hangingPunct="1">
+              <a:spcBef>
+                <a:spcPts val="1000"/>
+              </a:spcBef>
+              <a:spcAft>
+                <a:spcPts val="0"/>
+              </a:spcAft>
+              <a:buClr>
+                <a:schemeClr val="accent1"/>
+              </a:buClr>
+              <a:buSzPct val="80000"/>
+              <a:buFont typeface="Wingdings 3" charset="2"/>
+              <a:buChar char=""/>
+              <a:defRPr sz="1200" kern="1200">
+                <a:solidFill>
+                  <a:schemeClr val="tx1">
+                    <a:lumMod val="75000"/>
+                    <a:lumOff val="25000"/>
+                  </a:schemeClr>
+                </a:solidFill>
+                <a:latin typeface="+mn-lt"/>
+                <a:ea typeface="+mn-ea"/>
+                <a:cs typeface="+mn-cs"/>
+              </a:defRPr>
+            </a:lvl7pPr>
+            <a:lvl8pPr marL="3429000" indent="-228600" algn="l" defTabSz="457200" rtl="0" eaLnBrk="1" latinLnBrk="0" hangingPunct="1">
+              <a:spcBef>
+                <a:spcPts val="1000"/>
+              </a:spcBef>
+              <a:spcAft>
+                <a:spcPts val="0"/>
+              </a:spcAft>
+              <a:buClr>
+                <a:schemeClr val="accent1"/>
+              </a:buClr>
+              <a:buSzPct val="80000"/>
+              <a:buFont typeface="Wingdings 3" charset="2"/>
+              <a:buChar char=""/>
+              <a:defRPr sz="1200" kern="1200">
+                <a:solidFill>
+                  <a:schemeClr val="tx1">
+                    <a:lumMod val="75000"/>
+                    <a:lumOff val="25000"/>
+                  </a:schemeClr>
+                </a:solidFill>
+                <a:latin typeface="+mn-lt"/>
+                <a:ea typeface="+mn-ea"/>
+                <a:cs typeface="+mn-cs"/>
+              </a:defRPr>
+            </a:lvl8pPr>
+            <a:lvl9pPr marL="3886200" indent="-228600" algn="l" defTabSz="457200" rtl="0" eaLnBrk="1" latinLnBrk="0" hangingPunct="1">
+              <a:spcBef>
+                <a:spcPts val="1000"/>
+              </a:spcBef>
+              <a:spcAft>
+                <a:spcPts val="0"/>
+              </a:spcAft>
+              <a:buClr>
+                <a:schemeClr val="accent1"/>
+              </a:buClr>
+              <a:buSzPct val="80000"/>
+              <a:buFont typeface="Wingdings 3" charset="2"/>
+              <a:buChar char=""/>
+              <a:defRPr sz="1200" kern="1200">
+                <a:solidFill>
+                  <a:schemeClr val="tx1">
+                    <a:lumMod val="75000"/>
+                    <a:lumOff val="25000"/>
+                  </a:schemeClr>
+                </a:solidFill>
+                <a:latin typeface="+mn-lt"/>
+                <a:ea typeface="+mn-ea"/>
+                <a:cs typeface="+mn-cs"/>
+              </a:defRPr>
+            </a:lvl9pPr>
+          </a:lstStyle>
           <a:p>
             <a:r>
               <a:rPr lang="it-IT" sz="2000" dirty="0"/>
-              <a:t>Scopi principali della replicazione:</a:t>
+              <a:t>Posso avere un’elezione nei seguenti casi:</a:t>
             </a:r>
           </a:p>
           <a:p>
             <a:pPr lvl="1"/>
             <a:r>
               <a:rPr lang="it-IT" sz="2000" dirty="0"/>
-              <a:t>Fornisce ridondanza dei dati, così ho un livello di tolleranza agli errori contro la perdita di un singolo server (</a:t>
+              <a:t>Aggiungendo un nuovo nodo al set di repliche.</a:t>
+            </a:r>
+          </a:p>
+          <a:p>
+            <a:pPr lvl="1"/>
+            <a:r>
+              <a:rPr lang="it-IT" sz="2000" dirty="0"/>
+              <a:t>Inizializzare un set di repliche.</a:t>
+            </a:r>
+          </a:p>
+          <a:p>
+            <a:pPr lvl="1"/>
+            <a:r>
+              <a:rPr lang="it-IT" sz="2000" dirty="0"/>
+              <a:t> Eseguire la manutenzione del set di repliche.</a:t>
+            </a:r>
+          </a:p>
+          <a:p>
+            <a:pPr lvl="1"/>
+            <a:r>
+              <a:rPr lang="it-IT" sz="2000" dirty="0"/>
+              <a:t> I nodi secondari perdono la connettività al primario per più del </a:t>
             </a:r>
             <a:r>
               <a:rPr lang="it-IT" sz="2000" dirty="0" err="1"/>
-              <a:t>Availability</a:t>
+              <a:t>timeout</a:t>
             </a:r>
             <a:r>
               <a:rPr lang="it-IT" sz="2000" dirty="0"/>
-              <a:t>).</a:t>
-            </a:r>
-          </a:p>
-          <a:p>
-            <a:pPr lvl="1"/>
-            <a:r>
-              <a:rPr lang="it-IT" sz="2000" dirty="0"/>
-              <a:t>Maggiore capacità di lettura, infatti i client possono inviare operazioni di lettura a server diversi.</a:t>
-            </a:r>
-          </a:p>
-          <a:p>
-            <a:pPr lvl="1"/>
-            <a:r>
-              <a:rPr lang="it-IT" sz="2000" dirty="0"/>
-              <a:t>Maggiore disponibilità per applicazioni distribuite.</a:t>
-            </a:r>
-          </a:p>
-          <a:p>
-            <a:pPr lvl="1"/>
-            <a:r>
-              <a:rPr lang="it-IT" sz="2000" dirty="0"/>
-              <a:t>Scopi dedicati come il backup</a:t>
-            </a:r>
-          </a:p>
-          <a:p>
-            <a:r>
-              <a:rPr lang="it-IT" sz="2000" dirty="0"/>
-              <a:t>Come funzione in </a:t>
-            </a:r>
-            <a:r>
-              <a:rPr lang="it-IT" sz="2000" dirty="0" err="1"/>
-              <a:t>MongoDB</a:t>
-            </a:r>
-            <a:r>
-              <a:rPr lang="it-IT" sz="2000" dirty="0"/>
-              <a:t>:</a:t>
-            </a:r>
-          </a:p>
-          <a:p>
-            <a:pPr lvl="1"/>
-            <a:r>
-              <a:rPr lang="it-IT" sz="2000" dirty="0"/>
-              <a:t>Ho un replica set che mantiene lo stesso set di dati.</a:t>
-            </a:r>
-          </a:p>
-          <a:p>
-            <a:pPr lvl="1"/>
-            <a:r>
-              <a:rPr lang="it-IT" sz="2000" dirty="0"/>
-              <a:t>Un replica set ha diversi nodi portanti e un nodo arbitro facoltativo.</a:t>
-            </a:r>
-          </a:p>
-          <a:p>
-            <a:pPr lvl="1"/>
-            <a:r>
-              <a:rPr lang="it-IT" sz="2000" dirty="0"/>
-              <a:t>Dei nodi portanti uno solo è considerato primario, mentre gli altri nodi sono considerati secondari.</a:t>
+              <a:t> configurato (10 secondi per default). </a:t>
             </a:r>
           </a:p>
         </p:txBody>
@@ -11950,7 +12244,7 @@
     </p:spTree>
     <p:extLst>
       <p:ext uri="{BB962C8B-B14F-4D97-AF65-F5344CB8AC3E}">
-        <p14:creationId xmlns:p14="http://schemas.microsoft.com/office/powerpoint/2010/main" val="3419229553"/>
+        <p14:creationId xmlns:p14="http://schemas.microsoft.com/office/powerpoint/2010/main" val="1275923587"/>
       </p:ext>
     </p:extLst>
   </p:cSld>
@@ -11982,7 +12276,7 @@
           <p:cNvPr id="2" name="Titolo 1">
             <a:extLst>
               <a:ext uri="{FF2B5EF4-FFF2-40B4-BE49-F238E27FC236}">
-                <a16:creationId xmlns:a16="http://schemas.microsoft.com/office/drawing/2014/main" id="{C34BB43E-7C0E-4277-AB2D-6D41651B4CF5}"/>
+                <a16:creationId xmlns:a16="http://schemas.microsoft.com/office/drawing/2014/main" id="{306E3E34-60AA-447B-AAF0-4A11CEF3540E}"/>
               </a:ext>
             </a:extLst>
           </p:cNvPr>
@@ -11995,70 +12289,27 @@
         </p:nvSpPr>
         <p:spPr>
           <a:xfrm>
-            <a:off x="581081" y="164432"/>
-            <a:ext cx="8596668" cy="617621"/>
+            <a:off x="677334" y="609600"/>
+            <a:ext cx="8596668" cy="737937"/>
           </a:xfrm>
         </p:spPr>
         <p:txBody>
-          <a:bodyPr>
-            <a:normAutofit fontScale="90000"/>
-          </a:bodyPr>
+          <a:bodyPr/>
           <a:lstStyle/>
           <a:p>
             <a:r>
               <a:rPr lang="it-IT" dirty="0"/>
-              <a:t>Nodi primari e Nodi secondari</a:t>
-            </a:r>
-          </a:p>
-        </p:txBody>
-      </p:sp>
-      <p:sp>
-        <p:nvSpPr>
-          <p:cNvPr id="3" name="Segnaposto contenuto 2">
+              <a:t>Configurazione processo di elezione</a:t>
+            </a:r>
+          </a:p>
+        </p:txBody>
+      </p:sp>
+      <p:sp>
+        <p:nvSpPr>
+          <p:cNvPr id="4" name="CasellaDiTesto 3">
             <a:extLst>
               <a:ext uri="{FF2B5EF4-FFF2-40B4-BE49-F238E27FC236}">
-                <a16:creationId xmlns:a16="http://schemas.microsoft.com/office/drawing/2014/main" id="{3F921689-5397-4128-9266-7EE889DB9C07}"/>
-              </a:ext>
-            </a:extLst>
-          </p:cNvPr>
-          <p:cNvSpPr>
-            <a:spLocks noGrp="1"/>
-          </p:cNvSpPr>
-          <p:nvPr>
-            <p:ph idx="1"/>
-          </p:nvPr>
-        </p:nvSpPr>
-        <p:spPr>
-          <a:xfrm>
-            <a:off x="581081" y="955048"/>
-            <a:ext cx="8596668" cy="1660358"/>
-          </a:xfrm>
-        </p:spPr>
-        <p:txBody>
-          <a:bodyPr>
-            <a:noAutofit/>
-          </a:bodyPr>
-          <a:lstStyle/>
-          <a:p>
-            <a:r>
-              <a:rPr lang="it-IT" sz="2000" dirty="0"/>
-              <a:t>Il Nodo primario riceve tutte le operazioni di scrittura. Di default anche quelle di lettura, ma quest’ultime posso essere dirette anche ai nodi secondari.</a:t>
-            </a:r>
-          </a:p>
-          <a:p>
-            <a:r>
-              <a:rPr lang="it-IT" sz="2000" dirty="0"/>
-              <a:t>Un Nodo di un replica set diventa il nodo primario attraverso un processo di elezioni.</a:t>
-            </a:r>
-          </a:p>
-        </p:txBody>
-      </p:sp>
-      <p:sp>
-        <p:nvSpPr>
-          <p:cNvPr id="6" name="CasellaDiTesto 5">
-            <a:extLst>
-              <a:ext uri="{FF2B5EF4-FFF2-40B4-BE49-F238E27FC236}">
-                <a16:creationId xmlns:a16="http://schemas.microsoft.com/office/drawing/2014/main" id="{1436BC69-C58B-40DB-975B-B9949D7085B5}"/>
+                <a16:creationId xmlns:a16="http://schemas.microsoft.com/office/drawing/2014/main" id="{0D9BDB9C-602C-438B-90EE-DFCBBDEDC5BF}"/>
               </a:ext>
             </a:extLst>
           </p:cNvPr>
@@ -12067,8 +12318,8 @@
         </p:nvSpPr>
         <p:spPr>
           <a:xfrm>
-            <a:off x="581081" y="2967335"/>
-            <a:ext cx="5514919" cy="461665"/>
+            <a:off x="5812263" y="1191127"/>
+            <a:ext cx="4764446" cy="5016758"/>
           </a:xfrm>
           <a:prstGeom prst="rect">
             <a:avLst/>
@@ -12076,328 +12327,594 @@
           <a:noFill/>
         </p:spPr>
         <p:txBody>
+          <a:bodyPr wrap="none" rtlCol="0">
+            <a:spAutoFit/>
+          </a:bodyPr>
+          <a:lstStyle/>
+          <a:p>
+            <a:r>
+              <a:rPr lang="it-IT" sz="2000" dirty="0"/>
+              <a:t> …</a:t>
+            </a:r>
+          </a:p>
+          <a:p>
+            <a:r>
+              <a:rPr lang="it-IT" sz="2000" dirty="0"/>
+              <a:t>  settings: </a:t>
+            </a:r>
+            <a:r>
+              <a:rPr lang="it-IT" sz="2000" dirty="0">
+                <a:solidFill>
+                  <a:schemeClr val="accent2"/>
+                </a:solidFill>
+              </a:rPr>
+              <a:t>{// settaggio per intero</a:t>
+            </a:r>
+          </a:p>
+          <a:p>
+            <a:r>
+              <a:rPr lang="it-IT" sz="2000" dirty="0">
+                <a:solidFill>
+                  <a:schemeClr val="accent2"/>
+                </a:solidFill>
+              </a:rPr>
+              <a:t>  replica set</a:t>
+            </a:r>
+          </a:p>
+          <a:p>
+            <a:r>
+              <a:rPr lang="it-IT" sz="2000" dirty="0"/>
+              <a:t>    </a:t>
+            </a:r>
+            <a:r>
+              <a:rPr lang="it-IT" sz="2000" dirty="0" err="1"/>
+              <a:t>chainingAllowed</a:t>
+            </a:r>
+            <a:r>
+              <a:rPr lang="it-IT" sz="2000" dirty="0"/>
+              <a:t> : &lt;</a:t>
+            </a:r>
+            <a:r>
+              <a:rPr lang="it-IT" sz="2000" dirty="0" err="1"/>
+              <a:t>boolean</a:t>
+            </a:r>
+            <a:r>
+              <a:rPr lang="it-IT" sz="2000" dirty="0"/>
+              <a:t>&gt;,</a:t>
+            </a:r>
+          </a:p>
+          <a:p>
+            <a:r>
+              <a:rPr lang="it-IT" sz="2000" dirty="0"/>
+              <a:t>    </a:t>
+            </a:r>
+            <a:r>
+              <a:rPr lang="it-IT" sz="2000" dirty="0" err="1"/>
+              <a:t>heartbeatIntervalMillis</a:t>
+            </a:r>
+            <a:r>
+              <a:rPr lang="it-IT" sz="2000" dirty="0"/>
+              <a:t> : &lt;</a:t>
+            </a:r>
+            <a:r>
+              <a:rPr lang="it-IT" sz="2000" dirty="0" err="1"/>
+              <a:t>int</a:t>
+            </a:r>
+            <a:r>
+              <a:rPr lang="it-IT" sz="2000" dirty="0"/>
+              <a:t>&gt;,</a:t>
+            </a:r>
+          </a:p>
+          <a:p>
+            <a:r>
+              <a:rPr lang="it-IT" sz="2000" dirty="0"/>
+              <a:t>    </a:t>
+            </a:r>
+            <a:r>
+              <a:rPr lang="it-IT" sz="2000" dirty="0" err="1"/>
+              <a:t>heartbeatTimeoutSecs</a:t>
+            </a:r>
+            <a:r>
+              <a:rPr lang="it-IT" sz="2000" dirty="0"/>
+              <a:t>: &lt;</a:t>
+            </a:r>
+            <a:r>
+              <a:rPr lang="it-IT" sz="2000" dirty="0" err="1"/>
+              <a:t>int</a:t>
+            </a:r>
+            <a:r>
+              <a:rPr lang="it-IT" sz="2000" dirty="0"/>
+              <a:t>&gt;,</a:t>
+            </a:r>
+          </a:p>
+          <a:p>
+            <a:r>
+              <a:rPr lang="it-IT" sz="2000" dirty="0"/>
+              <a:t>    </a:t>
+            </a:r>
+            <a:r>
+              <a:rPr lang="it-IT" sz="2000" dirty="0">
+                <a:solidFill>
+                  <a:schemeClr val="accent2"/>
+                </a:solidFill>
+              </a:rPr>
+              <a:t>// quanti secondi posso aspettare </a:t>
+            </a:r>
+          </a:p>
+          <a:p>
+            <a:r>
+              <a:rPr lang="it-IT" sz="2000" dirty="0">
+                <a:solidFill>
+                  <a:schemeClr val="accent2"/>
+                </a:solidFill>
+              </a:rPr>
+              <a:t>    per avere un messaggio </a:t>
+            </a:r>
+            <a:r>
+              <a:rPr lang="it-IT" sz="2000" dirty="0" err="1">
+                <a:solidFill>
+                  <a:schemeClr val="accent2"/>
+                </a:solidFill>
+              </a:rPr>
+              <a:t>heartbeat</a:t>
+            </a:r>
+            <a:r>
+              <a:rPr lang="it-IT" sz="2000" dirty="0">
+                <a:solidFill>
+                  <a:schemeClr val="accent2"/>
+                </a:solidFill>
+              </a:rPr>
+              <a:t> di </a:t>
+            </a:r>
+          </a:p>
+          <a:p>
+            <a:r>
+              <a:rPr lang="it-IT" sz="2000" dirty="0">
+                <a:solidFill>
+                  <a:schemeClr val="accent2"/>
+                </a:solidFill>
+              </a:rPr>
+              <a:t>    successo, default=10s</a:t>
+            </a:r>
+          </a:p>
+          <a:p>
+            <a:r>
+              <a:rPr lang="it-IT" sz="2000" dirty="0"/>
+              <a:t>    </a:t>
+            </a:r>
+            <a:r>
+              <a:rPr lang="it-IT" sz="2000" dirty="0" err="1"/>
+              <a:t>electionTimeoutMillis</a:t>
+            </a:r>
+            <a:r>
+              <a:rPr lang="it-IT" sz="2000" dirty="0"/>
+              <a:t> : &lt;</a:t>
+            </a:r>
+            <a:r>
+              <a:rPr lang="it-IT" sz="2000" dirty="0" err="1"/>
+              <a:t>int</a:t>
+            </a:r>
+            <a:r>
+              <a:rPr lang="it-IT" sz="2000" dirty="0"/>
+              <a:t>&gt;, </a:t>
+            </a:r>
+          </a:p>
+          <a:p>
+            <a:r>
+              <a:rPr lang="it-IT" sz="2000" dirty="0"/>
+              <a:t>    </a:t>
+            </a:r>
+            <a:r>
+              <a:rPr lang="it-IT" sz="2000" dirty="0">
+                <a:solidFill>
+                  <a:schemeClr val="accent2"/>
+                </a:solidFill>
+              </a:rPr>
+              <a:t>//identifica quando il </a:t>
+            </a:r>
+            <a:r>
+              <a:rPr lang="it-IT" sz="2000" dirty="0" err="1">
+                <a:solidFill>
+                  <a:schemeClr val="accent2"/>
+                </a:solidFill>
+              </a:rPr>
+              <a:t>primary</a:t>
+            </a:r>
+            <a:r>
+              <a:rPr lang="it-IT" sz="2000" dirty="0">
+                <a:solidFill>
+                  <a:schemeClr val="accent2"/>
+                </a:solidFill>
+              </a:rPr>
+              <a:t> </a:t>
+            </a:r>
+            <a:r>
+              <a:rPr lang="it-IT" sz="2000" dirty="0" err="1">
+                <a:solidFill>
+                  <a:schemeClr val="accent2"/>
+                </a:solidFill>
+              </a:rPr>
+              <a:t>node</a:t>
+            </a:r>
+            <a:r>
+              <a:rPr lang="it-IT" sz="2000" dirty="0">
+                <a:solidFill>
+                  <a:schemeClr val="accent2"/>
+                </a:solidFill>
+              </a:rPr>
+              <a:t> </a:t>
+            </a:r>
+          </a:p>
+          <a:p>
+            <a:r>
+              <a:rPr lang="it-IT" sz="2000" dirty="0">
+                <a:solidFill>
+                  <a:schemeClr val="accent2"/>
+                </a:solidFill>
+              </a:rPr>
+              <a:t>    è irraggiungibile</a:t>
+            </a:r>
+          </a:p>
+          <a:p>
+            <a:r>
+              <a:rPr lang="it-IT" sz="2000" dirty="0"/>
+              <a:t>    </a:t>
+            </a:r>
+            <a:r>
+              <a:rPr lang="it-IT" sz="2000" dirty="0" err="1"/>
+              <a:t>catchUpTimeoutMillis</a:t>
+            </a:r>
+            <a:r>
+              <a:rPr lang="it-IT" sz="2000" dirty="0"/>
+              <a:t> : &lt;</a:t>
+            </a:r>
+            <a:r>
+              <a:rPr lang="it-IT" sz="2000" dirty="0" err="1"/>
+              <a:t>int</a:t>
+            </a:r>
+            <a:r>
+              <a:rPr lang="it-IT" sz="2000" dirty="0"/>
+              <a:t>&gt;,</a:t>
+            </a:r>
+          </a:p>
+          <a:p>
+            <a:r>
+              <a:rPr lang="it-IT" sz="2000" dirty="0"/>
+              <a:t>    </a:t>
+            </a:r>
+            <a:r>
+              <a:rPr lang="it-IT" sz="2000" dirty="0" err="1"/>
+              <a:t>replicaSetId</a:t>
+            </a:r>
+            <a:r>
+              <a:rPr lang="it-IT" sz="2000" dirty="0"/>
+              <a:t>: &lt;</a:t>
+            </a:r>
+            <a:r>
+              <a:rPr lang="it-IT" sz="2000" dirty="0" err="1"/>
+              <a:t>ObjectId</a:t>
+            </a:r>
+            <a:r>
+              <a:rPr lang="it-IT" sz="2000" dirty="0"/>
+              <a:t>&gt;</a:t>
+            </a:r>
+          </a:p>
+          <a:p>
+            <a:r>
+              <a:rPr lang="it-IT" sz="2000" dirty="0"/>
+              <a:t>  }</a:t>
+            </a:r>
+          </a:p>
+          <a:p>
+            <a:r>
+              <a:rPr lang="it-IT" sz="2000" dirty="0"/>
+              <a:t>…</a:t>
+            </a:r>
+          </a:p>
+        </p:txBody>
+      </p:sp>
+      <p:sp>
+        <p:nvSpPr>
+          <p:cNvPr id="5" name="CasellaDiTesto 4">
+            <a:extLst>
+              <a:ext uri="{FF2B5EF4-FFF2-40B4-BE49-F238E27FC236}">
+                <a16:creationId xmlns:a16="http://schemas.microsoft.com/office/drawing/2014/main" id="{D7CF947C-2DE5-44F5-BFBA-033183D7C32E}"/>
+              </a:ext>
+            </a:extLst>
+          </p:cNvPr>
+          <p:cNvSpPr txBox="1"/>
+          <p:nvPr/>
+        </p:nvSpPr>
+        <p:spPr>
+          <a:xfrm>
+            <a:off x="245447" y="1191127"/>
+            <a:ext cx="4807816" cy="5909310"/>
+          </a:xfrm>
+          <a:prstGeom prst="rect">
+            <a:avLst/>
+          </a:prstGeom>
+          <a:noFill/>
+        </p:spPr>
+        <p:txBody>
           <a:bodyPr wrap="square" rtlCol="0">
             <a:spAutoFit/>
           </a:bodyPr>
           <a:lstStyle/>
           <a:p>
             <a:r>
-              <a:rPr lang="it-IT" sz="2400" dirty="0"/>
-              <a:t>Replica sete </a:t>
-            </a:r>
-            <a:r>
-              <a:rPr lang="it-IT" sz="2400" dirty="0" err="1"/>
-              <a:t>Elections</a:t>
-            </a:r>
-            <a:r>
-              <a:rPr lang="it-IT" sz="2400" dirty="0"/>
-              <a:t>:</a:t>
-            </a:r>
-          </a:p>
-        </p:txBody>
-      </p:sp>
-      <p:sp>
-        <p:nvSpPr>
-          <p:cNvPr id="8" name="Segnaposto contenuto 2">
-            <a:extLst>
-              <a:ext uri="{FF2B5EF4-FFF2-40B4-BE49-F238E27FC236}">
-                <a16:creationId xmlns:a16="http://schemas.microsoft.com/office/drawing/2014/main" id="{1289CDAC-1B35-4F01-BCE6-D1B3DBD5F38D}"/>
-              </a:ext>
-            </a:extLst>
-          </p:cNvPr>
-          <p:cNvSpPr txBox="1">
-            <a:spLocks/>
-          </p:cNvSpPr>
-          <p:nvPr/>
-        </p:nvSpPr>
-        <p:spPr>
-          <a:xfrm>
-            <a:off x="581081" y="3951019"/>
-            <a:ext cx="8596668" cy="3681662"/>
-          </a:xfrm>
-          <a:prstGeom prst="rect">
-            <a:avLst/>
-          </a:prstGeom>
-        </p:spPr>
-        <p:txBody>
-          <a:bodyPr vert="horz" lIns="91440" tIns="45720" rIns="91440" bIns="45720" rtlCol="0">
-            <a:normAutofit/>
-          </a:bodyPr>
-          <a:lstStyle>
-            <a:lvl1pPr marL="342900" indent="-342900" algn="l" defTabSz="457200" rtl="0" eaLnBrk="1" latinLnBrk="0" hangingPunct="1">
-              <a:spcBef>
-                <a:spcPts val="1000"/>
-              </a:spcBef>
-              <a:spcAft>
-                <a:spcPts val="0"/>
-              </a:spcAft>
-              <a:buClr>
-                <a:schemeClr val="accent1"/>
-              </a:buClr>
-              <a:buSzPct val="80000"/>
-              <a:buFont typeface="Wingdings 3" charset="2"/>
-              <a:buChar char=""/>
-              <a:defRPr sz="1800" kern="1200">
-                <a:solidFill>
-                  <a:schemeClr val="tx1">
-                    <a:lumMod val="75000"/>
-                    <a:lumOff val="25000"/>
-                  </a:schemeClr>
-                </a:solidFill>
-                <a:latin typeface="+mn-lt"/>
-                <a:ea typeface="+mn-ea"/>
-                <a:cs typeface="+mn-cs"/>
-              </a:defRPr>
-            </a:lvl1pPr>
-            <a:lvl2pPr marL="742950" indent="-285750" algn="l" defTabSz="457200" rtl="0" eaLnBrk="1" latinLnBrk="0" hangingPunct="1">
-              <a:spcBef>
-                <a:spcPts val="1000"/>
-              </a:spcBef>
-              <a:spcAft>
-                <a:spcPts val="0"/>
-              </a:spcAft>
-              <a:buClr>
-                <a:schemeClr val="accent1"/>
-              </a:buClr>
-              <a:buSzPct val="80000"/>
-              <a:buFont typeface="Wingdings 3" charset="2"/>
-              <a:buChar char=""/>
-              <a:defRPr sz="1600" kern="1200">
-                <a:solidFill>
-                  <a:schemeClr val="tx1">
-                    <a:lumMod val="75000"/>
-                    <a:lumOff val="25000"/>
-                  </a:schemeClr>
-                </a:solidFill>
-                <a:latin typeface="+mn-lt"/>
-                <a:ea typeface="+mn-ea"/>
-                <a:cs typeface="+mn-cs"/>
-              </a:defRPr>
-            </a:lvl2pPr>
-            <a:lvl3pPr marL="1143000" indent="-228600" algn="l" defTabSz="457200" rtl="0" eaLnBrk="1" latinLnBrk="0" hangingPunct="1">
-              <a:spcBef>
-                <a:spcPts val="1000"/>
-              </a:spcBef>
-              <a:spcAft>
-                <a:spcPts val="0"/>
-              </a:spcAft>
-              <a:buClr>
-                <a:schemeClr val="accent1"/>
-              </a:buClr>
-              <a:buSzPct val="80000"/>
-              <a:buFont typeface="Wingdings 3" charset="2"/>
-              <a:buChar char=""/>
-              <a:defRPr sz="1400" kern="1200">
-                <a:solidFill>
-                  <a:schemeClr val="tx1">
-                    <a:lumMod val="75000"/>
-                    <a:lumOff val="25000"/>
-                  </a:schemeClr>
-                </a:solidFill>
-                <a:latin typeface="+mn-lt"/>
-                <a:ea typeface="+mn-ea"/>
-                <a:cs typeface="+mn-cs"/>
-              </a:defRPr>
-            </a:lvl3pPr>
-            <a:lvl4pPr marL="1600200" indent="-228600" algn="l" defTabSz="457200" rtl="0" eaLnBrk="1" latinLnBrk="0" hangingPunct="1">
-              <a:spcBef>
-                <a:spcPts val="1000"/>
-              </a:spcBef>
-              <a:spcAft>
-                <a:spcPts val="0"/>
-              </a:spcAft>
-              <a:buClr>
-                <a:schemeClr val="accent1"/>
-              </a:buClr>
-              <a:buSzPct val="80000"/>
-              <a:buFont typeface="Wingdings 3" charset="2"/>
-              <a:buChar char=""/>
-              <a:defRPr sz="1200" kern="1200">
-                <a:solidFill>
-                  <a:schemeClr val="tx1">
-                    <a:lumMod val="75000"/>
-                    <a:lumOff val="25000"/>
-                  </a:schemeClr>
-                </a:solidFill>
-                <a:latin typeface="+mn-lt"/>
-                <a:ea typeface="+mn-ea"/>
-                <a:cs typeface="+mn-cs"/>
-              </a:defRPr>
-            </a:lvl4pPr>
-            <a:lvl5pPr marL="2057400" indent="-228600" algn="l" defTabSz="457200" rtl="0" eaLnBrk="1" latinLnBrk="0" hangingPunct="1">
-              <a:spcBef>
-                <a:spcPts val="1000"/>
-              </a:spcBef>
-              <a:spcAft>
-                <a:spcPts val="0"/>
-              </a:spcAft>
-              <a:buClr>
-                <a:schemeClr val="accent1"/>
-              </a:buClr>
-              <a:buSzPct val="80000"/>
-              <a:buFont typeface="Wingdings 3" charset="2"/>
-              <a:buChar char=""/>
-              <a:defRPr sz="1200" kern="1200">
-                <a:solidFill>
-                  <a:schemeClr val="tx1">
-                    <a:lumMod val="75000"/>
-                    <a:lumOff val="25000"/>
-                  </a:schemeClr>
-                </a:solidFill>
-                <a:latin typeface="+mn-lt"/>
-                <a:ea typeface="+mn-ea"/>
-                <a:cs typeface="+mn-cs"/>
-              </a:defRPr>
-            </a:lvl5pPr>
-            <a:lvl6pPr marL="2514600" indent="-228600" algn="l" defTabSz="457200" rtl="0" eaLnBrk="1" latinLnBrk="0" hangingPunct="1">
-              <a:spcBef>
-                <a:spcPts val="1000"/>
-              </a:spcBef>
-              <a:spcAft>
-                <a:spcPts val="0"/>
-              </a:spcAft>
-              <a:buClr>
-                <a:schemeClr val="accent1"/>
-              </a:buClr>
-              <a:buSzPct val="80000"/>
-              <a:buFont typeface="Wingdings 3" charset="2"/>
-              <a:buChar char=""/>
-              <a:defRPr sz="1200" kern="1200">
-                <a:solidFill>
-                  <a:schemeClr val="tx1">
-                    <a:lumMod val="75000"/>
-                    <a:lumOff val="25000"/>
-                  </a:schemeClr>
-                </a:solidFill>
-                <a:latin typeface="+mn-lt"/>
-                <a:ea typeface="+mn-ea"/>
-                <a:cs typeface="+mn-cs"/>
-              </a:defRPr>
-            </a:lvl6pPr>
-            <a:lvl7pPr marL="2971800" indent="-228600" algn="l" defTabSz="457200" rtl="0" eaLnBrk="1" latinLnBrk="0" hangingPunct="1">
-              <a:spcBef>
-                <a:spcPts val="1000"/>
-              </a:spcBef>
-              <a:spcAft>
-                <a:spcPts val="0"/>
-              </a:spcAft>
-              <a:buClr>
-                <a:schemeClr val="accent1"/>
-              </a:buClr>
-              <a:buSzPct val="80000"/>
-              <a:buFont typeface="Wingdings 3" charset="2"/>
-              <a:buChar char=""/>
-              <a:defRPr sz="1200" kern="1200">
-                <a:solidFill>
-                  <a:schemeClr val="tx1">
-                    <a:lumMod val="75000"/>
-                    <a:lumOff val="25000"/>
-                  </a:schemeClr>
-                </a:solidFill>
-                <a:latin typeface="+mn-lt"/>
-                <a:ea typeface="+mn-ea"/>
-                <a:cs typeface="+mn-cs"/>
-              </a:defRPr>
-            </a:lvl7pPr>
-            <a:lvl8pPr marL="3429000" indent="-228600" algn="l" defTabSz="457200" rtl="0" eaLnBrk="1" latinLnBrk="0" hangingPunct="1">
-              <a:spcBef>
-                <a:spcPts val="1000"/>
-              </a:spcBef>
-              <a:spcAft>
-                <a:spcPts val="0"/>
-              </a:spcAft>
-              <a:buClr>
-                <a:schemeClr val="accent1"/>
-              </a:buClr>
-              <a:buSzPct val="80000"/>
-              <a:buFont typeface="Wingdings 3" charset="2"/>
-              <a:buChar char=""/>
-              <a:defRPr sz="1200" kern="1200">
-                <a:solidFill>
-                  <a:schemeClr val="tx1">
-                    <a:lumMod val="75000"/>
-                    <a:lumOff val="25000"/>
-                  </a:schemeClr>
-                </a:solidFill>
-                <a:latin typeface="+mn-lt"/>
-                <a:ea typeface="+mn-ea"/>
-                <a:cs typeface="+mn-cs"/>
-              </a:defRPr>
-            </a:lvl8pPr>
-            <a:lvl9pPr marL="3886200" indent="-228600" algn="l" defTabSz="457200" rtl="0" eaLnBrk="1" latinLnBrk="0" hangingPunct="1">
-              <a:spcBef>
-                <a:spcPts val="1000"/>
-              </a:spcBef>
-              <a:spcAft>
-                <a:spcPts val="0"/>
-              </a:spcAft>
-              <a:buClr>
-                <a:schemeClr val="accent1"/>
-              </a:buClr>
-              <a:buSzPct val="80000"/>
-              <a:buFont typeface="Wingdings 3" charset="2"/>
-              <a:buChar char=""/>
-              <a:defRPr sz="1200" kern="1200">
-                <a:solidFill>
-                  <a:schemeClr val="tx1">
-                    <a:lumMod val="75000"/>
-                    <a:lumOff val="25000"/>
-                  </a:schemeClr>
-                </a:solidFill>
-                <a:latin typeface="+mn-lt"/>
-                <a:ea typeface="+mn-ea"/>
-                <a:cs typeface="+mn-cs"/>
-              </a:defRPr>
-            </a:lvl9pPr>
-          </a:lstStyle>
-          <a:p>
-            <a:r>
               <a:rPr lang="it-IT" sz="2000" dirty="0"/>
-              <a:t>Posso avere un’elezione nei seguenti casi:</a:t>
-            </a:r>
-          </a:p>
-          <a:p>
-            <a:pPr lvl="1"/>
+              <a:t>…</a:t>
+            </a:r>
+          </a:p>
+          <a:p>
+            <a:r>
+              <a:rPr lang="it-IT" sz="2000" dirty="0" err="1"/>
+              <a:t>members</a:t>
+            </a:r>
             <a:r>
               <a:rPr lang="it-IT" sz="2000" dirty="0"/>
-              <a:t>Aggiungendo un nuovo nodo al set di repliche.</a:t>
-            </a:r>
-          </a:p>
-          <a:p>
-            <a:pPr lvl="1"/>
+              <a:t>: [ </a:t>
+            </a:r>
+            <a:r>
+              <a:rPr lang="it-IT" sz="2000" dirty="0">
+                <a:solidFill>
+                  <a:schemeClr val="accent2"/>
+                </a:solidFill>
+              </a:rPr>
+              <a:t>//array per ogni membro</a:t>
+            </a:r>
+          </a:p>
+          <a:p>
             <a:r>
               <a:rPr lang="it-IT" sz="2000" dirty="0"/>
-              <a:t>Inizializzare un set di repliche.</a:t>
-            </a:r>
-          </a:p>
-          <a:p>
-            <a:pPr lvl="1"/>
+              <a:t>    {</a:t>
+            </a:r>
+          </a:p>
+          <a:p>
             <a:r>
               <a:rPr lang="it-IT" sz="2000" dirty="0"/>
-              <a:t> Eseguire la manutenzione del set di repliche.</a:t>
-            </a:r>
-          </a:p>
-          <a:p>
-            <a:pPr lvl="1"/>
+              <a:t>      _id: &lt;</a:t>
+            </a:r>
+            <a:r>
+              <a:rPr lang="it-IT" sz="2000" dirty="0" err="1"/>
+              <a:t>int</a:t>
+            </a:r>
             <a:r>
               <a:rPr lang="it-IT" sz="2000" dirty="0"/>
-              <a:t> I nodi secondari perdono la connettività al primario per più del </a:t>
+              <a:t>&gt;, </a:t>
+            </a:r>
+            <a:r>
+              <a:rPr lang="it-IT" sz="2000" dirty="0">
+                <a:solidFill>
+                  <a:schemeClr val="accent2"/>
+                </a:solidFill>
+              </a:rPr>
+              <a:t>//Identifica membro</a:t>
+            </a:r>
+          </a:p>
+          <a:p>
+            <a:r>
+              <a:rPr lang="it-IT" sz="2000" dirty="0"/>
+              <a:t>      </a:t>
             </a:r>
             <a:r>
               <a:rPr lang="it-IT" sz="2000" dirty="0" err="1"/>
-              <a:t>timeout</a:t>
+              <a:t>host</a:t>
             </a:r>
             <a:r>
               <a:rPr lang="it-IT" sz="2000" dirty="0"/>
-              <a:t> configurato (10 secondi per default). </a:t>
-            </a:r>
+              <a:t>: &lt;</a:t>
+            </a:r>
+            <a:r>
+              <a:rPr lang="it-IT" sz="2000" dirty="0" err="1"/>
+              <a:t>string</a:t>
+            </a:r>
+            <a:r>
+              <a:rPr lang="it-IT" sz="2000" dirty="0"/>
+              <a:t>&gt;, </a:t>
+            </a:r>
+            <a:r>
+              <a:rPr lang="it-IT" sz="2000" dirty="0">
+                <a:solidFill>
+                  <a:schemeClr val="accent2"/>
+                </a:solidFill>
+              </a:rPr>
+              <a:t>// nome </a:t>
+            </a:r>
+            <a:r>
+              <a:rPr lang="it-IT" sz="2000" dirty="0" err="1">
+                <a:solidFill>
+                  <a:schemeClr val="accent2"/>
+                </a:solidFill>
+              </a:rPr>
+              <a:t>host</a:t>
+            </a:r>
+            <a:r>
+              <a:rPr lang="it-IT" sz="2000" dirty="0">
+                <a:solidFill>
+                  <a:schemeClr val="accent2"/>
+                </a:solidFill>
+              </a:rPr>
+              <a:t> e porta</a:t>
+            </a:r>
+          </a:p>
+          <a:p>
+            <a:r>
+              <a:rPr lang="it-IT" sz="2000" dirty="0"/>
+              <a:t>      </a:t>
+            </a:r>
+            <a:r>
+              <a:rPr lang="it-IT" sz="2000" dirty="0" err="1"/>
+              <a:t>arbiterOnly</a:t>
+            </a:r>
+            <a:r>
+              <a:rPr lang="it-IT" sz="2000" dirty="0"/>
+              <a:t>: &lt;</a:t>
+            </a:r>
+            <a:r>
+              <a:rPr lang="it-IT" sz="2000" dirty="0" err="1"/>
+              <a:t>boolean</a:t>
+            </a:r>
+            <a:r>
+              <a:rPr lang="it-IT" sz="2000" dirty="0"/>
+              <a:t>&gt;,</a:t>
+            </a:r>
+          </a:p>
+          <a:p>
+            <a:r>
+              <a:rPr lang="it-IT" sz="2000" dirty="0"/>
+              <a:t>      </a:t>
+            </a:r>
+            <a:r>
+              <a:rPr lang="it-IT" sz="2000" dirty="0" err="1"/>
+              <a:t>buildIndexes</a:t>
+            </a:r>
+            <a:r>
+              <a:rPr lang="it-IT" sz="2000" dirty="0"/>
+              <a:t>: &lt;</a:t>
+            </a:r>
+            <a:r>
+              <a:rPr lang="it-IT" sz="2000" dirty="0" err="1"/>
+              <a:t>boolean</a:t>
+            </a:r>
+            <a:r>
+              <a:rPr lang="it-IT" sz="2000" dirty="0"/>
+              <a:t>&gt;,</a:t>
+            </a:r>
+          </a:p>
+          <a:p>
+            <a:r>
+              <a:rPr lang="it-IT" sz="2000" dirty="0"/>
+              <a:t>      </a:t>
+            </a:r>
+            <a:r>
+              <a:rPr lang="it-IT" sz="2000" dirty="0" err="1"/>
+              <a:t>hidden</a:t>
+            </a:r>
+            <a:r>
+              <a:rPr lang="it-IT" sz="2000" dirty="0"/>
+              <a:t>: &lt;</a:t>
+            </a:r>
+            <a:r>
+              <a:rPr lang="it-IT" sz="2000" dirty="0" err="1"/>
+              <a:t>boolean</a:t>
+            </a:r>
+            <a:r>
+              <a:rPr lang="it-IT" sz="2000" dirty="0"/>
+              <a:t>&gt;,</a:t>
+            </a:r>
+          </a:p>
+          <a:p>
+            <a:r>
+              <a:rPr lang="it-IT" sz="2000" dirty="0"/>
+              <a:t>      </a:t>
+            </a:r>
+            <a:r>
+              <a:rPr lang="it-IT" sz="2000" dirty="0" err="1"/>
+              <a:t>priority</a:t>
+            </a:r>
+            <a:r>
+              <a:rPr lang="it-IT" sz="2000" dirty="0"/>
+              <a:t>: &lt;</a:t>
+            </a:r>
+            <a:r>
+              <a:rPr lang="it-IT" sz="2000" dirty="0" err="1"/>
+              <a:t>number</a:t>
+            </a:r>
+            <a:r>
+              <a:rPr lang="it-IT" sz="2000" dirty="0"/>
+              <a:t>&gt; </a:t>
+            </a:r>
+            <a:r>
+              <a:rPr lang="it-IT" sz="2000" dirty="0">
+                <a:solidFill>
+                  <a:schemeClr val="accent2"/>
+                </a:solidFill>
+              </a:rPr>
+              <a:t>// Un numero 	che indica l'idoneità relativa di un 	membro a diventare primario.(0-	1000)</a:t>
+            </a:r>
+          </a:p>
+          <a:p>
+            <a:r>
+              <a:rPr lang="it-IT" sz="2000" dirty="0"/>
+              <a:t>      tags: &lt;</a:t>
+            </a:r>
+            <a:r>
+              <a:rPr lang="it-IT" sz="2000" dirty="0" err="1"/>
+              <a:t>document</a:t>
+            </a:r>
+            <a:r>
+              <a:rPr lang="it-IT" sz="2000" dirty="0"/>
+              <a:t>&gt;,</a:t>
+            </a:r>
+          </a:p>
+          <a:p>
+            <a:r>
+              <a:rPr lang="it-IT" sz="2000" dirty="0"/>
+              <a:t>      </a:t>
+            </a:r>
+            <a:r>
+              <a:rPr lang="it-IT" sz="2000" dirty="0" err="1"/>
+              <a:t>secondaryDelaySecs</a:t>
+            </a:r>
+            <a:r>
+              <a:rPr lang="it-IT" sz="2000" dirty="0"/>
+              <a:t>: &lt;</a:t>
+            </a:r>
+            <a:r>
+              <a:rPr lang="it-IT" sz="2000" dirty="0" err="1"/>
+              <a:t>int</a:t>
+            </a:r>
+            <a:r>
+              <a:rPr lang="it-IT" sz="2000" dirty="0"/>
+              <a:t>&gt;,</a:t>
+            </a:r>
+          </a:p>
+          <a:p>
+            <a:r>
+              <a:rPr lang="it-IT" sz="2000" dirty="0"/>
+              <a:t>      </a:t>
+            </a:r>
+            <a:r>
+              <a:rPr lang="it-IT" sz="2000" dirty="0" err="1"/>
+              <a:t>votes</a:t>
+            </a:r>
+            <a:r>
+              <a:rPr lang="it-IT" sz="2000" dirty="0"/>
+              <a:t>: &lt;</a:t>
+            </a:r>
+            <a:r>
+              <a:rPr lang="it-IT" sz="2000" dirty="0" err="1"/>
+              <a:t>number</a:t>
+            </a:r>
+            <a:r>
+              <a:rPr lang="it-IT" sz="2000" dirty="0">
+                <a:solidFill>
+                  <a:schemeClr val="accent2"/>
+                </a:solidFill>
+              </a:rPr>
+              <a:t>&gt;// Il numero di voti 	che un server esprimerà in 	un'elezione (0-1) </a:t>
+            </a:r>
+            <a:r>
+              <a:rPr lang="it-IT" sz="2000" dirty="0"/>
+              <a:t>},</a:t>
+            </a:r>
+          </a:p>
+          <a:p>
+            <a:r>
+              <a:rPr lang="it-IT" sz="2000" dirty="0"/>
+              <a:t>    ...</a:t>
+            </a:r>
+          </a:p>
+          <a:p>
+            <a:endParaRPr lang="it-IT" dirty="0"/>
           </a:p>
         </p:txBody>
       </p:sp>
     </p:spTree>
     <p:extLst>
       <p:ext uri="{BB962C8B-B14F-4D97-AF65-F5344CB8AC3E}">
-        <p14:creationId xmlns:p14="http://schemas.microsoft.com/office/powerpoint/2010/main" val="1275923587"/>
+        <p14:creationId xmlns:p14="http://schemas.microsoft.com/office/powerpoint/2010/main" val="2529083846"/>
       </p:ext>
     </p:extLst>
   </p:cSld>

</xml_diff>

<commit_message>
Inizio shard-key... to be continued
</commit_message>
<xml_diff>
--- a/Presentazione_progetto.pptx
+++ b/Presentazione_progetto.pptx
@@ -5,7 +5,7 @@
     <p:sldMasterId id="2147483672" r:id="rId1"/>
   </p:sldMasterIdLst>
   <p:notesMasterIdLst>
-    <p:notesMasterId r:id="rId20"/>
+    <p:notesMasterId r:id="rId22"/>
   </p:notesMasterIdLst>
   <p:sldIdLst>
     <p:sldId id="256" r:id="rId2"/>
@@ -26,6 +26,8 @@
     <p:sldId id="273" r:id="rId17"/>
     <p:sldId id="274" r:id="rId18"/>
     <p:sldId id="263" r:id="rId19"/>
+    <p:sldId id="275" r:id="rId20"/>
+    <p:sldId id="276" r:id="rId21"/>
   </p:sldIdLst>
   <p:sldSz cx="12192000" cy="6858000"/>
   <p:notesSz cx="6858000" cy="9144000"/>
@@ -214,7 +216,7 @@
           <a:p>
             <a:fld id="{5D86E91A-6C9D-48EA-9EAF-BBA9F3961CF9}" type="datetimeFigureOut">
               <a:rPr lang="it-IT" smtClean="0"/>
-              <a:t>18/03/2022</a:t>
+              <a:t>19/03/2022</a:t>
             </a:fld>
             <a:endParaRPr lang="it-IT"/>
           </a:p>
@@ -755,6 +757,97 @@
     <p:extLst>
       <p:ext uri="{BB962C8B-B14F-4D97-AF65-F5344CB8AC3E}">
         <p14:creationId xmlns:p14="http://schemas.microsoft.com/office/powerpoint/2010/main" val="1108071276"/>
+      </p:ext>
+    </p:extLst>
+  </p:cSld>
+  <p:clrMapOvr>
+    <a:masterClrMapping/>
+  </p:clrMapOvr>
+</p:notes>
+</file>
+
+<file path=ppt/notesSlides/notesSlide11.xml><?xml version="1.0" encoding="utf-8"?>
+<p:notes xmlns:a="http://schemas.openxmlformats.org/drawingml/2006/main" xmlns:r="http://schemas.openxmlformats.org/officeDocument/2006/relationships" xmlns:p="http://schemas.openxmlformats.org/presentationml/2006/main">
+  <p:cSld>
+    <p:spTree>
+      <p:nvGrpSpPr>
+        <p:cNvPr id="1" name=""/>
+        <p:cNvGrpSpPr/>
+        <p:nvPr/>
+      </p:nvGrpSpPr>
+      <p:grpSpPr>
+        <a:xfrm>
+          <a:off x="0" y="0"/>
+          <a:ext cx="0" cy="0"/>
+          <a:chOff x="0" y="0"/>
+          <a:chExt cx="0" cy="0"/>
+        </a:xfrm>
+      </p:grpSpPr>
+      <p:sp>
+        <p:nvSpPr>
+          <p:cNvPr id="2" name="Segnaposto immagine diapositiva 1"/>
+          <p:cNvSpPr>
+            <a:spLocks noGrp="1" noRot="1" noChangeAspect="1"/>
+          </p:cNvSpPr>
+          <p:nvPr>
+            <p:ph type="sldImg"/>
+          </p:nvPr>
+        </p:nvSpPr>
+        <p:spPr/>
+      </p:sp>
+      <p:sp>
+        <p:nvSpPr>
+          <p:cNvPr id="3" name="Segnaposto note 2"/>
+          <p:cNvSpPr>
+            <a:spLocks noGrp="1"/>
+          </p:cNvSpPr>
+          <p:nvPr>
+            <p:ph type="body" idx="1"/>
+          </p:nvPr>
+        </p:nvSpPr>
+        <p:spPr/>
+        <p:txBody>
+          <a:bodyPr/>
+          <a:lstStyle/>
+          <a:p>
+            <a:r>
+              <a:rPr lang="it-IT" b="1" dirty="0" err="1"/>
+              <a:t>Sharding</a:t>
+            </a:r>
+            <a:r>
+              <a:rPr lang="it-IT" dirty="0"/>
+              <a:t>: metodo per distribuire i dati attraverso macchine multiple.</a:t>
+            </a:r>
+          </a:p>
+        </p:txBody>
+      </p:sp>
+      <p:sp>
+        <p:nvSpPr>
+          <p:cNvPr id="4" name="Segnaposto numero diapositiva 3"/>
+          <p:cNvSpPr>
+            <a:spLocks noGrp="1"/>
+          </p:cNvSpPr>
+          <p:nvPr>
+            <p:ph type="sldNum" sz="quarter" idx="5"/>
+          </p:nvPr>
+        </p:nvSpPr>
+        <p:spPr/>
+        <p:txBody>
+          <a:bodyPr/>
+          <a:lstStyle/>
+          <a:p>
+            <a:fld id="{7B9EF5EE-42ED-4142-B01A-B637985E9B70}" type="slidenum">
+              <a:rPr lang="it-IT" smtClean="0"/>
+              <a:t>18</a:t>
+            </a:fld>
+            <a:endParaRPr lang="it-IT"/>
+          </a:p>
+        </p:txBody>
+      </p:sp>
+    </p:spTree>
+    <p:extLst>
+      <p:ext uri="{BB962C8B-B14F-4D97-AF65-F5344CB8AC3E}">
+        <p14:creationId xmlns:p14="http://schemas.microsoft.com/office/powerpoint/2010/main" val="2423137204"/>
       </p:ext>
     </p:extLst>
   </p:cSld>
@@ -2470,7 +2563,7 @@
           <a:p>
             <a:fld id="{5EEC1FBE-7A50-402B-9218-00262FCB5F53}" type="datetimeFigureOut">
               <a:rPr lang="it-IT" smtClean="0"/>
-              <a:t>18/03/2022</a:t>
+              <a:t>19/03/2022</a:t>
             </a:fld>
             <a:endParaRPr lang="it-IT"/>
           </a:p>
@@ -2721,7 +2814,7 @@
           <a:p>
             <a:fld id="{5EEC1FBE-7A50-402B-9218-00262FCB5F53}" type="datetimeFigureOut">
               <a:rPr lang="it-IT" smtClean="0"/>
-              <a:t>18/03/2022</a:t>
+              <a:t>19/03/2022</a:t>
             </a:fld>
             <a:endParaRPr lang="it-IT"/>
           </a:p>
@@ -3035,7 +3128,7 @@
           <a:p>
             <a:fld id="{5EEC1FBE-7A50-402B-9218-00262FCB5F53}" type="datetimeFigureOut">
               <a:rPr lang="it-IT" smtClean="0"/>
-              <a:t>18/03/2022</a:t>
+              <a:t>19/03/2022</a:t>
             </a:fld>
             <a:endParaRPr lang="it-IT"/>
           </a:p>
@@ -3376,7 +3469,7 @@
           <a:p>
             <a:fld id="{5EEC1FBE-7A50-402B-9218-00262FCB5F53}" type="datetimeFigureOut">
               <a:rPr lang="it-IT" smtClean="0"/>
-              <a:t>18/03/2022</a:t>
+              <a:t>19/03/2022</a:t>
             </a:fld>
             <a:endParaRPr lang="it-IT"/>
           </a:p>
@@ -3690,7 +3783,7 @@
           <a:p>
             <a:fld id="{5EEC1FBE-7A50-402B-9218-00262FCB5F53}" type="datetimeFigureOut">
               <a:rPr lang="it-IT" smtClean="0"/>
-              <a:t>18/03/2022</a:t>
+              <a:t>19/03/2022</a:t>
             </a:fld>
             <a:endParaRPr lang="it-IT"/>
           </a:p>
@@ -4083,7 +4176,7 @@
           <a:p>
             <a:fld id="{5EEC1FBE-7A50-402B-9218-00262FCB5F53}" type="datetimeFigureOut">
               <a:rPr lang="it-IT" smtClean="0"/>
-              <a:t>18/03/2022</a:t>
+              <a:t>19/03/2022</a:t>
             </a:fld>
             <a:endParaRPr lang="it-IT"/>
           </a:p>
@@ -4253,7 +4346,7 @@
           <a:p>
             <a:fld id="{5EEC1FBE-7A50-402B-9218-00262FCB5F53}" type="datetimeFigureOut">
               <a:rPr lang="it-IT" smtClean="0"/>
-              <a:t>18/03/2022</a:t>
+              <a:t>19/03/2022</a:t>
             </a:fld>
             <a:endParaRPr lang="it-IT"/>
           </a:p>
@@ -4433,7 +4526,7 @@
           <a:p>
             <a:fld id="{5EEC1FBE-7A50-402B-9218-00262FCB5F53}" type="datetimeFigureOut">
               <a:rPr lang="it-IT" smtClean="0"/>
-              <a:t>18/03/2022</a:t>
+              <a:t>19/03/2022</a:t>
             </a:fld>
             <a:endParaRPr lang="it-IT"/>
           </a:p>
@@ -4609,7 +4702,7 @@
           <a:p>
             <a:fld id="{5EEC1FBE-7A50-402B-9218-00262FCB5F53}" type="datetimeFigureOut">
               <a:rPr lang="it-IT" smtClean="0"/>
-              <a:t>18/03/2022</a:t>
+              <a:t>19/03/2022</a:t>
             </a:fld>
             <a:endParaRPr lang="it-IT"/>
           </a:p>
@@ -4856,7 +4949,7 @@
           <a:p>
             <a:fld id="{5EEC1FBE-7A50-402B-9218-00262FCB5F53}" type="datetimeFigureOut">
               <a:rPr lang="it-IT" smtClean="0"/>
-              <a:t>18/03/2022</a:t>
+              <a:t>19/03/2022</a:t>
             </a:fld>
             <a:endParaRPr lang="it-IT"/>
           </a:p>
@@ -5088,7 +5181,7 @@
           <a:p>
             <a:fld id="{5EEC1FBE-7A50-402B-9218-00262FCB5F53}" type="datetimeFigureOut">
               <a:rPr lang="it-IT" smtClean="0"/>
-              <a:t>18/03/2022</a:t>
+              <a:t>19/03/2022</a:t>
             </a:fld>
             <a:endParaRPr lang="it-IT"/>
           </a:p>
@@ -5462,7 +5555,7 @@
           <a:p>
             <a:fld id="{5EEC1FBE-7A50-402B-9218-00262FCB5F53}" type="datetimeFigureOut">
               <a:rPr lang="it-IT" smtClean="0"/>
-              <a:t>18/03/2022</a:t>
+              <a:t>19/03/2022</a:t>
             </a:fld>
             <a:endParaRPr lang="it-IT"/>
           </a:p>
@@ -5585,7 +5678,7 @@
           <a:p>
             <a:fld id="{5EEC1FBE-7A50-402B-9218-00262FCB5F53}" type="datetimeFigureOut">
               <a:rPr lang="it-IT" smtClean="0"/>
-              <a:t>18/03/2022</a:t>
+              <a:t>19/03/2022</a:t>
             </a:fld>
             <a:endParaRPr lang="it-IT"/>
           </a:p>
@@ -5680,7 +5773,7 @@
           <a:p>
             <a:fld id="{5EEC1FBE-7A50-402B-9218-00262FCB5F53}" type="datetimeFigureOut">
               <a:rPr lang="it-IT" smtClean="0"/>
-              <a:t>18/03/2022</a:t>
+              <a:t>19/03/2022</a:t>
             </a:fld>
             <a:endParaRPr lang="it-IT"/>
           </a:p>
@@ -5935,7 +6028,7 @@
           <a:p>
             <a:fld id="{5EEC1FBE-7A50-402B-9218-00262FCB5F53}" type="datetimeFigureOut">
               <a:rPr lang="it-IT" smtClean="0"/>
-              <a:t>18/03/2022</a:t>
+              <a:t>19/03/2022</a:t>
             </a:fld>
             <a:endParaRPr lang="it-IT"/>
           </a:p>
@@ -6198,7 +6291,7 @@
           <a:p>
             <a:fld id="{5EEC1FBE-7A50-402B-9218-00262FCB5F53}" type="datetimeFigureOut">
               <a:rPr lang="it-IT" smtClean="0"/>
-              <a:t>18/03/2022</a:t>
+              <a:t>19/03/2022</a:t>
             </a:fld>
             <a:endParaRPr lang="it-IT"/>
           </a:p>
@@ -6941,7 +7034,7 @@
           <a:p>
             <a:fld id="{5EEC1FBE-7A50-402B-9218-00262FCB5F53}" type="datetimeFigureOut">
               <a:rPr lang="it-IT" smtClean="0"/>
-              <a:t>18/03/2022</a:t>
+              <a:t>19/03/2022</a:t>
             </a:fld>
             <a:endParaRPr lang="it-IT"/>
           </a:p>
@@ -9967,12 +10060,123 @@
             <p:ph idx="1"/>
           </p:nvPr>
         </p:nvSpPr>
-        <p:spPr/>
+        <p:spPr>
+          <a:xfrm>
+            <a:off x="677334" y="2160589"/>
+            <a:ext cx="8596668" cy="3037053"/>
+          </a:xfrm>
+        </p:spPr>
         <p:txBody>
           <a:bodyPr/>
           <a:lstStyle/>
           <a:p>
-            <a:endParaRPr lang="it-IT" dirty="0"/>
+            <a:r>
+              <a:rPr lang="it-IT" dirty="0" err="1"/>
+              <a:t>MongoDB</a:t>
+            </a:r>
+            <a:r>
+              <a:rPr lang="it-IT" dirty="0"/>
+              <a:t> supporta lo scaling orizzontale attraverso lo </a:t>
+            </a:r>
+            <a:r>
+              <a:rPr lang="it-IT" dirty="0" err="1"/>
+              <a:t>sharding</a:t>
+            </a:r>
+            <a:r>
+              <a:rPr lang="it-IT" dirty="0"/>
+              <a:t>.</a:t>
+            </a:r>
+          </a:p>
+          <a:p>
+            <a:r>
+              <a:rPr lang="it-IT" dirty="0"/>
+              <a:t>Componenti del </a:t>
+            </a:r>
+            <a:r>
+              <a:rPr lang="it-IT" dirty="0" err="1"/>
+              <a:t>Sharded</a:t>
+            </a:r>
+            <a:r>
+              <a:rPr lang="it-IT" dirty="0"/>
+              <a:t> Cluster di </a:t>
+            </a:r>
+            <a:r>
+              <a:rPr lang="it-IT" dirty="0" err="1"/>
+              <a:t>MongoDB</a:t>
+            </a:r>
+            <a:r>
+              <a:rPr lang="it-IT" dirty="0"/>
+              <a:t>:</a:t>
+            </a:r>
+          </a:p>
+          <a:p>
+            <a:pPr lvl="1"/>
+            <a:r>
+              <a:rPr lang="it-IT" dirty="0" err="1">
+                <a:solidFill>
+                  <a:schemeClr val="accent2"/>
+                </a:solidFill>
+              </a:rPr>
+              <a:t>Shard</a:t>
+            </a:r>
+            <a:r>
+              <a:rPr lang="it-IT" dirty="0"/>
+              <a:t>: Contiene un subset dei dati e insieme tutti i </a:t>
+            </a:r>
+            <a:r>
+              <a:rPr lang="it-IT" dirty="0" err="1"/>
+              <a:t>shard</a:t>
+            </a:r>
+            <a:r>
+              <a:rPr lang="it-IT" dirty="0"/>
+              <a:t> formano l’intero data set de dati del </a:t>
+            </a:r>
+            <a:r>
+              <a:rPr lang="it-IT" dirty="0" err="1"/>
+              <a:t>clustrer</a:t>
+            </a:r>
+            <a:r>
+              <a:rPr lang="it-IT" dirty="0"/>
+              <a:t>. Può essere strutturato come un replica set.</a:t>
+            </a:r>
+          </a:p>
+          <a:p>
+            <a:pPr lvl="1"/>
+            <a:r>
+              <a:rPr lang="it-IT" dirty="0" err="1">
+                <a:solidFill>
+                  <a:schemeClr val="accent2"/>
+                </a:solidFill>
+              </a:rPr>
+              <a:t>Mongos</a:t>
+            </a:r>
+            <a:r>
+              <a:rPr lang="it-IT" dirty="0"/>
+              <a:t>: fa da query router, provvedere all’interfaccia tra l’app client e lo </a:t>
+            </a:r>
+            <a:r>
+              <a:rPr lang="it-IT" dirty="0" err="1"/>
+              <a:t>Sharded</a:t>
+            </a:r>
+            <a:r>
+              <a:rPr lang="it-IT" dirty="0"/>
+              <a:t> Cluster.</a:t>
+            </a:r>
+          </a:p>
+          <a:p>
+            <a:pPr lvl="1"/>
+            <a:r>
+              <a:rPr lang="it-IT" dirty="0" err="1">
+                <a:solidFill>
+                  <a:schemeClr val="accent2"/>
+                </a:solidFill>
+              </a:rPr>
+              <a:t>Config</a:t>
+            </a:r>
+            <a:r>
+              <a:rPr lang="it-IT" dirty="0"/>
+              <a:t> Servers: immagazzina i metadata e le impostazioni di configurazione del cluster. I metadati riflettono lo stato e l’organizzazione di tutti i dati nel cluster. </a:t>
+            </a:r>
           </a:p>
         </p:txBody>
       </p:sp>
@@ -9980,6 +10184,75 @@
     <p:extLst>
       <p:ext uri="{BB962C8B-B14F-4D97-AF65-F5344CB8AC3E}">
         <p14:creationId xmlns:p14="http://schemas.microsoft.com/office/powerpoint/2010/main" val="1959518528"/>
+      </p:ext>
+    </p:extLst>
+  </p:cSld>
+  <p:clrMapOvr>
+    <a:masterClrMapping/>
+  </p:clrMapOvr>
+</p:sld>
+</file>
+
+<file path=ppt/slides/slide19.xml><?xml version="1.0" encoding="utf-8"?>
+<p:sld xmlns:a="http://schemas.openxmlformats.org/drawingml/2006/main" xmlns:r="http://schemas.openxmlformats.org/officeDocument/2006/relationships" xmlns:p="http://schemas.openxmlformats.org/presentationml/2006/main">
+  <p:cSld>
+    <p:spTree>
+      <p:nvGrpSpPr>
+        <p:cNvPr id="1" name=""/>
+        <p:cNvGrpSpPr/>
+        <p:nvPr/>
+      </p:nvGrpSpPr>
+      <p:grpSpPr>
+        <a:xfrm>
+          <a:off x="0" y="0"/>
+          <a:ext cx="0" cy="0"/>
+          <a:chOff x="0" y="0"/>
+          <a:chExt cx="0" cy="0"/>
+        </a:xfrm>
+      </p:grpSpPr>
+      <p:pic>
+        <p:nvPicPr>
+          <p:cNvPr id="5" name="Elemento grafico 4">
+            <a:extLst>
+              <a:ext uri="{FF2B5EF4-FFF2-40B4-BE49-F238E27FC236}">
+                <a16:creationId xmlns:a16="http://schemas.microsoft.com/office/drawing/2014/main" id="{08B218CF-2E6A-4233-88AB-D25F9F90775E}"/>
+              </a:ext>
+            </a:extLst>
+          </p:cNvPr>
+          <p:cNvPicPr>
+            <a:picLocks noChangeAspect="1"/>
+          </p:cNvPicPr>
+          <p:nvPr/>
+        </p:nvPicPr>
+        <p:blipFill>
+          <a:blip r:embed="rId2">
+            <a:extLst>
+              <a:ext uri="{28A0092B-C50C-407E-A947-70E740481C1C}">
+                <a14:useLocalDpi xmlns:a14="http://schemas.microsoft.com/office/drawing/2010/main" val="0"/>
+              </a:ext>
+              <a:ext uri="{96DAC541-7B7A-43D3-8B79-37D633B846F1}">
+                <asvg:svgBlip xmlns:asvg="http://schemas.microsoft.com/office/drawing/2016/SVG/main" r:embed="rId3"/>
+              </a:ext>
+            </a:extLst>
+          </a:blip>
+          <a:stretch>
+            <a:fillRect/>
+          </a:stretch>
+        </p:blipFill>
+        <p:spPr>
+          <a:xfrm>
+            <a:off x="472238" y="238626"/>
+            <a:ext cx="8467225" cy="6008998"/>
+          </a:xfrm>
+          <a:prstGeom prst="rect">
+            <a:avLst/>
+          </a:prstGeom>
+        </p:spPr>
+      </p:pic>
+    </p:spTree>
+    <p:extLst>
+      <p:ext uri="{BB962C8B-B14F-4D97-AF65-F5344CB8AC3E}">
+        <p14:creationId xmlns:p14="http://schemas.microsoft.com/office/powerpoint/2010/main" val="2316479846"/>
       </p:ext>
     </p:extLst>
   </p:cSld>
@@ -10135,6 +10408,168 @@
     <p:extLst>
       <p:ext uri="{BB962C8B-B14F-4D97-AF65-F5344CB8AC3E}">
         <p14:creationId xmlns:p14="http://schemas.microsoft.com/office/powerpoint/2010/main" val="2974307821"/>
+      </p:ext>
+    </p:extLst>
+  </p:cSld>
+  <p:clrMapOvr>
+    <a:masterClrMapping/>
+  </p:clrMapOvr>
+</p:sld>
+</file>
+
+<file path=ppt/slides/slide20.xml><?xml version="1.0" encoding="utf-8"?>
+<p:sld xmlns:a="http://schemas.openxmlformats.org/drawingml/2006/main" xmlns:r="http://schemas.openxmlformats.org/officeDocument/2006/relationships" xmlns:p="http://schemas.openxmlformats.org/presentationml/2006/main">
+  <p:cSld>
+    <p:spTree>
+      <p:nvGrpSpPr>
+        <p:cNvPr id="1" name=""/>
+        <p:cNvGrpSpPr/>
+        <p:nvPr/>
+      </p:nvGrpSpPr>
+      <p:grpSpPr>
+        <a:xfrm>
+          <a:off x="0" y="0"/>
+          <a:ext cx="0" cy="0"/>
+          <a:chOff x="0" y="0"/>
+          <a:chExt cx="0" cy="0"/>
+        </a:xfrm>
+      </p:grpSpPr>
+      <p:sp>
+        <p:nvSpPr>
+          <p:cNvPr id="2" name="Titolo 1">
+            <a:extLst>
+              <a:ext uri="{FF2B5EF4-FFF2-40B4-BE49-F238E27FC236}">
+                <a16:creationId xmlns:a16="http://schemas.microsoft.com/office/drawing/2014/main" id="{194ACF36-30C2-4968-ADB5-018347F7FAB7}"/>
+              </a:ext>
+            </a:extLst>
+          </p:cNvPr>
+          <p:cNvSpPr>
+            <a:spLocks noGrp="1"/>
+          </p:cNvSpPr>
+          <p:nvPr>
+            <p:ph type="title"/>
+          </p:nvPr>
+        </p:nvSpPr>
+        <p:spPr/>
+        <p:txBody>
+          <a:bodyPr/>
+          <a:lstStyle/>
+          <a:p>
+            <a:r>
+              <a:rPr lang="it-IT" dirty="0" err="1"/>
+              <a:t>Shard</a:t>
+            </a:r>
+            <a:r>
+              <a:rPr lang="it-IT" dirty="0"/>
+              <a:t> keys:</a:t>
+            </a:r>
+          </a:p>
+        </p:txBody>
+      </p:sp>
+      <p:sp>
+        <p:nvSpPr>
+          <p:cNvPr id="3" name="Segnaposto contenuto 2">
+            <a:extLst>
+              <a:ext uri="{FF2B5EF4-FFF2-40B4-BE49-F238E27FC236}">
+                <a16:creationId xmlns:a16="http://schemas.microsoft.com/office/drawing/2014/main" id="{E92172EA-4017-44F0-B322-5FD95B1BC964}"/>
+              </a:ext>
+            </a:extLst>
+          </p:cNvPr>
+          <p:cNvSpPr>
+            <a:spLocks noGrp="1"/>
+          </p:cNvSpPr>
+          <p:nvPr>
+            <p:ph idx="1"/>
+          </p:nvPr>
+        </p:nvSpPr>
+        <p:spPr>
+          <a:xfrm>
+            <a:off x="677334" y="1264906"/>
+            <a:ext cx="8596668" cy="1320800"/>
+          </a:xfrm>
+        </p:spPr>
+        <p:txBody>
+          <a:bodyPr>
+            <a:normAutofit fontScale="92500" lnSpcReduction="20000"/>
+          </a:bodyPr>
+          <a:lstStyle/>
+          <a:p>
+            <a:r>
+              <a:rPr lang="it-IT" dirty="0" err="1"/>
+              <a:t>MongoDB</a:t>
+            </a:r>
+            <a:r>
+              <a:rPr lang="it-IT" dirty="0"/>
+              <a:t> organizza i dati a livello di Collection e le distribuisce tra gli </a:t>
+            </a:r>
+            <a:r>
+              <a:rPr lang="it-IT" dirty="0" err="1"/>
+              <a:t>shard</a:t>
+            </a:r>
+            <a:r>
+              <a:rPr lang="it-IT" dirty="0"/>
+              <a:t> nel cluster.</a:t>
+            </a:r>
+          </a:p>
+          <a:p>
+            <a:r>
+              <a:rPr lang="it-IT" dirty="0"/>
+              <a:t>Usa gli </a:t>
+            </a:r>
+            <a:r>
+              <a:rPr lang="it-IT" dirty="0" err="1"/>
+              <a:t>shard</a:t>
+            </a:r>
+            <a:r>
+              <a:rPr lang="it-IT" dirty="0"/>
+              <a:t> key per distribuire le collezioni di documenti. Queste key consistono in un o più campi nei documenti coperti da un indice composto che determina la distribuzione della collezione di documenti lungo il cluster</a:t>
+            </a:r>
+          </a:p>
+        </p:txBody>
+      </p:sp>
+      <p:pic>
+        <p:nvPicPr>
+          <p:cNvPr id="5" name="Elemento grafico 4">
+            <a:extLst>
+              <a:ext uri="{FF2B5EF4-FFF2-40B4-BE49-F238E27FC236}">
+                <a16:creationId xmlns:a16="http://schemas.microsoft.com/office/drawing/2014/main" id="{ED665132-C692-4E34-B9E8-F3760B388987}"/>
+              </a:ext>
+            </a:extLst>
+          </p:cNvPr>
+          <p:cNvPicPr>
+            <a:picLocks noChangeAspect="1"/>
+          </p:cNvPicPr>
+          <p:nvPr/>
+        </p:nvPicPr>
+        <p:blipFill>
+          <a:blip r:embed="rId2">
+            <a:extLst>
+              <a:ext uri="{28A0092B-C50C-407E-A947-70E740481C1C}">
+                <a14:useLocalDpi xmlns:a14="http://schemas.microsoft.com/office/drawing/2010/main" val="0"/>
+              </a:ext>
+              <a:ext uri="{96DAC541-7B7A-43D3-8B79-37D633B846F1}">
+                <asvg:svgBlip xmlns:asvg="http://schemas.microsoft.com/office/drawing/2016/SVG/main" r:embed="rId3"/>
+              </a:ext>
+            </a:extLst>
+          </a:blip>
+          <a:stretch>
+            <a:fillRect/>
+          </a:stretch>
+        </p:blipFill>
+        <p:spPr>
+          <a:xfrm>
+            <a:off x="832253" y="2815809"/>
+            <a:ext cx="7722200" cy="2381250"/>
+          </a:xfrm>
+          <a:prstGeom prst="rect">
+            <a:avLst/>
+          </a:prstGeom>
+        </p:spPr>
+      </p:pic>
+    </p:spTree>
+    <p:extLst>
+      <p:ext uri="{BB962C8B-B14F-4D97-AF65-F5344CB8AC3E}">
+        <p14:creationId xmlns:p14="http://schemas.microsoft.com/office/powerpoint/2010/main" val="2843099999"/>
       </p:ext>
     </p:extLst>
   </p:cSld>

</xml_diff>